<commit_message>
Added Off state in the state machine flowchart
</commit_message>
<xml_diff>
--- a/Pictures/StateMachine.pptx
+++ b/Pictures/StateMachine.pptx
@@ -106,7 +106,7 @@
   </p:defaultTextStyle>
   <p:extLst>
     <p:ext uri="{EFAFB233-063F-42B5-8137-9DF3F51BA10A}">
-      <p15:sldGuideLst xmlns:p15="http://schemas.microsoft.com/office/powerpoint/2012/main"/>
+      <p15:sldGuideLst xmlns="" xmlns:p15="http://schemas.microsoft.com/office/powerpoint/2012/main"/>
     </p:ext>
   </p:extLst>
 </p:presentation>
@@ -134,7 +134,7 @@
           <p:cNvPr id="2" name="Otsikko 1">
             <a:extLst>
               <a:ext uri="{FF2B5EF4-FFF2-40B4-BE49-F238E27FC236}">
-                <a16:creationId xmlns:a16="http://schemas.microsoft.com/office/drawing/2014/main" id="{E983380A-2C93-4627-A7FF-2C98A628820B}"/>
+                <a16:creationId xmlns="" xmlns:a16="http://schemas.microsoft.com/office/drawing/2014/main" id="{E983380A-2C93-4627-A7FF-2C98A628820B}"/>
               </a:ext>
             </a:extLst>
           </p:cNvPr>
@@ -171,7 +171,7 @@
           <p:cNvPr id="3" name="Alaotsikko 2">
             <a:extLst>
               <a:ext uri="{FF2B5EF4-FFF2-40B4-BE49-F238E27FC236}">
-                <a16:creationId xmlns:a16="http://schemas.microsoft.com/office/drawing/2014/main" id="{C0D5825D-C1F6-4257-B8D7-EBCD8CB7B9D5}"/>
+                <a16:creationId xmlns="" xmlns:a16="http://schemas.microsoft.com/office/drawing/2014/main" id="{C0D5825D-C1F6-4257-B8D7-EBCD8CB7B9D5}"/>
               </a:ext>
             </a:extLst>
           </p:cNvPr>
@@ -241,7 +241,7 @@
           <p:cNvPr id="4" name="Päivämäärän paikkamerkki 3">
             <a:extLst>
               <a:ext uri="{FF2B5EF4-FFF2-40B4-BE49-F238E27FC236}">
-                <a16:creationId xmlns:a16="http://schemas.microsoft.com/office/drawing/2014/main" id="{448E2378-B7C8-406C-ADD5-7DA75D584D01}"/>
+                <a16:creationId xmlns="" xmlns:a16="http://schemas.microsoft.com/office/drawing/2014/main" id="{448E2378-B7C8-406C-ADD5-7DA75D584D01}"/>
               </a:ext>
             </a:extLst>
           </p:cNvPr>
@@ -259,7 +259,8 @@
           <a:p>
             <a:fld id="{978E5B9B-AA1C-4837-A679-92CCBB0596D1}" type="datetimeFigureOut">
               <a:rPr lang="fi-FI" smtClean="0"/>
-              <a:t>13.3.2021</a:t>
+              <a:pPr/>
+              <a:t>16.3.2021</a:t>
             </a:fld>
             <a:endParaRPr lang="fi-FI"/>
           </a:p>
@@ -270,7 +271,7 @@
           <p:cNvPr id="5" name="Alatunnisteen paikkamerkki 4">
             <a:extLst>
               <a:ext uri="{FF2B5EF4-FFF2-40B4-BE49-F238E27FC236}">
-                <a16:creationId xmlns:a16="http://schemas.microsoft.com/office/drawing/2014/main" id="{16412164-C220-4619-95E4-E6154E09ACB6}"/>
+                <a16:creationId xmlns="" xmlns:a16="http://schemas.microsoft.com/office/drawing/2014/main" id="{16412164-C220-4619-95E4-E6154E09ACB6}"/>
               </a:ext>
             </a:extLst>
           </p:cNvPr>
@@ -295,7 +296,7 @@
           <p:cNvPr id="6" name="Dian numeron paikkamerkki 5">
             <a:extLst>
               <a:ext uri="{FF2B5EF4-FFF2-40B4-BE49-F238E27FC236}">
-                <a16:creationId xmlns:a16="http://schemas.microsoft.com/office/drawing/2014/main" id="{196593D6-6319-4CFD-BFE7-83BDE86A3EA1}"/>
+                <a16:creationId xmlns="" xmlns:a16="http://schemas.microsoft.com/office/drawing/2014/main" id="{196593D6-6319-4CFD-BFE7-83BDE86A3EA1}"/>
               </a:ext>
             </a:extLst>
           </p:cNvPr>
@@ -313,6 +314,7 @@
           <a:p>
             <a:fld id="{784304D2-DF8B-49B7-9B54-9F8017A67B0D}" type="slidenum">
               <a:rPr lang="fi-FI" smtClean="0"/>
+              <a:pPr/>
               <a:t>‹#›</a:t>
             </a:fld>
             <a:endParaRPr lang="fi-FI"/>
@@ -322,7 +324,7 @@
     </p:spTree>
     <p:extLst>
       <p:ext uri="{BB962C8B-B14F-4D97-AF65-F5344CB8AC3E}">
-        <p14:creationId xmlns:p14="http://schemas.microsoft.com/office/powerpoint/2010/main" val="2143216308"/>
+        <p14:creationId xmlns="" xmlns:p14="http://schemas.microsoft.com/office/powerpoint/2010/main" val="2143216308"/>
       </p:ext>
     </p:extLst>
   </p:cSld>
@@ -354,7 +356,7 @@
           <p:cNvPr id="2" name="Otsikko 1">
             <a:extLst>
               <a:ext uri="{FF2B5EF4-FFF2-40B4-BE49-F238E27FC236}">
-                <a16:creationId xmlns:a16="http://schemas.microsoft.com/office/drawing/2014/main" id="{D7CB1C1C-9D52-43A2-B9FC-4BA04C9E6407}"/>
+                <a16:creationId xmlns="" xmlns:a16="http://schemas.microsoft.com/office/drawing/2014/main" id="{D7CB1C1C-9D52-43A2-B9FC-4BA04C9E6407}"/>
               </a:ext>
             </a:extLst>
           </p:cNvPr>
@@ -382,7 +384,7 @@
           <p:cNvPr id="3" name="Pystysuoran tekstin paikkamerkki 2">
             <a:extLst>
               <a:ext uri="{FF2B5EF4-FFF2-40B4-BE49-F238E27FC236}">
-                <a16:creationId xmlns:a16="http://schemas.microsoft.com/office/drawing/2014/main" id="{60CFB7ED-2D8C-4201-81E9-F569CE9A17C7}"/>
+                <a16:creationId xmlns="" xmlns:a16="http://schemas.microsoft.com/office/drawing/2014/main" id="{60CFB7ED-2D8C-4201-81E9-F569CE9A17C7}"/>
               </a:ext>
             </a:extLst>
           </p:cNvPr>
@@ -439,7 +441,7 @@
           <p:cNvPr id="4" name="Päivämäärän paikkamerkki 3">
             <a:extLst>
               <a:ext uri="{FF2B5EF4-FFF2-40B4-BE49-F238E27FC236}">
-                <a16:creationId xmlns:a16="http://schemas.microsoft.com/office/drawing/2014/main" id="{0ECCF3DC-8399-4665-9649-A0E62AA04849}"/>
+                <a16:creationId xmlns="" xmlns:a16="http://schemas.microsoft.com/office/drawing/2014/main" id="{0ECCF3DC-8399-4665-9649-A0E62AA04849}"/>
               </a:ext>
             </a:extLst>
           </p:cNvPr>
@@ -457,7 +459,8 @@
           <a:p>
             <a:fld id="{978E5B9B-AA1C-4837-A679-92CCBB0596D1}" type="datetimeFigureOut">
               <a:rPr lang="fi-FI" smtClean="0"/>
-              <a:t>13.3.2021</a:t>
+              <a:pPr/>
+              <a:t>16.3.2021</a:t>
             </a:fld>
             <a:endParaRPr lang="fi-FI"/>
           </a:p>
@@ -468,7 +471,7 @@
           <p:cNvPr id="5" name="Alatunnisteen paikkamerkki 4">
             <a:extLst>
               <a:ext uri="{FF2B5EF4-FFF2-40B4-BE49-F238E27FC236}">
-                <a16:creationId xmlns:a16="http://schemas.microsoft.com/office/drawing/2014/main" id="{AFA39FBB-3896-4A1D-BC3C-D9201CB3D085}"/>
+                <a16:creationId xmlns="" xmlns:a16="http://schemas.microsoft.com/office/drawing/2014/main" id="{AFA39FBB-3896-4A1D-BC3C-D9201CB3D085}"/>
               </a:ext>
             </a:extLst>
           </p:cNvPr>
@@ -493,7 +496,7 @@
           <p:cNvPr id="6" name="Dian numeron paikkamerkki 5">
             <a:extLst>
               <a:ext uri="{FF2B5EF4-FFF2-40B4-BE49-F238E27FC236}">
-                <a16:creationId xmlns:a16="http://schemas.microsoft.com/office/drawing/2014/main" id="{0F1973C7-B3D5-40C6-AF0E-9F4115A08C28}"/>
+                <a16:creationId xmlns="" xmlns:a16="http://schemas.microsoft.com/office/drawing/2014/main" id="{0F1973C7-B3D5-40C6-AF0E-9F4115A08C28}"/>
               </a:ext>
             </a:extLst>
           </p:cNvPr>
@@ -511,6 +514,7 @@
           <a:p>
             <a:fld id="{784304D2-DF8B-49B7-9B54-9F8017A67B0D}" type="slidenum">
               <a:rPr lang="fi-FI" smtClean="0"/>
+              <a:pPr/>
               <a:t>‹#›</a:t>
             </a:fld>
             <a:endParaRPr lang="fi-FI"/>
@@ -520,7 +524,7 @@
     </p:spTree>
     <p:extLst>
       <p:ext uri="{BB962C8B-B14F-4D97-AF65-F5344CB8AC3E}">
-        <p14:creationId xmlns:p14="http://schemas.microsoft.com/office/powerpoint/2010/main" val="3555321225"/>
+        <p14:creationId xmlns="" xmlns:p14="http://schemas.microsoft.com/office/powerpoint/2010/main" val="3555321225"/>
       </p:ext>
     </p:extLst>
   </p:cSld>
@@ -552,7 +556,7 @@
           <p:cNvPr id="2" name="Pystysuora otsikko 1">
             <a:extLst>
               <a:ext uri="{FF2B5EF4-FFF2-40B4-BE49-F238E27FC236}">
-                <a16:creationId xmlns:a16="http://schemas.microsoft.com/office/drawing/2014/main" id="{684506DD-5BA4-4F30-941F-4E22D4BC27B8}"/>
+                <a16:creationId xmlns="" xmlns:a16="http://schemas.microsoft.com/office/drawing/2014/main" id="{684506DD-5BA4-4F30-941F-4E22D4BC27B8}"/>
               </a:ext>
             </a:extLst>
           </p:cNvPr>
@@ -585,7 +589,7 @@
           <p:cNvPr id="3" name="Pystysuoran tekstin paikkamerkki 2">
             <a:extLst>
               <a:ext uri="{FF2B5EF4-FFF2-40B4-BE49-F238E27FC236}">
-                <a16:creationId xmlns:a16="http://schemas.microsoft.com/office/drawing/2014/main" id="{9B35C9CE-91D9-450C-9D18-65633952E7C1}"/>
+                <a16:creationId xmlns="" xmlns:a16="http://schemas.microsoft.com/office/drawing/2014/main" id="{9B35C9CE-91D9-450C-9D18-65633952E7C1}"/>
               </a:ext>
             </a:extLst>
           </p:cNvPr>
@@ -647,7 +651,7 @@
           <p:cNvPr id="4" name="Päivämäärän paikkamerkki 3">
             <a:extLst>
               <a:ext uri="{FF2B5EF4-FFF2-40B4-BE49-F238E27FC236}">
-                <a16:creationId xmlns:a16="http://schemas.microsoft.com/office/drawing/2014/main" id="{3EE242D7-B75B-462D-B448-790ABCEC68A6}"/>
+                <a16:creationId xmlns="" xmlns:a16="http://schemas.microsoft.com/office/drawing/2014/main" id="{3EE242D7-B75B-462D-B448-790ABCEC68A6}"/>
               </a:ext>
             </a:extLst>
           </p:cNvPr>
@@ -665,7 +669,8 @@
           <a:p>
             <a:fld id="{978E5B9B-AA1C-4837-A679-92CCBB0596D1}" type="datetimeFigureOut">
               <a:rPr lang="fi-FI" smtClean="0"/>
-              <a:t>13.3.2021</a:t>
+              <a:pPr/>
+              <a:t>16.3.2021</a:t>
             </a:fld>
             <a:endParaRPr lang="fi-FI"/>
           </a:p>
@@ -676,7 +681,7 @@
           <p:cNvPr id="5" name="Alatunnisteen paikkamerkki 4">
             <a:extLst>
               <a:ext uri="{FF2B5EF4-FFF2-40B4-BE49-F238E27FC236}">
-                <a16:creationId xmlns:a16="http://schemas.microsoft.com/office/drawing/2014/main" id="{B1B9A095-BC9E-4C65-86B7-83B45445FBB5}"/>
+                <a16:creationId xmlns="" xmlns:a16="http://schemas.microsoft.com/office/drawing/2014/main" id="{B1B9A095-BC9E-4C65-86B7-83B45445FBB5}"/>
               </a:ext>
             </a:extLst>
           </p:cNvPr>
@@ -701,7 +706,7 @@
           <p:cNvPr id="6" name="Dian numeron paikkamerkki 5">
             <a:extLst>
               <a:ext uri="{FF2B5EF4-FFF2-40B4-BE49-F238E27FC236}">
-                <a16:creationId xmlns:a16="http://schemas.microsoft.com/office/drawing/2014/main" id="{DFE8704E-160F-4BCC-8202-356603BD2CEC}"/>
+                <a16:creationId xmlns="" xmlns:a16="http://schemas.microsoft.com/office/drawing/2014/main" id="{DFE8704E-160F-4BCC-8202-356603BD2CEC}"/>
               </a:ext>
             </a:extLst>
           </p:cNvPr>
@@ -719,6 +724,7 @@
           <a:p>
             <a:fld id="{784304D2-DF8B-49B7-9B54-9F8017A67B0D}" type="slidenum">
               <a:rPr lang="fi-FI" smtClean="0"/>
+              <a:pPr/>
               <a:t>‹#›</a:t>
             </a:fld>
             <a:endParaRPr lang="fi-FI"/>
@@ -728,7 +734,7 @@
     </p:spTree>
     <p:extLst>
       <p:ext uri="{BB962C8B-B14F-4D97-AF65-F5344CB8AC3E}">
-        <p14:creationId xmlns:p14="http://schemas.microsoft.com/office/powerpoint/2010/main" val="833568155"/>
+        <p14:creationId xmlns="" xmlns:p14="http://schemas.microsoft.com/office/powerpoint/2010/main" val="833568155"/>
       </p:ext>
     </p:extLst>
   </p:cSld>
@@ -760,7 +766,7 @@
           <p:cNvPr id="2" name="Otsikko 1">
             <a:extLst>
               <a:ext uri="{FF2B5EF4-FFF2-40B4-BE49-F238E27FC236}">
-                <a16:creationId xmlns:a16="http://schemas.microsoft.com/office/drawing/2014/main" id="{33E9EC22-552B-485C-A387-01442440CF5A}"/>
+                <a16:creationId xmlns="" xmlns:a16="http://schemas.microsoft.com/office/drawing/2014/main" id="{33E9EC22-552B-485C-A387-01442440CF5A}"/>
               </a:ext>
             </a:extLst>
           </p:cNvPr>
@@ -788,7 +794,7 @@
           <p:cNvPr id="3" name="Sisällön paikkamerkki 2">
             <a:extLst>
               <a:ext uri="{FF2B5EF4-FFF2-40B4-BE49-F238E27FC236}">
-                <a16:creationId xmlns:a16="http://schemas.microsoft.com/office/drawing/2014/main" id="{8B0C1ACF-B48D-4596-82DC-BDFB7E16D8C0}"/>
+                <a16:creationId xmlns="" xmlns:a16="http://schemas.microsoft.com/office/drawing/2014/main" id="{8B0C1ACF-B48D-4596-82DC-BDFB7E16D8C0}"/>
               </a:ext>
             </a:extLst>
           </p:cNvPr>
@@ -845,7 +851,7 @@
           <p:cNvPr id="4" name="Päivämäärän paikkamerkki 3">
             <a:extLst>
               <a:ext uri="{FF2B5EF4-FFF2-40B4-BE49-F238E27FC236}">
-                <a16:creationId xmlns:a16="http://schemas.microsoft.com/office/drawing/2014/main" id="{CDBCA2F5-1BE7-47BA-9F4A-CBFF4174A314}"/>
+                <a16:creationId xmlns="" xmlns:a16="http://schemas.microsoft.com/office/drawing/2014/main" id="{CDBCA2F5-1BE7-47BA-9F4A-CBFF4174A314}"/>
               </a:ext>
             </a:extLst>
           </p:cNvPr>
@@ -863,7 +869,8 @@
           <a:p>
             <a:fld id="{978E5B9B-AA1C-4837-A679-92CCBB0596D1}" type="datetimeFigureOut">
               <a:rPr lang="fi-FI" smtClean="0"/>
-              <a:t>13.3.2021</a:t>
+              <a:pPr/>
+              <a:t>16.3.2021</a:t>
             </a:fld>
             <a:endParaRPr lang="fi-FI"/>
           </a:p>
@@ -874,7 +881,7 @@
           <p:cNvPr id="5" name="Alatunnisteen paikkamerkki 4">
             <a:extLst>
               <a:ext uri="{FF2B5EF4-FFF2-40B4-BE49-F238E27FC236}">
-                <a16:creationId xmlns:a16="http://schemas.microsoft.com/office/drawing/2014/main" id="{ECB84B2A-A93E-4D7B-A1B4-DB3ABBC134A4}"/>
+                <a16:creationId xmlns="" xmlns:a16="http://schemas.microsoft.com/office/drawing/2014/main" id="{ECB84B2A-A93E-4D7B-A1B4-DB3ABBC134A4}"/>
               </a:ext>
             </a:extLst>
           </p:cNvPr>
@@ -899,7 +906,7 @@
           <p:cNvPr id="6" name="Dian numeron paikkamerkki 5">
             <a:extLst>
               <a:ext uri="{FF2B5EF4-FFF2-40B4-BE49-F238E27FC236}">
-                <a16:creationId xmlns:a16="http://schemas.microsoft.com/office/drawing/2014/main" id="{CB02ACE8-2F12-4C16-9F22-E1A80412358C}"/>
+                <a16:creationId xmlns="" xmlns:a16="http://schemas.microsoft.com/office/drawing/2014/main" id="{CB02ACE8-2F12-4C16-9F22-E1A80412358C}"/>
               </a:ext>
             </a:extLst>
           </p:cNvPr>
@@ -917,6 +924,7 @@
           <a:p>
             <a:fld id="{784304D2-DF8B-49B7-9B54-9F8017A67B0D}" type="slidenum">
               <a:rPr lang="fi-FI" smtClean="0"/>
+              <a:pPr/>
               <a:t>‹#›</a:t>
             </a:fld>
             <a:endParaRPr lang="fi-FI"/>
@@ -926,7 +934,7 @@
     </p:spTree>
     <p:extLst>
       <p:ext uri="{BB962C8B-B14F-4D97-AF65-F5344CB8AC3E}">
-        <p14:creationId xmlns:p14="http://schemas.microsoft.com/office/powerpoint/2010/main" val="2633283370"/>
+        <p14:creationId xmlns="" xmlns:p14="http://schemas.microsoft.com/office/powerpoint/2010/main" val="2633283370"/>
       </p:ext>
     </p:extLst>
   </p:cSld>
@@ -958,7 +966,7 @@
           <p:cNvPr id="2" name="Otsikko 1">
             <a:extLst>
               <a:ext uri="{FF2B5EF4-FFF2-40B4-BE49-F238E27FC236}">
-                <a16:creationId xmlns:a16="http://schemas.microsoft.com/office/drawing/2014/main" id="{517905B5-6D55-473F-B728-04B583B896A5}"/>
+                <a16:creationId xmlns="" xmlns:a16="http://schemas.microsoft.com/office/drawing/2014/main" id="{517905B5-6D55-473F-B728-04B583B896A5}"/>
               </a:ext>
             </a:extLst>
           </p:cNvPr>
@@ -995,7 +1003,7 @@
           <p:cNvPr id="3" name="Tekstin paikkamerkki 2">
             <a:extLst>
               <a:ext uri="{FF2B5EF4-FFF2-40B4-BE49-F238E27FC236}">
-                <a16:creationId xmlns:a16="http://schemas.microsoft.com/office/drawing/2014/main" id="{7290D0AC-51E6-41A5-9732-4815C0913AA9}"/>
+                <a16:creationId xmlns="" xmlns:a16="http://schemas.microsoft.com/office/drawing/2014/main" id="{7290D0AC-51E6-41A5-9732-4815C0913AA9}"/>
               </a:ext>
             </a:extLst>
           </p:cNvPr>
@@ -1120,7 +1128,7 @@
           <p:cNvPr id="4" name="Päivämäärän paikkamerkki 3">
             <a:extLst>
               <a:ext uri="{FF2B5EF4-FFF2-40B4-BE49-F238E27FC236}">
-                <a16:creationId xmlns:a16="http://schemas.microsoft.com/office/drawing/2014/main" id="{EE214F55-8812-44E4-86FA-9B8B2883FA47}"/>
+                <a16:creationId xmlns="" xmlns:a16="http://schemas.microsoft.com/office/drawing/2014/main" id="{EE214F55-8812-44E4-86FA-9B8B2883FA47}"/>
               </a:ext>
             </a:extLst>
           </p:cNvPr>
@@ -1138,7 +1146,8 @@
           <a:p>
             <a:fld id="{978E5B9B-AA1C-4837-A679-92CCBB0596D1}" type="datetimeFigureOut">
               <a:rPr lang="fi-FI" smtClean="0"/>
-              <a:t>13.3.2021</a:t>
+              <a:pPr/>
+              <a:t>16.3.2021</a:t>
             </a:fld>
             <a:endParaRPr lang="fi-FI"/>
           </a:p>
@@ -1149,7 +1158,7 @@
           <p:cNvPr id="5" name="Alatunnisteen paikkamerkki 4">
             <a:extLst>
               <a:ext uri="{FF2B5EF4-FFF2-40B4-BE49-F238E27FC236}">
-                <a16:creationId xmlns:a16="http://schemas.microsoft.com/office/drawing/2014/main" id="{F2746287-314B-4AB5-8824-1FE1A8BC28F2}"/>
+                <a16:creationId xmlns="" xmlns:a16="http://schemas.microsoft.com/office/drawing/2014/main" id="{F2746287-314B-4AB5-8824-1FE1A8BC28F2}"/>
               </a:ext>
             </a:extLst>
           </p:cNvPr>
@@ -1174,7 +1183,7 @@
           <p:cNvPr id="6" name="Dian numeron paikkamerkki 5">
             <a:extLst>
               <a:ext uri="{FF2B5EF4-FFF2-40B4-BE49-F238E27FC236}">
-                <a16:creationId xmlns:a16="http://schemas.microsoft.com/office/drawing/2014/main" id="{BBC829C2-9102-4BB9-8FA7-34D1B2096A8D}"/>
+                <a16:creationId xmlns="" xmlns:a16="http://schemas.microsoft.com/office/drawing/2014/main" id="{BBC829C2-9102-4BB9-8FA7-34D1B2096A8D}"/>
               </a:ext>
             </a:extLst>
           </p:cNvPr>
@@ -1192,6 +1201,7 @@
           <a:p>
             <a:fld id="{784304D2-DF8B-49B7-9B54-9F8017A67B0D}" type="slidenum">
               <a:rPr lang="fi-FI" smtClean="0"/>
+              <a:pPr/>
               <a:t>‹#›</a:t>
             </a:fld>
             <a:endParaRPr lang="fi-FI"/>
@@ -1201,7 +1211,7 @@
     </p:spTree>
     <p:extLst>
       <p:ext uri="{BB962C8B-B14F-4D97-AF65-F5344CB8AC3E}">
-        <p14:creationId xmlns:p14="http://schemas.microsoft.com/office/powerpoint/2010/main" val="3068268997"/>
+        <p14:creationId xmlns="" xmlns:p14="http://schemas.microsoft.com/office/powerpoint/2010/main" val="3068268997"/>
       </p:ext>
     </p:extLst>
   </p:cSld>
@@ -1233,7 +1243,7 @@
           <p:cNvPr id="2" name="Otsikko 1">
             <a:extLst>
               <a:ext uri="{FF2B5EF4-FFF2-40B4-BE49-F238E27FC236}">
-                <a16:creationId xmlns:a16="http://schemas.microsoft.com/office/drawing/2014/main" id="{015BFC9C-B785-47DE-9480-EFED7B0D07C9}"/>
+                <a16:creationId xmlns="" xmlns:a16="http://schemas.microsoft.com/office/drawing/2014/main" id="{015BFC9C-B785-47DE-9480-EFED7B0D07C9}"/>
               </a:ext>
             </a:extLst>
           </p:cNvPr>
@@ -1261,7 +1271,7 @@
           <p:cNvPr id="3" name="Sisällön paikkamerkki 2">
             <a:extLst>
               <a:ext uri="{FF2B5EF4-FFF2-40B4-BE49-F238E27FC236}">
-                <a16:creationId xmlns:a16="http://schemas.microsoft.com/office/drawing/2014/main" id="{3FC677EF-259E-4504-8027-99C356AFF193}"/>
+                <a16:creationId xmlns="" xmlns:a16="http://schemas.microsoft.com/office/drawing/2014/main" id="{3FC677EF-259E-4504-8027-99C356AFF193}"/>
               </a:ext>
             </a:extLst>
           </p:cNvPr>
@@ -1323,7 +1333,7 @@
           <p:cNvPr id="4" name="Sisällön paikkamerkki 3">
             <a:extLst>
               <a:ext uri="{FF2B5EF4-FFF2-40B4-BE49-F238E27FC236}">
-                <a16:creationId xmlns:a16="http://schemas.microsoft.com/office/drawing/2014/main" id="{61629DEA-E5B4-4895-A3B2-EA317B123ADA}"/>
+                <a16:creationId xmlns="" xmlns:a16="http://schemas.microsoft.com/office/drawing/2014/main" id="{61629DEA-E5B4-4895-A3B2-EA317B123ADA}"/>
               </a:ext>
             </a:extLst>
           </p:cNvPr>
@@ -1385,7 +1395,7 @@
           <p:cNvPr id="5" name="Päivämäärän paikkamerkki 4">
             <a:extLst>
               <a:ext uri="{FF2B5EF4-FFF2-40B4-BE49-F238E27FC236}">
-                <a16:creationId xmlns:a16="http://schemas.microsoft.com/office/drawing/2014/main" id="{4FD3810E-C958-4CB2-92C7-76795EDA4B5C}"/>
+                <a16:creationId xmlns="" xmlns:a16="http://schemas.microsoft.com/office/drawing/2014/main" id="{4FD3810E-C958-4CB2-92C7-76795EDA4B5C}"/>
               </a:ext>
             </a:extLst>
           </p:cNvPr>
@@ -1403,7 +1413,8 @@
           <a:p>
             <a:fld id="{978E5B9B-AA1C-4837-A679-92CCBB0596D1}" type="datetimeFigureOut">
               <a:rPr lang="fi-FI" smtClean="0"/>
-              <a:t>13.3.2021</a:t>
+              <a:pPr/>
+              <a:t>16.3.2021</a:t>
             </a:fld>
             <a:endParaRPr lang="fi-FI"/>
           </a:p>
@@ -1414,7 +1425,7 @@
           <p:cNvPr id="6" name="Alatunnisteen paikkamerkki 5">
             <a:extLst>
               <a:ext uri="{FF2B5EF4-FFF2-40B4-BE49-F238E27FC236}">
-                <a16:creationId xmlns:a16="http://schemas.microsoft.com/office/drawing/2014/main" id="{51A02365-67F2-4EA6-82B9-934B2BD1E8C2}"/>
+                <a16:creationId xmlns="" xmlns:a16="http://schemas.microsoft.com/office/drawing/2014/main" id="{51A02365-67F2-4EA6-82B9-934B2BD1E8C2}"/>
               </a:ext>
             </a:extLst>
           </p:cNvPr>
@@ -1439,7 +1450,7 @@
           <p:cNvPr id="7" name="Dian numeron paikkamerkki 6">
             <a:extLst>
               <a:ext uri="{FF2B5EF4-FFF2-40B4-BE49-F238E27FC236}">
-                <a16:creationId xmlns:a16="http://schemas.microsoft.com/office/drawing/2014/main" id="{99C5B4AC-35D9-4AAC-99CC-B0642C207416}"/>
+                <a16:creationId xmlns="" xmlns:a16="http://schemas.microsoft.com/office/drawing/2014/main" id="{99C5B4AC-35D9-4AAC-99CC-B0642C207416}"/>
               </a:ext>
             </a:extLst>
           </p:cNvPr>
@@ -1457,6 +1468,7 @@
           <a:p>
             <a:fld id="{784304D2-DF8B-49B7-9B54-9F8017A67B0D}" type="slidenum">
               <a:rPr lang="fi-FI" smtClean="0"/>
+              <a:pPr/>
               <a:t>‹#›</a:t>
             </a:fld>
             <a:endParaRPr lang="fi-FI"/>
@@ -1466,7 +1478,7 @@
     </p:spTree>
     <p:extLst>
       <p:ext uri="{BB962C8B-B14F-4D97-AF65-F5344CB8AC3E}">
-        <p14:creationId xmlns:p14="http://schemas.microsoft.com/office/powerpoint/2010/main" val="942935185"/>
+        <p14:creationId xmlns="" xmlns:p14="http://schemas.microsoft.com/office/powerpoint/2010/main" val="942935185"/>
       </p:ext>
     </p:extLst>
   </p:cSld>
@@ -1498,7 +1510,7 @@
           <p:cNvPr id="2" name="Otsikko 1">
             <a:extLst>
               <a:ext uri="{FF2B5EF4-FFF2-40B4-BE49-F238E27FC236}">
-                <a16:creationId xmlns:a16="http://schemas.microsoft.com/office/drawing/2014/main" id="{609BE095-C86D-4E28-AAB0-B88191969063}"/>
+                <a16:creationId xmlns="" xmlns:a16="http://schemas.microsoft.com/office/drawing/2014/main" id="{609BE095-C86D-4E28-AAB0-B88191969063}"/>
               </a:ext>
             </a:extLst>
           </p:cNvPr>
@@ -1531,7 +1543,7 @@
           <p:cNvPr id="3" name="Tekstin paikkamerkki 2">
             <a:extLst>
               <a:ext uri="{FF2B5EF4-FFF2-40B4-BE49-F238E27FC236}">
-                <a16:creationId xmlns:a16="http://schemas.microsoft.com/office/drawing/2014/main" id="{E443448A-1661-4F07-9502-A19E32A367E1}"/>
+                <a16:creationId xmlns="" xmlns:a16="http://schemas.microsoft.com/office/drawing/2014/main" id="{E443448A-1661-4F07-9502-A19E32A367E1}"/>
               </a:ext>
             </a:extLst>
           </p:cNvPr>
@@ -1602,7 +1614,7 @@
           <p:cNvPr id="4" name="Sisällön paikkamerkki 3">
             <a:extLst>
               <a:ext uri="{FF2B5EF4-FFF2-40B4-BE49-F238E27FC236}">
-                <a16:creationId xmlns:a16="http://schemas.microsoft.com/office/drawing/2014/main" id="{39CE3B77-FF2C-435A-8E34-894658D39AE6}"/>
+                <a16:creationId xmlns="" xmlns:a16="http://schemas.microsoft.com/office/drawing/2014/main" id="{39CE3B77-FF2C-435A-8E34-894658D39AE6}"/>
               </a:ext>
             </a:extLst>
           </p:cNvPr>
@@ -1664,7 +1676,7 @@
           <p:cNvPr id="5" name="Tekstin paikkamerkki 4">
             <a:extLst>
               <a:ext uri="{FF2B5EF4-FFF2-40B4-BE49-F238E27FC236}">
-                <a16:creationId xmlns:a16="http://schemas.microsoft.com/office/drawing/2014/main" id="{9327D033-B4BC-4586-BA7F-44F76414D274}"/>
+                <a16:creationId xmlns="" xmlns:a16="http://schemas.microsoft.com/office/drawing/2014/main" id="{9327D033-B4BC-4586-BA7F-44F76414D274}"/>
               </a:ext>
             </a:extLst>
           </p:cNvPr>
@@ -1735,7 +1747,7 @@
           <p:cNvPr id="6" name="Sisällön paikkamerkki 5">
             <a:extLst>
               <a:ext uri="{FF2B5EF4-FFF2-40B4-BE49-F238E27FC236}">
-                <a16:creationId xmlns:a16="http://schemas.microsoft.com/office/drawing/2014/main" id="{E9A0C292-6C7E-4266-ADB4-38C7E81D44D1}"/>
+                <a16:creationId xmlns="" xmlns:a16="http://schemas.microsoft.com/office/drawing/2014/main" id="{E9A0C292-6C7E-4266-ADB4-38C7E81D44D1}"/>
               </a:ext>
             </a:extLst>
           </p:cNvPr>
@@ -1797,7 +1809,7 @@
           <p:cNvPr id="7" name="Päivämäärän paikkamerkki 6">
             <a:extLst>
               <a:ext uri="{FF2B5EF4-FFF2-40B4-BE49-F238E27FC236}">
-                <a16:creationId xmlns:a16="http://schemas.microsoft.com/office/drawing/2014/main" id="{B7E01BE9-E38A-4F80-A485-120C2BFB983F}"/>
+                <a16:creationId xmlns="" xmlns:a16="http://schemas.microsoft.com/office/drawing/2014/main" id="{B7E01BE9-E38A-4F80-A485-120C2BFB983F}"/>
               </a:ext>
             </a:extLst>
           </p:cNvPr>
@@ -1815,7 +1827,8 @@
           <a:p>
             <a:fld id="{978E5B9B-AA1C-4837-A679-92CCBB0596D1}" type="datetimeFigureOut">
               <a:rPr lang="fi-FI" smtClean="0"/>
-              <a:t>13.3.2021</a:t>
+              <a:pPr/>
+              <a:t>16.3.2021</a:t>
             </a:fld>
             <a:endParaRPr lang="fi-FI"/>
           </a:p>
@@ -1826,7 +1839,7 @@
           <p:cNvPr id="8" name="Alatunnisteen paikkamerkki 7">
             <a:extLst>
               <a:ext uri="{FF2B5EF4-FFF2-40B4-BE49-F238E27FC236}">
-                <a16:creationId xmlns:a16="http://schemas.microsoft.com/office/drawing/2014/main" id="{16FF1AC1-FA04-46D3-90C5-C6DFB264C039}"/>
+                <a16:creationId xmlns="" xmlns:a16="http://schemas.microsoft.com/office/drawing/2014/main" id="{16FF1AC1-FA04-46D3-90C5-C6DFB264C039}"/>
               </a:ext>
             </a:extLst>
           </p:cNvPr>
@@ -1851,7 +1864,7 @@
           <p:cNvPr id="9" name="Dian numeron paikkamerkki 8">
             <a:extLst>
               <a:ext uri="{FF2B5EF4-FFF2-40B4-BE49-F238E27FC236}">
-                <a16:creationId xmlns:a16="http://schemas.microsoft.com/office/drawing/2014/main" id="{B434B465-A96E-4EBE-84C2-C4397F5A6D7B}"/>
+                <a16:creationId xmlns="" xmlns:a16="http://schemas.microsoft.com/office/drawing/2014/main" id="{B434B465-A96E-4EBE-84C2-C4397F5A6D7B}"/>
               </a:ext>
             </a:extLst>
           </p:cNvPr>
@@ -1869,6 +1882,7 @@
           <a:p>
             <a:fld id="{784304D2-DF8B-49B7-9B54-9F8017A67B0D}" type="slidenum">
               <a:rPr lang="fi-FI" smtClean="0"/>
+              <a:pPr/>
               <a:t>‹#›</a:t>
             </a:fld>
             <a:endParaRPr lang="fi-FI"/>
@@ -1878,7 +1892,7 @@
     </p:spTree>
     <p:extLst>
       <p:ext uri="{BB962C8B-B14F-4D97-AF65-F5344CB8AC3E}">
-        <p14:creationId xmlns:p14="http://schemas.microsoft.com/office/powerpoint/2010/main" val="957973266"/>
+        <p14:creationId xmlns="" xmlns:p14="http://schemas.microsoft.com/office/powerpoint/2010/main" val="957973266"/>
       </p:ext>
     </p:extLst>
   </p:cSld>
@@ -1910,7 +1924,7 @@
           <p:cNvPr id="2" name="Otsikko 1">
             <a:extLst>
               <a:ext uri="{FF2B5EF4-FFF2-40B4-BE49-F238E27FC236}">
-                <a16:creationId xmlns:a16="http://schemas.microsoft.com/office/drawing/2014/main" id="{633F33DD-3C4B-4EF8-A703-9C82DCB2BF9B}"/>
+                <a16:creationId xmlns="" xmlns:a16="http://schemas.microsoft.com/office/drawing/2014/main" id="{633F33DD-3C4B-4EF8-A703-9C82DCB2BF9B}"/>
               </a:ext>
             </a:extLst>
           </p:cNvPr>
@@ -1938,7 +1952,7 @@
           <p:cNvPr id="3" name="Päivämäärän paikkamerkki 2">
             <a:extLst>
               <a:ext uri="{FF2B5EF4-FFF2-40B4-BE49-F238E27FC236}">
-                <a16:creationId xmlns:a16="http://schemas.microsoft.com/office/drawing/2014/main" id="{7D765B99-C505-4601-A09B-549514CF5C75}"/>
+                <a16:creationId xmlns="" xmlns:a16="http://schemas.microsoft.com/office/drawing/2014/main" id="{7D765B99-C505-4601-A09B-549514CF5C75}"/>
               </a:ext>
             </a:extLst>
           </p:cNvPr>
@@ -1956,7 +1970,8 @@
           <a:p>
             <a:fld id="{978E5B9B-AA1C-4837-A679-92CCBB0596D1}" type="datetimeFigureOut">
               <a:rPr lang="fi-FI" smtClean="0"/>
-              <a:t>13.3.2021</a:t>
+              <a:pPr/>
+              <a:t>16.3.2021</a:t>
             </a:fld>
             <a:endParaRPr lang="fi-FI"/>
           </a:p>
@@ -1967,7 +1982,7 @@
           <p:cNvPr id="4" name="Alatunnisteen paikkamerkki 3">
             <a:extLst>
               <a:ext uri="{FF2B5EF4-FFF2-40B4-BE49-F238E27FC236}">
-                <a16:creationId xmlns:a16="http://schemas.microsoft.com/office/drawing/2014/main" id="{F9091152-1DCD-43DB-9328-A17656ACC5C0}"/>
+                <a16:creationId xmlns="" xmlns:a16="http://schemas.microsoft.com/office/drawing/2014/main" id="{F9091152-1DCD-43DB-9328-A17656ACC5C0}"/>
               </a:ext>
             </a:extLst>
           </p:cNvPr>
@@ -1992,7 +2007,7 @@
           <p:cNvPr id="5" name="Dian numeron paikkamerkki 4">
             <a:extLst>
               <a:ext uri="{FF2B5EF4-FFF2-40B4-BE49-F238E27FC236}">
-                <a16:creationId xmlns:a16="http://schemas.microsoft.com/office/drawing/2014/main" id="{CC8BC656-C8B6-4D0C-B370-AE5070A804E5}"/>
+                <a16:creationId xmlns="" xmlns:a16="http://schemas.microsoft.com/office/drawing/2014/main" id="{CC8BC656-C8B6-4D0C-B370-AE5070A804E5}"/>
               </a:ext>
             </a:extLst>
           </p:cNvPr>
@@ -2010,6 +2025,7 @@
           <a:p>
             <a:fld id="{784304D2-DF8B-49B7-9B54-9F8017A67B0D}" type="slidenum">
               <a:rPr lang="fi-FI" smtClean="0"/>
+              <a:pPr/>
               <a:t>‹#›</a:t>
             </a:fld>
             <a:endParaRPr lang="fi-FI"/>
@@ -2019,7 +2035,7 @@
     </p:spTree>
     <p:extLst>
       <p:ext uri="{BB962C8B-B14F-4D97-AF65-F5344CB8AC3E}">
-        <p14:creationId xmlns:p14="http://schemas.microsoft.com/office/powerpoint/2010/main" val="1569995312"/>
+        <p14:creationId xmlns="" xmlns:p14="http://schemas.microsoft.com/office/powerpoint/2010/main" val="1569995312"/>
       </p:ext>
     </p:extLst>
   </p:cSld>
@@ -2051,7 +2067,7 @@
           <p:cNvPr id="2" name="Päivämäärän paikkamerkki 1">
             <a:extLst>
               <a:ext uri="{FF2B5EF4-FFF2-40B4-BE49-F238E27FC236}">
-                <a16:creationId xmlns:a16="http://schemas.microsoft.com/office/drawing/2014/main" id="{F71A13CB-6D93-4422-BF1F-3449FA2B57F1}"/>
+                <a16:creationId xmlns="" xmlns:a16="http://schemas.microsoft.com/office/drawing/2014/main" id="{F71A13CB-6D93-4422-BF1F-3449FA2B57F1}"/>
               </a:ext>
             </a:extLst>
           </p:cNvPr>
@@ -2069,7 +2085,8 @@
           <a:p>
             <a:fld id="{978E5B9B-AA1C-4837-A679-92CCBB0596D1}" type="datetimeFigureOut">
               <a:rPr lang="fi-FI" smtClean="0"/>
-              <a:t>13.3.2021</a:t>
+              <a:pPr/>
+              <a:t>16.3.2021</a:t>
             </a:fld>
             <a:endParaRPr lang="fi-FI"/>
           </a:p>
@@ -2080,7 +2097,7 @@
           <p:cNvPr id="3" name="Alatunnisteen paikkamerkki 2">
             <a:extLst>
               <a:ext uri="{FF2B5EF4-FFF2-40B4-BE49-F238E27FC236}">
-                <a16:creationId xmlns:a16="http://schemas.microsoft.com/office/drawing/2014/main" id="{16CE53C6-5B70-4270-BF9B-50F3F3A824B8}"/>
+                <a16:creationId xmlns="" xmlns:a16="http://schemas.microsoft.com/office/drawing/2014/main" id="{16CE53C6-5B70-4270-BF9B-50F3F3A824B8}"/>
               </a:ext>
             </a:extLst>
           </p:cNvPr>
@@ -2105,7 +2122,7 @@
           <p:cNvPr id="4" name="Dian numeron paikkamerkki 3">
             <a:extLst>
               <a:ext uri="{FF2B5EF4-FFF2-40B4-BE49-F238E27FC236}">
-                <a16:creationId xmlns:a16="http://schemas.microsoft.com/office/drawing/2014/main" id="{3A5CB582-6E3C-4EDB-B945-8FEA50B51AD2}"/>
+                <a16:creationId xmlns="" xmlns:a16="http://schemas.microsoft.com/office/drawing/2014/main" id="{3A5CB582-6E3C-4EDB-B945-8FEA50B51AD2}"/>
               </a:ext>
             </a:extLst>
           </p:cNvPr>
@@ -2123,6 +2140,7 @@
           <a:p>
             <a:fld id="{784304D2-DF8B-49B7-9B54-9F8017A67B0D}" type="slidenum">
               <a:rPr lang="fi-FI" smtClean="0"/>
+              <a:pPr/>
               <a:t>‹#›</a:t>
             </a:fld>
             <a:endParaRPr lang="fi-FI"/>
@@ -2132,7 +2150,7 @@
     </p:spTree>
     <p:extLst>
       <p:ext uri="{BB962C8B-B14F-4D97-AF65-F5344CB8AC3E}">
-        <p14:creationId xmlns:p14="http://schemas.microsoft.com/office/powerpoint/2010/main" val="1361461699"/>
+        <p14:creationId xmlns="" xmlns:p14="http://schemas.microsoft.com/office/powerpoint/2010/main" val="1361461699"/>
       </p:ext>
     </p:extLst>
   </p:cSld>
@@ -2164,7 +2182,7 @@
           <p:cNvPr id="2" name="Otsikko 1">
             <a:extLst>
               <a:ext uri="{FF2B5EF4-FFF2-40B4-BE49-F238E27FC236}">
-                <a16:creationId xmlns:a16="http://schemas.microsoft.com/office/drawing/2014/main" id="{31541142-D9E2-43DE-A459-1E9EF87A8111}"/>
+                <a16:creationId xmlns="" xmlns:a16="http://schemas.microsoft.com/office/drawing/2014/main" id="{31541142-D9E2-43DE-A459-1E9EF87A8111}"/>
               </a:ext>
             </a:extLst>
           </p:cNvPr>
@@ -2201,7 +2219,7 @@
           <p:cNvPr id="3" name="Sisällön paikkamerkki 2">
             <a:extLst>
               <a:ext uri="{FF2B5EF4-FFF2-40B4-BE49-F238E27FC236}">
-                <a16:creationId xmlns:a16="http://schemas.microsoft.com/office/drawing/2014/main" id="{08AD3E29-7066-4B98-A8FD-F6DE134FF548}"/>
+                <a16:creationId xmlns="" xmlns:a16="http://schemas.microsoft.com/office/drawing/2014/main" id="{08AD3E29-7066-4B98-A8FD-F6DE134FF548}"/>
               </a:ext>
             </a:extLst>
           </p:cNvPr>
@@ -2291,7 +2309,7 @@
           <p:cNvPr id="4" name="Tekstin paikkamerkki 3">
             <a:extLst>
               <a:ext uri="{FF2B5EF4-FFF2-40B4-BE49-F238E27FC236}">
-                <a16:creationId xmlns:a16="http://schemas.microsoft.com/office/drawing/2014/main" id="{C8F20798-77F4-4C6E-B58A-E2CCFA28B970}"/>
+                <a16:creationId xmlns="" xmlns:a16="http://schemas.microsoft.com/office/drawing/2014/main" id="{C8F20798-77F4-4C6E-B58A-E2CCFA28B970}"/>
               </a:ext>
             </a:extLst>
           </p:cNvPr>
@@ -2362,7 +2380,7 @@
           <p:cNvPr id="5" name="Päivämäärän paikkamerkki 4">
             <a:extLst>
               <a:ext uri="{FF2B5EF4-FFF2-40B4-BE49-F238E27FC236}">
-                <a16:creationId xmlns:a16="http://schemas.microsoft.com/office/drawing/2014/main" id="{803B089E-FDAA-48BF-A28D-CAABA145B40B}"/>
+                <a16:creationId xmlns="" xmlns:a16="http://schemas.microsoft.com/office/drawing/2014/main" id="{803B089E-FDAA-48BF-A28D-CAABA145B40B}"/>
               </a:ext>
             </a:extLst>
           </p:cNvPr>
@@ -2380,7 +2398,8 @@
           <a:p>
             <a:fld id="{978E5B9B-AA1C-4837-A679-92CCBB0596D1}" type="datetimeFigureOut">
               <a:rPr lang="fi-FI" smtClean="0"/>
-              <a:t>13.3.2021</a:t>
+              <a:pPr/>
+              <a:t>16.3.2021</a:t>
             </a:fld>
             <a:endParaRPr lang="fi-FI"/>
           </a:p>
@@ -2391,7 +2410,7 @@
           <p:cNvPr id="6" name="Alatunnisteen paikkamerkki 5">
             <a:extLst>
               <a:ext uri="{FF2B5EF4-FFF2-40B4-BE49-F238E27FC236}">
-                <a16:creationId xmlns:a16="http://schemas.microsoft.com/office/drawing/2014/main" id="{B3B94AA2-9EB3-435E-9532-9D9DE9DA0C1D}"/>
+                <a16:creationId xmlns="" xmlns:a16="http://schemas.microsoft.com/office/drawing/2014/main" id="{B3B94AA2-9EB3-435E-9532-9D9DE9DA0C1D}"/>
               </a:ext>
             </a:extLst>
           </p:cNvPr>
@@ -2416,7 +2435,7 @@
           <p:cNvPr id="7" name="Dian numeron paikkamerkki 6">
             <a:extLst>
               <a:ext uri="{FF2B5EF4-FFF2-40B4-BE49-F238E27FC236}">
-                <a16:creationId xmlns:a16="http://schemas.microsoft.com/office/drawing/2014/main" id="{3487B107-AD2D-48A6-80F2-F11409615AD5}"/>
+                <a16:creationId xmlns="" xmlns:a16="http://schemas.microsoft.com/office/drawing/2014/main" id="{3487B107-AD2D-48A6-80F2-F11409615AD5}"/>
               </a:ext>
             </a:extLst>
           </p:cNvPr>
@@ -2434,6 +2453,7 @@
           <a:p>
             <a:fld id="{784304D2-DF8B-49B7-9B54-9F8017A67B0D}" type="slidenum">
               <a:rPr lang="fi-FI" smtClean="0"/>
+              <a:pPr/>
               <a:t>‹#›</a:t>
             </a:fld>
             <a:endParaRPr lang="fi-FI"/>
@@ -2443,7 +2463,7 @@
     </p:spTree>
     <p:extLst>
       <p:ext uri="{BB962C8B-B14F-4D97-AF65-F5344CB8AC3E}">
-        <p14:creationId xmlns:p14="http://schemas.microsoft.com/office/powerpoint/2010/main" val="2916801510"/>
+        <p14:creationId xmlns="" xmlns:p14="http://schemas.microsoft.com/office/powerpoint/2010/main" val="2916801510"/>
       </p:ext>
     </p:extLst>
   </p:cSld>
@@ -2475,7 +2495,7 @@
           <p:cNvPr id="2" name="Otsikko 1">
             <a:extLst>
               <a:ext uri="{FF2B5EF4-FFF2-40B4-BE49-F238E27FC236}">
-                <a16:creationId xmlns:a16="http://schemas.microsoft.com/office/drawing/2014/main" id="{E11A26D3-B181-425A-9EF6-91381C901E99}"/>
+                <a16:creationId xmlns="" xmlns:a16="http://schemas.microsoft.com/office/drawing/2014/main" id="{E11A26D3-B181-425A-9EF6-91381C901E99}"/>
               </a:ext>
             </a:extLst>
           </p:cNvPr>
@@ -2512,7 +2532,7 @@
           <p:cNvPr id="3" name="Kuvan paikkamerkki 2">
             <a:extLst>
               <a:ext uri="{FF2B5EF4-FFF2-40B4-BE49-F238E27FC236}">
-                <a16:creationId xmlns:a16="http://schemas.microsoft.com/office/drawing/2014/main" id="{98BAB6F1-2F8C-4B85-9D4F-9FB88B83F382}"/>
+                <a16:creationId xmlns="" xmlns:a16="http://schemas.microsoft.com/office/drawing/2014/main" id="{98BAB6F1-2F8C-4B85-9D4F-9FB88B83F382}"/>
               </a:ext>
             </a:extLst>
           </p:cNvPr>
@@ -2579,7 +2599,7 @@
           <p:cNvPr id="4" name="Tekstin paikkamerkki 3">
             <a:extLst>
               <a:ext uri="{FF2B5EF4-FFF2-40B4-BE49-F238E27FC236}">
-                <a16:creationId xmlns:a16="http://schemas.microsoft.com/office/drawing/2014/main" id="{9498AD85-2AF2-426F-9530-005653FAE0F1}"/>
+                <a16:creationId xmlns="" xmlns:a16="http://schemas.microsoft.com/office/drawing/2014/main" id="{9498AD85-2AF2-426F-9530-005653FAE0F1}"/>
               </a:ext>
             </a:extLst>
           </p:cNvPr>
@@ -2650,7 +2670,7 @@
           <p:cNvPr id="5" name="Päivämäärän paikkamerkki 4">
             <a:extLst>
               <a:ext uri="{FF2B5EF4-FFF2-40B4-BE49-F238E27FC236}">
-                <a16:creationId xmlns:a16="http://schemas.microsoft.com/office/drawing/2014/main" id="{0D709AD5-2386-49B0-BA56-697CCD2AF538}"/>
+                <a16:creationId xmlns="" xmlns:a16="http://schemas.microsoft.com/office/drawing/2014/main" id="{0D709AD5-2386-49B0-BA56-697CCD2AF538}"/>
               </a:ext>
             </a:extLst>
           </p:cNvPr>
@@ -2668,7 +2688,8 @@
           <a:p>
             <a:fld id="{978E5B9B-AA1C-4837-A679-92CCBB0596D1}" type="datetimeFigureOut">
               <a:rPr lang="fi-FI" smtClean="0"/>
-              <a:t>13.3.2021</a:t>
+              <a:pPr/>
+              <a:t>16.3.2021</a:t>
             </a:fld>
             <a:endParaRPr lang="fi-FI"/>
           </a:p>
@@ -2679,7 +2700,7 @@
           <p:cNvPr id="6" name="Alatunnisteen paikkamerkki 5">
             <a:extLst>
               <a:ext uri="{FF2B5EF4-FFF2-40B4-BE49-F238E27FC236}">
-                <a16:creationId xmlns:a16="http://schemas.microsoft.com/office/drawing/2014/main" id="{F67B804E-191A-425F-8214-50DE5CB6B3A2}"/>
+                <a16:creationId xmlns="" xmlns:a16="http://schemas.microsoft.com/office/drawing/2014/main" id="{F67B804E-191A-425F-8214-50DE5CB6B3A2}"/>
               </a:ext>
             </a:extLst>
           </p:cNvPr>
@@ -2704,7 +2725,7 @@
           <p:cNvPr id="7" name="Dian numeron paikkamerkki 6">
             <a:extLst>
               <a:ext uri="{FF2B5EF4-FFF2-40B4-BE49-F238E27FC236}">
-                <a16:creationId xmlns:a16="http://schemas.microsoft.com/office/drawing/2014/main" id="{91A7BC45-8E2F-427F-8053-22F51303351A}"/>
+                <a16:creationId xmlns="" xmlns:a16="http://schemas.microsoft.com/office/drawing/2014/main" id="{91A7BC45-8E2F-427F-8053-22F51303351A}"/>
               </a:ext>
             </a:extLst>
           </p:cNvPr>
@@ -2722,6 +2743,7 @@
           <a:p>
             <a:fld id="{784304D2-DF8B-49B7-9B54-9F8017A67B0D}" type="slidenum">
               <a:rPr lang="fi-FI" smtClean="0"/>
+              <a:pPr/>
               <a:t>‹#›</a:t>
             </a:fld>
             <a:endParaRPr lang="fi-FI"/>
@@ -2731,7 +2753,7 @@
     </p:spTree>
     <p:extLst>
       <p:ext uri="{BB962C8B-B14F-4D97-AF65-F5344CB8AC3E}">
-        <p14:creationId xmlns:p14="http://schemas.microsoft.com/office/powerpoint/2010/main" val="1694345294"/>
+        <p14:creationId xmlns="" xmlns:p14="http://schemas.microsoft.com/office/powerpoint/2010/main" val="1694345294"/>
       </p:ext>
     </p:extLst>
   </p:cSld>
@@ -2768,7 +2790,7 @@
           <p:cNvPr id="2" name="Otsikon paikkamerkki 1">
             <a:extLst>
               <a:ext uri="{FF2B5EF4-FFF2-40B4-BE49-F238E27FC236}">
-                <a16:creationId xmlns:a16="http://schemas.microsoft.com/office/drawing/2014/main" id="{053687A8-345E-4D5B-9532-7C3CAF35DA11}"/>
+                <a16:creationId xmlns="" xmlns:a16="http://schemas.microsoft.com/office/drawing/2014/main" id="{053687A8-345E-4D5B-9532-7C3CAF35DA11}"/>
               </a:ext>
             </a:extLst>
           </p:cNvPr>
@@ -2806,7 +2828,7 @@
           <p:cNvPr id="3" name="Tekstin paikkamerkki 2">
             <a:extLst>
               <a:ext uri="{FF2B5EF4-FFF2-40B4-BE49-F238E27FC236}">
-                <a16:creationId xmlns:a16="http://schemas.microsoft.com/office/drawing/2014/main" id="{80896637-E869-4B6E-82ED-0852E3F018BF}"/>
+                <a16:creationId xmlns="" xmlns:a16="http://schemas.microsoft.com/office/drawing/2014/main" id="{80896637-E869-4B6E-82ED-0852E3F018BF}"/>
               </a:ext>
             </a:extLst>
           </p:cNvPr>
@@ -2873,7 +2895,7 @@
           <p:cNvPr id="4" name="Päivämäärän paikkamerkki 3">
             <a:extLst>
               <a:ext uri="{FF2B5EF4-FFF2-40B4-BE49-F238E27FC236}">
-                <a16:creationId xmlns:a16="http://schemas.microsoft.com/office/drawing/2014/main" id="{A2810AE2-AB52-42AE-9F79-868DC17453E6}"/>
+                <a16:creationId xmlns="" xmlns:a16="http://schemas.microsoft.com/office/drawing/2014/main" id="{A2810AE2-AB52-42AE-9F79-868DC17453E6}"/>
               </a:ext>
             </a:extLst>
           </p:cNvPr>
@@ -2909,7 +2931,8 @@
           <a:p>
             <a:fld id="{978E5B9B-AA1C-4837-A679-92CCBB0596D1}" type="datetimeFigureOut">
               <a:rPr lang="fi-FI" smtClean="0"/>
-              <a:t>13.3.2021</a:t>
+              <a:pPr/>
+              <a:t>16.3.2021</a:t>
             </a:fld>
             <a:endParaRPr lang="fi-FI"/>
           </a:p>
@@ -2920,7 +2943,7 @@
           <p:cNvPr id="5" name="Alatunnisteen paikkamerkki 4">
             <a:extLst>
               <a:ext uri="{FF2B5EF4-FFF2-40B4-BE49-F238E27FC236}">
-                <a16:creationId xmlns:a16="http://schemas.microsoft.com/office/drawing/2014/main" id="{5F12A07B-960C-4082-B506-C909FEB7B005}"/>
+                <a16:creationId xmlns="" xmlns:a16="http://schemas.microsoft.com/office/drawing/2014/main" id="{5F12A07B-960C-4082-B506-C909FEB7B005}"/>
               </a:ext>
             </a:extLst>
           </p:cNvPr>
@@ -2963,7 +2986,7 @@
           <p:cNvPr id="6" name="Dian numeron paikkamerkki 5">
             <a:extLst>
               <a:ext uri="{FF2B5EF4-FFF2-40B4-BE49-F238E27FC236}">
-                <a16:creationId xmlns:a16="http://schemas.microsoft.com/office/drawing/2014/main" id="{5CA8B8B0-ABE5-4DD0-B465-9C06B8F80F09}"/>
+                <a16:creationId xmlns="" xmlns:a16="http://schemas.microsoft.com/office/drawing/2014/main" id="{5CA8B8B0-ABE5-4DD0-B465-9C06B8F80F09}"/>
               </a:ext>
             </a:extLst>
           </p:cNvPr>
@@ -2999,6 +3022,7 @@
           <a:p>
             <a:fld id="{784304D2-DF8B-49B7-9B54-9F8017A67B0D}" type="slidenum">
               <a:rPr lang="fi-FI" smtClean="0"/>
+              <a:pPr/>
               <a:t>‹#›</a:t>
             </a:fld>
             <a:endParaRPr lang="fi-FI"/>
@@ -3008,7 +3032,7 @@
     </p:spTree>
     <p:extLst>
       <p:ext uri="{BB962C8B-B14F-4D97-AF65-F5344CB8AC3E}">
-        <p14:creationId xmlns:p14="http://schemas.microsoft.com/office/powerpoint/2010/main" val="2388750885"/>
+        <p14:creationId xmlns="" xmlns:p14="http://schemas.microsoft.com/office/powerpoint/2010/main" val="2388750885"/>
       </p:ext>
     </p:extLst>
   </p:cSld>
@@ -3326,462 +3350,506 @@
           <a:chExt cx="0" cy="0"/>
         </a:xfrm>
       </p:grpSpPr>
-      <p:sp>
-        <p:nvSpPr>
-          <p:cNvPr id="4" name="Vuokaavio: Prosessi 3">
-            <a:extLst>
-              <a:ext uri="{FF2B5EF4-FFF2-40B4-BE49-F238E27FC236}">
-                <a16:creationId xmlns:a16="http://schemas.microsoft.com/office/drawing/2014/main" id="{37593701-5539-423E-807B-FDE41CECEC3B}"/>
-              </a:ext>
-            </a:extLst>
-          </p:cNvPr>
-          <p:cNvSpPr/>
+      <p:grpSp>
+        <p:nvGrpSpPr>
+          <p:cNvPr id="65" name="Group 64"/>
+          <p:cNvGrpSpPr/>
           <p:nvPr/>
-        </p:nvSpPr>
-        <p:spPr>
+        </p:nvGrpSpPr>
+        <p:grpSpPr>
           <a:xfrm>
-            <a:off x="6772765" y="5847808"/>
-            <a:ext cx="2300287" cy="718818"/>
+            <a:off x="5822749" y="6020337"/>
+            <a:ext cx="4088503" cy="718819"/>
+            <a:chOff x="5822749" y="5847807"/>
+            <a:chExt cx="4088503" cy="718819"/>
           </a:xfrm>
-          <a:prstGeom prst="flowChartProcess">
-            <a:avLst/>
-          </a:prstGeom>
-          <a:solidFill>
-            <a:schemeClr val="accent2">
-              <a:lumMod val="20000"/>
-              <a:lumOff val="80000"/>
-            </a:schemeClr>
-          </a:solidFill>
-        </p:spPr>
-        <p:style>
-          <a:lnRef idx="2">
-            <a:schemeClr val="accent6"/>
-          </a:lnRef>
-          <a:fillRef idx="1">
-            <a:schemeClr val="lt1"/>
-          </a:fillRef>
-          <a:effectRef idx="0">
-            <a:schemeClr val="accent6"/>
-          </a:effectRef>
-          <a:fontRef idx="minor">
-            <a:schemeClr val="dk1"/>
-          </a:fontRef>
-        </p:style>
-        <p:txBody>
-          <a:bodyPr rtlCol="0" anchor="ctr"/>
-          <a:lstStyle/>
-          <a:p>
-            <a:pPr algn="ctr"/>
-            <a:r>
-              <a:rPr lang="fi-FI" dirty="0" err="1"/>
-              <a:t>Heating_min_time</a:t>
-            </a:r>
-            <a:r>
-              <a:rPr lang="fi-FI" dirty="0"/>
-              <a:t>(-1) </a:t>
-            </a:r>
-          </a:p>
-          <a:p>
-            <a:pPr algn="ctr"/>
-            <a:r>
-              <a:rPr lang="fi-FI" dirty="0"/>
-              <a:t>RELAY ON</a:t>
-            </a:r>
-          </a:p>
-        </p:txBody>
-      </p:sp>
-      <p:sp>
-        <p:nvSpPr>
-          <p:cNvPr id="6" name="Tasakylkinen kolmio 5">
-            <a:extLst>
-              <a:ext uri="{FF2B5EF4-FFF2-40B4-BE49-F238E27FC236}">
-                <a16:creationId xmlns:a16="http://schemas.microsoft.com/office/drawing/2014/main" id="{89DFCAA1-2A8E-4805-94D5-CBEEBCEFC86E}"/>
-              </a:ext>
-            </a:extLst>
-          </p:cNvPr>
-          <p:cNvSpPr/>
+        </p:grpSpPr>
+        <p:sp>
+          <p:nvSpPr>
+            <p:cNvPr id="4" name="Vuokaavio: Prosessi 3">
+              <a:extLst>
+                <a:ext uri="{FF2B5EF4-FFF2-40B4-BE49-F238E27FC236}">
+                  <a16:creationId xmlns="" xmlns:a16="http://schemas.microsoft.com/office/drawing/2014/main" id="{37593701-5539-423E-807B-FDE41CECEC3B}"/>
+                </a:ext>
+              </a:extLst>
+            </p:cNvPr>
+            <p:cNvSpPr/>
+            <p:nvPr/>
+          </p:nvSpPr>
+          <p:spPr>
+            <a:xfrm>
+              <a:off x="6772765" y="5847808"/>
+              <a:ext cx="2300287" cy="718818"/>
+            </a:xfrm>
+            <a:prstGeom prst="flowChartProcess">
+              <a:avLst/>
+            </a:prstGeom>
+            <a:solidFill>
+              <a:schemeClr val="accent2">
+                <a:lumMod val="20000"/>
+                <a:lumOff val="80000"/>
+              </a:schemeClr>
+            </a:solidFill>
+          </p:spPr>
+          <p:style>
+            <a:lnRef idx="2">
+              <a:schemeClr val="accent6"/>
+            </a:lnRef>
+            <a:fillRef idx="1">
+              <a:schemeClr val="lt1"/>
+            </a:fillRef>
+            <a:effectRef idx="0">
+              <a:schemeClr val="accent6"/>
+            </a:effectRef>
+            <a:fontRef idx="minor">
+              <a:schemeClr val="dk1"/>
+            </a:fontRef>
+          </p:style>
+          <p:txBody>
+            <a:bodyPr rtlCol="0" anchor="ctr"/>
+            <a:lstStyle/>
+            <a:p>
+              <a:pPr algn="ctr"/>
+              <a:r>
+                <a:rPr lang="fi-FI" dirty="0" err="1"/>
+                <a:t>Heating_min_time</a:t>
+              </a:r>
+              <a:r>
+                <a:rPr lang="fi-FI" dirty="0"/>
+                <a:t>(-1) </a:t>
+              </a:r>
+            </a:p>
+            <a:p>
+              <a:pPr algn="ctr"/>
+              <a:r>
+                <a:rPr lang="fi-FI" dirty="0"/>
+                <a:t>RELAY ON</a:t>
+              </a:r>
+            </a:p>
+          </p:txBody>
+        </p:sp>
+        <p:sp>
+          <p:nvSpPr>
+            <p:cNvPr id="6" name="Tasakylkinen kolmio 5">
+              <a:extLst>
+                <a:ext uri="{FF2B5EF4-FFF2-40B4-BE49-F238E27FC236}">
+                  <a16:creationId xmlns="" xmlns:a16="http://schemas.microsoft.com/office/drawing/2014/main" id="{89DFCAA1-2A8E-4805-94D5-CBEEBCEFC86E}"/>
+                </a:ext>
+              </a:extLst>
+            </p:cNvPr>
+            <p:cNvSpPr/>
+            <p:nvPr/>
+          </p:nvSpPr>
+          <p:spPr>
+            <a:xfrm rot="5400000">
+              <a:off x="9132743" y="5788116"/>
+              <a:ext cx="718817" cy="838200"/>
+            </a:xfrm>
+            <a:prstGeom prst="triangle">
+              <a:avLst/>
+            </a:prstGeom>
+          </p:spPr>
+          <p:style>
+            <a:lnRef idx="2">
+              <a:schemeClr val="accent6"/>
+            </a:lnRef>
+            <a:fillRef idx="1">
+              <a:schemeClr val="lt1"/>
+            </a:fillRef>
+            <a:effectRef idx="0">
+              <a:schemeClr val="accent6"/>
+            </a:effectRef>
+            <a:fontRef idx="minor">
+              <a:schemeClr val="dk1"/>
+            </a:fontRef>
+          </p:style>
+          <p:txBody>
+            <a:bodyPr vert="vert270" rtlCol="0" anchor="ctr"/>
+            <a:lstStyle/>
+            <a:p>
+              <a:pPr algn="ctr"/>
+              <a:r>
+                <a:rPr lang="fi-FI" dirty="0"/>
+                <a:t>20</a:t>
+              </a:r>
+            </a:p>
+          </p:txBody>
+        </p:sp>
+        <p:sp>
+          <p:nvSpPr>
+            <p:cNvPr id="7" name="Tasakylkinen kolmio 6">
+              <a:extLst>
+                <a:ext uri="{FF2B5EF4-FFF2-40B4-BE49-F238E27FC236}">
+                  <a16:creationId xmlns="" xmlns:a16="http://schemas.microsoft.com/office/drawing/2014/main" id="{BCBBA7E4-7636-4121-BA4E-1BD9788EA51E}"/>
+                </a:ext>
+              </a:extLst>
+            </p:cNvPr>
+            <p:cNvSpPr/>
+            <p:nvPr/>
+          </p:nvSpPr>
+          <p:spPr>
+            <a:xfrm rot="16200000">
+              <a:off x="5941324" y="5729233"/>
+              <a:ext cx="718817" cy="955967"/>
+            </a:xfrm>
+            <a:prstGeom prst="triangle">
+              <a:avLst/>
+            </a:prstGeom>
+          </p:spPr>
+          <p:style>
+            <a:lnRef idx="2">
+              <a:schemeClr val="accent6"/>
+            </a:lnRef>
+            <a:fillRef idx="1">
+              <a:schemeClr val="lt1"/>
+            </a:fillRef>
+            <a:effectRef idx="0">
+              <a:schemeClr val="accent6"/>
+            </a:effectRef>
+            <a:fontRef idx="minor">
+              <a:schemeClr val="dk1"/>
+            </a:fontRef>
+          </p:style>
+          <p:txBody>
+            <a:bodyPr vert="vert" rtlCol="0" anchor="ctr"/>
+            <a:lstStyle/>
+            <a:p>
+              <a:pPr algn="ctr"/>
+              <a:r>
+                <a:rPr lang="fi-FI" dirty="0"/>
+                <a:t>150</a:t>
+              </a:r>
+            </a:p>
+          </p:txBody>
+        </p:sp>
+      </p:grpSp>
+      <p:grpSp>
+        <p:nvGrpSpPr>
+          <p:cNvPr id="69" name="Group 68"/>
+          <p:cNvGrpSpPr/>
           <p:nvPr/>
-        </p:nvSpPr>
-        <p:spPr>
-          <a:xfrm rot="5400000">
-            <a:off x="9132743" y="5788116"/>
-            <a:ext cx="718817" cy="838200"/>
+        </p:nvGrpSpPr>
+        <p:grpSpPr>
+          <a:xfrm>
+            <a:off x="5569052" y="3932813"/>
+            <a:ext cx="3415768" cy="721618"/>
+            <a:chOff x="5569052" y="3760283"/>
+            <a:chExt cx="3415768" cy="721618"/>
           </a:xfrm>
-          <a:prstGeom prst="triangle">
-            <a:avLst/>
-          </a:prstGeom>
-        </p:spPr>
-        <p:style>
-          <a:lnRef idx="2">
-            <a:schemeClr val="accent6"/>
-          </a:lnRef>
-          <a:fillRef idx="1">
-            <a:schemeClr val="lt1"/>
-          </a:fillRef>
-          <a:effectRef idx="0">
-            <a:schemeClr val="accent6"/>
-          </a:effectRef>
-          <a:fontRef idx="minor">
-            <a:schemeClr val="dk1"/>
-          </a:fontRef>
-        </p:style>
-        <p:txBody>
-          <a:bodyPr vert="vert270" rtlCol="0" anchor="ctr"/>
-          <a:lstStyle/>
-          <a:p>
-            <a:pPr algn="ctr"/>
-            <a:r>
-              <a:rPr lang="fi-FI" dirty="0"/>
-              <a:t>20</a:t>
-            </a:r>
-          </a:p>
-        </p:txBody>
-      </p:sp>
-      <p:sp>
-        <p:nvSpPr>
-          <p:cNvPr id="7" name="Tasakylkinen kolmio 6">
-            <a:extLst>
-              <a:ext uri="{FF2B5EF4-FFF2-40B4-BE49-F238E27FC236}">
-                <a16:creationId xmlns:a16="http://schemas.microsoft.com/office/drawing/2014/main" id="{BCBBA7E4-7636-4121-BA4E-1BD9788EA51E}"/>
-              </a:ext>
-            </a:extLst>
-          </p:cNvPr>
-          <p:cNvSpPr/>
+        </p:grpSpPr>
+        <p:sp>
+          <p:nvSpPr>
+            <p:cNvPr id="15" name="Vuokaavio: Prosessi 14">
+              <a:extLst>
+                <a:ext uri="{FF2B5EF4-FFF2-40B4-BE49-F238E27FC236}">
+                  <a16:creationId xmlns="" xmlns:a16="http://schemas.microsoft.com/office/drawing/2014/main" id="{F413B50F-C243-4093-AB97-C86C4DC4BD7A}"/>
+                </a:ext>
+              </a:extLst>
+            </p:cNvPr>
+            <p:cNvSpPr/>
+            <p:nvPr/>
+          </p:nvSpPr>
+          <p:spPr>
+            <a:xfrm>
+              <a:off x="6220928" y="3760285"/>
+              <a:ext cx="2054618" cy="718818"/>
+            </a:xfrm>
+            <a:prstGeom prst="flowChartProcess">
+              <a:avLst/>
+            </a:prstGeom>
+            <a:solidFill>
+              <a:schemeClr val="accent5">
+                <a:lumMod val="20000"/>
+                <a:lumOff val="80000"/>
+              </a:schemeClr>
+            </a:solidFill>
+          </p:spPr>
+          <p:style>
+            <a:lnRef idx="2">
+              <a:schemeClr val="accent6"/>
+            </a:lnRef>
+            <a:fillRef idx="1">
+              <a:schemeClr val="lt1"/>
+            </a:fillRef>
+            <a:effectRef idx="0">
+              <a:schemeClr val="accent6"/>
+            </a:effectRef>
+            <a:fontRef idx="minor">
+              <a:schemeClr val="dk1"/>
+            </a:fontRef>
+          </p:style>
+          <p:txBody>
+            <a:bodyPr rtlCol="0" anchor="ctr"/>
+            <a:lstStyle/>
+            <a:p>
+              <a:pPr algn="ctr"/>
+              <a:r>
+                <a:rPr lang="fi-FI" dirty="0" err="1"/>
+                <a:t>Start_defrosting</a:t>
+              </a:r>
+              <a:r>
+                <a:rPr lang="fi-FI" dirty="0"/>
+                <a:t>(2)</a:t>
+              </a:r>
+            </a:p>
+            <a:p>
+              <a:pPr algn="ctr"/>
+              <a:r>
+                <a:rPr lang="fi-FI" dirty="0"/>
+                <a:t> RELAY OFF</a:t>
+              </a:r>
+            </a:p>
+          </p:txBody>
+        </p:sp>
+        <p:sp>
+          <p:nvSpPr>
+            <p:cNvPr id="16" name="Tasakylkinen kolmio 15">
+              <a:extLst>
+                <a:ext uri="{FF2B5EF4-FFF2-40B4-BE49-F238E27FC236}">
+                  <a16:creationId xmlns="" xmlns:a16="http://schemas.microsoft.com/office/drawing/2014/main" id="{DEA8720E-700C-4AC1-838C-BB65147986D5}"/>
+                </a:ext>
+              </a:extLst>
+            </p:cNvPr>
+            <p:cNvSpPr/>
+            <p:nvPr/>
+          </p:nvSpPr>
+          <p:spPr>
+            <a:xfrm rot="5400000">
+              <a:off x="8269374" y="3766454"/>
+              <a:ext cx="721618" cy="709275"/>
+            </a:xfrm>
+            <a:prstGeom prst="triangle">
+              <a:avLst>
+                <a:gd name="adj" fmla="val 51325"/>
+              </a:avLst>
+            </a:prstGeom>
+          </p:spPr>
+          <p:style>
+            <a:lnRef idx="2">
+              <a:schemeClr val="accent6"/>
+            </a:lnRef>
+            <a:fillRef idx="1">
+              <a:schemeClr val="lt1"/>
+            </a:fillRef>
+            <a:effectRef idx="0">
+              <a:schemeClr val="accent6"/>
+            </a:effectRef>
+            <a:fontRef idx="minor">
+              <a:schemeClr val="dk1"/>
+            </a:fontRef>
+          </p:style>
+          <p:txBody>
+            <a:bodyPr vert="vert270" rtlCol="0" anchor="ctr"/>
+            <a:lstStyle/>
+            <a:p>
+              <a:pPr algn="ctr"/>
+              <a:r>
+                <a:rPr lang="fi-FI" dirty="0"/>
+                <a:t>10</a:t>
+              </a:r>
+            </a:p>
+          </p:txBody>
+        </p:sp>
+        <p:sp>
+          <p:nvSpPr>
+            <p:cNvPr id="17" name="Tasakylkinen kolmio 16">
+              <a:extLst>
+                <a:ext uri="{FF2B5EF4-FFF2-40B4-BE49-F238E27FC236}">
+                  <a16:creationId xmlns="" xmlns:a16="http://schemas.microsoft.com/office/drawing/2014/main" id="{410E68D5-E13F-4E0E-89B9-19C35FFA3DE7}"/>
+                </a:ext>
+              </a:extLst>
+            </p:cNvPr>
+            <p:cNvSpPr/>
+            <p:nvPr/>
+          </p:nvSpPr>
+          <p:spPr>
+            <a:xfrm rot="16200000">
+              <a:off x="5532907" y="3796429"/>
+              <a:ext cx="718817" cy="646527"/>
+            </a:xfrm>
+            <a:prstGeom prst="triangle">
+              <a:avLst/>
+            </a:prstGeom>
+          </p:spPr>
+          <p:style>
+            <a:lnRef idx="2">
+              <a:schemeClr val="accent6"/>
+            </a:lnRef>
+            <a:fillRef idx="1">
+              <a:schemeClr val="lt1"/>
+            </a:fillRef>
+            <a:effectRef idx="0">
+              <a:schemeClr val="accent6"/>
+            </a:effectRef>
+            <a:fontRef idx="minor">
+              <a:schemeClr val="dk1"/>
+            </a:fontRef>
+          </p:style>
+          <p:txBody>
+            <a:bodyPr vert="vert" rtlCol="0" anchor="ctr"/>
+            <a:lstStyle/>
+            <a:p>
+              <a:pPr algn="ctr"/>
+              <a:r>
+                <a:rPr lang="fi-FI" dirty="0"/>
+                <a:t>0</a:t>
+              </a:r>
+            </a:p>
+          </p:txBody>
+        </p:sp>
+      </p:grpSp>
+      <p:grpSp>
+        <p:nvGrpSpPr>
+          <p:cNvPr id="64" name="Group 63"/>
+          <p:cNvGrpSpPr/>
           <p:nvPr/>
-        </p:nvSpPr>
-        <p:spPr>
-          <a:xfrm rot="16200000">
-            <a:off x="5941324" y="5729233"/>
-            <a:ext cx="718817" cy="955967"/>
+        </p:nvGrpSpPr>
+        <p:grpSpPr>
+          <a:xfrm>
+            <a:off x="3869890" y="4941840"/>
+            <a:ext cx="3140118" cy="718821"/>
+            <a:chOff x="3869890" y="4769310"/>
+            <a:chExt cx="3140118" cy="718821"/>
           </a:xfrm>
-          <a:prstGeom prst="triangle">
-            <a:avLst/>
-          </a:prstGeom>
-        </p:spPr>
-        <p:style>
-          <a:lnRef idx="2">
-            <a:schemeClr val="accent6"/>
-          </a:lnRef>
-          <a:fillRef idx="1">
-            <a:schemeClr val="lt1"/>
-          </a:fillRef>
-          <a:effectRef idx="0">
-            <a:schemeClr val="accent6"/>
-          </a:effectRef>
-          <a:fontRef idx="minor">
-            <a:schemeClr val="dk1"/>
-          </a:fontRef>
-        </p:style>
-        <p:txBody>
-          <a:bodyPr vert="vert" rtlCol="0" anchor="ctr"/>
-          <a:lstStyle/>
-          <a:p>
-            <a:pPr algn="ctr"/>
-            <a:r>
-              <a:rPr lang="fi-FI" dirty="0"/>
-              <a:t>150</a:t>
-            </a:r>
-          </a:p>
-        </p:txBody>
-      </p:sp>
-      <p:sp>
-        <p:nvSpPr>
-          <p:cNvPr id="15" name="Vuokaavio: Prosessi 14">
-            <a:extLst>
-              <a:ext uri="{FF2B5EF4-FFF2-40B4-BE49-F238E27FC236}">
-                <a16:creationId xmlns:a16="http://schemas.microsoft.com/office/drawing/2014/main" id="{F413B50F-C243-4093-AB97-C86C4DC4BD7A}"/>
-              </a:ext>
-            </a:extLst>
-          </p:cNvPr>
-          <p:cNvSpPr/>
-          <p:nvPr/>
-        </p:nvSpPr>
-        <p:spPr>
-          <a:xfrm>
-            <a:off x="6220928" y="3760285"/>
-            <a:ext cx="2054618" cy="718818"/>
-          </a:xfrm>
-          <a:prstGeom prst="flowChartProcess">
-            <a:avLst/>
-          </a:prstGeom>
-          <a:solidFill>
-            <a:schemeClr val="accent5">
-              <a:lumMod val="20000"/>
-              <a:lumOff val="80000"/>
-            </a:schemeClr>
-          </a:solidFill>
-        </p:spPr>
-        <p:style>
-          <a:lnRef idx="2">
-            <a:schemeClr val="accent6"/>
-          </a:lnRef>
-          <a:fillRef idx="1">
-            <a:schemeClr val="lt1"/>
-          </a:fillRef>
-          <a:effectRef idx="0">
-            <a:schemeClr val="accent6"/>
-          </a:effectRef>
-          <a:fontRef idx="minor">
-            <a:schemeClr val="dk1"/>
-          </a:fontRef>
-        </p:style>
-        <p:txBody>
-          <a:bodyPr rtlCol="0" anchor="ctr"/>
-          <a:lstStyle/>
-          <a:p>
-            <a:pPr algn="ctr"/>
-            <a:r>
-              <a:rPr lang="fi-FI" dirty="0" err="1"/>
-              <a:t>Start_defrosting</a:t>
-            </a:r>
-            <a:r>
-              <a:rPr lang="fi-FI" dirty="0"/>
-              <a:t>(2)</a:t>
-            </a:r>
-          </a:p>
-          <a:p>
-            <a:pPr algn="ctr"/>
-            <a:r>
-              <a:rPr lang="fi-FI" dirty="0"/>
-              <a:t> RELAY OFF</a:t>
-            </a:r>
-          </a:p>
-        </p:txBody>
-      </p:sp>
-      <p:sp>
-        <p:nvSpPr>
-          <p:cNvPr id="16" name="Tasakylkinen kolmio 15">
-            <a:extLst>
-              <a:ext uri="{FF2B5EF4-FFF2-40B4-BE49-F238E27FC236}">
-                <a16:creationId xmlns:a16="http://schemas.microsoft.com/office/drawing/2014/main" id="{DEA8720E-700C-4AC1-838C-BB65147986D5}"/>
-              </a:ext>
-            </a:extLst>
-          </p:cNvPr>
-          <p:cNvSpPr/>
-          <p:nvPr/>
-        </p:nvSpPr>
-        <p:spPr>
-          <a:xfrm rot="5400000">
-            <a:off x="8269374" y="3766454"/>
-            <a:ext cx="721618" cy="709275"/>
-          </a:xfrm>
-          <a:prstGeom prst="triangle">
-            <a:avLst>
-              <a:gd name="adj" fmla="val 51325"/>
-            </a:avLst>
-          </a:prstGeom>
-        </p:spPr>
-        <p:style>
-          <a:lnRef idx="2">
-            <a:schemeClr val="accent6"/>
-          </a:lnRef>
-          <a:fillRef idx="1">
-            <a:schemeClr val="lt1"/>
-          </a:fillRef>
-          <a:effectRef idx="0">
-            <a:schemeClr val="accent6"/>
-          </a:effectRef>
-          <a:fontRef idx="minor">
-            <a:schemeClr val="dk1"/>
-          </a:fontRef>
-        </p:style>
-        <p:txBody>
-          <a:bodyPr vert="vert270" rtlCol="0" anchor="ctr"/>
-          <a:lstStyle/>
-          <a:p>
-            <a:pPr algn="ctr"/>
-            <a:r>
-              <a:rPr lang="fi-FI" dirty="0"/>
-              <a:t>10</a:t>
-            </a:r>
-          </a:p>
-        </p:txBody>
-      </p:sp>
-      <p:sp>
-        <p:nvSpPr>
-          <p:cNvPr id="17" name="Tasakylkinen kolmio 16">
-            <a:extLst>
-              <a:ext uri="{FF2B5EF4-FFF2-40B4-BE49-F238E27FC236}">
-                <a16:creationId xmlns:a16="http://schemas.microsoft.com/office/drawing/2014/main" id="{410E68D5-E13F-4E0E-89B9-19C35FFA3DE7}"/>
-              </a:ext>
-            </a:extLst>
-          </p:cNvPr>
-          <p:cNvSpPr/>
-          <p:nvPr/>
-        </p:nvSpPr>
-        <p:spPr>
-          <a:xfrm rot="16200000">
-            <a:off x="5532907" y="3796429"/>
-            <a:ext cx="718817" cy="646527"/>
-          </a:xfrm>
-          <a:prstGeom prst="triangle">
-            <a:avLst/>
-          </a:prstGeom>
-        </p:spPr>
-        <p:style>
-          <a:lnRef idx="2">
-            <a:schemeClr val="accent6"/>
-          </a:lnRef>
-          <a:fillRef idx="1">
-            <a:schemeClr val="lt1"/>
-          </a:fillRef>
-          <a:effectRef idx="0">
-            <a:schemeClr val="accent6"/>
-          </a:effectRef>
-          <a:fontRef idx="minor">
-            <a:schemeClr val="dk1"/>
-          </a:fontRef>
-        </p:style>
-        <p:txBody>
-          <a:bodyPr vert="vert" rtlCol="0" anchor="ctr"/>
-          <a:lstStyle/>
-          <a:p>
-            <a:pPr algn="ctr"/>
-            <a:r>
-              <a:rPr lang="fi-FI" dirty="0"/>
-              <a:t>0</a:t>
-            </a:r>
-          </a:p>
-        </p:txBody>
-      </p:sp>
-      <p:sp>
-        <p:nvSpPr>
-          <p:cNvPr id="19" name="Vuokaavio: Prosessi 18">
-            <a:extLst>
-              <a:ext uri="{FF2B5EF4-FFF2-40B4-BE49-F238E27FC236}">
-                <a16:creationId xmlns:a16="http://schemas.microsoft.com/office/drawing/2014/main" id="{9DF1E845-CA70-4963-AF56-EA0AEB0B9CFF}"/>
-              </a:ext>
-            </a:extLst>
-          </p:cNvPr>
-          <p:cNvSpPr/>
-          <p:nvPr/>
-        </p:nvSpPr>
-        <p:spPr>
-          <a:xfrm>
-            <a:off x="3869890" y="4769310"/>
-            <a:ext cx="2301918" cy="718818"/>
-          </a:xfrm>
-          <a:prstGeom prst="flowChartProcess">
-            <a:avLst/>
-          </a:prstGeom>
-          <a:solidFill>
-            <a:schemeClr val="accent5">
-              <a:lumMod val="20000"/>
-              <a:lumOff val="80000"/>
-            </a:schemeClr>
-          </a:solidFill>
-        </p:spPr>
-        <p:style>
-          <a:lnRef idx="2">
-            <a:schemeClr val="accent6"/>
-          </a:lnRef>
-          <a:fillRef idx="1">
-            <a:schemeClr val="lt1"/>
-          </a:fillRef>
-          <a:effectRef idx="0">
-            <a:schemeClr val="accent6"/>
-          </a:effectRef>
-          <a:fontRef idx="minor">
-            <a:schemeClr val="dk1"/>
-          </a:fontRef>
-        </p:style>
-        <p:txBody>
-          <a:bodyPr rtlCol="0" anchor="ctr"/>
-          <a:lstStyle/>
-          <a:p>
-            <a:pPr algn="ctr"/>
-            <a:r>
-              <a:rPr lang="fi-FI" dirty="0" err="1"/>
-              <a:t>Defrosting</a:t>
-            </a:r>
-            <a:r>
-              <a:rPr lang="fi-FI" dirty="0"/>
-              <a:t> </a:t>
-            </a:r>
-            <a:r>
-              <a:rPr lang="fi-FI" dirty="0" err="1"/>
-              <a:t>started</a:t>
-            </a:r>
-            <a:r>
-              <a:rPr lang="fi-FI" dirty="0"/>
-              <a:t>(-2)</a:t>
-            </a:r>
-          </a:p>
-          <a:p>
-            <a:pPr algn="ctr"/>
-            <a:r>
-              <a:rPr lang="fi-FI" dirty="0"/>
-              <a:t> RELAY OFF</a:t>
-            </a:r>
-          </a:p>
-        </p:txBody>
-      </p:sp>
-      <p:sp>
-        <p:nvSpPr>
-          <p:cNvPr id="20" name="Tasakylkinen kolmio 19">
-            <a:extLst>
-              <a:ext uri="{FF2B5EF4-FFF2-40B4-BE49-F238E27FC236}">
-                <a16:creationId xmlns:a16="http://schemas.microsoft.com/office/drawing/2014/main" id="{8FD3623A-0795-4CF7-8904-63D3F40B300F}"/>
-              </a:ext>
-            </a:extLst>
-          </p:cNvPr>
-          <p:cNvSpPr/>
-          <p:nvPr/>
-        </p:nvSpPr>
-        <p:spPr>
-          <a:xfrm rot="5400000">
-            <a:off x="6231499" y="4709623"/>
-            <a:ext cx="718817" cy="838200"/>
-          </a:xfrm>
-          <a:prstGeom prst="triangle">
-            <a:avLst/>
-          </a:prstGeom>
-        </p:spPr>
-        <p:style>
-          <a:lnRef idx="2">
-            <a:schemeClr val="accent6"/>
-          </a:lnRef>
-          <a:fillRef idx="1">
-            <a:schemeClr val="lt1"/>
-          </a:fillRef>
-          <a:effectRef idx="0">
-            <a:schemeClr val="accent6"/>
-          </a:effectRef>
-          <a:fontRef idx="minor">
-            <a:schemeClr val="dk1"/>
-          </a:fontRef>
-        </p:style>
-        <p:txBody>
-          <a:bodyPr vert="vert270" rtlCol="0" anchor="ctr"/>
-          <a:lstStyle/>
-          <a:p>
-            <a:pPr algn="ctr"/>
-            <a:r>
-              <a:rPr lang="fi-FI" dirty="0"/>
-              <a:t>30</a:t>
-            </a:r>
-          </a:p>
-        </p:txBody>
-      </p:sp>
+        </p:grpSpPr>
+        <p:sp>
+          <p:nvSpPr>
+            <p:cNvPr id="19" name="Vuokaavio: Prosessi 18">
+              <a:extLst>
+                <a:ext uri="{FF2B5EF4-FFF2-40B4-BE49-F238E27FC236}">
+                  <a16:creationId xmlns="" xmlns:a16="http://schemas.microsoft.com/office/drawing/2014/main" id="{9DF1E845-CA70-4963-AF56-EA0AEB0B9CFF}"/>
+                </a:ext>
+              </a:extLst>
+            </p:cNvPr>
+            <p:cNvSpPr/>
+            <p:nvPr/>
+          </p:nvSpPr>
+          <p:spPr>
+            <a:xfrm>
+              <a:off x="3869890" y="4769310"/>
+              <a:ext cx="2301918" cy="718818"/>
+            </a:xfrm>
+            <a:prstGeom prst="flowChartProcess">
+              <a:avLst/>
+            </a:prstGeom>
+            <a:solidFill>
+              <a:schemeClr val="accent5">
+                <a:lumMod val="20000"/>
+                <a:lumOff val="80000"/>
+              </a:schemeClr>
+            </a:solidFill>
+          </p:spPr>
+          <p:style>
+            <a:lnRef idx="2">
+              <a:schemeClr val="accent6"/>
+            </a:lnRef>
+            <a:fillRef idx="1">
+              <a:schemeClr val="lt1"/>
+            </a:fillRef>
+            <a:effectRef idx="0">
+              <a:schemeClr val="accent6"/>
+            </a:effectRef>
+            <a:fontRef idx="minor">
+              <a:schemeClr val="dk1"/>
+            </a:fontRef>
+          </p:style>
+          <p:txBody>
+            <a:bodyPr rtlCol="0" anchor="ctr"/>
+            <a:lstStyle/>
+            <a:p>
+              <a:pPr algn="ctr"/>
+              <a:r>
+                <a:rPr lang="fi-FI" dirty="0" err="1"/>
+                <a:t>Defrosting</a:t>
+              </a:r>
+              <a:r>
+                <a:rPr lang="fi-FI" dirty="0"/>
+                <a:t> </a:t>
+              </a:r>
+              <a:r>
+                <a:rPr lang="fi-FI" dirty="0" err="1"/>
+                <a:t>started</a:t>
+              </a:r>
+              <a:r>
+                <a:rPr lang="fi-FI" dirty="0"/>
+                <a:t>(-2)</a:t>
+              </a:r>
+            </a:p>
+            <a:p>
+              <a:pPr algn="ctr"/>
+              <a:r>
+                <a:rPr lang="fi-FI" dirty="0"/>
+                <a:t> RELAY OFF</a:t>
+              </a:r>
+            </a:p>
+          </p:txBody>
+        </p:sp>
+        <p:sp>
+          <p:nvSpPr>
+            <p:cNvPr id="20" name="Tasakylkinen kolmio 19">
+              <a:extLst>
+                <a:ext uri="{FF2B5EF4-FFF2-40B4-BE49-F238E27FC236}">
+                  <a16:creationId xmlns="" xmlns:a16="http://schemas.microsoft.com/office/drawing/2014/main" id="{8FD3623A-0795-4CF7-8904-63D3F40B300F}"/>
+                </a:ext>
+              </a:extLst>
+            </p:cNvPr>
+            <p:cNvSpPr/>
+            <p:nvPr/>
+          </p:nvSpPr>
+          <p:spPr>
+            <a:xfrm rot="5400000">
+              <a:off x="6231499" y="4709623"/>
+              <a:ext cx="718817" cy="838200"/>
+            </a:xfrm>
+            <a:prstGeom prst="triangle">
+              <a:avLst/>
+            </a:prstGeom>
+          </p:spPr>
+          <p:style>
+            <a:lnRef idx="2">
+              <a:schemeClr val="accent6"/>
+            </a:lnRef>
+            <a:fillRef idx="1">
+              <a:schemeClr val="lt1"/>
+            </a:fillRef>
+            <a:effectRef idx="0">
+              <a:schemeClr val="accent6"/>
+            </a:effectRef>
+            <a:fontRef idx="minor">
+              <a:schemeClr val="dk1"/>
+            </a:fontRef>
+          </p:style>
+          <p:txBody>
+            <a:bodyPr vert="vert270" rtlCol="0" anchor="ctr"/>
+            <a:lstStyle/>
+            <a:p>
+              <a:pPr algn="ctr"/>
+              <a:r>
+                <a:rPr lang="fi-FI" dirty="0"/>
+                <a:t>30</a:t>
+              </a:r>
+            </a:p>
+          </p:txBody>
+        </p:sp>
+      </p:grpSp>
       <p:cxnSp>
         <p:nvCxnSpPr>
           <p:cNvPr id="23" name="Yhdistin: Kulma 22">
             <a:extLst>
               <a:ext uri="{FF2B5EF4-FFF2-40B4-BE49-F238E27FC236}">
-                <a16:creationId xmlns:a16="http://schemas.microsoft.com/office/drawing/2014/main" id="{60791C9F-5625-4EE9-AD9B-B26409AA9872}"/>
+                <a16:creationId xmlns="" xmlns:a16="http://schemas.microsoft.com/office/drawing/2014/main" id="{60791C9F-5625-4EE9-AD9B-B26409AA9872}"/>
               </a:ext>
             </a:extLst>
           </p:cNvPr>
           <p:cNvCxnSpPr>
             <a:cxnSpLocks/>
-            <a:stCxn id="67" idx="0"/>
           </p:cNvCxnSpPr>
           <p:nvPr/>
         </p:nvCxnSpPr>
         <p:spPr>
           <a:xfrm>
-            <a:off x="7206470" y="1817994"/>
-            <a:ext cx="507490" cy="1942288"/>
+            <a:off x="6670438" y="2159699"/>
+            <a:ext cx="1037771" cy="2123921"/>
           </a:xfrm>
           <a:prstGeom prst="bentConnector2">
             <a:avLst/>
@@ -3810,20 +3878,18 @@
           <p:cNvPr id="25" name="Yhdistin: Kulma 24">
             <a:extLst>
               <a:ext uri="{FF2B5EF4-FFF2-40B4-BE49-F238E27FC236}">
-                <a16:creationId xmlns:a16="http://schemas.microsoft.com/office/drawing/2014/main" id="{A9975FA8-A447-41AE-A825-F6451924304F}"/>
+                <a16:creationId xmlns="" xmlns:a16="http://schemas.microsoft.com/office/drawing/2014/main" id="{A9975FA8-A447-41AE-A825-F6451924304F}"/>
               </a:ext>
             </a:extLst>
           </p:cNvPr>
           <p:cNvCxnSpPr>
             <a:cxnSpLocks/>
-            <a:stCxn id="17" idx="0"/>
-            <a:endCxn id="19" idx="0"/>
           </p:cNvCxnSpPr>
           <p:nvPr/>
         </p:nvCxnSpPr>
         <p:spPr>
           <a:xfrm rot="10800000" flipV="1">
-            <a:off x="5020850" y="4119692"/>
+            <a:off x="5020850" y="4292222"/>
             <a:ext cx="548203" cy="649618"/>
           </a:xfrm>
           <a:prstGeom prst="bentConnector2">
@@ -3853,7 +3919,7 @@
           <p:cNvPr id="26" name="Tekstiruutu 25">
             <a:extLst>
               <a:ext uri="{FF2B5EF4-FFF2-40B4-BE49-F238E27FC236}">
-                <a16:creationId xmlns:a16="http://schemas.microsoft.com/office/drawing/2014/main" id="{B007E2E9-B25B-4B3E-A0CD-9234EADDDC3A}"/>
+                <a16:creationId xmlns="" xmlns:a16="http://schemas.microsoft.com/office/drawing/2014/main" id="{B007E2E9-B25B-4B3E-A0CD-9234EADDDC3A}"/>
               </a:ext>
             </a:extLst>
           </p:cNvPr>
@@ -3862,7 +3928,7 @@
         </p:nvSpPr>
         <p:spPr>
           <a:xfrm>
-            <a:off x="2061975" y="1445158"/>
+            <a:off x="2061975" y="1617688"/>
             <a:ext cx="1807915" cy="369332"/>
           </a:xfrm>
           <a:prstGeom prst="rect">
@@ -3897,7 +3963,7 @@
           <p:cNvPr id="27" name="Tekstiruutu 26">
             <a:extLst>
               <a:ext uri="{FF2B5EF4-FFF2-40B4-BE49-F238E27FC236}">
-                <a16:creationId xmlns:a16="http://schemas.microsoft.com/office/drawing/2014/main" id="{73E848BC-8F51-4F02-9544-CF3B5220EB06}"/>
+                <a16:creationId xmlns="" xmlns:a16="http://schemas.microsoft.com/office/drawing/2014/main" id="{73E848BC-8F51-4F02-9544-CF3B5220EB06}"/>
               </a:ext>
             </a:extLst>
           </p:cNvPr>
@@ -3906,7 +3972,7 @@
         </p:nvSpPr>
         <p:spPr>
           <a:xfrm>
-            <a:off x="3518256" y="3547230"/>
+            <a:off x="3518256" y="3719760"/>
             <a:ext cx="1994264" cy="646331"/>
           </a:xfrm>
           <a:prstGeom prst="rect">
@@ -3958,20 +4024,18 @@
           <p:cNvPr id="29" name="Yhdistin: Kulma 28">
             <a:extLst>
               <a:ext uri="{FF2B5EF4-FFF2-40B4-BE49-F238E27FC236}">
-                <a16:creationId xmlns:a16="http://schemas.microsoft.com/office/drawing/2014/main" id="{8A5B9D61-8B98-4298-9E8F-06E80110EEAF}"/>
+                <a16:creationId xmlns="" xmlns:a16="http://schemas.microsoft.com/office/drawing/2014/main" id="{8A5B9D61-8B98-4298-9E8F-06E80110EEAF}"/>
               </a:ext>
             </a:extLst>
           </p:cNvPr>
           <p:cNvCxnSpPr>
             <a:cxnSpLocks/>
-            <a:stCxn id="20" idx="0"/>
-            <a:endCxn id="4" idx="0"/>
           </p:cNvCxnSpPr>
           <p:nvPr/>
         </p:nvCxnSpPr>
         <p:spPr>
           <a:xfrm>
-            <a:off x="7010008" y="5128724"/>
+            <a:off x="7010008" y="5301254"/>
             <a:ext cx="912901" cy="719084"/>
           </a:xfrm>
           <a:prstGeom prst="bentConnector2">
@@ -4001,19 +4065,18 @@
           <p:cNvPr id="32" name="Yhdistin: Kulma 31">
             <a:extLst>
               <a:ext uri="{FF2B5EF4-FFF2-40B4-BE49-F238E27FC236}">
-                <a16:creationId xmlns:a16="http://schemas.microsoft.com/office/drawing/2014/main" id="{F69F939A-A614-44B9-A4D7-6787A78EA7CD}"/>
+                <a16:creationId xmlns="" xmlns:a16="http://schemas.microsoft.com/office/drawing/2014/main" id="{F69F939A-A614-44B9-A4D7-6787A78EA7CD}"/>
               </a:ext>
             </a:extLst>
           </p:cNvPr>
           <p:cNvCxnSpPr>
             <a:cxnSpLocks/>
-            <a:stCxn id="16" idx="0"/>
           </p:cNvCxnSpPr>
           <p:nvPr/>
         </p:nvCxnSpPr>
         <p:spPr>
           <a:xfrm flipH="1" flipV="1">
-            <a:off x="5397929" y="1200723"/>
+            <a:off x="5397929" y="1373253"/>
             <a:ext cx="3586892" cy="2929930"/>
           </a:xfrm>
           <a:prstGeom prst="bentConnector3">
@@ -4045,19 +4108,18 @@
           <p:cNvPr id="39" name="Yhdistin: Kulma 38">
             <a:extLst>
               <a:ext uri="{FF2B5EF4-FFF2-40B4-BE49-F238E27FC236}">
-                <a16:creationId xmlns:a16="http://schemas.microsoft.com/office/drawing/2014/main" id="{0DAFC146-E166-4427-861D-B06F02B2CCEC}"/>
+                <a16:creationId xmlns="" xmlns:a16="http://schemas.microsoft.com/office/drawing/2014/main" id="{0DAFC146-E166-4427-861D-B06F02B2CCEC}"/>
               </a:ext>
             </a:extLst>
           </p:cNvPr>
           <p:cNvCxnSpPr>
             <a:cxnSpLocks/>
-            <a:stCxn id="6" idx="0"/>
           </p:cNvCxnSpPr>
           <p:nvPr/>
         </p:nvCxnSpPr>
         <p:spPr>
           <a:xfrm flipV="1">
-            <a:off x="9911252" y="4135726"/>
+            <a:off x="9911252" y="4308256"/>
             <a:ext cx="1642573" cy="2071491"/>
           </a:xfrm>
           <a:prstGeom prst="bentConnector2">
@@ -4087,20 +4149,18 @@
           <p:cNvPr id="42" name="Yhdistin: Kulma 41">
             <a:extLst>
               <a:ext uri="{FF2B5EF4-FFF2-40B4-BE49-F238E27FC236}">
-                <a16:creationId xmlns:a16="http://schemas.microsoft.com/office/drawing/2014/main" id="{7085DE89-0D59-4550-92C6-50B997AC81CB}"/>
+                <a16:creationId xmlns="" xmlns:a16="http://schemas.microsoft.com/office/drawing/2014/main" id="{7085DE89-0D59-4550-92C6-50B997AC81CB}"/>
               </a:ext>
             </a:extLst>
           </p:cNvPr>
           <p:cNvCxnSpPr>
             <a:cxnSpLocks/>
-            <a:stCxn id="68" idx="0"/>
-            <a:endCxn id="45" idx="0"/>
           </p:cNvCxnSpPr>
           <p:nvPr/>
         </p:nvCxnSpPr>
         <p:spPr>
           <a:xfrm rot="10800000" flipV="1">
-            <a:off x="2707391" y="1818451"/>
+            <a:off x="2707391" y="1990981"/>
             <a:ext cx="976039" cy="620607"/>
           </a:xfrm>
           <a:prstGeom prst="bentConnector2">
@@ -4130,7 +4190,7 @@
           <p:cNvPr id="43" name="Tekstiruutu 42">
             <a:extLst>
               <a:ext uri="{FF2B5EF4-FFF2-40B4-BE49-F238E27FC236}">
-                <a16:creationId xmlns:a16="http://schemas.microsoft.com/office/drawing/2014/main" id="{BC02B610-F398-461E-BC05-8637EF952F5A}"/>
+                <a16:creationId xmlns="" xmlns:a16="http://schemas.microsoft.com/office/drawing/2014/main" id="{BC02B610-F398-461E-BC05-8637EF952F5A}"/>
               </a:ext>
             </a:extLst>
           </p:cNvPr>
@@ -4139,7 +4199,7 @@
         </p:nvSpPr>
         <p:spPr>
           <a:xfrm>
-            <a:off x="7067066" y="1427457"/>
+            <a:off x="7670916" y="2232591"/>
             <a:ext cx="2855842" cy="369332"/>
           </a:xfrm>
           <a:prstGeom prst="rect">
@@ -4181,182 +4241,23 @@
           </a:p>
         </p:txBody>
       </p:sp>
-      <p:sp>
-        <p:nvSpPr>
-          <p:cNvPr id="45" name="Vuokaavio: Prosessi 44">
-            <a:extLst>
-              <a:ext uri="{FF2B5EF4-FFF2-40B4-BE49-F238E27FC236}">
-                <a16:creationId xmlns:a16="http://schemas.microsoft.com/office/drawing/2014/main" id="{C630C195-B3BF-486C-A3C4-F2F6B07F387E}"/>
-              </a:ext>
-            </a:extLst>
-          </p:cNvPr>
-          <p:cNvSpPr/>
-          <p:nvPr/>
-        </p:nvSpPr>
-        <p:spPr>
-          <a:xfrm>
-            <a:off x="1638303" y="2439059"/>
-            <a:ext cx="2138173" cy="718818"/>
-          </a:xfrm>
-          <a:prstGeom prst="flowChartProcess">
-            <a:avLst/>
-          </a:prstGeom>
-          <a:solidFill>
-            <a:schemeClr val="accent2">
-              <a:lumMod val="20000"/>
-              <a:lumOff val="80000"/>
-            </a:schemeClr>
-          </a:solidFill>
-        </p:spPr>
-        <p:style>
-          <a:lnRef idx="2">
-            <a:schemeClr val="accent6"/>
-          </a:lnRef>
-          <a:fillRef idx="1">
-            <a:schemeClr val="lt1"/>
-          </a:fillRef>
-          <a:effectRef idx="0">
-            <a:schemeClr val="accent6"/>
-          </a:effectRef>
-          <a:fontRef idx="minor">
-            <a:schemeClr val="dk1"/>
-          </a:fontRef>
-        </p:style>
-        <p:txBody>
-          <a:bodyPr rtlCol="0" anchor="ctr"/>
-          <a:lstStyle/>
-          <a:p>
-            <a:pPr algn="ctr"/>
-            <a:r>
-              <a:rPr lang="fi-FI" dirty="0" err="1"/>
-              <a:t>Temp_exceeded</a:t>
-            </a:r>
-            <a:r>
-              <a:rPr lang="fi-FI" dirty="0"/>
-              <a:t>(1)</a:t>
-            </a:r>
-          </a:p>
-          <a:p>
-            <a:pPr algn="ctr"/>
-            <a:r>
-              <a:rPr lang="fi-FI" dirty="0"/>
-              <a:t>RELAY ON</a:t>
-            </a:r>
-          </a:p>
-        </p:txBody>
-      </p:sp>
-      <p:sp>
-        <p:nvSpPr>
-          <p:cNvPr id="46" name="Tasakylkinen kolmio 45">
-            <a:extLst>
-              <a:ext uri="{FF2B5EF4-FFF2-40B4-BE49-F238E27FC236}">
-                <a16:creationId xmlns:a16="http://schemas.microsoft.com/office/drawing/2014/main" id="{552DD7F1-6614-4407-96BE-0B42A9A9FEC7}"/>
-              </a:ext>
-            </a:extLst>
-          </p:cNvPr>
-          <p:cNvSpPr/>
-          <p:nvPr/>
-        </p:nvSpPr>
-        <p:spPr>
-          <a:xfrm rot="5400000">
-            <a:off x="3812232" y="2410552"/>
-            <a:ext cx="386667" cy="447192"/>
-          </a:xfrm>
-          <a:prstGeom prst="triangle">
-            <a:avLst/>
-          </a:prstGeom>
-        </p:spPr>
-        <p:style>
-          <a:lnRef idx="2">
-            <a:schemeClr val="accent6"/>
-          </a:lnRef>
-          <a:fillRef idx="1">
-            <a:schemeClr val="lt1"/>
-          </a:fillRef>
-          <a:effectRef idx="0">
-            <a:schemeClr val="accent6"/>
-          </a:effectRef>
-          <a:fontRef idx="minor">
-            <a:schemeClr val="dk1"/>
-          </a:fontRef>
-        </p:style>
-        <p:txBody>
-          <a:bodyPr vert="vert270" rtlCol="0" anchor="ctr"/>
-          <a:lstStyle/>
-          <a:p>
-            <a:pPr algn="ctr"/>
-            <a:r>
-              <a:rPr lang="fi-FI" dirty="0"/>
-              <a:t>5</a:t>
-            </a:r>
-          </a:p>
-        </p:txBody>
-      </p:sp>
-      <p:sp>
-        <p:nvSpPr>
-          <p:cNvPr id="47" name="Tasakylkinen kolmio 46">
-            <a:extLst>
-              <a:ext uri="{FF2B5EF4-FFF2-40B4-BE49-F238E27FC236}">
-                <a16:creationId xmlns:a16="http://schemas.microsoft.com/office/drawing/2014/main" id="{EAE226B5-0B5C-4680-9B70-2A61B86384B9}"/>
-              </a:ext>
-            </a:extLst>
-          </p:cNvPr>
-          <p:cNvSpPr/>
-          <p:nvPr/>
-        </p:nvSpPr>
-        <p:spPr>
-          <a:xfrm rot="16200000">
-            <a:off x="1052551" y="2572125"/>
-            <a:ext cx="718817" cy="452686"/>
-          </a:xfrm>
-          <a:prstGeom prst="triangle">
-            <a:avLst/>
-          </a:prstGeom>
-        </p:spPr>
-        <p:style>
-          <a:lnRef idx="2">
-            <a:schemeClr val="accent6"/>
-          </a:lnRef>
-          <a:fillRef idx="1">
-            <a:schemeClr val="lt1"/>
-          </a:fillRef>
-          <a:effectRef idx="0">
-            <a:schemeClr val="accent6"/>
-          </a:effectRef>
-          <a:fontRef idx="minor">
-            <a:schemeClr val="dk1"/>
-          </a:fontRef>
-        </p:style>
-        <p:txBody>
-          <a:bodyPr vert="vert" rtlCol="0" anchor="ctr"/>
-          <a:lstStyle/>
-          <a:p>
-            <a:pPr algn="ctr"/>
-            <a:r>
-              <a:rPr lang="fi-FI" dirty="0"/>
-              <a:t>4</a:t>
-            </a:r>
-          </a:p>
-        </p:txBody>
-      </p:sp>
       <p:cxnSp>
         <p:nvCxnSpPr>
           <p:cNvPr id="56" name="Yhdistin: Kulma 55">
             <a:extLst>
               <a:ext uri="{FF2B5EF4-FFF2-40B4-BE49-F238E27FC236}">
-                <a16:creationId xmlns:a16="http://schemas.microsoft.com/office/drawing/2014/main" id="{EEF17C22-A620-4C69-A5A2-3AB17B5DA731}"/>
+                <a16:creationId xmlns="" xmlns:a16="http://schemas.microsoft.com/office/drawing/2014/main" id="{EEF17C22-A620-4C69-A5A2-3AB17B5DA731}"/>
               </a:ext>
             </a:extLst>
           </p:cNvPr>
           <p:cNvCxnSpPr>
             <a:cxnSpLocks/>
-            <a:stCxn id="47" idx="0"/>
           </p:cNvCxnSpPr>
           <p:nvPr/>
         </p:nvCxnSpPr>
         <p:spPr>
           <a:xfrm rot="10800000" flipH="1">
-            <a:off x="1185616" y="1200724"/>
+            <a:off x="1185616" y="1373254"/>
             <a:ext cx="4188335" cy="1597744"/>
           </a:xfrm>
           <a:prstGeom prst="bentConnector3">
@@ -4388,7 +4289,7 @@
           <p:cNvPr id="62" name="Tekstiruutu 61">
             <a:extLst>
               <a:ext uri="{FF2B5EF4-FFF2-40B4-BE49-F238E27FC236}">
-                <a16:creationId xmlns:a16="http://schemas.microsoft.com/office/drawing/2014/main" id="{5B429EDC-B27D-4DFA-81C8-5E8767A89E00}"/>
+                <a16:creationId xmlns="" xmlns:a16="http://schemas.microsoft.com/office/drawing/2014/main" id="{5B429EDC-B27D-4DFA-81C8-5E8767A89E00}"/>
               </a:ext>
             </a:extLst>
           </p:cNvPr>
@@ -4397,7 +4298,7 @@
         </p:nvSpPr>
         <p:spPr>
           <a:xfrm>
-            <a:off x="604652" y="2009260"/>
+            <a:off x="604652" y="2181790"/>
             <a:ext cx="1807915" cy="369332"/>
           </a:xfrm>
           <a:prstGeom prst="rect">
@@ -4429,179 +4330,19 @@
       </p:sp>
       <p:sp>
         <p:nvSpPr>
-          <p:cNvPr id="66" name="Vuokaavio: Prosessi 65">
-            <a:extLst>
-              <a:ext uri="{FF2B5EF4-FFF2-40B4-BE49-F238E27FC236}">
-                <a16:creationId xmlns:a16="http://schemas.microsoft.com/office/drawing/2014/main" id="{1632A193-82B9-4F36-9C54-7AFFDE315963}"/>
-              </a:ext>
-            </a:extLst>
-          </p:cNvPr>
-          <p:cNvSpPr/>
+          <p:cNvPr id="98" name="Tekstiruutu 97">
+            <a:extLst>
+              <a:ext uri="{FF2B5EF4-FFF2-40B4-BE49-F238E27FC236}">
+                <a16:creationId xmlns="" xmlns:a16="http://schemas.microsoft.com/office/drawing/2014/main" id="{E740B5C8-BA76-4034-B504-51381BFFE49A}"/>
+              </a:ext>
+            </a:extLst>
+          </p:cNvPr>
+          <p:cNvSpPr txBox="1"/>
           <p:nvPr/>
         </p:nvSpPr>
         <p:spPr>
           <a:xfrm>
-            <a:off x="4521629" y="1449058"/>
-            <a:ext cx="1693950" cy="718818"/>
-          </a:xfrm>
-          <a:prstGeom prst="flowChartProcess">
-            <a:avLst/>
-          </a:prstGeom>
-          <a:solidFill>
-            <a:schemeClr val="accent2">
-              <a:lumMod val="20000"/>
-              <a:lumOff val="80000"/>
-            </a:schemeClr>
-          </a:solidFill>
-        </p:spPr>
-        <p:style>
-          <a:lnRef idx="2">
-            <a:schemeClr val="accent6"/>
-          </a:lnRef>
-          <a:fillRef idx="1">
-            <a:schemeClr val="lt1"/>
-          </a:fillRef>
-          <a:effectRef idx="0">
-            <a:schemeClr val="accent6"/>
-          </a:effectRef>
-          <a:fontRef idx="minor">
-            <a:schemeClr val="dk1"/>
-          </a:fontRef>
-        </p:style>
-        <p:txBody>
-          <a:bodyPr rtlCol="0" anchor="ctr"/>
-          <a:lstStyle/>
-          <a:p>
-            <a:pPr algn="ctr"/>
-            <a:r>
-              <a:rPr lang="fi-FI" dirty="0" err="1"/>
-              <a:t>Idle</a:t>
-            </a:r>
-            <a:r>
-              <a:rPr lang="fi-FI" dirty="0"/>
-              <a:t>(0)</a:t>
-            </a:r>
-          </a:p>
-          <a:p>
-            <a:pPr algn="ctr"/>
-            <a:r>
-              <a:rPr lang="fi-FI" dirty="0"/>
-              <a:t>RELAY ON</a:t>
-            </a:r>
-          </a:p>
-        </p:txBody>
-      </p:sp>
-      <p:sp>
-        <p:nvSpPr>
-          <p:cNvPr id="67" name="Tasakylkinen kolmio 66">
-            <a:extLst>
-              <a:ext uri="{FF2B5EF4-FFF2-40B4-BE49-F238E27FC236}">
-                <a16:creationId xmlns:a16="http://schemas.microsoft.com/office/drawing/2014/main" id="{AABCBC3C-34F1-409D-852B-087253346DF4}"/>
-              </a:ext>
-            </a:extLst>
-          </p:cNvPr>
-          <p:cNvSpPr/>
-          <p:nvPr/>
-        </p:nvSpPr>
-        <p:spPr>
-          <a:xfrm rot="5400000">
-            <a:off x="6354290" y="1315698"/>
-            <a:ext cx="718817" cy="985542"/>
-          </a:xfrm>
-          <a:prstGeom prst="triangle">
-            <a:avLst>
-              <a:gd name="adj" fmla="val 51325"/>
-            </a:avLst>
-          </a:prstGeom>
-        </p:spPr>
-        <p:style>
-          <a:lnRef idx="2">
-            <a:schemeClr val="accent6"/>
-          </a:lnRef>
-          <a:fillRef idx="1">
-            <a:schemeClr val="lt1"/>
-          </a:fillRef>
-          <a:effectRef idx="0">
-            <a:schemeClr val="accent6"/>
-          </a:effectRef>
-          <a:fontRef idx="minor">
-            <a:schemeClr val="dk1"/>
-          </a:fontRef>
-        </p:style>
-        <p:txBody>
-          <a:bodyPr vert="vert270" rtlCol="0" anchor="ctr"/>
-          <a:lstStyle/>
-          <a:p>
-            <a:pPr algn="ctr"/>
-            <a:r>
-              <a:rPr lang="fi-FI" dirty="0"/>
-              <a:t>150</a:t>
-            </a:r>
-          </a:p>
-        </p:txBody>
-      </p:sp>
-      <p:sp>
-        <p:nvSpPr>
-          <p:cNvPr id="68" name="Tasakylkinen kolmio 67">
-            <a:extLst>
-              <a:ext uri="{FF2B5EF4-FFF2-40B4-BE49-F238E27FC236}">
-                <a16:creationId xmlns:a16="http://schemas.microsoft.com/office/drawing/2014/main" id="{2887D7DB-E49B-4FA2-85D3-44366855794A}"/>
-              </a:ext>
-            </a:extLst>
-          </p:cNvPr>
-          <p:cNvSpPr/>
-          <p:nvPr/>
-        </p:nvSpPr>
-        <p:spPr>
-          <a:xfrm rot="16200000">
-            <a:off x="3743120" y="1399352"/>
-            <a:ext cx="718817" cy="838200"/>
-          </a:xfrm>
-          <a:prstGeom prst="triangle">
-            <a:avLst/>
-          </a:prstGeom>
-        </p:spPr>
-        <p:style>
-          <a:lnRef idx="2">
-            <a:schemeClr val="accent6"/>
-          </a:lnRef>
-          <a:fillRef idx="1">
-            <a:schemeClr val="lt1"/>
-          </a:fillRef>
-          <a:effectRef idx="0">
-            <a:schemeClr val="accent6"/>
-          </a:effectRef>
-          <a:fontRef idx="minor">
-            <a:schemeClr val="dk1"/>
-          </a:fontRef>
-        </p:style>
-        <p:txBody>
-          <a:bodyPr vert="vert" rtlCol="0" anchor="ctr"/>
-          <a:lstStyle/>
-          <a:p>
-            <a:pPr algn="ctr"/>
-            <a:r>
-              <a:rPr lang="fi-FI" dirty="0"/>
-              <a:t>4</a:t>
-            </a:r>
-          </a:p>
-        </p:txBody>
-      </p:sp>
-      <p:sp>
-        <p:nvSpPr>
-          <p:cNvPr id="98" name="Tekstiruutu 97">
-            <a:extLst>
-              <a:ext uri="{FF2B5EF4-FFF2-40B4-BE49-F238E27FC236}">
-                <a16:creationId xmlns:a16="http://schemas.microsoft.com/office/drawing/2014/main" id="{E740B5C8-BA76-4034-B504-51381BFFE49A}"/>
-              </a:ext>
-            </a:extLst>
-          </p:cNvPr>
-          <p:cNvSpPr txBox="1"/>
-          <p:nvPr/>
-        </p:nvSpPr>
-        <p:spPr>
-          <a:xfrm>
-            <a:off x="4170454" y="2313555"/>
+            <a:off x="4170454" y="2486085"/>
             <a:ext cx="3167183" cy="369332"/>
           </a:xfrm>
           <a:prstGeom prst="rect">
@@ -4644,7 +4385,7 @@
           <p:cNvPr id="105" name="Tekstiruutu 104">
             <a:extLst>
               <a:ext uri="{FF2B5EF4-FFF2-40B4-BE49-F238E27FC236}">
-                <a16:creationId xmlns:a16="http://schemas.microsoft.com/office/drawing/2014/main" id="{7062F488-3153-4E41-A3BE-076E5B7118D6}"/>
+                <a16:creationId xmlns="" xmlns:a16="http://schemas.microsoft.com/office/drawing/2014/main" id="{7062F488-3153-4E41-A3BE-076E5B7118D6}"/>
               </a:ext>
             </a:extLst>
           </p:cNvPr>
@@ -4653,7 +4394,7 @@
         </p:nvSpPr>
         <p:spPr>
           <a:xfrm>
-            <a:off x="9014413" y="3448457"/>
+            <a:off x="9014413" y="3620987"/>
             <a:ext cx="2368800" cy="646331"/>
           </a:xfrm>
           <a:prstGeom prst="rect">
@@ -4718,7 +4459,7 @@
           <p:cNvPr id="113" name="Tekstiruutu 112">
             <a:extLst>
               <a:ext uri="{FF2B5EF4-FFF2-40B4-BE49-F238E27FC236}">
-                <a16:creationId xmlns:a16="http://schemas.microsoft.com/office/drawing/2014/main" id="{E1B46EB5-6D79-44BB-8E0F-D374CCF292FC}"/>
+                <a16:creationId xmlns="" xmlns:a16="http://schemas.microsoft.com/office/drawing/2014/main" id="{E1B46EB5-6D79-44BB-8E0F-D374CCF292FC}"/>
               </a:ext>
             </a:extLst>
           </p:cNvPr>
@@ -4727,7 +4468,7 @@
         </p:nvSpPr>
         <p:spPr>
           <a:xfrm>
-            <a:off x="7895929" y="4625854"/>
+            <a:off x="7895929" y="4798384"/>
             <a:ext cx="1881102" cy="646331"/>
           </a:xfrm>
           <a:prstGeom prst="rect">
@@ -4778,7 +4519,7 @@
           <p:cNvPr id="118" name="Tekstiruutu 117">
             <a:extLst>
               <a:ext uri="{FF2B5EF4-FFF2-40B4-BE49-F238E27FC236}">
-                <a16:creationId xmlns:a16="http://schemas.microsoft.com/office/drawing/2014/main" id="{4E2A27A7-38C9-4C35-8EBF-C06A9F4E5A60}"/>
+                <a16:creationId xmlns="" xmlns:a16="http://schemas.microsoft.com/office/drawing/2014/main" id="{4E2A27A7-38C9-4C35-8EBF-C06A9F4E5A60}"/>
               </a:ext>
             </a:extLst>
           </p:cNvPr>
@@ -4787,7 +4528,7 @@
         </p:nvSpPr>
         <p:spPr>
           <a:xfrm>
-            <a:off x="9911252" y="5309839"/>
+            <a:off x="9911252" y="5482369"/>
             <a:ext cx="1633163" cy="923330"/>
           </a:xfrm>
           <a:prstGeom prst="rect">
@@ -4838,19 +4579,18 @@
           <p:cNvPr id="139" name="Yhdistin: Kulma 138">
             <a:extLst>
               <a:ext uri="{FF2B5EF4-FFF2-40B4-BE49-F238E27FC236}">
-                <a16:creationId xmlns:a16="http://schemas.microsoft.com/office/drawing/2014/main" id="{E3A88081-ED3B-4E41-A7C1-90830541B65A}"/>
+                <a16:creationId xmlns="" xmlns:a16="http://schemas.microsoft.com/office/drawing/2014/main" id="{E3A88081-ED3B-4E41-A7C1-90830541B65A}"/>
               </a:ext>
             </a:extLst>
           </p:cNvPr>
           <p:cNvCxnSpPr>
             <a:cxnSpLocks/>
-            <a:stCxn id="7" idx="0"/>
           </p:cNvCxnSpPr>
           <p:nvPr/>
         </p:nvCxnSpPr>
         <p:spPr>
           <a:xfrm rot="10800000" flipH="1">
-            <a:off x="5822749" y="3704610"/>
+            <a:off x="5822749" y="3877140"/>
             <a:ext cx="631720" cy="2502607"/>
           </a:xfrm>
           <a:prstGeom prst="bentConnector4">
@@ -4883,7 +4623,7 @@
           <p:cNvPr id="157" name="Tekstiruutu 156">
             <a:extLst>
               <a:ext uri="{FF2B5EF4-FFF2-40B4-BE49-F238E27FC236}">
-                <a16:creationId xmlns:a16="http://schemas.microsoft.com/office/drawing/2014/main" id="{12510DC3-EEAC-4B20-9CB8-C81BCA62EDEB}"/>
+                <a16:creationId xmlns="" xmlns:a16="http://schemas.microsoft.com/office/drawing/2014/main" id="{12510DC3-EEAC-4B20-9CB8-C81BCA62EDEB}"/>
               </a:ext>
             </a:extLst>
           </p:cNvPr>
@@ -4892,7 +4632,7 @@
         </p:nvSpPr>
         <p:spPr>
           <a:xfrm>
-            <a:off x="3219888" y="5863837"/>
+            <a:off x="3219888" y="6036367"/>
             <a:ext cx="2557437" cy="369332"/>
           </a:xfrm>
           <a:prstGeom prst="rect">
@@ -4939,7 +4679,7 @@
           <p:cNvPr id="171" name="Yhdistin: Kulma 170">
             <a:extLst>
               <a:ext uri="{FF2B5EF4-FFF2-40B4-BE49-F238E27FC236}">
-                <a16:creationId xmlns:a16="http://schemas.microsoft.com/office/drawing/2014/main" id="{00ED9033-5C0A-476F-B8AD-152C87CA55CB}"/>
+                <a16:creationId xmlns="" xmlns:a16="http://schemas.microsoft.com/office/drawing/2014/main" id="{00ED9033-5C0A-476F-B8AD-152C87CA55CB}"/>
               </a:ext>
             </a:extLst>
           </p:cNvPr>
@@ -4950,7 +4690,7 @@
         </p:nvCxnSpPr>
         <p:spPr>
           <a:xfrm>
-            <a:off x="4229162" y="2642784"/>
+            <a:off x="4229162" y="2815314"/>
             <a:ext cx="3505138" cy="5166"/>
           </a:xfrm>
           <a:prstGeom prst="bentConnector3">
@@ -4977,226 +4717,242 @@
           </a:fontRef>
         </p:style>
       </p:cxnSp>
-      <p:sp>
-        <p:nvSpPr>
-          <p:cNvPr id="36" name="Vuokaavio: Prosessi 35">
-            <a:extLst>
-              <a:ext uri="{FF2B5EF4-FFF2-40B4-BE49-F238E27FC236}">
-                <a16:creationId xmlns:a16="http://schemas.microsoft.com/office/drawing/2014/main" id="{90497816-96AC-43D8-AAB9-F35DC3844092}"/>
-              </a:ext>
-            </a:extLst>
-          </p:cNvPr>
-          <p:cNvSpPr/>
+      <p:grpSp>
+        <p:nvGrpSpPr>
+          <p:cNvPr id="63" name="Group 62"/>
+          <p:cNvGrpSpPr/>
+          <p:nvPr/>
+        </p:nvGrpSpPr>
+        <p:grpSpPr>
+          <a:xfrm>
+            <a:off x="1185617" y="2611589"/>
+            <a:ext cx="3043545" cy="729666"/>
+            <a:chOff x="1185617" y="2439059"/>
+            <a:chExt cx="3043545" cy="729666"/>
+          </a:xfrm>
+        </p:grpSpPr>
+        <p:sp>
+          <p:nvSpPr>
+            <p:cNvPr id="45" name="Vuokaavio: Prosessi 44">
+              <a:extLst>
+                <a:ext uri="{FF2B5EF4-FFF2-40B4-BE49-F238E27FC236}">
+                  <a16:creationId xmlns="" xmlns:a16="http://schemas.microsoft.com/office/drawing/2014/main" id="{C630C195-B3BF-486C-A3C4-F2F6B07F387E}"/>
+                </a:ext>
+              </a:extLst>
+            </p:cNvPr>
+            <p:cNvSpPr/>
+            <p:nvPr/>
+          </p:nvSpPr>
+          <p:spPr>
+            <a:xfrm>
+              <a:off x="1638303" y="2439059"/>
+              <a:ext cx="2138173" cy="718818"/>
+            </a:xfrm>
+            <a:prstGeom prst="flowChartProcess">
+              <a:avLst/>
+            </a:prstGeom>
+            <a:solidFill>
+              <a:schemeClr val="accent2">
+                <a:lumMod val="20000"/>
+                <a:lumOff val="80000"/>
+              </a:schemeClr>
+            </a:solidFill>
+          </p:spPr>
+          <p:style>
+            <a:lnRef idx="2">
+              <a:schemeClr val="accent6"/>
+            </a:lnRef>
+            <a:fillRef idx="1">
+              <a:schemeClr val="lt1"/>
+            </a:fillRef>
+            <a:effectRef idx="0">
+              <a:schemeClr val="accent6"/>
+            </a:effectRef>
+            <a:fontRef idx="minor">
+              <a:schemeClr val="dk1"/>
+            </a:fontRef>
+          </p:style>
+          <p:txBody>
+            <a:bodyPr rtlCol="0" anchor="ctr"/>
+            <a:lstStyle/>
+            <a:p>
+              <a:pPr algn="ctr"/>
+              <a:r>
+                <a:rPr lang="fi-FI" dirty="0" err="1"/>
+                <a:t>Temp_exceeded</a:t>
+              </a:r>
+              <a:r>
+                <a:rPr lang="fi-FI" dirty="0"/>
+                <a:t>(1)</a:t>
+              </a:r>
+            </a:p>
+            <a:p>
+              <a:pPr algn="ctr"/>
+              <a:r>
+                <a:rPr lang="fi-FI" dirty="0"/>
+                <a:t>RELAY ON</a:t>
+              </a:r>
+            </a:p>
+          </p:txBody>
+        </p:sp>
+        <p:sp>
+          <p:nvSpPr>
+            <p:cNvPr id="46" name="Tasakylkinen kolmio 45">
+              <a:extLst>
+                <a:ext uri="{FF2B5EF4-FFF2-40B4-BE49-F238E27FC236}">
+                  <a16:creationId xmlns="" xmlns:a16="http://schemas.microsoft.com/office/drawing/2014/main" id="{552DD7F1-6614-4407-96BE-0B42A9A9FEC7}"/>
+                </a:ext>
+              </a:extLst>
+            </p:cNvPr>
+            <p:cNvSpPr/>
+            <p:nvPr/>
+          </p:nvSpPr>
+          <p:spPr>
+            <a:xfrm rot="5400000">
+              <a:off x="3812232" y="2410552"/>
+              <a:ext cx="386667" cy="447192"/>
+            </a:xfrm>
+            <a:prstGeom prst="triangle">
+              <a:avLst/>
+            </a:prstGeom>
+          </p:spPr>
+          <p:style>
+            <a:lnRef idx="2">
+              <a:schemeClr val="accent6"/>
+            </a:lnRef>
+            <a:fillRef idx="1">
+              <a:schemeClr val="lt1"/>
+            </a:fillRef>
+            <a:effectRef idx="0">
+              <a:schemeClr val="accent6"/>
+            </a:effectRef>
+            <a:fontRef idx="minor">
+              <a:schemeClr val="dk1"/>
+            </a:fontRef>
+          </p:style>
+          <p:txBody>
+            <a:bodyPr vert="vert270" rtlCol="0" anchor="ctr"/>
+            <a:lstStyle/>
+            <a:p>
+              <a:pPr algn="ctr"/>
+              <a:r>
+                <a:rPr lang="fi-FI" dirty="0"/>
+                <a:t>5</a:t>
+              </a:r>
+            </a:p>
+          </p:txBody>
+        </p:sp>
+        <p:sp>
+          <p:nvSpPr>
+            <p:cNvPr id="47" name="Tasakylkinen kolmio 46">
+              <a:extLst>
+                <a:ext uri="{FF2B5EF4-FFF2-40B4-BE49-F238E27FC236}">
+                  <a16:creationId xmlns="" xmlns:a16="http://schemas.microsoft.com/office/drawing/2014/main" id="{EAE226B5-0B5C-4680-9B70-2A61B86384B9}"/>
+                </a:ext>
+              </a:extLst>
+            </p:cNvPr>
+            <p:cNvSpPr/>
+            <p:nvPr/>
+          </p:nvSpPr>
+          <p:spPr>
+            <a:xfrm rot="16200000">
+              <a:off x="1052551" y="2572125"/>
+              <a:ext cx="718817" cy="452686"/>
+            </a:xfrm>
+            <a:prstGeom prst="triangle">
+              <a:avLst/>
+            </a:prstGeom>
+          </p:spPr>
+          <p:style>
+            <a:lnRef idx="2">
+              <a:schemeClr val="accent6"/>
+            </a:lnRef>
+            <a:fillRef idx="1">
+              <a:schemeClr val="lt1"/>
+            </a:fillRef>
+            <a:effectRef idx="0">
+              <a:schemeClr val="accent6"/>
+            </a:effectRef>
+            <a:fontRef idx="minor">
+              <a:schemeClr val="dk1"/>
+            </a:fontRef>
+          </p:style>
+          <p:txBody>
+            <a:bodyPr vert="vert" rtlCol="0" anchor="ctr"/>
+            <a:lstStyle/>
+            <a:p>
+              <a:pPr algn="ctr"/>
+              <a:r>
+                <a:rPr lang="fi-FI" dirty="0"/>
+                <a:t>4</a:t>
+              </a:r>
+            </a:p>
+          </p:txBody>
+        </p:sp>
+        <p:sp>
+          <p:nvSpPr>
+            <p:cNvPr id="44" name="Tasakylkinen kolmio 43">
+              <a:extLst>
+                <a:ext uri="{FF2B5EF4-FFF2-40B4-BE49-F238E27FC236}">
+                  <a16:creationId xmlns="" xmlns:a16="http://schemas.microsoft.com/office/drawing/2014/main" id="{39FA4BA9-140D-4177-87CC-E225E08D8180}"/>
+                </a:ext>
+              </a:extLst>
+            </p:cNvPr>
+            <p:cNvSpPr/>
+            <p:nvPr/>
+          </p:nvSpPr>
+          <p:spPr>
+            <a:xfrm rot="5400000">
+              <a:off x="3812232" y="2751796"/>
+              <a:ext cx="386667" cy="447192"/>
+            </a:xfrm>
+            <a:prstGeom prst="triangle">
+              <a:avLst/>
+            </a:prstGeom>
+          </p:spPr>
+          <p:style>
+            <a:lnRef idx="2">
+              <a:schemeClr val="accent6"/>
+            </a:lnRef>
+            <a:fillRef idx="1">
+              <a:schemeClr val="lt1"/>
+            </a:fillRef>
+            <a:effectRef idx="0">
+              <a:schemeClr val="accent6"/>
+            </a:effectRef>
+            <a:fontRef idx="minor">
+              <a:schemeClr val="dk1"/>
+            </a:fontRef>
+          </p:style>
+          <p:txBody>
+            <a:bodyPr vert="vert270" rtlCol="0" anchor="ctr"/>
+            <a:lstStyle/>
+            <a:p>
+              <a:pPr algn="ctr"/>
+              <a:endParaRPr lang="fi-FI" dirty="0"/>
+            </a:p>
+            <a:p>
+              <a:pPr algn="ctr"/>
+              <a:endParaRPr lang="fi-FI" dirty="0"/>
+            </a:p>
+          </p:txBody>
+        </p:sp>
+      </p:grpSp>
+      <p:sp>
+        <p:nvSpPr>
+          <p:cNvPr id="48" name="Tekstiruutu 47">
+            <a:extLst>
+              <a:ext uri="{FF2B5EF4-FFF2-40B4-BE49-F238E27FC236}">
+                <a16:creationId xmlns="" xmlns:a16="http://schemas.microsoft.com/office/drawing/2014/main" id="{799FFFCB-19E3-4CBA-A69C-3EED8E87A3AF}"/>
+              </a:ext>
+            </a:extLst>
+          </p:cNvPr>
+          <p:cNvSpPr txBox="1"/>
           <p:nvPr/>
         </p:nvSpPr>
         <p:spPr>
           <a:xfrm>
-            <a:off x="2471011" y="302301"/>
-            <a:ext cx="1693950" cy="718818"/>
-          </a:xfrm>
-          <a:prstGeom prst="flowChartProcess">
-            <a:avLst/>
-          </a:prstGeom>
-          <a:solidFill>
-            <a:schemeClr val="accent5">
-              <a:lumMod val="20000"/>
-              <a:lumOff val="80000"/>
-            </a:schemeClr>
-          </a:solidFill>
-        </p:spPr>
-        <p:style>
-          <a:lnRef idx="2">
-            <a:schemeClr val="accent6"/>
-          </a:lnRef>
-          <a:fillRef idx="1">
-            <a:schemeClr val="lt1"/>
-          </a:fillRef>
-          <a:effectRef idx="0">
-            <a:schemeClr val="accent6"/>
-          </a:effectRef>
-          <a:fontRef idx="minor">
-            <a:schemeClr val="dk1"/>
-          </a:fontRef>
-        </p:style>
-        <p:txBody>
-          <a:bodyPr rtlCol="0" anchor="ctr"/>
-          <a:lstStyle/>
-          <a:p>
-            <a:pPr algn="ctr"/>
-            <a:r>
-              <a:rPr lang="fi-FI" dirty="0" err="1"/>
-              <a:t>Reset</a:t>
-            </a:r>
-            <a:r>
-              <a:rPr lang="fi-FI" dirty="0"/>
-              <a:t>(-4)</a:t>
-            </a:r>
-          </a:p>
-          <a:p>
-            <a:pPr algn="ctr"/>
-            <a:r>
-              <a:rPr lang="fi-FI" dirty="0"/>
-              <a:t>RELAY OFF</a:t>
-            </a:r>
-          </a:p>
-        </p:txBody>
-      </p:sp>
-      <p:sp>
-        <p:nvSpPr>
-          <p:cNvPr id="37" name="Tasakylkinen kolmio 36">
-            <a:extLst>
-              <a:ext uri="{FF2B5EF4-FFF2-40B4-BE49-F238E27FC236}">
-                <a16:creationId xmlns:a16="http://schemas.microsoft.com/office/drawing/2014/main" id="{97A1569A-1C68-4ECA-8511-AB664D419E77}"/>
-              </a:ext>
-            </a:extLst>
-          </p:cNvPr>
-          <p:cNvSpPr/>
-          <p:nvPr/>
-        </p:nvSpPr>
-        <p:spPr>
-          <a:xfrm rot="5400000">
-            <a:off x="4136210" y="354615"/>
-            <a:ext cx="718817" cy="639716"/>
-          </a:xfrm>
-          <a:prstGeom prst="triangle">
-            <a:avLst>
-              <a:gd name="adj" fmla="val 51325"/>
-            </a:avLst>
-          </a:prstGeom>
-        </p:spPr>
-        <p:style>
-          <a:lnRef idx="2">
-            <a:schemeClr val="accent6"/>
-          </a:lnRef>
-          <a:fillRef idx="1">
-            <a:schemeClr val="lt1"/>
-          </a:fillRef>
-          <a:effectRef idx="0">
-            <a:schemeClr val="accent6"/>
-          </a:effectRef>
-          <a:fontRef idx="minor">
-            <a:schemeClr val="dk1"/>
-          </a:fontRef>
-        </p:style>
-        <p:txBody>
-          <a:bodyPr vert="vert270" rtlCol="0" anchor="ctr"/>
-          <a:lstStyle/>
-          <a:p>
-            <a:pPr algn="ctr"/>
-            <a:endParaRPr lang="fi-FI" dirty="0"/>
-          </a:p>
-        </p:txBody>
-      </p:sp>
-      <p:sp>
-        <p:nvSpPr>
-          <p:cNvPr id="38" name="Tasakylkinen kolmio 37">
-            <a:extLst>
-              <a:ext uri="{FF2B5EF4-FFF2-40B4-BE49-F238E27FC236}">
-                <a16:creationId xmlns:a16="http://schemas.microsoft.com/office/drawing/2014/main" id="{C40A5B0E-8DDF-4E0E-8AB8-1B35DA2D6D26}"/>
-              </a:ext>
-            </a:extLst>
-          </p:cNvPr>
-          <p:cNvSpPr/>
-          <p:nvPr/>
-        </p:nvSpPr>
-        <p:spPr>
-          <a:xfrm rot="16200000">
-            <a:off x="1885474" y="431407"/>
-            <a:ext cx="718817" cy="451271"/>
-          </a:xfrm>
-          <a:prstGeom prst="triangle">
-            <a:avLst/>
-          </a:prstGeom>
-        </p:spPr>
-        <p:style>
-          <a:lnRef idx="2">
-            <a:schemeClr val="accent6"/>
-          </a:lnRef>
-          <a:fillRef idx="1">
-            <a:schemeClr val="lt1"/>
-          </a:fillRef>
-          <a:effectRef idx="0">
-            <a:schemeClr val="accent6"/>
-          </a:effectRef>
-          <a:fontRef idx="minor">
-            <a:schemeClr val="dk1"/>
-          </a:fontRef>
-        </p:style>
-        <p:txBody>
-          <a:bodyPr vert="vert" rtlCol="0" anchor="ctr"/>
-          <a:lstStyle/>
-          <a:p>
-            <a:pPr algn="ctr"/>
-            <a:r>
-              <a:rPr lang="fi-FI" dirty="0"/>
-              <a:t>0</a:t>
-            </a:r>
-          </a:p>
-        </p:txBody>
-      </p:sp>
-      <p:sp>
-        <p:nvSpPr>
-          <p:cNvPr id="44" name="Tasakylkinen kolmio 43">
-            <a:extLst>
-              <a:ext uri="{FF2B5EF4-FFF2-40B4-BE49-F238E27FC236}">
-                <a16:creationId xmlns:a16="http://schemas.microsoft.com/office/drawing/2014/main" id="{39FA4BA9-140D-4177-87CC-E225E08D8180}"/>
-              </a:ext>
-            </a:extLst>
-          </p:cNvPr>
-          <p:cNvSpPr/>
-          <p:nvPr/>
-        </p:nvSpPr>
-        <p:spPr>
-          <a:xfrm rot="5400000">
-            <a:off x="3812232" y="2751796"/>
-            <a:ext cx="386667" cy="447192"/>
-          </a:xfrm>
-          <a:prstGeom prst="triangle">
-            <a:avLst/>
-          </a:prstGeom>
-        </p:spPr>
-        <p:style>
-          <a:lnRef idx="2">
-            <a:schemeClr val="accent6"/>
-          </a:lnRef>
-          <a:fillRef idx="1">
-            <a:schemeClr val="lt1"/>
-          </a:fillRef>
-          <a:effectRef idx="0">
-            <a:schemeClr val="accent6"/>
-          </a:effectRef>
-          <a:fontRef idx="minor">
-            <a:schemeClr val="dk1"/>
-          </a:fontRef>
-        </p:style>
-        <p:txBody>
-          <a:bodyPr vert="vert270" rtlCol="0" anchor="ctr"/>
-          <a:lstStyle/>
-          <a:p>
-            <a:pPr algn="ctr"/>
-            <a:endParaRPr lang="fi-FI" dirty="0"/>
-          </a:p>
-          <a:p>
-            <a:pPr algn="ctr"/>
-            <a:endParaRPr lang="fi-FI" dirty="0"/>
-          </a:p>
-        </p:txBody>
-      </p:sp>
-      <p:sp>
-        <p:nvSpPr>
-          <p:cNvPr id="48" name="Tekstiruutu 47">
-            <a:extLst>
-              <a:ext uri="{FF2B5EF4-FFF2-40B4-BE49-F238E27FC236}">
-                <a16:creationId xmlns:a16="http://schemas.microsoft.com/office/drawing/2014/main" id="{799FFFCB-19E3-4CBA-A69C-3EED8E87A3AF}"/>
-              </a:ext>
-            </a:extLst>
-          </p:cNvPr>
-          <p:cNvSpPr txBox="1"/>
-          <p:nvPr/>
-        </p:nvSpPr>
-        <p:spPr>
-          <a:xfrm>
-            <a:off x="4164961" y="2644539"/>
+            <a:off x="4164961" y="2817069"/>
             <a:ext cx="2855842" cy="369332"/>
           </a:xfrm>
           <a:prstGeom prst="rect">
@@ -5243,7 +4999,7 @@
           <p:cNvPr id="12" name="Yhdistin: Kulma 11">
             <a:extLst>
               <a:ext uri="{FF2B5EF4-FFF2-40B4-BE49-F238E27FC236}">
-                <a16:creationId xmlns:a16="http://schemas.microsoft.com/office/drawing/2014/main" id="{81D52178-9AE6-4370-9797-112DE02B8C4D}"/>
+                <a16:creationId xmlns="" xmlns:a16="http://schemas.microsoft.com/office/drawing/2014/main" id="{81D52178-9AE6-4370-9797-112DE02B8C4D}"/>
               </a:ext>
             </a:extLst>
           </p:cNvPr>
@@ -5254,7 +5010,7 @@
         </p:nvCxnSpPr>
         <p:spPr>
           <a:xfrm>
-            <a:off x="4229162" y="2973440"/>
+            <a:off x="4229162" y="3145970"/>
             <a:ext cx="3484798" cy="1953"/>
           </a:xfrm>
           <a:prstGeom prst="bentConnector3">
@@ -5284,19 +5040,18 @@
           <p:cNvPr id="18" name="Yhdistin: Kulma 17">
             <a:extLst>
               <a:ext uri="{FF2B5EF4-FFF2-40B4-BE49-F238E27FC236}">
-                <a16:creationId xmlns:a16="http://schemas.microsoft.com/office/drawing/2014/main" id="{D9464A69-88F8-4050-9789-2F16F1A28499}"/>
+                <a16:creationId xmlns="" xmlns:a16="http://schemas.microsoft.com/office/drawing/2014/main" id="{D9464A69-88F8-4050-9789-2F16F1A28499}"/>
               </a:ext>
             </a:extLst>
           </p:cNvPr>
           <p:cNvCxnSpPr>
             <a:cxnSpLocks/>
-            <a:stCxn id="38" idx="0"/>
           </p:cNvCxnSpPr>
           <p:nvPr/>
         </p:nvCxnSpPr>
         <p:spPr>
           <a:xfrm rot="10800000" flipH="1" flipV="1">
-            <a:off x="2019247" y="657042"/>
+            <a:off x="2019247" y="829572"/>
             <a:ext cx="2590858" cy="4122312"/>
           </a:xfrm>
           <a:prstGeom prst="bentConnector4">
@@ -5329,7 +5084,7 @@
           <p:cNvPr id="52" name="Tekstiruutu 51">
             <a:extLst>
               <a:ext uri="{FF2B5EF4-FFF2-40B4-BE49-F238E27FC236}">
-                <a16:creationId xmlns:a16="http://schemas.microsoft.com/office/drawing/2014/main" id="{331AFF1C-C092-44DF-910A-5900261A07BF}"/>
+                <a16:creationId xmlns="" xmlns:a16="http://schemas.microsoft.com/office/drawing/2014/main" id="{331AFF1C-C092-44DF-910A-5900261A07BF}"/>
               </a:ext>
             </a:extLst>
           </p:cNvPr>
@@ -5338,7 +5093,7 @@
         </p:nvSpPr>
         <p:spPr>
           <a:xfrm>
-            <a:off x="119699" y="401341"/>
+            <a:off x="119699" y="573871"/>
             <a:ext cx="1994264" cy="646331"/>
           </a:xfrm>
           <a:prstGeom prst="rect">
@@ -5390,21 +5145,19 @@
           <p:cNvPr id="33" name="Yhdistin: Kulma 32">
             <a:extLst>
               <a:ext uri="{FF2B5EF4-FFF2-40B4-BE49-F238E27FC236}">
-                <a16:creationId xmlns:a16="http://schemas.microsoft.com/office/drawing/2014/main" id="{A695496F-E1E4-40D2-A63D-184D01DB514B}"/>
+                <a16:creationId xmlns="" xmlns:a16="http://schemas.microsoft.com/office/drawing/2014/main" id="{A695496F-E1E4-40D2-A63D-184D01DB514B}"/>
               </a:ext>
             </a:extLst>
           </p:cNvPr>
           <p:cNvCxnSpPr>
             <a:cxnSpLocks/>
-            <a:stCxn id="37" idx="0"/>
-            <a:endCxn id="66" idx="0"/>
           </p:cNvCxnSpPr>
           <p:nvPr/>
         </p:nvCxnSpPr>
         <p:spPr>
           <a:xfrm>
-            <a:off x="4815477" y="683998"/>
-            <a:ext cx="553127" cy="765060"/>
+            <a:off x="4623102" y="1017201"/>
+            <a:ext cx="745502" cy="604387"/>
           </a:xfrm>
           <a:prstGeom prst="bentConnector2">
             <a:avLst/>
@@ -5428,10 +5181,867 @@
           </a:fontRef>
         </p:style>
       </p:cxnSp>
+      <p:grpSp>
+        <p:nvGrpSpPr>
+          <p:cNvPr id="71" name="Group 70"/>
+          <p:cNvGrpSpPr/>
+          <p:nvPr/>
+        </p:nvGrpSpPr>
+        <p:grpSpPr>
+          <a:xfrm>
+            <a:off x="7734794" y="607646"/>
+            <a:ext cx="2532150" cy="728802"/>
+            <a:chOff x="8085777" y="1992523"/>
+            <a:chExt cx="2532150" cy="728802"/>
+          </a:xfrm>
+        </p:grpSpPr>
+        <p:sp>
+          <p:nvSpPr>
+            <p:cNvPr id="58" name="Vuokaavio: Prosessi 65">
+              <a:extLst>
+                <a:ext uri="{FF2B5EF4-FFF2-40B4-BE49-F238E27FC236}">
+                  <a16:creationId xmlns="" xmlns:a16="http://schemas.microsoft.com/office/drawing/2014/main" id="{1632A193-82B9-4F36-9C54-7AFFDE315963}"/>
+                </a:ext>
+              </a:extLst>
+            </p:cNvPr>
+            <p:cNvSpPr/>
+            <p:nvPr/>
+          </p:nvSpPr>
+          <p:spPr>
+            <a:xfrm>
+              <a:off x="8923977" y="1992523"/>
+              <a:ext cx="1693950" cy="718818"/>
+            </a:xfrm>
+            <a:prstGeom prst="flowChartProcess">
+              <a:avLst/>
+            </a:prstGeom>
+            <a:solidFill>
+              <a:schemeClr val="accent2">
+                <a:lumMod val="20000"/>
+                <a:lumOff val="80000"/>
+              </a:schemeClr>
+            </a:solidFill>
+          </p:spPr>
+          <p:style>
+            <a:lnRef idx="2">
+              <a:schemeClr val="accent6"/>
+            </a:lnRef>
+            <a:fillRef idx="1">
+              <a:schemeClr val="lt1"/>
+            </a:fillRef>
+            <a:effectRef idx="0">
+              <a:schemeClr val="accent6"/>
+            </a:effectRef>
+            <a:fontRef idx="minor">
+              <a:schemeClr val="dk1"/>
+            </a:fontRef>
+          </p:style>
+          <p:txBody>
+            <a:bodyPr rtlCol="0" anchor="ctr"/>
+            <a:lstStyle/>
+            <a:p>
+              <a:pPr algn="ctr"/>
+              <a:r>
+                <a:rPr lang="fi-FI" dirty="0" smtClean="0"/>
+                <a:t>Off(-3)</a:t>
+              </a:r>
+              <a:endParaRPr lang="fi-FI" dirty="0"/>
+            </a:p>
+            <a:p>
+              <a:pPr algn="ctr"/>
+              <a:r>
+                <a:rPr lang="fi-FI" dirty="0"/>
+                <a:t>RELAY </a:t>
+              </a:r>
+              <a:r>
+                <a:rPr lang="fi-FI" dirty="0" smtClean="0"/>
+                <a:t>OFF</a:t>
+              </a:r>
+              <a:endParaRPr lang="fi-FI" dirty="0"/>
+            </a:p>
+          </p:txBody>
+        </p:sp>
+        <p:sp>
+          <p:nvSpPr>
+            <p:cNvPr id="60" name="Tasakylkinen kolmio 67">
+              <a:extLst>
+                <a:ext uri="{FF2B5EF4-FFF2-40B4-BE49-F238E27FC236}">
+                  <a16:creationId xmlns="" xmlns:a16="http://schemas.microsoft.com/office/drawing/2014/main" id="{2887D7DB-E49B-4FA2-85D3-44366855794A}"/>
+                </a:ext>
+              </a:extLst>
+            </p:cNvPr>
+            <p:cNvSpPr/>
+            <p:nvPr/>
+          </p:nvSpPr>
+          <p:spPr>
+            <a:xfrm rot="16200000">
+              <a:off x="8145468" y="1942817"/>
+              <a:ext cx="718817" cy="838200"/>
+            </a:xfrm>
+            <a:prstGeom prst="triangle">
+              <a:avLst/>
+            </a:prstGeom>
+          </p:spPr>
+          <p:style>
+            <a:lnRef idx="2">
+              <a:schemeClr val="accent6"/>
+            </a:lnRef>
+            <a:fillRef idx="1">
+              <a:schemeClr val="lt1"/>
+            </a:fillRef>
+            <a:effectRef idx="0">
+              <a:schemeClr val="accent6"/>
+            </a:effectRef>
+            <a:fontRef idx="minor">
+              <a:schemeClr val="dk1"/>
+            </a:fontRef>
+          </p:style>
+          <p:txBody>
+            <a:bodyPr vert="vert" rtlCol="0" anchor="ctr"/>
+            <a:lstStyle/>
+            <a:p>
+              <a:pPr algn="ctr"/>
+              <a:endParaRPr lang="fi-FI" dirty="0"/>
+            </a:p>
+          </p:txBody>
+        </p:sp>
+      </p:grpSp>
+      <p:grpSp>
+        <p:nvGrpSpPr>
+          <p:cNvPr id="77" name="Group 76"/>
+          <p:cNvGrpSpPr/>
+          <p:nvPr/>
+        </p:nvGrpSpPr>
+        <p:grpSpPr>
+          <a:xfrm>
+            <a:off x="3683429" y="1605995"/>
+            <a:ext cx="2987009" cy="747036"/>
+            <a:chOff x="3683429" y="1433465"/>
+            <a:chExt cx="2987009" cy="747036"/>
+          </a:xfrm>
+        </p:grpSpPr>
+        <p:grpSp>
+          <p:nvGrpSpPr>
+            <p:cNvPr id="61" name="Group 60"/>
+            <p:cNvGrpSpPr/>
+            <p:nvPr/>
+          </p:nvGrpSpPr>
+          <p:grpSpPr>
+            <a:xfrm>
+              <a:off x="3683429" y="1449058"/>
+              <a:ext cx="2532150" cy="728802"/>
+              <a:chOff x="3683429" y="1449058"/>
+              <a:chExt cx="2532150" cy="728802"/>
+            </a:xfrm>
+          </p:grpSpPr>
+          <p:sp>
+            <p:nvSpPr>
+              <p:cNvPr id="66" name="Vuokaavio: Prosessi 65">
+                <a:extLst>
+                  <a:ext uri="{FF2B5EF4-FFF2-40B4-BE49-F238E27FC236}">
+                    <a16:creationId xmlns="" xmlns:a16="http://schemas.microsoft.com/office/drawing/2014/main" id="{1632A193-82B9-4F36-9C54-7AFFDE315963}"/>
+                  </a:ext>
+                </a:extLst>
+              </p:cNvPr>
+              <p:cNvSpPr/>
+              <p:nvPr/>
+            </p:nvSpPr>
+            <p:spPr>
+              <a:xfrm>
+                <a:off x="4521629" y="1449058"/>
+                <a:ext cx="1693950" cy="718818"/>
+              </a:xfrm>
+              <a:prstGeom prst="flowChartProcess">
+                <a:avLst/>
+              </a:prstGeom>
+              <a:solidFill>
+                <a:schemeClr val="accent2">
+                  <a:lumMod val="20000"/>
+                  <a:lumOff val="80000"/>
+                </a:schemeClr>
+              </a:solidFill>
+            </p:spPr>
+            <p:style>
+              <a:lnRef idx="2">
+                <a:schemeClr val="accent6"/>
+              </a:lnRef>
+              <a:fillRef idx="1">
+                <a:schemeClr val="lt1"/>
+              </a:fillRef>
+              <a:effectRef idx="0">
+                <a:schemeClr val="accent6"/>
+              </a:effectRef>
+              <a:fontRef idx="minor">
+                <a:schemeClr val="dk1"/>
+              </a:fontRef>
+            </p:style>
+            <p:txBody>
+              <a:bodyPr rtlCol="0" anchor="ctr"/>
+              <a:lstStyle/>
+              <a:p>
+                <a:pPr algn="ctr"/>
+                <a:r>
+                  <a:rPr lang="fi-FI" dirty="0" err="1"/>
+                  <a:t>Idle</a:t>
+                </a:r>
+                <a:r>
+                  <a:rPr lang="fi-FI" dirty="0"/>
+                  <a:t>(0)</a:t>
+                </a:r>
+              </a:p>
+              <a:p>
+                <a:pPr algn="ctr"/>
+                <a:r>
+                  <a:rPr lang="fi-FI" dirty="0"/>
+                  <a:t>RELAY </a:t>
+                </a:r>
+                <a:r>
+                  <a:rPr lang="fi-FI" dirty="0" smtClean="0"/>
+                  <a:t>ON</a:t>
+                </a:r>
+                <a:endParaRPr lang="fi-FI" dirty="0"/>
+              </a:p>
+            </p:txBody>
+          </p:sp>
+          <p:sp>
+            <p:nvSpPr>
+              <p:cNvPr id="68" name="Tasakylkinen kolmio 67">
+                <a:extLst>
+                  <a:ext uri="{FF2B5EF4-FFF2-40B4-BE49-F238E27FC236}">
+                    <a16:creationId xmlns="" xmlns:a16="http://schemas.microsoft.com/office/drawing/2014/main" id="{2887D7DB-E49B-4FA2-85D3-44366855794A}"/>
+                  </a:ext>
+                </a:extLst>
+              </p:cNvPr>
+              <p:cNvSpPr/>
+              <p:nvPr/>
+            </p:nvSpPr>
+            <p:spPr>
+              <a:xfrm rot="16200000">
+                <a:off x="3743120" y="1399352"/>
+                <a:ext cx="718817" cy="838200"/>
+              </a:xfrm>
+              <a:prstGeom prst="triangle">
+                <a:avLst/>
+              </a:prstGeom>
+            </p:spPr>
+            <p:style>
+              <a:lnRef idx="2">
+                <a:schemeClr val="accent6"/>
+              </a:lnRef>
+              <a:fillRef idx="1">
+                <a:schemeClr val="lt1"/>
+              </a:fillRef>
+              <a:effectRef idx="0">
+                <a:schemeClr val="accent6"/>
+              </a:effectRef>
+              <a:fontRef idx="minor">
+                <a:schemeClr val="dk1"/>
+              </a:fontRef>
+            </p:style>
+            <p:txBody>
+              <a:bodyPr vert="vert" rtlCol="0" anchor="ctr"/>
+              <a:lstStyle/>
+              <a:p>
+                <a:pPr algn="ctr"/>
+                <a:r>
+                  <a:rPr lang="fi-FI" dirty="0"/>
+                  <a:t>5</a:t>
+                </a:r>
+              </a:p>
+            </p:txBody>
+          </p:sp>
+        </p:grpSp>
+        <p:sp>
+          <p:nvSpPr>
+            <p:cNvPr id="72" name="Tasakylkinen kolmio 45">
+              <a:extLst>
+                <a:ext uri="{FF2B5EF4-FFF2-40B4-BE49-F238E27FC236}">
+                  <a16:creationId xmlns="" xmlns:a16="http://schemas.microsoft.com/office/drawing/2014/main" id="{552DD7F1-6614-4407-96BE-0B42A9A9FEC7}"/>
+                </a:ext>
+              </a:extLst>
+            </p:cNvPr>
+            <p:cNvSpPr/>
+            <p:nvPr/>
+          </p:nvSpPr>
+          <p:spPr>
+            <a:xfrm rot="5400000">
+              <a:off x="6253508" y="1763572"/>
+              <a:ext cx="386667" cy="447192"/>
+            </a:xfrm>
+            <a:prstGeom prst="triangle">
+              <a:avLst/>
+            </a:prstGeom>
+          </p:spPr>
+          <p:style>
+            <a:lnRef idx="2">
+              <a:schemeClr val="accent6"/>
+            </a:lnRef>
+            <a:fillRef idx="1">
+              <a:schemeClr val="lt1"/>
+            </a:fillRef>
+            <a:effectRef idx="0">
+              <a:schemeClr val="accent6"/>
+            </a:effectRef>
+            <a:fontRef idx="minor">
+              <a:schemeClr val="dk1"/>
+            </a:fontRef>
+          </p:style>
+          <p:txBody>
+            <a:bodyPr vert="vert270" rtlCol="0" anchor="ctr"/>
+            <a:lstStyle/>
+            <a:p>
+              <a:pPr algn="ctr"/>
+              <a:r>
+                <a:rPr lang="fi-FI" sz="600" dirty="0" smtClean="0"/>
+                <a:t>150</a:t>
+              </a:r>
+              <a:endParaRPr lang="fi-FI" sz="600" dirty="0"/>
+            </a:p>
+          </p:txBody>
+        </p:sp>
+        <p:sp>
+          <p:nvSpPr>
+            <p:cNvPr id="73" name="Tasakylkinen kolmio 43">
+              <a:extLst>
+                <a:ext uri="{FF2B5EF4-FFF2-40B4-BE49-F238E27FC236}">
+                  <a16:creationId xmlns="" xmlns:a16="http://schemas.microsoft.com/office/drawing/2014/main" id="{39FA4BA9-140D-4177-87CC-E225E08D8180}"/>
+                </a:ext>
+              </a:extLst>
+            </p:cNvPr>
+            <p:cNvSpPr/>
+            <p:nvPr/>
+          </p:nvSpPr>
+          <p:spPr>
+            <a:xfrm rot="5400000">
+              <a:off x="6242007" y="1403203"/>
+              <a:ext cx="386667" cy="447192"/>
+            </a:xfrm>
+            <a:prstGeom prst="triangle">
+              <a:avLst/>
+            </a:prstGeom>
+          </p:spPr>
+          <p:style>
+            <a:lnRef idx="2">
+              <a:schemeClr val="accent6"/>
+            </a:lnRef>
+            <a:fillRef idx="1">
+              <a:schemeClr val="lt1"/>
+            </a:fillRef>
+            <a:effectRef idx="0">
+              <a:schemeClr val="accent6"/>
+            </a:effectRef>
+            <a:fontRef idx="minor">
+              <a:schemeClr val="dk1"/>
+            </a:fontRef>
+          </p:style>
+          <p:txBody>
+            <a:bodyPr vert="vert270" rtlCol="0" anchor="ctr"/>
+            <a:lstStyle/>
+            <a:p>
+              <a:pPr algn="ctr"/>
+              <a:endParaRPr lang="fi-FI" dirty="0"/>
+            </a:p>
+            <a:p>
+              <a:pPr algn="ctr"/>
+              <a:endParaRPr lang="fi-FI" dirty="0"/>
+            </a:p>
+          </p:txBody>
+        </p:sp>
+      </p:grpSp>
+      <p:cxnSp>
+        <p:nvCxnSpPr>
+          <p:cNvPr id="75" name="Yhdistin: Kulma 22">
+            <a:extLst>
+              <a:ext uri="{FF2B5EF4-FFF2-40B4-BE49-F238E27FC236}">
+                <a16:creationId xmlns="" xmlns:a16="http://schemas.microsoft.com/office/drawing/2014/main" id="{60791C9F-5625-4EE9-AD9B-B26409AA9872}"/>
+              </a:ext>
+            </a:extLst>
+          </p:cNvPr>
+          <p:cNvCxnSpPr>
+            <a:cxnSpLocks/>
+          </p:cNvCxnSpPr>
+          <p:nvPr/>
+        </p:nvCxnSpPr>
+        <p:spPr>
+          <a:xfrm flipV="1">
+            <a:off x="6658937" y="967055"/>
+            <a:ext cx="3608007" cy="832275"/>
+          </a:xfrm>
+          <a:prstGeom prst="bentConnector3">
+            <a:avLst>
+              <a:gd name="adj1" fmla="val 106336"/>
+            </a:avLst>
+          </a:prstGeom>
+          <a:ln>
+            <a:tailEnd type="triangle"/>
+          </a:ln>
+        </p:spPr>
+        <p:style>
+          <a:lnRef idx="1">
+            <a:schemeClr val="accent1"/>
+          </a:lnRef>
+          <a:fillRef idx="0">
+            <a:schemeClr val="accent1"/>
+          </a:fillRef>
+          <a:effectRef idx="0">
+            <a:schemeClr val="accent1"/>
+          </a:effectRef>
+          <a:fontRef idx="minor">
+            <a:schemeClr val="tx1"/>
+          </a:fontRef>
+        </p:style>
+      </p:cxnSp>
+      <p:sp>
+        <p:nvSpPr>
+          <p:cNvPr id="79" name="Tekstiruutu 42">
+            <a:extLst>
+              <a:ext uri="{FF2B5EF4-FFF2-40B4-BE49-F238E27FC236}">
+                <a16:creationId xmlns="" xmlns:a16="http://schemas.microsoft.com/office/drawing/2014/main" id="{BC02B610-F398-461E-BC05-8637EF952F5A}"/>
+              </a:ext>
+            </a:extLst>
+          </p:cNvPr>
+          <p:cNvSpPr txBox="1"/>
+          <p:nvPr/>
+        </p:nvSpPr>
+        <p:spPr>
+          <a:xfrm>
+            <a:off x="7073752" y="1465865"/>
+            <a:ext cx="4574656" cy="369332"/>
+          </a:xfrm>
+          <a:prstGeom prst="rect">
+            <a:avLst/>
+          </a:prstGeom>
+          <a:noFill/>
+        </p:spPr>
+        <p:txBody>
+          <a:bodyPr wrap="square" rtlCol="0">
+            <a:spAutoFit/>
+          </a:bodyPr>
+          <a:lstStyle/>
+          <a:p>
+            <a:r>
+              <a:rPr lang="fi-FI" dirty="0" smtClean="0"/>
+              <a:t>Temperature threshold to enter Off exceeded</a:t>
+            </a:r>
+            <a:endParaRPr lang="fi-FI" dirty="0"/>
+          </a:p>
+        </p:txBody>
+      </p:sp>
+      <p:sp>
+        <p:nvSpPr>
+          <p:cNvPr id="80" name="Tekstiruutu 42">
+            <a:extLst>
+              <a:ext uri="{FF2B5EF4-FFF2-40B4-BE49-F238E27FC236}">
+                <a16:creationId xmlns="" xmlns:a16="http://schemas.microsoft.com/office/drawing/2014/main" id="{BC02B610-F398-461E-BC05-8637EF952F5A}"/>
+              </a:ext>
+            </a:extLst>
+          </p:cNvPr>
+          <p:cNvSpPr txBox="1"/>
+          <p:nvPr/>
+        </p:nvSpPr>
+        <p:spPr>
+          <a:xfrm>
+            <a:off x="5472554" y="631312"/>
+            <a:ext cx="2319718" cy="646331"/>
+          </a:xfrm>
+          <a:prstGeom prst="rect">
+            <a:avLst/>
+          </a:prstGeom>
+          <a:noFill/>
+        </p:spPr>
+        <p:txBody>
+          <a:bodyPr wrap="square" rtlCol="0">
+            <a:spAutoFit/>
+          </a:bodyPr>
+          <a:lstStyle/>
+          <a:p>
+            <a:r>
+              <a:rPr lang="fi-FI" dirty="0" smtClean="0"/>
+              <a:t>Temperature threshold to exit Off exceeded</a:t>
+            </a:r>
+            <a:endParaRPr lang="fi-FI" dirty="0"/>
+          </a:p>
+        </p:txBody>
+      </p:sp>
+      <p:cxnSp>
+        <p:nvCxnSpPr>
+          <p:cNvPr id="81" name="Yhdistin: Kulma 22">
+            <a:extLst>
+              <a:ext uri="{FF2B5EF4-FFF2-40B4-BE49-F238E27FC236}">
+                <a16:creationId xmlns="" xmlns:a16="http://schemas.microsoft.com/office/drawing/2014/main" id="{60791C9F-5625-4EE9-AD9B-B26409AA9872}"/>
+              </a:ext>
+            </a:extLst>
+          </p:cNvPr>
+          <p:cNvCxnSpPr>
+            <a:cxnSpLocks/>
+          </p:cNvCxnSpPr>
+          <p:nvPr/>
+        </p:nvCxnSpPr>
+        <p:spPr>
+          <a:xfrm rot="10800000" flipV="1">
+            <a:off x="5368604" y="977040"/>
+            <a:ext cx="2366190" cy="644548"/>
+          </a:xfrm>
+          <a:prstGeom prst="bentConnector2">
+            <a:avLst/>
+          </a:prstGeom>
+          <a:ln>
+            <a:tailEnd type="triangle"/>
+          </a:ln>
+        </p:spPr>
+        <p:style>
+          <a:lnRef idx="1">
+            <a:schemeClr val="accent1"/>
+          </a:lnRef>
+          <a:fillRef idx="0">
+            <a:schemeClr val="accent1"/>
+          </a:fillRef>
+          <a:effectRef idx="0">
+            <a:schemeClr val="accent1"/>
+          </a:effectRef>
+          <a:fontRef idx="minor">
+            <a:schemeClr val="tx1"/>
+          </a:fontRef>
+        </p:style>
+      </p:cxnSp>
+      <p:cxnSp>
+        <p:nvCxnSpPr>
+          <p:cNvPr id="57" name="Yhdistin: Kulma 22">
+            <a:extLst>
+              <a:ext uri="{FF2B5EF4-FFF2-40B4-BE49-F238E27FC236}">
+                <a16:creationId xmlns="" xmlns:a16="http://schemas.microsoft.com/office/drawing/2014/main" id="{60791C9F-5625-4EE9-AD9B-B26409AA9872}"/>
+              </a:ext>
+            </a:extLst>
+          </p:cNvPr>
+          <p:cNvCxnSpPr>
+            <a:cxnSpLocks/>
+          </p:cNvCxnSpPr>
+          <p:nvPr/>
+        </p:nvCxnSpPr>
+        <p:spPr>
+          <a:xfrm>
+            <a:off x="4623102" y="675957"/>
+            <a:ext cx="5643842" cy="291098"/>
+          </a:xfrm>
+          <a:prstGeom prst="bentConnector5">
+            <a:avLst>
+              <a:gd name="adj1" fmla="val 11111"/>
+              <a:gd name="adj2" fmla="val -101997"/>
+              <a:gd name="adj3" fmla="val 104050"/>
+            </a:avLst>
+          </a:prstGeom>
+          <a:ln>
+            <a:tailEnd type="triangle"/>
+          </a:ln>
+        </p:spPr>
+        <p:style>
+          <a:lnRef idx="1">
+            <a:schemeClr val="accent1"/>
+          </a:lnRef>
+          <a:fillRef idx="0">
+            <a:schemeClr val="accent1"/>
+          </a:fillRef>
+          <a:effectRef idx="0">
+            <a:schemeClr val="accent1"/>
+          </a:effectRef>
+          <a:fontRef idx="minor">
+            <a:schemeClr val="tx1"/>
+          </a:fontRef>
+        </p:style>
+      </p:cxnSp>
+      <p:grpSp>
+        <p:nvGrpSpPr>
+          <p:cNvPr id="78" name="Group 77"/>
+          <p:cNvGrpSpPr/>
+          <p:nvPr/>
+        </p:nvGrpSpPr>
+        <p:grpSpPr>
+          <a:xfrm>
+            <a:off x="2019247" y="470164"/>
+            <a:ext cx="2603855" cy="740369"/>
+            <a:chOff x="2019247" y="297634"/>
+            <a:chExt cx="2603855" cy="740369"/>
+          </a:xfrm>
+        </p:grpSpPr>
+        <p:grpSp>
+          <p:nvGrpSpPr>
+            <p:cNvPr id="70" name="Group 69"/>
+            <p:cNvGrpSpPr/>
+            <p:nvPr/>
+          </p:nvGrpSpPr>
+          <p:grpSpPr>
+            <a:xfrm>
+              <a:off x="2019247" y="297634"/>
+              <a:ext cx="2145714" cy="723485"/>
+              <a:chOff x="2019247" y="297634"/>
+              <a:chExt cx="2145714" cy="723485"/>
+            </a:xfrm>
+          </p:grpSpPr>
+          <p:sp>
+            <p:nvSpPr>
+              <p:cNvPr id="36" name="Vuokaavio: Prosessi 35">
+                <a:extLst>
+                  <a:ext uri="{FF2B5EF4-FFF2-40B4-BE49-F238E27FC236}">
+                    <a16:creationId xmlns="" xmlns:a16="http://schemas.microsoft.com/office/drawing/2014/main" id="{90497816-96AC-43D8-AAB9-F35DC3844092}"/>
+                  </a:ext>
+                </a:extLst>
+              </p:cNvPr>
+              <p:cNvSpPr/>
+              <p:nvPr/>
+            </p:nvSpPr>
+            <p:spPr>
+              <a:xfrm>
+                <a:off x="2471011" y="302301"/>
+                <a:ext cx="1693950" cy="718818"/>
+              </a:xfrm>
+              <a:prstGeom prst="flowChartProcess">
+                <a:avLst/>
+              </a:prstGeom>
+              <a:solidFill>
+                <a:schemeClr val="accent5">
+                  <a:lumMod val="20000"/>
+                  <a:lumOff val="80000"/>
+                </a:schemeClr>
+              </a:solidFill>
+              <a:ln w="15875">
+                <a:solidFill>
+                  <a:schemeClr val="tx1"/>
+                </a:solidFill>
+              </a:ln>
+            </p:spPr>
+            <p:style>
+              <a:lnRef idx="2">
+                <a:schemeClr val="accent6"/>
+              </a:lnRef>
+              <a:fillRef idx="1">
+                <a:schemeClr val="lt1"/>
+              </a:fillRef>
+              <a:effectRef idx="0">
+                <a:schemeClr val="accent6"/>
+              </a:effectRef>
+              <a:fontRef idx="minor">
+                <a:schemeClr val="dk1"/>
+              </a:fontRef>
+            </p:style>
+            <p:txBody>
+              <a:bodyPr rtlCol="0" anchor="ctr"/>
+              <a:lstStyle/>
+              <a:p>
+                <a:pPr algn="ctr"/>
+                <a:r>
+                  <a:rPr lang="fi-FI" dirty="0" err="1"/>
+                  <a:t>Reset</a:t>
+                </a:r>
+                <a:r>
+                  <a:rPr lang="fi-FI" dirty="0"/>
+                  <a:t>(-4)</a:t>
+                </a:r>
+              </a:p>
+              <a:p>
+                <a:pPr algn="ctr"/>
+                <a:r>
+                  <a:rPr lang="fi-FI" dirty="0"/>
+                  <a:t>RELAY OFF</a:t>
+                </a:r>
+              </a:p>
+            </p:txBody>
+          </p:sp>
+          <p:sp>
+            <p:nvSpPr>
+              <p:cNvPr id="38" name="Tasakylkinen kolmio 37">
+                <a:extLst>
+                  <a:ext uri="{FF2B5EF4-FFF2-40B4-BE49-F238E27FC236}">
+                    <a16:creationId xmlns="" xmlns:a16="http://schemas.microsoft.com/office/drawing/2014/main" id="{C40A5B0E-8DDF-4E0E-8AB8-1B35DA2D6D26}"/>
+                  </a:ext>
+                </a:extLst>
+              </p:cNvPr>
+              <p:cNvSpPr/>
+              <p:nvPr/>
+            </p:nvSpPr>
+            <p:spPr>
+              <a:xfrm rot="16200000">
+                <a:off x="1885474" y="431407"/>
+                <a:ext cx="718817" cy="451271"/>
+              </a:xfrm>
+              <a:prstGeom prst="triangle">
+                <a:avLst/>
+              </a:prstGeom>
+              <a:ln w="15875">
+                <a:solidFill>
+                  <a:schemeClr val="tx1"/>
+                </a:solidFill>
+              </a:ln>
+            </p:spPr>
+            <p:style>
+              <a:lnRef idx="2">
+                <a:schemeClr val="accent6"/>
+              </a:lnRef>
+              <a:fillRef idx="1">
+                <a:schemeClr val="lt1"/>
+              </a:fillRef>
+              <a:effectRef idx="0">
+                <a:schemeClr val="accent6"/>
+              </a:effectRef>
+              <a:fontRef idx="minor">
+                <a:schemeClr val="dk1"/>
+              </a:fontRef>
+            </p:style>
+            <p:txBody>
+              <a:bodyPr vert="vert" rtlCol="0" anchor="ctr"/>
+              <a:lstStyle/>
+              <a:p>
+                <a:pPr algn="ctr"/>
+                <a:r>
+                  <a:rPr lang="fi-FI" dirty="0"/>
+                  <a:t>0</a:t>
+                </a:r>
+              </a:p>
+            </p:txBody>
+          </p:sp>
+        </p:grpSp>
+        <p:sp>
+          <p:nvSpPr>
+            <p:cNvPr id="74" name="Tasakylkinen kolmio 45">
+              <a:extLst>
+                <a:ext uri="{FF2B5EF4-FFF2-40B4-BE49-F238E27FC236}">
+                  <a16:creationId xmlns="" xmlns:a16="http://schemas.microsoft.com/office/drawing/2014/main" id="{552DD7F1-6614-4407-96BE-0B42A9A9FEC7}"/>
+                </a:ext>
+              </a:extLst>
+            </p:cNvPr>
+            <p:cNvSpPr/>
+            <p:nvPr/>
+          </p:nvSpPr>
+          <p:spPr>
+            <a:xfrm rot="5400000">
+              <a:off x="4206172" y="279830"/>
+              <a:ext cx="386667" cy="447192"/>
+            </a:xfrm>
+            <a:prstGeom prst="triangle">
+              <a:avLst/>
+            </a:prstGeom>
+            <a:ln w="15875">
+              <a:solidFill>
+                <a:schemeClr val="tx1"/>
+              </a:solidFill>
+            </a:ln>
+          </p:spPr>
+          <p:style>
+            <a:lnRef idx="2">
+              <a:schemeClr val="accent6"/>
+            </a:lnRef>
+            <a:fillRef idx="1">
+              <a:schemeClr val="lt1"/>
+            </a:fillRef>
+            <a:effectRef idx="0">
+              <a:schemeClr val="accent6"/>
+            </a:effectRef>
+            <a:fontRef idx="minor">
+              <a:schemeClr val="dk1"/>
+            </a:fontRef>
+          </p:style>
+          <p:txBody>
+            <a:bodyPr vert="vert270" rtlCol="0" anchor="ctr"/>
+            <a:lstStyle/>
+            <a:p>
+              <a:pPr algn="ctr"/>
+              <a:endParaRPr lang="fi-FI" dirty="0"/>
+            </a:p>
+          </p:txBody>
+        </p:sp>
+        <p:sp>
+          <p:nvSpPr>
+            <p:cNvPr id="76" name="Tasakylkinen kolmio 43">
+              <a:extLst>
+                <a:ext uri="{FF2B5EF4-FFF2-40B4-BE49-F238E27FC236}">
+                  <a16:creationId xmlns="" xmlns:a16="http://schemas.microsoft.com/office/drawing/2014/main" id="{39FA4BA9-140D-4177-87CC-E225E08D8180}"/>
+                </a:ext>
+              </a:extLst>
+            </p:cNvPr>
+            <p:cNvSpPr/>
+            <p:nvPr/>
+          </p:nvSpPr>
+          <p:spPr>
+            <a:xfrm rot="5400000">
+              <a:off x="4206172" y="621074"/>
+              <a:ext cx="386667" cy="447192"/>
+            </a:xfrm>
+            <a:prstGeom prst="triangle">
+              <a:avLst/>
+            </a:prstGeom>
+            <a:ln w="15875">
+              <a:solidFill>
+                <a:schemeClr val="tx1"/>
+              </a:solidFill>
+            </a:ln>
+          </p:spPr>
+          <p:style>
+            <a:lnRef idx="2">
+              <a:schemeClr val="accent6"/>
+            </a:lnRef>
+            <a:fillRef idx="1">
+              <a:schemeClr val="lt1"/>
+            </a:fillRef>
+            <a:effectRef idx="0">
+              <a:schemeClr val="accent6"/>
+            </a:effectRef>
+            <a:fontRef idx="minor">
+              <a:schemeClr val="dk1"/>
+            </a:fontRef>
+          </p:style>
+          <p:txBody>
+            <a:bodyPr vert="vert270" rtlCol="0" anchor="ctr"/>
+            <a:lstStyle/>
+            <a:p>
+              <a:pPr algn="ctr"/>
+              <a:endParaRPr lang="fi-FI" dirty="0"/>
+            </a:p>
+            <a:p>
+              <a:pPr algn="ctr"/>
+              <a:endParaRPr lang="fi-FI" dirty="0"/>
+            </a:p>
+          </p:txBody>
+        </p:sp>
+      </p:grpSp>
+      <p:sp>
+        <p:nvSpPr>
+          <p:cNvPr id="90" name="Tekstiruutu 42">
+            <a:extLst>
+              <a:ext uri="{FF2B5EF4-FFF2-40B4-BE49-F238E27FC236}">
+                <a16:creationId xmlns="" xmlns:a16="http://schemas.microsoft.com/office/drawing/2014/main" id="{BC02B610-F398-461E-BC05-8637EF952F5A}"/>
+              </a:ext>
+            </a:extLst>
+          </p:cNvPr>
+          <p:cNvSpPr txBox="1"/>
+          <p:nvPr/>
+        </p:nvSpPr>
+        <p:spPr>
+          <a:xfrm>
+            <a:off x="5334091" y="74764"/>
+            <a:ext cx="4574656" cy="369332"/>
+          </a:xfrm>
+          <a:prstGeom prst="rect">
+            <a:avLst/>
+          </a:prstGeom>
+          <a:noFill/>
+        </p:spPr>
+        <p:txBody>
+          <a:bodyPr wrap="square" rtlCol="0">
+            <a:spAutoFit/>
+          </a:bodyPr>
+          <a:lstStyle/>
+          <a:p>
+            <a:r>
+              <a:rPr lang="fi-FI" dirty="0" smtClean="0"/>
+              <a:t>Temperature threshold to enter Off exceeded</a:t>
+            </a:r>
+            <a:endParaRPr lang="fi-FI" dirty="0"/>
+          </a:p>
+        </p:txBody>
+      </p:sp>
     </p:spTree>
     <p:extLst>
       <p:ext uri="{BB962C8B-B14F-4D97-AF65-F5344CB8AC3E}">
-        <p14:creationId xmlns:p14="http://schemas.microsoft.com/office/powerpoint/2010/main" val="4065499932"/>
+        <p14:creationId xmlns="" xmlns:p14="http://schemas.microsoft.com/office/powerpoint/2010/main" val="4065499932"/>
       </p:ext>
     </p:extLst>
   </p:cSld>
@@ -5484,7 +6094,7 @@
     </a:clrScheme>
     <a:fontScheme name="Office">
       <a:majorFont>
-        <a:latin typeface="Calibri Light" panose="020F0302020204030204"/>
+        <a:latin typeface="Calibri Light"/>
         <a:ea typeface=""/>
         <a:cs typeface=""/>
         <a:font script="Jpan" typeface="游ゴシック Light"/>
@@ -5536,7 +6146,7 @@
         <a:font script="Tfng" typeface="Ebrima"/>
       </a:majorFont>
       <a:minorFont>
-        <a:latin typeface="Calibri" panose="020F0502020204030204"/>
+        <a:latin typeface="Calibri"/>
         <a:ea typeface=""/>
         <a:cs typeface=""/>
         <a:font script="Jpan" typeface="游ゴシック"/>
@@ -5730,7 +6340,7 @@
   <a:extraClrSchemeLst/>
   <a:extLst>
     <a:ext uri="{05A4C25C-085E-4340-85A3-A5531E510DB2}">
-      <thm15:themeFamily xmlns:thm15="http://schemas.microsoft.com/office/thememl/2012/main" name="Office Theme" id="{62F939B6-93AF-4DB8-9C6B-D6C7DFDC589F}" vid="{4A3C46E8-61CC-4603-A589-7422A47A8E4A}"/>
+      <thm15:themeFamily xmlns="" xmlns:thm15="http://schemas.microsoft.com/office/thememl/2012/main" name="Office Theme" id="{62F939B6-93AF-4DB8-9C6B-D6C7DFDC589F}" vid="{4A3C46E8-61CC-4603-A589-7422A47A8E4A}"/>
     </a:ext>
   </a:extLst>
 </a:theme>

</xml_diff>

<commit_message>
Updated state machine flowchart
</commit_message>
<xml_diff>
--- a/Pictures/StateMachine.pptx
+++ b/Pictures/StateMachine.pptx
@@ -106,7 +106,7 @@
   </p:defaultTextStyle>
   <p:extLst>
     <p:ext uri="{EFAFB233-063F-42B5-8137-9DF3F51BA10A}">
-      <p15:sldGuideLst xmlns="" xmlns:p15="http://schemas.microsoft.com/office/powerpoint/2012/main"/>
+      <p15:sldGuideLst xmlns:p15="http://schemas.microsoft.com/office/powerpoint/2012/main"/>
     </p:ext>
   </p:extLst>
 </p:presentation>
@@ -134,7 +134,7 @@
           <p:cNvPr id="2" name="Otsikko 1">
             <a:extLst>
               <a:ext uri="{FF2B5EF4-FFF2-40B4-BE49-F238E27FC236}">
-                <a16:creationId xmlns="" xmlns:a16="http://schemas.microsoft.com/office/drawing/2014/main" id="{E983380A-2C93-4627-A7FF-2C98A628820B}"/>
+                <a16:creationId xmlns:a16="http://schemas.microsoft.com/office/drawing/2014/main" id="{E983380A-2C93-4627-A7FF-2C98A628820B}"/>
               </a:ext>
             </a:extLst>
           </p:cNvPr>
@@ -171,7 +171,7 @@
           <p:cNvPr id="3" name="Alaotsikko 2">
             <a:extLst>
               <a:ext uri="{FF2B5EF4-FFF2-40B4-BE49-F238E27FC236}">
-                <a16:creationId xmlns="" xmlns:a16="http://schemas.microsoft.com/office/drawing/2014/main" id="{C0D5825D-C1F6-4257-B8D7-EBCD8CB7B9D5}"/>
+                <a16:creationId xmlns:a16="http://schemas.microsoft.com/office/drawing/2014/main" id="{C0D5825D-C1F6-4257-B8D7-EBCD8CB7B9D5}"/>
               </a:ext>
             </a:extLst>
           </p:cNvPr>
@@ -241,7 +241,7 @@
           <p:cNvPr id="4" name="Päivämäärän paikkamerkki 3">
             <a:extLst>
               <a:ext uri="{FF2B5EF4-FFF2-40B4-BE49-F238E27FC236}">
-                <a16:creationId xmlns="" xmlns:a16="http://schemas.microsoft.com/office/drawing/2014/main" id="{448E2378-B7C8-406C-ADD5-7DA75D584D01}"/>
+                <a16:creationId xmlns:a16="http://schemas.microsoft.com/office/drawing/2014/main" id="{448E2378-B7C8-406C-ADD5-7DA75D584D01}"/>
               </a:ext>
             </a:extLst>
           </p:cNvPr>
@@ -259,8 +259,7 @@
           <a:p>
             <a:fld id="{978E5B9B-AA1C-4837-A679-92CCBB0596D1}" type="datetimeFigureOut">
               <a:rPr lang="fi-FI" smtClean="0"/>
-              <a:pPr/>
-              <a:t>16.3.2021</a:t>
+              <a:t>18.3.2021</a:t>
             </a:fld>
             <a:endParaRPr lang="fi-FI"/>
           </a:p>
@@ -271,7 +270,7 @@
           <p:cNvPr id="5" name="Alatunnisteen paikkamerkki 4">
             <a:extLst>
               <a:ext uri="{FF2B5EF4-FFF2-40B4-BE49-F238E27FC236}">
-                <a16:creationId xmlns="" xmlns:a16="http://schemas.microsoft.com/office/drawing/2014/main" id="{16412164-C220-4619-95E4-E6154E09ACB6}"/>
+                <a16:creationId xmlns:a16="http://schemas.microsoft.com/office/drawing/2014/main" id="{16412164-C220-4619-95E4-E6154E09ACB6}"/>
               </a:ext>
             </a:extLst>
           </p:cNvPr>
@@ -296,7 +295,7 @@
           <p:cNvPr id="6" name="Dian numeron paikkamerkki 5">
             <a:extLst>
               <a:ext uri="{FF2B5EF4-FFF2-40B4-BE49-F238E27FC236}">
-                <a16:creationId xmlns="" xmlns:a16="http://schemas.microsoft.com/office/drawing/2014/main" id="{196593D6-6319-4CFD-BFE7-83BDE86A3EA1}"/>
+                <a16:creationId xmlns:a16="http://schemas.microsoft.com/office/drawing/2014/main" id="{196593D6-6319-4CFD-BFE7-83BDE86A3EA1}"/>
               </a:ext>
             </a:extLst>
           </p:cNvPr>
@@ -314,7 +313,6 @@
           <a:p>
             <a:fld id="{784304D2-DF8B-49B7-9B54-9F8017A67B0D}" type="slidenum">
               <a:rPr lang="fi-FI" smtClean="0"/>
-              <a:pPr/>
               <a:t>‹#›</a:t>
             </a:fld>
             <a:endParaRPr lang="fi-FI"/>
@@ -324,7 +322,7 @@
     </p:spTree>
     <p:extLst>
       <p:ext uri="{BB962C8B-B14F-4D97-AF65-F5344CB8AC3E}">
-        <p14:creationId xmlns="" xmlns:p14="http://schemas.microsoft.com/office/powerpoint/2010/main" val="2143216308"/>
+        <p14:creationId xmlns:p14="http://schemas.microsoft.com/office/powerpoint/2010/main" val="2143216308"/>
       </p:ext>
     </p:extLst>
   </p:cSld>
@@ -356,7 +354,7 @@
           <p:cNvPr id="2" name="Otsikko 1">
             <a:extLst>
               <a:ext uri="{FF2B5EF4-FFF2-40B4-BE49-F238E27FC236}">
-                <a16:creationId xmlns="" xmlns:a16="http://schemas.microsoft.com/office/drawing/2014/main" id="{D7CB1C1C-9D52-43A2-B9FC-4BA04C9E6407}"/>
+                <a16:creationId xmlns:a16="http://schemas.microsoft.com/office/drawing/2014/main" id="{D7CB1C1C-9D52-43A2-B9FC-4BA04C9E6407}"/>
               </a:ext>
             </a:extLst>
           </p:cNvPr>
@@ -384,7 +382,7 @@
           <p:cNvPr id="3" name="Pystysuoran tekstin paikkamerkki 2">
             <a:extLst>
               <a:ext uri="{FF2B5EF4-FFF2-40B4-BE49-F238E27FC236}">
-                <a16:creationId xmlns="" xmlns:a16="http://schemas.microsoft.com/office/drawing/2014/main" id="{60CFB7ED-2D8C-4201-81E9-F569CE9A17C7}"/>
+                <a16:creationId xmlns:a16="http://schemas.microsoft.com/office/drawing/2014/main" id="{60CFB7ED-2D8C-4201-81E9-F569CE9A17C7}"/>
               </a:ext>
             </a:extLst>
           </p:cNvPr>
@@ -441,7 +439,7 @@
           <p:cNvPr id="4" name="Päivämäärän paikkamerkki 3">
             <a:extLst>
               <a:ext uri="{FF2B5EF4-FFF2-40B4-BE49-F238E27FC236}">
-                <a16:creationId xmlns="" xmlns:a16="http://schemas.microsoft.com/office/drawing/2014/main" id="{0ECCF3DC-8399-4665-9649-A0E62AA04849}"/>
+                <a16:creationId xmlns:a16="http://schemas.microsoft.com/office/drawing/2014/main" id="{0ECCF3DC-8399-4665-9649-A0E62AA04849}"/>
               </a:ext>
             </a:extLst>
           </p:cNvPr>
@@ -459,8 +457,7 @@
           <a:p>
             <a:fld id="{978E5B9B-AA1C-4837-A679-92CCBB0596D1}" type="datetimeFigureOut">
               <a:rPr lang="fi-FI" smtClean="0"/>
-              <a:pPr/>
-              <a:t>16.3.2021</a:t>
+              <a:t>18.3.2021</a:t>
             </a:fld>
             <a:endParaRPr lang="fi-FI"/>
           </a:p>
@@ -471,7 +468,7 @@
           <p:cNvPr id="5" name="Alatunnisteen paikkamerkki 4">
             <a:extLst>
               <a:ext uri="{FF2B5EF4-FFF2-40B4-BE49-F238E27FC236}">
-                <a16:creationId xmlns="" xmlns:a16="http://schemas.microsoft.com/office/drawing/2014/main" id="{AFA39FBB-3896-4A1D-BC3C-D9201CB3D085}"/>
+                <a16:creationId xmlns:a16="http://schemas.microsoft.com/office/drawing/2014/main" id="{AFA39FBB-3896-4A1D-BC3C-D9201CB3D085}"/>
               </a:ext>
             </a:extLst>
           </p:cNvPr>
@@ -496,7 +493,7 @@
           <p:cNvPr id="6" name="Dian numeron paikkamerkki 5">
             <a:extLst>
               <a:ext uri="{FF2B5EF4-FFF2-40B4-BE49-F238E27FC236}">
-                <a16:creationId xmlns="" xmlns:a16="http://schemas.microsoft.com/office/drawing/2014/main" id="{0F1973C7-B3D5-40C6-AF0E-9F4115A08C28}"/>
+                <a16:creationId xmlns:a16="http://schemas.microsoft.com/office/drawing/2014/main" id="{0F1973C7-B3D5-40C6-AF0E-9F4115A08C28}"/>
               </a:ext>
             </a:extLst>
           </p:cNvPr>
@@ -514,7 +511,6 @@
           <a:p>
             <a:fld id="{784304D2-DF8B-49B7-9B54-9F8017A67B0D}" type="slidenum">
               <a:rPr lang="fi-FI" smtClean="0"/>
-              <a:pPr/>
               <a:t>‹#›</a:t>
             </a:fld>
             <a:endParaRPr lang="fi-FI"/>
@@ -524,7 +520,7 @@
     </p:spTree>
     <p:extLst>
       <p:ext uri="{BB962C8B-B14F-4D97-AF65-F5344CB8AC3E}">
-        <p14:creationId xmlns="" xmlns:p14="http://schemas.microsoft.com/office/powerpoint/2010/main" val="3555321225"/>
+        <p14:creationId xmlns:p14="http://schemas.microsoft.com/office/powerpoint/2010/main" val="3555321225"/>
       </p:ext>
     </p:extLst>
   </p:cSld>
@@ -556,7 +552,7 @@
           <p:cNvPr id="2" name="Pystysuora otsikko 1">
             <a:extLst>
               <a:ext uri="{FF2B5EF4-FFF2-40B4-BE49-F238E27FC236}">
-                <a16:creationId xmlns="" xmlns:a16="http://schemas.microsoft.com/office/drawing/2014/main" id="{684506DD-5BA4-4F30-941F-4E22D4BC27B8}"/>
+                <a16:creationId xmlns:a16="http://schemas.microsoft.com/office/drawing/2014/main" id="{684506DD-5BA4-4F30-941F-4E22D4BC27B8}"/>
               </a:ext>
             </a:extLst>
           </p:cNvPr>
@@ -589,7 +585,7 @@
           <p:cNvPr id="3" name="Pystysuoran tekstin paikkamerkki 2">
             <a:extLst>
               <a:ext uri="{FF2B5EF4-FFF2-40B4-BE49-F238E27FC236}">
-                <a16:creationId xmlns="" xmlns:a16="http://schemas.microsoft.com/office/drawing/2014/main" id="{9B35C9CE-91D9-450C-9D18-65633952E7C1}"/>
+                <a16:creationId xmlns:a16="http://schemas.microsoft.com/office/drawing/2014/main" id="{9B35C9CE-91D9-450C-9D18-65633952E7C1}"/>
               </a:ext>
             </a:extLst>
           </p:cNvPr>
@@ -651,7 +647,7 @@
           <p:cNvPr id="4" name="Päivämäärän paikkamerkki 3">
             <a:extLst>
               <a:ext uri="{FF2B5EF4-FFF2-40B4-BE49-F238E27FC236}">
-                <a16:creationId xmlns="" xmlns:a16="http://schemas.microsoft.com/office/drawing/2014/main" id="{3EE242D7-B75B-462D-B448-790ABCEC68A6}"/>
+                <a16:creationId xmlns:a16="http://schemas.microsoft.com/office/drawing/2014/main" id="{3EE242D7-B75B-462D-B448-790ABCEC68A6}"/>
               </a:ext>
             </a:extLst>
           </p:cNvPr>
@@ -669,8 +665,7 @@
           <a:p>
             <a:fld id="{978E5B9B-AA1C-4837-A679-92CCBB0596D1}" type="datetimeFigureOut">
               <a:rPr lang="fi-FI" smtClean="0"/>
-              <a:pPr/>
-              <a:t>16.3.2021</a:t>
+              <a:t>18.3.2021</a:t>
             </a:fld>
             <a:endParaRPr lang="fi-FI"/>
           </a:p>
@@ -681,7 +676,7 @@
           <p:cNvPr id="5" name="Alatunnisteen paikkamerkki 4">
             <a:extLst>
               <a:ext uri="{FF2B5EF4-FFF2-40B4-BE49-F238E27FC236}">
-                <a16:creationId xmlns="" xmlns:a16="http://schemas.microsoft.com/office/drawing/2014/main" id="{B1B9A095-BC9E-4C65-86B7-83B45445FBB5}"/>
+                <a16:creationId xmlns:a16="http://schemas.microsoft.com/office/drawing/2014/main" id="{B1B9A095-BC9E-4C65-86B7-83B45445FBB5}"/>
               </a:ext>
             </a:extLst>
           </p:cNvPr>
@@ -706,7 +701,7 @@
           <p:cNvPr id="6" name="Dian numeron paikkamerkki 5">
             <a:extLst>
               <a:ext uri="{FF2B5EF4-FFF2-40B4-BE49-F238E27FC236}">
-                <a16:creationId xmlns="" xmlns:a16="http://schemas.microsoft.com/office/drawing/2014/main" id="{DFE8704E-160F-4BCC-8202-356603BD2CEC}"/>
+                <a16:creationId xmlns:a16="http://schemas.microsoft.com/office/drawing/2014/main" id="{DFE8704E-160F-4BCC-8202-356603BD2CEC}"/>
               </a:ext>
             </a:extLst>
           </p:cNvPr>
@@ -724,7 +719,6 @@
           <a:p>
             <a:fld id="{784304D2-DF8B-49B7-9B54-9F8017A67B0D}" type="slidenum">
               <a:rPr lang="fi-FI" smtClean="0"/>
-              <a:pPr/>
               <a:t>‹#›</a:t>
             </a:fld>
             <a:endParaRPr lang="fi-FI"/>
@@ -734,7 +728,7 @@
     </p:spTree>
     <p:extLst>
       <p:ext uri="{BB962C8B-B14F-4D97-AF65-F5344CB8AC3E}">
-        <p14:creationId xmlns="" xmlns:p14="http://schemas.microsoft.com/office/powerpoint/2010/main" val="833568155"/>
+        <p14:creationId xmlns:p14="http://schemas.microsoft.com/office/powerpoint/2010/main" val="833568155"/>
       </p:ext>
     </p:extLst>
   </p:cSld>
@@ -766,7 +760,7 @@
           <p:cNvPr id="2" name="Otsikko 1">
             <a:extLst>
               <a:ext uri="{FF2B5EF4-FFF2-40B4-BE49-F238E27FC236}">
-                <a16:creationId xmlns="" xmlns:a16="http://schemas.microsoft.com/office/drawing/2014/main" id="{33E9EC22-552B-485C-A387-01442440CF5A}"/>
+                <a16:creationId xmlns:a16="http://schemas.microsoft.com/office/drawing/2014/main" id="{33E9EC22-552B-485C-A387-01442440CF5A}"/>
               </a:ext>
             </a:extLst>
           </p:cNvPr>
@@ -794,7 +788,7 @@
           <p:cNvPr id="3" name="Sisällön paikkamerkki 2">
             <a:extLst>
               <a:ext uri="{FF2B5EF4-FFF2-40B4-BE49-F238E27FC236}">
-                <a16:creationId xmlns="" xmlns:a16="http://schemas.microsoft.com/office/drawing/2014/main" id="{8B0C1ACF-B48D-4596-82DC-BDFB7E16D8C0}"/>
+                <a16:creationId xmlns:a16="http://schemas.microsoft.com/office/drawing/2014/main" id="{8B0C1ACF-B48D-4596-82DC-BDFB7E16D8C0}"/>
               </a:ext>
             </a:extLst>
           </p:cNvPr>
@@ -851,7 +845,7 @@
           <p:cNvPr id="4" name="Päivämäärän paikkamerkki 3">
             <a:extLst>
               <a:ext uri="{FF2B5EF4-FFF2-40B4-BE49-F238E27FC236}">
-                <a16:creationId xmlns="" xmlns:a16="http://schemas.microsoft.com/office/drawing/2014/main" id="{CDBCA2F5-1BE7-47BA-9F4A-CBFF4174A314}"/>
+                <a16:creationId xmlns:a16="http://schemas.microsoft.com/office/drawing/2014/main" id="{CDBCA2F5-1BE7-47BA-9F4A-CBFF4174A314}"/>
               </a:ext>
             </a:extLst>
           </p:cNvPr>
@@ -869,8 +863,7 @@
           <a:p>
             <a:fld id="{978E5B9B-AA1C-4837-A679-92CCBB0596D1}" type="datetimeFigureOut">
               <a:rPr lang="fi-FI" smtClean="0"/>
-              <a:pPr/>
-              <a:t>16.3.2021</a:t>
+              <a:t>18.3.2021</a:t>
             </a:fld>
             <a:endParaRPr lang="fi-FI"/>
           </a:p>
@@ -881,7 +874,7 @@
           <p:cNvPr id="5" name="Alatunnisteen paikkamerkki 4">
             <a:extLst>
               <a:ext uri="{FF2B5EF4-FFF2-40B4-BE49-F238E27FC236}">
-                <a16:creationId xmlns="" xmlns:a16="http://schemas.microsoft.com/office/drawing/2014/main" id="{ECB84B2A-A93E-4D7B-A1B4-DB3ABBC134A4}"/>
+                <a16:creationId xmlns:a16="http://schemas.microsoft.com/office/drawing/2014/main" id="{ECB84B2A-A93E-4D7B-A1B4-DB3ABBC134A4}"/>
               </a:ext>
             </a:extLst>
           </p:cNvPr>
@@ -906,7 +899,7 @@
           <p:cNvPr id="6" name="Dian numeron paikkamerkki 5">
             <a:extLst>
               <a:ext uri="{FF2B5EF4-FFF2-40B4-BE49-F238E27FC236}">
-                <a16:creationId xmlns="" xmlns:a16="http://schemas.microsoft.com/office/drawing/2014/main" id="{CB02ACE8-2F12-4C16-9F22-E1A80412358C}"/>
+                <a16:creationId xmlns:a16="http://schemas.microsoft.com/office/drawing/2014/main" id="{CB02ACE8-2F12-4C16-9F22-E1A80412358C}"/>
               </a:ext>
             </a:extLst>
           </p:cNvPr>
@@ -924,7 +917,6 @@
           <a:p>
             <a:fld id="{784304D2-DF8B-49B7-9B54-9F8017A67B0D}" type="slidenum">
               <a:rPr lang="fi-FI" smtClean="0"/>
-              <a:pPr/>
               <a:t>‹#›</a:t>
             </a:fld>
             <a:endParaRPr lang="fi-FI"/>
@@ -934,7 +926,7 @@
     </p:spTree>
     <p:extLst>
       <p:ext uri="{BB962C8B-B14F-4D97-AF65-F5344CB8AC3E}">
-        <p14:creationId xmlns="" xmlns:p14="http://schemas.microsoft.com/office/powerpoint/2010/main" val="2633283370"/>
+        <p14:creationId xmlns:p14="http://schemas.microsoft.com/office/powerpoint/2010/main" val="2633283370"/>
       </p:ext>
     </p:extLst>
   </p:cSld>
@@ -966,7 +958,7 @@
           <p:cNvPr id="2" name="Otsikko 1">
             <a:extLst>
               <a:ext uri="{FF2B5EF4-FFF2-40B4-BE49-F238E27FC236}">
-                <a16:creationId xmlns="" xmlns:a16="http://schemas.microsoft.com/office/drawing/2014/main" id="{517905B5-6D55-473F-B728-04B583B896A5}"/>
+                <a16:creationId xmlns:a16="http://schemas.microsoft.com/office/drawing/2014/main" id="{517905B5-6D55-473F-B728-04B583B896A5}"/>
               </a:ext>
             </a:extLst>
           </p:cNvPr>
@@ -1003,7 +995,7 @@
           <p:cNvPr id="3" name="Tekstin paikkamerkki 2">
             <a:extLst>
               <a:ext uri="{FF2B5EF4-FFF2-40B4-BE49-F238E27FC236}">
-                <a16:creationId xmlns="" xmlns:a16="http://schemas.microsoft.com/office/drawing/2014/main" id="{7290D0AC-51E6-41A5-9732-4815C0913AA9}"/>
+                <a16:creationId xmlns:a16="http://schemas.microsoft.com/office/drawing/2014/main" id="{7290D0AC-51E6-41A5-9732-4815C0913AA9}"/>
               </a:ext>
             </a:extLst>
           </p:cNvPr>
@@ -1128,7 +1120,7 @@
           <p:cNvPr id="4" name="Päivämäärän paikkamerkki 3">
             <a:extLst>
               <a:ext uri="{FF2B5EF4-FFF2-40B4-BE49-F238E27FC236}">
-                <a16:creationId xmlns="" xmlns:a16="http://schemas.microsoft.com/office/drawing/2014/main" id="{EE214F55-8812-44E4-86FA-9B8B2883FA47}"/>
+                <a16:creationId xmlns:a16="http://schemas.microsoft.com/office/drawing/2014/main" id="{EE214F55-8812-44E4-86FA-9B8B2883FA47}"/>
               </a:ext>
             </a:extLst>
           </p:cNvPr>
@@ -1146,8 +1138,7 @@
           <a:p>
             <a:fld id="{978E5B9B-AA1C-4837-A679-92CCBB0596D1}" type="datetimeFigureOut">
               <a:rPr lang="fi-FI" smtClean="0"/>
-              <a:pPr/>
-              <a:t>16.3.2021</a:t>
+              <a:t>18.3.2021</a:t>
             </a:fld>
             <a:endParaRPr lang="fi-FI"/>
           </a:p>
@@ -1158,7 +1149,7 @@
           <p:cNvPr id="5" name="Alatunnisteen paikkamerkki 4">
             <a:extLst>
               <a:ext uri="{FF2B5EF4-FFF2-40B4-BE49-F238E27FC236}">
-                <a16:creationId xmlns="" xmlns:a16="http://schemas.microsoft.com/office/drawing/2014/main" id="{F2746287-314B-4AB5-8824-1FE1A8BC28F2}"/>
+                <a16:creationId xmlns:a16="http://schemas.microsoft.com/office/drawing/2014/main" id="{F2746287-314B-4AB5-8824-1FE1A8BC28F2}"/>
               </a:ext>
             </a:extLst>
           </p:cNvPr>
@@ -1183,7 +1174,7 @@
           <p:cNvPr id="6" name="Dian numeron paikkamerkki 5">
             <a:extLst>
               <a:ext uri="{FF2B5EF4-FFF2-40B4-BE49-F238E27FC236}">
-                <a16:creationId xmlns="" xmlns:a16="http://schemas.microsoft.com/office/drawing/2014/main" id="{BBC829C2-9102-4BB9-8FA7-34D1B2096A8D}"/>
+                <a16:creationId xmlns:a16="http://schemas.microsoft.com/office/drawing/2014/main" id="{BBC829C2-9102-4BB9-8FA7-34D1B2096A8D}"/>
               </a:ext>
             </a:extLst>
           </p:cNvPr>
@@ -1201,7 +1192,6 @@
           <a:p>
             <a:fld id="{784304D2-DF8B-49B7-9B54-9F8017A67B0D}" type="slidenum">
               <a:rPr lang="fi-FI" smtClean="0"/>
-              <a:pPr/>
               <a:t>‹#›</a:t>
             </a:fld>
             <a:endParaRPr lang="fi-FI"/>
@@ -1211,7 +1201,7 @@
     </p:spTree>
     <p:extLst>
       <p:ext uri="{BB962C8B-B14F-4D97-AF65-F5344CB8AC3E}">
-        <p14:creationId xmlns="" xmlns:p14="http://schemas.microsoft.com/office/powerpoint/2010/main" val="3068268997"/>
+        <p14:creationId xmlns:p14="http://schemas.microsoft.com/office/powerpoint/2010/main" val="3068268997"/>
       </p:ext>
     </p:extLst>
   </p:cSld>
@@ -1243,7 +1233,7 @@
           <p:cNvPr id="2" name="Otsikko 1">
             <a:extLst>
               <a:ext uri="{FF2B5EF4-FFF2-40B4-BE49-F238E27FC236}">
-                <a16:creationId xmlns="" xmlns:a16="http://schemas.microsoft.com/office/drawing/2014/main" id="{015BFC9C-B785-47DE-9480-EFED7B0D07C9}"/>
+                <a16:creationId xmlns:a16="http://schemas.microsoft.com/office/drawing/2014/main" id="{015BFC9C-B785-47DE-9480-EFED7B0D07C9}"/>
               </a:ext>
             </a:extLst>
           </p:cNvPr>
@@ -1271,7 +1261,7 @@
           <p:cNvPr id="3" name="Sisällön paikkamerkki 2">
             <a:extLst>
               <a:ext uri="{FF2B5EF4-FFF2-40B4-BE49-F238E27FC236}">
-                <a16:creationId xmlns="" xmlns:a16="http://schemas.microsoft.com/office/drawing/2014/main" id="{3FC677EF-259E-4504-8027-99C356AFF193}"/>
+                <a16:creationId xmlns:a16="http://schemas.microsoft.com/office/drawing/2014/main" id="{3FC677EF-259E-4504-8027-99C356AFF193}"/>
               </a:ext>
             </a:extLst>
           </p:cNvPr>
@@ -1333,7 +1323,7 @@
           <p:cNvPr id="4" name="Sisällön paikkamerkki 3">
             <a:extLst>
               <a:ext uri="{FF2B5EF4-FFF2-40B4-BE49-F238E27FC236}">
-                <a16:creationId xmlns="" xmlns:a16="http://schemas.microsoft.com/office/drawing/2014/main" id="{61629DEA-E5B4-4895-A3B2-EA317B123ADA}"/>
+                <a16:creationId xmlns:a16="http://schemas.microsoft.com/office/drawing/2014/main" id="{61629DEA-E5B4-4895-A3B2-EA317B123ADA}"/>
               </a:ext>
             </a:extLst>
           </p:cNvPr>
@@ -1395,7 +1385,7 @@
           <p:cNvPr id="5" name="Päivämäärän paikkamerkki 4">
             <a:extLst>
               <a:ext uri="{FF2B5EF4-FFF2-40B4-BE49-F238E27FC236}">
-                <a16:creationId xmlns="" xmlns:a16="http://schemas.microsoft.com/office/drawing/2014/main" id="{4FD3810E-C958-4CB2-92C7-76795EDA4B5C}"/>
+                <a16:creationId xmlns:a16="http://schemas.microsoft.com/office/drawing/2014/main" id="{4FD3810E-C958-4CB2-92C7-76795EDA4B5C}"/>
               </a:ext>
             </a:extLst>
           </p:cNvPr>
@@ -1413,8 +1403,7 @@
           <a:p>
             <a:fld id="{978E5B9B-AA1C-4837-A679-92CCBB0596D1}" type="datetimeFigureOut">
               <a:rPr lang="fi-FI" smtClean="0"/>
-              <a:pPr/>
-              <a:t>16.3.2021</a:t>
+              <a:t>18.3.2021</a:t>
             </a:fld>
             <a:endParaRPr lang="fi-FI"/>
           </a:p>
@@ -1425,7 +1414,7 @@
           <p:cNvPr id="6" name="Alatunnisteen paikkamerkki 5">
             <a:extLst>
               <a:ext uri="{FF2B5EF4-FFF2-40B4-BE49-F238E27FC236}">
-                <a16:creationId xmlns="" xmlns:a16="http://schemas.microsoft.com/office/drawing/2014/main" id="{51A02365-67F2-4EA6-82B9-934B2BD1E8C2}"/>
+                <a16:creationId xmlns:a16="http://schemas.microsoft.com/office/drawing/2014/main" id="{51A02365-67F2-4EA6-82B9-934B2BD1E8C2}"/>
               </a:ext>
             </a:extLst>
           </p:cNvPr>
@@ -1450,7 +1439,7 @@
           <p:cNvPr id="7" name="Dian numeron paikkamerkki 6">
             <a:extLst>
               <a:ext uri="{FF2B5EF4-FFF2-40B4-BE49-F238E27FC236}">
-                <a16:creationId xmlns="" xmlns:a16="http://schemas.microsoft.com/office/drawing/2014/main" id="{99C5B4AC-35D9-4AAC-99CC-B0642C207416}"/>
+                <a16:creationId xmlns:a16="http://schemas.microsoft.com/office/drawing/2014/main" id="{99C5B4AC-35D9-4AAC-99CC-B0642C207416}"/>
               </a:ext>
             </a:extLst>
           </p:cNvPr>
@@ -1468,7 +1457,6 @@
           <a:p>
             <a:fld id="{784304D2-DF8B-49B7-9B54-9F8017A67B0D}" type="slidenum">
               <a:rPr lang="fi-FI" smtClean="0"/>
-              <a:pPr/>
               <a:t>‹#›</a:t>
             </a:fld>
             <a:endParaRPr lang="fi-FI"/>
@@ -1478,7 +1466,7 @@
     </p:spTree>
     <p:extLst>
       <p:ext uri="{BB962C8B-B14F-4D97-AF65-F5344CB8AC3E}">
-        <p14:creationId xmlns="" xmlns:p14="http://schemas.microsoft.com/office/powerpoint/2010/main" val="942935185"/>
+        <p14:creationId xmlns:p14="http://schemas.microsoft.com/office/powerpoint/2010/main" val="942935185"/>
       </p:ext>
     </p:extLst>
   </p:cSld>
@@ -1510,7 +1498,7 @@
           <p:cNvPr id="2" name="Otsikko 1">
             <a:extLst>
               <a:ext uri="{FF2B5EF4-FFF2-40B4-BE49-F238E27FC236}">
-                <a16:creationId xmlns="" xmlns:a16="http://schemas.microsoft.com/office/drawing/2014/main" id="{609BE095-C86D-4E28-AAB0-B88191969063}"/>
+                <a16:creationId xmlns:a16="http://schemas.microsoft.com/office/drawing/2014/main" id="{609BE095-C86D-4E28-AAB0-B88191969063}"/>
               </a:ext>
             </a:extLst>
           </p:cNvPr>
@@ -1543,7 +1531,7 @@
           <p:cNvPr id="3" name="Tekstin paikkamerkki 2">
             <a:extLst>
               <a:ext uri="{FF2B5EF4-FFF2-40B4-BE49-F238E27FC236}">
-                <a16:creationId xmlns="" xmlns:a16="http://schemas.microsoft.com/office/drawing/2014/main" id="{E443448A-1661-4F07-9502-A19E32A367E1}"/>
+                <a16:creationId xmlns:a16="http://schemas.microsoft.com/office/drawing/2014/main" id="{E443448A-1661-4F07-9502-A19E32A367E1}"/>
               </a:ext>
             </a:extLst>
           </p:cNvPr>
@@ -1614,7 +1602,7 @@
           <p:cNvPr id="4" name="Sisällön paikkamerkki 3">
             <a:extLst>
               <a:ext uri="{FF2B5EF4-FFF2-40B4-BE49-F238E27FC236}">
-                <a16:creationId xmlns="" xmlns:a16="http://schemas.microsoft.com/office/drawing/2014/main" id="{39CE3B77-FF2C-435A-8E34-894658D39AE6}"/>
+                <a16:creationId xmlns:a16="http://schemas.microsoft.com/office/drawing/2014/main" id="{39CE3B77-FF2C-435A-8E34-894658D39AE6}"/>
               </a:ext>
             </a:extLst>
           </p:cNvPr>
@@ -1676,7 +1664,7 @@
           <p:cNvPr id="5" name="Tekstin paikkamerkki 4">
             <a:extLst>
               <a:ext uri="{FF2B5EF4-FFF2-40B4-BE49-F238E27FC236}">
-                <a16:creationId xmlns="" xmlns:a16="http://schemas.microsoft.com/office/drawing/2014/main" id="{9327D033-B4BC-4586-BA7F-44F76414D274}"/>
+                <a16:creationId xmlns:a16="http://schemas.microsoft.com/office/drawing/2014/main" id="{9327D033-B4BC-4586-BA7F-44F76414D274}"/>
               </a:ext>
             </a:extLst>
           </p:cNvPr>
@@ -1747,7 +1735,7 @@
           <p:cNvPr id="6" name="Sisällön paikkamerkki 5">
             <a:extLst>
               <a:ext uri="{FF2B5EF4-FFF2-40B4-BE49-F238E27FC236}">
-                <a16:creationId xmlns="" xmlns:a16="http://schemas.microsoft.com/office/drawing/2014/main" id="{E9A0C292-6C7E-4266-ADB4-38C7E81D44D1}"/>
+                <a16:creationId xmlns:a16="http://schemas.microsoft.com/office/drawing/2014/main" id="{E9A0C292-6C7E-4266-ADB4-38C7E81D44D1}"/>
               </a:ext>
             </a:extLst>
           </p:cNvPr>
@@ -1809,7 +1797,7 @@
           <p:cNvPr id="7" name="Päivämäärän paikkamerkki 6">
             <a:extLst>
               <a:ext uri="{FF2B5EF4-FFF2-40B4-BE49-F238E27FC236}">
-                <a16:creationId xmlns="" xmlns:a16="http://schemas.microsoft.com/office/drawing/2014/main" id="{B7E01BE9-E38A-4F80-A485-120C2BFB983F}"/>
+                <a16:creationId xmlns:a16="http://schemas.microsoft.com/office/drawing/2014/main" id="{B7E01BE9-E38A-4F80-A485-120C2BFB983F}"/>
               </a:ext>
             </a:extLst>
           </p:cNvPr>
@@ -1827,8 +1815,7 @@
           <a:p>
             <a:fld id="{978E5B9B-AA1C-4837-A679-92CCBB0596D1}" type="datetimeFigureOut">
               <a:rPr lang="fi-FI" smtClean="0"/>
-              <a:pPr/>
-              <a:t>16.3.2021</a:t>
+              <a:t>18.3.2021</a:t>
             </a:fld>
             <a:endParaRPr lang="fi-FI"/>
           </a:p>
@@ -1839,7 +1826,7 @@
           <p:cNvPr id="8" name="Alatunnisteen paikkamerkki 7">
             <a:extLst>
               <a:ext uri="{FF2B5EF4-FFF2-40B4-BE49-F238E27FC236}">
-                <a16:creationId xmlns="" xmlns:a16="http://schemas.microsoft.com/office/drawing/2014/main" id="{16FF1AC1-FA04-46D3-90C5-C6DFB264C039}"/>
+                <a16:creationId xmlns:a16="http://schemas.microsoft.com/office/drawing/2014/main" id="{16FF1AC1-FA04-46D3-90C5-C6DFB264C039}"/>
               </a:ext>
             </a:extLst>
           </p:cNvPr>
@@ -1864,7 +1851,7 @@
           <p:cNvPr id="9" name="Dian numeron paikkamerkki 8">
             <a:extLst>
               <a:ext uri="{FF2B5EF4-FFF2-40B4-BE49-F238E27FC236}">
-                <a16:creationId xmlns="" xmlns:a16="http://schemas.microsoft.com/office/drawing/2014/main" id="{B434B465-A96E-4EBE-84C2-C4397F5A6D7B}"/>
+                <a16:creationId xmlns:a16="http://schemas.microsoft.com/office/drawing/2014/main" id="{B434B465-A96E-4EBE-84C2-C4397F5A6D7B}"/>
               </a:ext>
             </a:extLst>
           </p:cNvPr>
@@ -1882,7 +1869,6 @@
           <a:p>
             <a:fld id="{784304D2-DF8B-49B7-9B54-9F8017A67B0D}" type="slidenum">
               <a:rPr lang="fi-FI" smtClean="0"/>
-              <a:pPr/>
               <a:t>‹#›</a:t>
             </a:fld>
             <a:endParaRPr lang="fi-FI"/>
@@ -1892,7 +1878,7 @@
     </p:spTree>
     <p:extLst>
       <p:ext uri="{BB962C8B-B14F-4D97-AF65-F5344CB8AC3E}">
-        <p14:creationId xmlns="" xmlns:p14="http://schemas.microsoft.com/office/powerpoint/2010/main" val="957973266"/>
+        <p14:creationId xmlns:p14="http://schemas.microsoft.com/office/powerpoint/2010/main" val="957973266"/>
       </p:ext>
     </p:extLst>
   </p:cSld>
@@ -1924,7 +1910,7 @@
           <p:cNvPr id="2" name="Otsikko 1">
             <a:extLst>
               <a:ext uri="{FF2B5EF4-FFF2-40B4-BE49-F238E27FC236}">
-                <a16:creationId xmlns="" xmlns:a16="http://schemas.microsoft.com/office/drawing/2014/main" id="{633F33DD-3C4B-4EF8-A703-9C82DCB2BF9B}"/>
+                <a16:creationId xmlns:a16="http://schemas.microsoft.com/office/drawing/2014/main" id="{633F33DD-3C4B-4EF8-A703-9C82DCB2BF9B}"/>
               </a:ext>
             </a:extLst>
           </p:cNvPr>
@@ -1952,7 +1938,7 @@
           <p:cNvPr id="3" name="Päivämäärän paikkamerkki 2">
             <a:extLst>
               <a:ext uri="{FF2B5EF4-FFF2-40B4-BE49-F238E27FC236}">
-                <a16:creationId xmlns="" xmlns:a16="http://schemas.microsoft.com/office/drawing/2014/main" id="{7D765B99-C505-4601-A09B-549514CF5C75}"/>
+                <a16:creationId xmlns:a16="http://schemas.microsoft.com/office/drawing/2014/main" id="{7D765B99-C505-4601-A09B-549514CF5C75}"/>
               </a:ext>
             </a:extLst>
           </p:cNvPr>
@@ -1970,8 +1956,7 @@
           <a:p>
             <a:fld id="{978E5B9B-AA1C-4837-A679-92CCBB0596D1}" type="datetimeFigureOut">
               <a:rPr lang="fi-FI" smtClean="0"/>
-              <a:pPr/>
-              <a:t>16.3.2021</a:t>
+              <a:t>18.3.2021</a:t>
             </a:fld>
             <a:endParaRPr lang="fi-FI"/>
           </a:p>
@@ -1982,7 +1967,7 @@
           <p:cNvPr id="4" name="Alatunnisteen paikkamerkki 3">
             <a:extLst>
               <a:ext uri="{FF2B5EF4-FFF2-40B4-BE49-F238E27FC236}">
-                <a16:creationId xmlns="" xmlns:a16="http://schemas.microsoft.com/office/drawing/2014/main" id="{F9091152-1DCD-43DB-9328-A17656ACC5C0}"/>
+                <a16:creationId xmlns:a16="http://schemas.microsoft.com/office/drawing/2014/main" id="{F9091152-1DCD-43DB-9328-A17656ACC5C0}"/>
               </a:ext>
             </a:extLst>
           </p:cNvPr>
@@ -2007,7 +1992,7 @@
           <p:cNvPr id="5" name="Dian numeron paikkamerkki 4">
             <a:extLst>
               <a:ext uri="{FF2B5EF4-FFF2-40B4-BE49-F238E27FC236}">
-                <a16:creationId xmlns="" xmlns:a16="http://schemas.microsoft.com/office/drawing/2014/main" id="{CC8BC656-C8B6-4D0C-B370-AE5070A804E5}"/>
+                <a16:creationId xmlns:a16="http://schemas.microsoft.com/office/drawing/2014/main" id="{CC8BC656-C8B6-4D0C-B370-AE5070A804E5}"/>
               </a:ext>
             </a:extLst>
           </p:cNvPr>
@@ -2025,7 +2010,6 @@
           <a:p>
             <a:fld id="{784304D2-DF8B-49B7-9B54-9F8017A67B0D}" type="slidenum">
               <a:rPr lang="fi-FI" smtClean="0"/>
-              <a:pPr/>
               <a:t>‹#›</a:t>
             </a:fld>
             <a:endParaRPr lang="fi-FI"/>
@@ -2035,7 +2019,7 @@
     </p:spTree>
     <p:extLst>
       <p:ext uri="{BB962C8B-B14F-4D97-AF65-F5344CB8AC3E}">
-        <p14:creationId xmlns="" xmlns:p14="http://schemas.microsoft.com/office/powerpoint/2010/main" val="1569995312"/>
+        <p14:creationId xmlns:p14="http://schemas.microsoft.com/office/powerpoint/2010/main" val="1569995312"/>
       </p:ext>
     </p:extLst>
   </p:cSld>
@@ -2067,7 +2051,7 @@
           <p:cNvPr id="2" name="Päivämäärän paikkamerkki 1">
             <a:extLst>
               <a:ext uri="{FF2B5EF4-FFF2-40B4-BE49-F238E27FC236}">
-                <a16:creationId xmlns="" xmlns:a16="http://schemas.microsoft.com/office/drawing/2014/main" id="{F71A13CB-6D93-4422-BF1F-3449FA2B57F1}"/>
+                <a16:creationId xmlns:a16="http://schemas.microsoft.com/office/drawing/2014/main" id="{F71A13CB-6D93-4422-BF1F-3449FA2B57F1}"/>
               </a:ext>
             </a:extLst>
           </p:cNvPr>
@@ -2085,8 +2069,7 @@
           <a:p>
             <a:fld id="{978E5B9B-AA1C-4837-A679-92CCBB0596D1}" type="datetimeFigureOut">
               <a:rPr lang="fi-FI" smtClean="0"/>
-              <a:pPr/>
-              <a:t>16.3.2021</a:t>
+              <a:t>18.3.2021</a:t>
             </a:fld>
             <a:endParaRPr lang="fi-FI"/>
           </a:p>
@@ -2097,7 +2080,7 @@
           <p:cNvPr id="3" name="Alatunnisteen paikkamerkki 2">
             <a:extLst>
               <a:ext uri="{FF2B5EF4-FFF2-40B4-BE49-F238E27FC236}">
-                <a16:creationId xmlns="" xmlns:a16="http://schemas.microsoft.com/office/drawing/2014/main" id="{16CE53C6-5B70-4270-BF9B-50F3F3A824B8}"/>
+                <a16:creationId xmlns:a16="http://schemas.microsoft.com/office/drawing/2014/main" id="{16CE53C6-5B70-4270-BF9B-50F3F3A824B8}"/>
               </a:ext>
             </a:extLst>
           </p:cNvPr>
@@ -2122,7 +2105,7 @@
           <p:cNvPr id="4" name="Dian numeron paikkamerkki 3">
             <a:extLst>
               <a:ext uri="{FF2B5EF4-FFF2-40B4-BE49-F238E27FC236}">
-                <a16:creationId xmlns="" xmlns:a16="http://schemas.microsoft.com/office/drawing/2014/main" id="{3A5CB582-6E3C-4EDB-B945-8FEA50B51AD2}"/>
+                <a16:creationId xmlns:a16="http://schemas.microsoft.com/office/drawing/2014/main" id="{3A5CB582-6E3C-4EDB-B945-8FEA50B51AD2}"/>
               </a:ext>
             </a:extLst>
           </p:cNvPr>
@@ -2140,7 +2123,6 @@
           <a:p>
             <a:fld id="{784304D2-DF8B-49B7-9B54-9F8017A67B0D}" type="slidenum">
               <a:rPr lang="fi-FI" smtClean="0"/>
-              <a:pPr/>
               <a:t>‹#›</a:t>
             </a:fld>
             <a:endParaRPr lang="fi-FI"/>
@@ -2150,7 +2132,7 @@
     </p:spTree>
     <p:extLst>
       <p:ext uri="{BB962C8B-B14F-4D97-AF65-F5344CB8AC3E}">
-        <p14:creationId xmlns="" xmlns:p14="http://schemas.microsoft.com/office/powerpoint/2010/main" val="1361461699"/>
+        <p14:creationId xmlns:p14="http://schemas.microsoft.com/office/powerpoint/2010/main" val="1361461699"/>
       </p:ext>
     </p:extLst>
   </p:cSld>
@@ -2182,7 +2164,7 @@
           <p:cNvPr id="2" name="Otsikko 1">
             <a:extLst>
               <a:ext uri="{FF2B5EF4-FFF2-40B4-BE49-F238E27FC236}">
-                <a16:creationId xmlns="" xmlns:a16="http://schemas.microsoft.com/office/drawing/2014/main" id="{31541142-D9E2-43DE-A459-1E9EF87A8111}"/>
+                <a16:creationId xmlns:a16="http://schemas.microsoft.com/office/drawing/2014/main" id="{31541142-D9E2-43DE-A459-1E9EF87A8111}"/>
               </a:ext>
             </a:extLst>
           </p:cNvPr>
@@ -2219,7 +2201,7 @@
           <p:cNvPr id="3" name="Sisällön paikkamerkki 2">
             <a:extLst>
               <a:ext uri="{FF2B5EF4-FFF2-40B4-BE49-F238E27FC236}">
-                <a16:creationId xmlns="" xmlns:a16="http://schemas.microsoft.com/office/drawing/2014/main" id="{08AD3E29-7066-4B98-A8FD-F6DE134FF548}"/>
+                <a16:creationId xmlns:a16="http://schemas.microsoft.com/office/drawing/2014/main" id="{08AD3E29-7066-4B98-A8FD-F6DE134FF548}"/>
               </a:ext>
             </a:extLst>
           </p:cNvPr>
@@ -2309,7 +2291,7 @@
           <p:cNvPr id="4" name="Tekstin paikkamerkki 3">
             <a:extLst>
               <a:ext uri="{FF2B5EF4-FFF2-40B4-BE49-F238E27FC236}">
-                <a16:creationId xmlns="" xmlns:a16="http://schemas.microsoft.com/office/drawing/2014/main" id="{C8F20798-77F4-4C6E-B58A-E2CCFA28B970}"/>
+                <a16:creationId xmlns:a16="http://schemas.microsoft.com/office/drawing/2014/main" id="{C8F20798-77F4-4C6E-B58A-E2CCFA28B970}"/>
               </a:ext>
             </a:extLst>
           </p:cNvPr>
@@ -2380,7 +2362,7 @@
           <p:cNvPr id="5" name="Päivämäärän paikkamerkki 4">
             <a:extLst>
               <a:ext uri="{FF2B5EF4-FFF2-40B4-BE49-F238E27FC236}">
-                <a16:creationId xmlns="" xmlns:a16="http://schemas.microsoft.com/office/drawing/2014/main" id="{803B089E-FDAA-48BF-A28D-CAABA145B40B}"/>
+                <a16:creationId xmlns:a16="http://schemas.microsoft.com/office/drawing/2014/main" id="{803B089E-FDAA-48BF-A28D-CAABA145B40B}"/>
               </a:ext>
             </a:extLst>
           </p:cNvPr>
@@ -2398,8 +2380,7 @@
           <a:p>
             <a:fld id="{978E5B9B-AA1C-4837-A679-92CCBB0596D1}" type="datetimeFigureOut">
               <a:rPr lang="fi-FI" smtClean="0"/>
-              <a:pPr/>
-              <a:t>16.3.2021</a:t>
+              <a:t>18.3.2021</a:t>
             </a:fld>
             <a:endParaRPr lang="fi-FI"/>
           </a:p>
@@ -2410,7 +2391,7 @@
           <p:cNvPr id="6" name="Alatunnisteen paikkamerkki 5">
             <a:extLst>
               <a:ext uri="{FF2B5EF4-FFF2-40B4-BE49-F238E27FC236}">
-                <a16:creationId xmlns="" xmlns:a16="http://schemas.microsoft.com/office/drawing/2014/main" id="{B3B94AA2-9EB3-435E-9532-9D9DE9DA0C1D}"/>
+                <a16:creationId xmlns:a16="http://schemas.microsoft.com/office/drawing/2014/main" id="{B3B94AA2-9EB3-435E-9532-9D9DE9DA0C1D}"/>
               </a:ext>
             </a:extLst>
           </p:cNvPr>
@@ -2435,7 +2416,7 @@
           <p:cNvPr id="7" name="Dian numeron paikkamerkki 6">
             <a:extLst>
               <a:ext uri="{FF2B5EF4-FFF2-40B4-BE49-F238E27FC236}">
-                <a16:creationId xmlns="" xmlns:a16="http://schemas.microsoft.com/office/drawing/2014/main" id="{3487B107-AD2D-48A6-80F2-F11409615AD5}"/>
+                <a16:creationId xmlns:a16="http://schemas.microsoft.com/office/drawing/2014/main" id="{3487B107-AD2D-48A6-80F2-F11409615AD5}"/>
               </a:ext>
             </a:extLst>
           </p:cNvPr>
@@ -2453,7 +2434,6 @@
           <a:p>
             <a:fld id="{784304D2-DF8B-49B7-9B54-9F8017A67B0D}" type="slidenum">
               <a:rPr lang="fi-FI" smtClean="0"/>
-              <a:pPr/>
               <a:t>‹#›</a:t>
             </a:fld>
             <a:endParaRPr lang="fi-FI"/>
@@ -2463,7 +2443,7 @@
     </p:spTree>
     <p:extLst>
       <p:ext uri="{BB962C8B-B14F-4D97-AF65-F5344CB8AC3E}">
-        <p14:creationId xmlns="" xmlns:p14="http://schemas.microsoft.com/office/powerpoint/2010/main" val="2916801510"/>
+        <p14:creationId xmlns:p14="http://schemas.microsoft.com/office/powerpoint/2010/main" val="2916801510"/>
       </p:ext>
     </p:extLst>
   </p:cSld>
@@ -2495,7 +2475,7 @@
           <p:cNvPr id="2" name="Otsikko 1">
             <a:extLst>
               <a:ext uri="{FF2B5EF4-FFF2-40B4-BE49-F238E27FC236}">
-                <a16:creationId xmlns="" xmlns:a16="http://schemas.microsoft.com/office/drawing/2014/main" id="{E11A26D3-B181-425A-9EF6-91381C901E99}"/>
+                <a16:creationId xmlns:a16="http://schemas.microsoft.com/office/drawing/2014/main" id="{E11A26D3-B181-425A-9EF6-91381C901E99}"/>
               </a:ext>
             </a:extLst>
           </p:cNvPr>
@@ -2532,7 +2512,7 @@
           <p:cNvPr id="3" name="Kuvan paikkamerkki 2">
             <a:extLst>
               <a:ext uri="{FF2B5EF4-FFF2-40B4-BE49-F238E27FC236}">
-                <a16:creationId xmlns="" xmlns:a16="http://schemas.microsoft.com/office/drawing/2014/main" id="{98BAB6F1-2F8C-4B85-9D4F-9FB88B83F382}"/>
+                <a16:creationId xmlns:a16="http://schemas.microsoft.com/office/drawing/2014/main" id="{98BAB6F1-2F8C-4B85-9D4F-9FB88B83F382}"/>
               </a:ext>
             </a:extLst>
           </p:cNvPr>
@@ -2599,7 +2579,7 @@
           <p:cNvPr id="4" name="Tekstin paikkamerkki 3">
             <a:extLst>
               <a:ext uri="{FF2B5EF4-FFF2-40B4-BE49-F238E27FC236}">
-                <a16:creationId xmlns="" xmlns:a16="http://schemas.microsoft.com/office/drawing/2014/main" id="{9498AD85-2AF2-426F-9530-005653FAE0F1}"/>
+                <a16:creationId xmlns:a16="http://schemas.microsoft.com/office/drawing/2014/main" id="{9498AD85-2AF2-426F-9530-005653FAE0F1}"/>
               </a:ext>
             </a:extLst>
           </p:cNvPr>
@@ -2670,7 +2650,7 @@
           <p:cNvPr id="5" name="Päivämäärän paikkamerkki 4">
             <a:extLst>
               <a:ext uri="{FF2B5EF4-FFF2-40B4-BE49-F238E27FC236}">
-                <a16:creationId xmlns="" xmlns:a16="http://schemas.microsoft.com/office/drawing/2014/main" id="{0D709AD5-2386-49B0-BA56-697CCD2AF538}"/>
+                <a16:creationId xmlns:a16="http://schemas.microsoft.com/office/drawing/2014/main" id="{0D709AD5-2386-49B0-BA56-697CCD2AF538}"/>
               </a:ext>
             </a:extLst>
           </p:cNvPr>
@@ -2688,8 +2668,7 @@
           <a:p>
             <a:fld id="{978E5B9B-AA1C-4837-A679-92CCBB0596D1}" type="datetimeFigureOut">
               <a:rPr lang="fi-FI" smtClean="0"/>
-              <a:pPr/>
-              <a:t>16.3.2021</a:t>
+              <a:t>18.3.2021</a:t>
             </a:fld>
             <a:endParaRPr lang="fi-FI"/>
           </a:p>
@@ -2700,7 +2679,7 @@
           <p:cNvPr id="6" name="Alatunnisteen paikkamerkki 5">
             <a:extLst>
               <a:ext uri="{FF2B5EF4-FFF2-40B4-BE49-F238E27FC236}">
-                <a16:creationId xmlns="" xmlns:a16="http://schemas.microsoft.com/office/drawing/2014/main" id="{F67B804E-191A-425F-8214-50DE5CB6B3A2}"/>
+                <a16:creationId xmlns:a16="http://schemas.microsoft.com/office/drawing/2014/main" id="{F67B804E-191A-425F-8214-50DE5CB6B3A2}"/>
               </a:ext>
             </a:extLst>
           </p:cNvPr>
@@ -2725,7 +2704,7 @@
           <p:cNvPr id="7" name="Dian numeron paikkamerkki 6">
             <a:extLst>
               <a:ext uri="{FF2B5EF4-FFF2-40B4-BE49-F238E27FC236}">
-                <a16:creationId xmlns="" xmlns:a16="http://schemas.microsoft.com/office/drawing/2014/main" id="{91A7BC45-8E2F-427F-8053-22F51303351A}"/>
+                <a16:creationId xmlns:a16="http://schemas.microsoft.com/office/drawing/2014/main" id="{91A7BC45-8E2F-427F-8053-22F51303351A}"/>
               </a:ext>
             </a:extLst>
           </p:cNvPr>
@@ -2743,7 +2722,6 @@
           <a:p>
             <a:fld id="{784304D2-DF8B-49B7-9B54-9F8017A67B0D}" type="slidenum">
               <a:rPr lang="fi-FI" smtClean="0"/>
-              <a:pPr/>
               <a:t>‹#›</a:t>
             </a:fld>
             <a:endParaRPr lang="fi-FI"/>
@@ -2753,7 +2731,7 @@
     </p:spTree>
     <p:extLst>
       <p:ext uri="{BB962C8B-B14F-4D97-AF65-F5344CB8AC3E}">
-        <p14:creationId xmlns="" xmlns:p14="http://schemas.microsoft.com/office/powerpoint/2010/main" val="1694345294"/>
+        <p14:creationId xmlns:p14="http://schemas.microsoft.com/office/powerpoint/2010/main" val="1694345294"/>
       </p:ext>
     </p:extLst>
   </p:cSld>
@@ -2790,7 +2768,7 @@
           <p:cNvPr id="2" name="Otsikon paikkamerkki 1">
             <a:extLst>
               <a:ext uri="{FF2B5EF4-FFF2-40B4-BE49-F238E27FC236}">
-                <a16:creationId xmlns="" xmlns:a16="http://schemas.microsoft.com/office/drawing/2014/main" id="{053687A8-345E-4D5B-9532-7C3CAF35DA11}"/>
+                <a16:creationId xmlns:a16="http://schemas.microsoft.com/office/drawing/2014/main" id="{053687A8-345E-4D5B-9532-7C3CAF35DA11}"/>
               </a:ext>
             </a:extLst>
           </p:cNvPr>
@@ -2828,7 +2806,7 @@
           <p:cNvPr id="3" name="Tekstin paikkamerkki 2">
             <a:extLst>
               <a:ext uri="{FF2B5EF4-FFF2-40B4-BE49-F238E27FC236}">
-                <a16:creationId xmlns="" xmlns:a16="http://schemas.microsoft.com/office/drawing/2014/main" id="{80896637-E869-4B6E-82ED-0852E3F018BF}"/>
+                <a16:creationId xmlns:a16="http://schemas.microsoft.com/office/drawing/2014/main" id="{80896637-E869-4B6E-82ED-0852E3F018BF}"/>
               </a:ext>
             </a:extLst>
           </p:cNvPr>
@@ -2895,7 +2873,7 @@
           <p:cNvPr id="4" name="Päivämäärän paikkamerkki 3">
             <a:extLst>
               <a:ext uri="{FF2B5EF4-FFF2-40B4-BE49-F238E27FC236}">
-                <a16:creationId xmlns="" xmlns:a16="http://schemas.microsoft.com/office/drawing/2014/main" id="{A2810AE2-AB52-42AE-9F79-868DC17453E6}"/>
+                <a16:creationId xmlns:a16="http://schemas.microsoft.com/office/drawing/2014/main" id="{A2810AE2-AB52-42AE-9F79-868DC17453E6}"/>
               </a:ext>
             </a:extLst>
           </p:cNvPr>
@@ -2931,8 +2909,7 @@
           <a:p>
             <a:fld id="{978E5B9B-AA1C-4837-A679-92CCBB0596D1}" type="datetimeFigureOut">
               <a:rPr lang="fi-FI" smtClean="0"/>
-              <a:pPr/>
-              <a:t>16.3.2021</a:t>
+              <a:t>18.3.2021</a:t>
             </a:fld>
             <a:endParaRPr lang="fi-FI"/>
           </a:p>
@@ -2943,7 +2920,7 @@
           <p:cNvPr id="5" name="Alatunnisteen paikkamerkki 4">
             <a:extLst>
               <a:ext uri="{FF2B5EF4-FFF2-40B4-BE49-F238E27FC236}">
-                <a16:creationId xmlns="" xmlns:a16="http://schemas.microsoft.com/office/drawing/2014/main" id="{5F12A07B-960C-4082-B506-C909FEB7B005}"/>
+                <a16:creationId xmlns:a16="http://schemas.microsoft.com/office/drawing/2014/main" id="{5F12A07B-960C-4082-B506-C909FEB7B005}"/>
               </a:ext>
             </a:extLst>
           </p:cNvPr>
@@ -2986,7 +2963,7 @@
           <p:cNvPr id="6" name="Dian numeron paikkamerkki 5">
             <a:extLst>
               <a:ext uri="{FF2B5EF4-FFF2-40B4-BE49-F238E27FC236}">
-                <a16:creationId xmlns="" xmlns:a16="http://schemas.microsoft.com/office/drawing/2014/main" id="{5CA8B8B0-ABE5-4DD0-B465-9C06B8F80F09}"/>
+                <a16:creationId xmlns:a16="http://schemas.microsoft.com/office/drawing/2014/main" id="{5CA8B8B0-ABE5-4DD0-B465-9C06B8F80F09}"/>
               </a:ext>
             </a:extLst>
           </p:cNvPr>
@@ -3022,7 +2999,6 @@
           <a:p>
             <a:fld id="{784304D2-DF8B-49B7-9B54-9F8017A67B0D}" type="slidenum">
               <a:rPr lang="fi-FI" smtClean="0"/>
-              <a:pPr/>
               <a:t>‹#›</a:t>
             </a:fld>
             <a:endParaRPr lang="fi-FI"/>
@@ -3032,7 +3008,7 @@
     </p:spTree>
     <p:extLst>
       <p:ext uri="{BB962C8B-B14F-4D97-AF65-F5344CB8AC3E}">
-        <p14:creationId xmlns="" xmlns:p14="http://schemas.microsoft.com/office/powerpoint/2010/main" val="2388750885"/>
+        <p14:creationId xmlns:p14="http://schemas.microsoft.com/office/powerpoint/2010/main" val="2388750885"/>
       </p:ext>
     </p:extLst>
   </p:cSld>
@@ -3350,511 +3326,467 @@
           <a:chExt cx="0" cy="0"/>
         </a:xfrm>
       </p:grpSpPr>
-      <p:grpSp>
-        <p:nvGrpSpPr>
-          <p:cNvPr id="65" name="Group 64"/>
-          <p:cNvGrpSpPr/>
+      <p:sp>
+        <p:nvSpPr>
+          <p:cNvPr id="4" name="Vuokaavio: Prosessi 3">
+            <a:extLst>
+              <a:ext uri="{FF2B5EF4-FFF2-40B4-BE49-F238E27FC236}">
+                <a16:creationId xmlns:a16="http://schemas.microsoft.com/office/drawing/2014/main" id="{37593701-5539-423E-807B-FDE41CECEC3B}"/>
+              </a:ext>
+            </a:extLst>
+          </p:cNvPr>
+          <p:cNvSpPr/>
           <p:nvPr/>
-        </p:nvGrpSpPr>
-        <p:grpSpPr>
+        </p:nvSpPr>
+        <p:spPr>
           <a:xfrm>
-            <a:off x="5822749" y="6020337"/>
-            <a:ext cx="4088503" cy="718819"/>
-            <a:chOff x="5822749" y="5847807"/>
-            <a:chExt cx="4088503" cy="718819"/>
-          </a:xfrm>
-        </p:grpSpPr>
-        <p:sp>
-          <p:nvSpPr>
-            <p:cNvPr id="4" name="Vuokaavio: Prosessi 3">
-              <a:extLst>
-                <a:ext uri="{FF2B5EF4-FFF2-40B4-BE49-F238E27FC236}">
-                  <a16:creationId xmlns="" xmlns:a16="http://schemas.microsoft.com/office/drawing/2014/main" id="{37593701-5539-423E-807B-FDE41CECEC3B}"/>
-                </a:ext>
-              </a:extLst>
-            </p:cNvPr>
-            <p:cNvSpPr/>
-            <p:nvPr/>
-          </p:nvSpPr>
-          <p:spPr>
-            <a:xfrm>
-              <a:off x="6772765" y="5847808"/>
-              <a:ext cx="2300287" cy="718818"/>
-            </a:xfrm>
-            <a:prstGeom prst="flowChartProcess">
-              <a:avLst/>
-            </a:prstGeom>
-            <a:solidFill>
-              <a:schemeClr val="accent2">
-                <a:lumMod val="20000"/>
-                <a:lumOff val="80000"/>
-              </a:schemeClr>
-            </a:solidFill>
-          </p:spPr>
-          <p:style>
-            <a:lnRef idx="2">
-              <a:schemeClr val="accent6"/>
-            </a:lnRef>
-            <a:fillRef idx="1">
-              <a:schemeClr val="lt1"/>
-            </a:fillRef>
-            <a:effectRef idx="0">
-              <a:schemeClr val="accent6"/>
-            </a:effectRef>
-            <a:fontRef idx="minor">
-              <a:schemeClr val="dk1"/>
-            </a:fontRef>
-          </p:style>
-          <p:txBody>
-            <a:bodyPr rtlCol="0" anchor="ctr"/>
-            <a:lstStyle/>
-            <a:p>
-              <a:pPr algn="ctr"/>
-              <a:r>
-                <a:rPr lang="fi-FI" dirty="0" err="1"/>
-                <a:t>Heating_min_time</a:t>
-              </a:r>
-              <a:r>
-                <a:rPr lang="fi-FI" dirty="0"/>
-                <a:t>(-1) </a:t>
-              </a:r>
-            </a:p>
-            <a:p>
-              <a:pPr algn="ctr"/>
-              <a:r>
-                <a:rPr lang="fi-FI" dirty="0"/>
-                <a:t>RELAY ON</a:t>
-              </a:r>
-            </a:p>
-          </p:txBody>
-        </p:sp>
-        <p:sp>
-          <p:nvSpPr>
-            <p:cNvPr id="6" name="Tasakylkinen kolmio 5">
-              <a:extLst>
-                <a:ext uri="{FF2B5EF4-FFF2-40B4-BE49-F238E27FC236}">
-                  <a16:creationId xmlns="" xmlns:a16="http://schemas.microsoft.com/office/drawing/2014/main" id="{89DFCAA1-2A8E-4805-94D5-CBEEBCEFC86E}"/>
-                </a:ext>
-              </a:extLst>
-            </p:cNvPr>
-            <p:cNvSpPr/>
-            <p:nvPr/>
-          </p:nvSpPr>
-          <p:spPr>
-            <a:xfrm rot="5400000">
-              <a:off x="9132743" y="5788116"/>
-              <a:ext cx="718817" cy="838200"/>
-            </a:xfrm>
-            <a:prstGeom prst="triangle">
-              <a:avLst/>
-            </a:prstGeom>
-          </p:spPr>
-          <p:style>
-            <a:lnRef idx="2">
-              <a:schemeClr val="accent6"/>
-            </a:lnRef>
-            <a:fillRef idx="1">
-              <a:schemeClr val="lt1"/>
-            </a:fillRef>
-            <a:effectRef idx="0">
-              <a:schemeClr val="accent6"/>
-            </a:effectRef>
-            <a:fontRef idx="minor">
-              <a:schemeClr val="dk1"/>
-            </a:fontRef>
-          </p:style>
-          <p:txBody>
-            <a:bodyPr vert="vert270" rtlCol="0" anchor="ctr"/>
-            <a:lstStyle/>
-            <a:p>
-              <a:pPr algn="ctr"/>
-              <a:r>
-                <a:rPr lang="fi-FI" dirty="0"/>
-                <a:t>20</a:t>
-              </a:r>
-            </a:p>
-          </p:txBody>
-        </p:sp>
-        <p:sp>
-          <p:nvSpPr>
-            <p:cNvPr id="7" name="Tasakylkinen kolmio 6">
-              <a:extLst>
-                <a:ext uri="{FF2B5EF4-FFF2-40B4-BE49-F238E27FC236}">
-                  <a16:creationId xmlns="" xmlns:a16="http://schemas.microsoft.com/office/drawing/2014/main" id="{BCBBA7E4-7636-4121-BA4E-1BD9788EA51E}"/>
-                </a:ext>
-              </a:extLst>
-            </p:cNvPr>
-            <p:cNvSpPr/>
-            <p:nvPr/>
-          </p:nvSpPr>
-          <p:spPr>
-            <a:xfrm rot="16200000">
-              <a:off x="5941324" y="5729233"/>
-              <a:ext cx="718817" cy="955967"/>
-            </a:xfrm>
-            <a:prstGeom prst="triangle">
-              <a:avLst/>
-            </a:prstGeom>
-          </p:spPr>
-          <p:style>
-            <a:lnRef idx="2">
-              <a:schemeClr val="accent6"/>
-            </a:lnRef>
-            <a:fillRef idx="1">
-              <a:schemeClr val="lt1"/>
-            </a:fillRef>
-            <a:effectRef idx="0">
-              <a:schemeClr val="accent6"/>
-            </a:effectRef>
-            <a:fontRef idx="minor">
-              <a:schemeClr val="dk1"/>
-            </a:fontRef>
-          </p:style>
-          <p:txBody>
-            <a:bodyPr vert="vert" rtlCol="0" anchor="ctr"/>
-            <a:lstStyle/>
-            <a:p>
-              <a:pPr algn="ctr"/>
-              <a:r>
-                <a:rPr lang="fi-FI" dirty="0"/>
-                <a:t>150</a:t>
-              </a:r>
-            </a:p>
-          </p:txBody>
-        </p:sp>
-      </p:grpSp>
-      <p:grpSp>
-        <p:nvGrpSpPr>
-          <p:cNvPr id="69" name="Group 68"/>
-          <p:cNvGrpSpPr/>
+            <a:off x="6772765" y="5847808"/>
+            <a:ext cx="2300287" cy="718818"/>
+          </a:xfrm>
+          <a:prstGeom prst="flowChartProcess">
+            <a:avLst/>
+          </a:prstGeom>
+          <a:solidFill>
+            <a:schemeClr val="accent2">
+              <a:lumMod val="20000"/>
+              <a:lumOff val="80000"/>
+            </a:schemeClr>
+          </a:solidFill>
+        </p:spPr>
+        <p:style>
+          <a:lnRef idx="2">
+            <a:schemeClr val="accent6"/>
+          </a:lnRef>
+          <a:fillRef idx="1">
+            <a:schemeClr val="lt1"/>
+          </a:fillRef>
+          <a:effectRef idx="0">
+            <a:schemeClr val="accent6"/>
+          </a:effectRef>
+          <a:fontRef idx="minor">
+            <a:schemeClr val="dk1"/>
+          </a:fontRef>
+        </p:style>
+        <p:txBody>
+          <a:bodyPr rtlCol="0" anchor="ctr"/>
+          <a:lstStyle/>
+          <a:p>
+            <a:pPr algn="ctr"/>
+            <a:r>
+              <a:rPr lang="fi-FI" dirty="0" err="1"/>
+              <a:t>Heating_min_time</a:t>
+            </a:r>
+            <a:r>
+              <a:rPr lang="fi-FI" dirty="0"/>
+              <a:t>(-1) </a:t>
+            </a:r>
+          </a:p>
+          <a:p>
+            <a:pPr algn="ctr"/>
+            <a:r>
+              <a:rPr lang="fi-FI" dirty="0"/>
+              <a:t>RELAY ON</a:t>
+            </a:r>
+          </a:p>
+        </p:txBody>
+      </p:sp>
+      <p:sp>
+        <p:nvSpPr>
+          <p:cNvPr id="6" name="Tasakylkinen kolmio 5">
+            <a:extLst>
+              <a:ext uri="{FF2B5EF4-FFF2-40B4-BE49-F238E27FC236}">
+                <a16:creationId xmlns:a16="http://schemas.microsoft.com/office/drawing/2014/main" id="{89DFCAA1-2A8E-4805-94D5-CBEEBCEFC86E}"/>
+              </a:ext>
+            </a:extLst>
+          </p:cNvPr>
+          <p:cNvSpPr/>
           <p:nvPr/>
-        </p:nvGrpSpPr>
-        <p:grpSpPr>
+        </p:nvSpPr>
+        <p:spPr>
+          <a:xfrm rot="5400000">
+            <a:off x="9132743" y="5788116"/>
+            <a:ext cx="718817" cy="838200"/>
+          </a:xfrm>
+          <a:prstGeom prst="triangle">
+            <a:avLst/>
+          </a:prstGeom>
+        </p:spPr>
+        <p:style>
+          <a:lnRef idx="2">
+            <a:schemeClr val="accent6"/>
+          </a:lnRef>
+          <a:fillRef idx="1">
+            <a:schemeClr val="lt1"/>
+          </a:fillRef>
+          <a:effectRef idx="0">
+            <a:schemeClr val="accent6"/>
+          </a:effectRef>
+          <a:fontRef idx="minor">
+            <a:schemeClr val="dk1"/>
+          </a:fontRef>
+        </p:style>
+        <p:txBody>
+          <a:bodyPr vert="vert270" rtlCol="0" anchor="ctr"/>
+          <a:lstStyle/>
+          <a:p>
+            <a:pPr algn="ctr"/>
+            <a:r>
+              <a:rPr lang="fi-FI" dirty="0"/>
+              <a:t>20</a:t>
+            </a:r>
+          </a:p>
+        </p:txBody>
+      </p:sp>
+      <p:sp>
+        <p:nvSpPr>
+          <p:cNvPr id="7" name="Tasakylkinen kolmio 6">
+            <a:extLst>
+              <a:ext uri="{FF2B5EF4-FFF2-40B4-BE49-F238E27FC236}">
+                <a16:creationId xmlns:a16="http://schemas.microsoft.com/office/drawing/2014/main" id="{BCBBA7E4-7636-4121-BA4E-1BD9788EA51E}"/>
+              </a:ext>
+            </a:extLst>
+          </p:cNvPr>
+          <p:cNvSpPr/>
+          <p:nvPr/>
+        </p:nvSpPr>
+        <p:spPr>
+          <a:xfrm rot="16200000">
+            <a:off x="5941324" y="5729233"/>
+            <a:ext cx="718817" cy="955967"/>
+          </a:xfrm>
+          <a:prstGeom prst="triangle">
+            <a:avLst/>
+          </a:prstGeom>
+        </p:spPr>
+        <p:style>
+          <a:lnRef idx="2">
+            <a:schemeClr val="accent6"/>
+          </a:lnRef>
+          <a:fillRef idx="1">
+            <a:schemeClr val="lt1"/>
+          </a:fillRef>
+          <a:effectRef idx="0">
+            <a:schemeClr val="accent6"/>
+          </a:effectRef>
+          <a:fontRef idx="minor">
+            <a:schemeClr val="dk1"/>
+          </a:fontRef>
+        </p:style>
+        <p:txBody>
+          <a:bodyPr vert="vert" rtlCol="0" anchor="ctr"/>
+          <a:lstStyle/>
+          <a:p>
+            <a:pPr algn="ctr"/>
+            <a:r>
+              <a:rPr lang="fi-FI" dirty="0"/>
+              <a:t>150</a:t>
+            </a:r>
+          </a:p>
+        </p:txBody>
+      </p:sp>
+      <p:sp>
+        <p:nvSpPr>
+          <p:cNvPr id="15" name="Vuokaavio: Prosessi 14">
+            <a:extLst>
+              <a:ext uri="{FF2B5EF4-FFF2-40B4-BE49-F238E27FC236}">
+                <a16:creationId xmlns:a16="http://schemas.microsoft.com/office/drawing/2014/main" id="{F413B50F-C243-4093-AB97-C86C4DC4BD7A}"/>
+              </a:ext>
+            </a:extLst>
+          </p:cNvPr>
+          <p:cNvSpPr/>
+          <p:nvPr/>
+        </p:nvSpPr>
+        <p:spPr>
           <a:xfrm>
-            <a:off x="5569052" y="3932813"/>
-            <a:ext cx="3415768" cy="721618"/>
-            <a:chOff x="5569052" y="3760283"/>
-            <a:chExt cx="3415768" cy="721618"/>
-          </a:xfrm>
-        </p:grpSpPr>
-        <p:sp>
-          <p:nvSpPr>
-            <p:cNvPr id="15" name="Vuokaavio: Prosessi 14">
-              <a:extLst>
-                <a:ext uri="{FF2B5EF4-FFF2-40B4-BE49-F238E27FC236}">
-                  <a16:creationId xmlns="" xmlns:a16="http://schemas.microsoft.com/office/drawing/2014/main" id="{F413B50F-C243-4093-AB97-C86C4DC4BD7A}"/>
-                </a:ext>
-              </a:extLst>
-            </p:cNvPr>
-            <p:cNvSpPr/>
-            <p:nvPr/>
-          </p:nvSpPr>
-          <p:spPr>
-            <a:xfrm>
-              <a:off x="6220928" y="3760285"/>
-              <a:ext cx="2054618" cy="718818"/>
-            </a:xfrm>
-            <a:prstGeom prst="flowChartProcess">
-              <a:avLst/>
-            </a:prstGeom>
-            <a:solidFill>
-              <a:schemeClr val="accent5">
-                <a:lumMod val="20000"/>
-                <a:lumOff val="80000"/>
-              </a:schemeClr>
-            </a:solidFill>
-          </p:spPr>
-          <p:style>
-            <a:lnRef idx="2">
-              <a:schemeClr val="accent6"/>
-            </a:lnRef>
-            <a:fillRef idx="1">
-              <a:schemeClr val="lt1"/>
-            </a:fillRef>
-            <a:effectRef idx="0">
-              <a:schemeClr val="accent6"/>
-            </a:effectRef>
-            <a:fontRef idx="minor">
-              <a:schemeClr val="dk1"/>
-            </a:fontRef>
-          </p:style>
-          <p:txBody>
-            <a:bodyPr rtlCol="0" anchor="ctr"/>
-            <a:lstStyle/>
-            <a:p>
-              <a:pPr algn="ctr"/>
-              <a:r>
-                <a:rPr lang="fi-FI" dirty="0" err="1"/>
-                <a:t>Start_defrosting</a:t>
-              </a:r>
-              <a:r>
-                <a:rPr lang="fi-FI" dirty="0"/>
-                <a:t>(2)</a:t>
-              </a:r>
-            </a:p>
-            <a:p>
-              <a:pPr algn="ctr"/>
-              <a:r>
-                <a:rPr lang="fi-FI" dirty="0"/>
-                <a:t> RELAY OFF</a:t>
-              </a:r>
-            </a:p>
-          </p:txBody>
-        </p:sp>
-        <p:sp>
-          <p:nvSpPr>
-            <p:cNvPr id="16" name="Tasakylkinen kolmio 15">
-              <a:extLst>
-                <a:ext uri="{FF2B5EF4-FFF2-40B4-BE49-F238E27FC236}">
-                  <a16:creationId xmlns="" xmlns:a16="http://schemas.microsoft.com/office/drawing/2014/main" id="{DEA8720E-700C-4AC1-838C-BB65147986D5}"/>
-                </a:ext>
-              </a:extLst>
-            </p:cNvPr>
-            <p:cNvSpPr/>
-            <p:nvPr/>
-          </p:nvSpPr>
-          <p:spPr>
-            <a:xfrm rot="5400000">
-              <a:off x="8269374" y="3766454"/>
-              <a:ext cx="721618" cy="709275"/>
-            </a:xfrm>
-            <a:prstGeom prst="triangle">
-              <a:avLst>
-                <a:gd name="adj" fmla="val 51325"/>
-              </a:avLst>
-            </a:prstGeom>
-          </p:spPr>
-          <p:style>
-            <a:lnRef idx="2">
-              <a:schemeClr val="accent6"/>
-            </a:lnRef>
-            <a:fillRef idx="1">
-              <a:schemeClr val="lt1"/>
-            </a:fillRef>
-            <a:effectRef idx="0">
-              <a:schemeClr val="accent6"/>
-            </a:effectRef>
-            <a:fontRef idx="minor">
-              <a:schemeClr val="dk1"/>
-            </a:fontRef>
-          </p:style>
-          <p:txBody>
-            <a:bodyPr vert="vert270" rtlCol="0" anchor="ctr"/>
-            <a:lstStyle/>
-            <a:p>
-              <a:pPr algn="ctr"/>
-              <a:r>
-                <a:rPr lang="fi-FI" dirty="0"/>
-                <a:t>10</a:t>
-              </a:r>
-            </a:p>
-          </p:txBody>
-        </p:sp>
-        <p:sp>
-          <p:nvSpPr>
-            <p:cNvPr id="17" name="Tasakylkinen kolmio 16">
-              <a:extLst>
-                <a:ext uri="{FF2B5EF4-FFF2-40B4-BE49-F238E27FC236}">
-                  <a16:creationId xmlns="" xmlns:a16="http://schemas.microsoft.com/office/drawing/2014/main" id="{410E68D5-E13F-4E0E-89B9-19C35FFA3DE7}"/>
-                </a:ext>
-              </a:extLst>
-            </p:cNvPr>
-            <p:cNvSpPr/>
-            <p:nvPr/>
-          </p:nvSpPr>
-          <p:spPr>
-            <a:xfrm rot="16200000">
-              <a:off x="5532907" y="3796429"/>
-              <a:ext cx="718817" cy="646527"/>
-            </a:xfrm>
-            <a:prstGeom prst="triangle">
-              <a:avLst/>
-            </a:prstGeom>
-          </p:spPr>
-          <p:style>
-            <a:lnRef idx="2">
-              <a:schemeClr val="accent6"/>
-            </a:lnRef>
-            <a:fillRef idx="1">
-              <a:schemeClr val="lt1"/>
-            </a:fillRef>
-            <a:effectRef idx="0">
-              <a:schemeClr val="accent6"/>
-            </a:effectRef>
-            <a:fontRef idx="minor">
-              <a:schemeClr val="dk1"/>
-            </a:fontRef>
-          </p:style>
-          <p:txBody>
-            <a:bodyPr vert="vert" rtlCol="0" anchor="ctr"/>
-            <a:lstStyle/>
-            <a:p>
-              <a:pPr algn="ctr"/>
-              <a:r>
-                <a:rPr lang="fi-FI" dirty="0"/>
-                <a:t>0</a:t>
-              </a:r>
-            </a:p>
-          </p:txBody>
-        </p:sp>
-      </p:grpSp>
-      <p:grpSp>
-        <p:nvGrpSpPr>
-          <p:cNvPr id="64" name="Group 63"/>
-          <p:cNvGrpSpPr/>
+            <a:off x="6220928" y="3760285"/>
+            <a:ext cx="2054618" cy="718818"/>
+          </a:xfrm>
+          <a:prstGeom prst="flowChartProcess">
+            <a:avLst/>
+          </a:prstGeom>
+          <a:solidFill>
+            <a:schemeClr val="accent5">
+              <a:lumMod val="20000"/>
+              <a:lumOff val="80000"/>
+            </a:schemeClr>
+          </a:solidFill>
+        </p:spPr>
+        <p:style>
+          <a:lnRef idx="2">
+            <a:schemeClr val="accent6"/>
+          </a:lnRef>
+          <a:fillRef idx="1">
+            <a:schemeClr val="lt1"/>
+          </a:fillRef>
+          <a:effectRef idx="0">
+            <a:schemeClr val="accent6"/>
+          </a:effectRef>
+          <a:fontRef idx="minor">
+            <a:schemeClr val="dk1"/>
+          </a:fontRef>
+        </p:style>
+        <p:txBody>
+          <a:bodyPr rtlCol="0" anchor="ctr"/>
+          <a:lstStyle/>
+          <a:p>
+            <a:pPr algn="ctr"/>
+            <a:r>
+              <a:rPr lang="fi-FI" dirty="0" err="1"/>
+              <a:t>Start_defrosting</a:t>
+            </a:r>
+            <a:r>
+              <a:rPr lang="fi-FI" dirty="0"/>
+              <a:t>(2)</a:t>
+            </a:r>
+          </a:p>
+          <a:p>
+            <a:pPr algn="ctr"/>
+            <a:r>
+              <a:rPr lang="fi-FI" dirty="0"/>
+              <a:t> RELAY OFF</a:t>
+            </a:r>
+          </a:p>
+        </p:txBody>
+      </p:sp>
+      <p:sp>
+        <p:nvSpPr>
+          <p:cNvPr id="16" name="Tasakylkinen kolmio 15">
+            <a:extLst>
+              <a:ext uri="{FF2B5EF4-FFF2-40B4-BE49-F238E27FC236}">
+                <a16:creationId xmlns:a16="http://schemas.microsoft.com/office/drawing/2014/main" id="{DEA8720E-700C-4AC1-838C-BB65147986D5}"/>
+              </a:ext>
+            </a:extLst>
+          </p:cNvPr>
+          <p:cNvSpPr/>
           <p:nvPr/>
-        </p:nvGrpSpPr>
-        <p:grpSpPr>
+        </p:nvSpPr>
+        <p:spPr>
+          <a:xfrm rot="5400000">
+            <a:off x="8269374" y="3766454"/>
+            <a:ext cx="721618" cy="709275"/>
+          </a:xfrm>
+          <a:prstGeom prst="triangle">
+            <a:avLst>
+              <a:gd name="adj" fmla="val 51325"/>
+            </a:avLst>
+          </a:prstGeom>
+        </p:spPr>
+        <p:style>
+          <a:lnRef idx="2">
+            <a:schemeClr val="accent6"/>
+          </a:lnRef>
+          <a:fillRef idx="1">
+            <a:schemeClr val="lt1"/>
+          </a:fillRef>
+          <a:effectRef idx="0">
+            <a:schemeClr val="accent6"/>
+          </a:effectRef>
+          <a:fontRef idx="minor">
+            <a:schemeClr val="dk1"/>
+          </a:fontRef>
+        </p:style>
+        <p:txBody>
+          <a:bodyPr vert="vert270" rtlCol="0" anchor="ctr"/>
+          <a:lstStyle/>
+          <a:p>
+            <a:pPr algn="ctr"/>
+            <a:r>
+              <a:rPr lang="fi-FI" dirty="0"/>
+              <a:t>10</a:t>
+            </a:r>
+          </a:p>
+        </p:txBody>
+      </p:sp>
+      <p:sp>
+        <p:nvSpPr>
+          <p:cNvPr id="17" name="Tasakylkinen kolmio 16">
+            <a:extLst>
+              <a:ext uri="{FF2B5EF4-FFF2-40B4-BE49-F238E27FC236}">
+                <a16:creationId xmlns:a16="http://schemas.microsoft.com/office/drawing/2014/main" id="{410E68D5-E13F-4E0E-89B9-19C35FFA3DE7}"/>
+              </a:ext>
+            </a:extLst>
+          </p:cNvPr>
+          <p:cNvSpPr/>
+          <p:nvPr/>
+        </p:nvSpPr>
+        <p:spPr>
+          <a:xfrm rot="16200000">
+            <a:off x="5532907" y="3796429"/>
+            <a:ext cx="718817" cy="646527"/>
+          </a:xfrm>
+          <a:prstGeom prst="triangle">
+            <a:avLst/>
+          </a:prstGeom>
+        </p:spPr>
+        <p:style>
+          <a:lnRef idx="2">
+            <a:schemeClr val="accent6"/>
+          </a:lnRef>
+          <a:fillRef idx="1">
+            <a:schemeClr val="lt1"/>
+          </a:fillRef>
+          <a:effectRef idx="0">
+            <a:schemeClr val="accent6"/>
+          </a:effectRef>
+          <a:fontRef idx="minor">
+            <a:schemeClr val="dk1"/>
+          </a:fontRef>
+        </p:style>
+        <p:txBody>
+          <a:bodyPr vert="vert" rtlCol="0" anchor="ctr"/>
+          <a:lstStyle/>
+          <a:p>
+            <a:pPr algn="ctr"/>
+            <a:r>
+              <a:rPr lang="fi-FI" dirty="0"/>
+              <a:t>0</a:t>
+            </a:r>
+          </a:p>
+        </p:txBody>
+      </p:sp>
+      <p:sp>
+        <p:nvSpPr>
+          <p:cNvPr id="19" name="Vuokaavio: Prosessi 18">
+            <a:extLst>
+              <a:ext uri="{FF2B5EF4-FFF2-40B4-BE49-F238E27FC236}">
+                <a16:creationId xmlns:a16="http://schemas.microsoft.com/office/drawing/2014/main" id="{9DF1E845-CA70-4963-AF56-EA0AEB0B9CFF}"/>
+              </a:ext>
+            </a:extLst>
+          </p:cNvPr>
+          <p:cNvSpPr/>
+          <p:nvPr/>
+        </p:nvSpPr>
+        <p:spPr>
           <a:xfrm>
-            <a:off x="3869890" y="4941840"/>
-            <a:ext cx="3140118" cy="718821"/>
-            <a:chOff x="3869890" y="4769310"/>
-            <a:chExt cx="3140118" cy="718821"/>
-          </a:xfrm>
-        </p:grpSpPr>
-        <p:sp>
-          <p:nvSpPr>
-            <p:cNvPr id="19" name="Vuokaavio: Prosessi 18">
-              <a:extLst>
-                <a:ext uri="{FF2B5EF4-FFF2-40B4-BE49-F238E27FC236}">
-                  <a16:creationId xmlns="" xmlns:a16="http://schemas.microsoft.com/office/drawing/2014/main" id="{9DF1E845-CA70-4963-AF56-EA0AEB0B9CFF}"/>
-                </a:ext>
-              </a:extLst>
-            </p:cNvPr>
-            <p:cNvSpPr/>
-            <p:nvPr/>
-          </p:nvSpPr>
-          <p:spPr>
-            <a:xfrm>
-              <a:off x="3869890" y="4769310"/>
-              <a:ext cx="2301918" cy="718818"/>
-            </a:xfrm>
-            <a:prstGeom prst="flowChartProcess">
-              <a:avLst/>
-            </a:prstGeom>
-            <a:solidFill>
-              <a:schemeClr val="accent5">
-                <a:lumMod val="20000"/>
-                <a:lumOff val="80000"/>
-              </a:schemeClr>
-            </a:solidFill>
-          </p:spPr>
-          <p:style>
-            <a:lnRef idx="2">
-              <a:schemeClr val="accent6"/>
-            </a:lnRef>
-            <a:fillRef idx="1">
-              <a:schemeClr val="lt1"/>
-            </a:fillRef>
-            <a:effectRef idx="0">
-              <a:schemeClr val="accent6"/>
-            </a:effectRef>
-            <a:fontRef idx="minor">
-              <a:schemeClr val="dk1"/>
-            </a:fontRef>
-          </p:style>
-          <p:txBody>
-            <a:bodyPr rtlCol="0" anchor="ctr"/>
-            <a:lstStyle/>
-            <a:p>
-              <a:pPr algn="ctr"/>
-              <a:r>
-                <a:rPr lang="fi-FI" dirty="0" err="1"/>
-                <a:t>Defrosting</a:t>
-              </a:r>
-              <a:r>
-                <a:rPr lang="fi-FI" dirty="0"/>
-                <a:t> </a:t>
-              </a:r>
-              <a:r>
-                <a:rPr lang="fi-FI" dirty="0" err="1"/>
-                <a:t>started</a:t>
-              </a:r>
-              <a:r>
-                <a:rPr lang="fi-FI" dirty="0"/>
-                <a:t>(-2)</a:t>
-              </a:r>
-            </a:p>
-            <a:p>
-              <a:pPr algn="ctr"/>
-              <a:r>
-                <a:rPr lang="fi-FI" dirty="0"/>
-                <a:t> RELAY OFF</a:t>
-              </a:r>
-            </a:p>
-          </p:txBody>
-        </p:sp>
-        <p:sp>
-          <p:nvSpPr>
-            <p:cNvPr id="20" name="Tasakylkinen kolmio 19">
-              <a:extLst>
-                <a:ext uri="{FF2B5EF4-FFF2-40B4-BE49-F238E27FC236}">
-                  <a16:creationId xmlns="" xmlns:a16="http://schemas.microsoft.com/office/drawing/2014/main" id="{8FD3623A-0795-4CF7-8904-63D3F40B300F}"/>
-                </a:ext>
-              </a:extLst>
-            </p:cNvPr>
-            <p:cNvSpPr/>
-            <p:nvPr/>
-          </p:nvSpPr>
-          <p:spPr>
-            <a:xfrm rot="5400000">
-              <a:off x="6231499" y="4709623"/>
-              <a:ext cx="718817" cy="838200"/>
-            </a:xfrm>
-            <a:prstGeom prst="triangle">
-              <a:avLst/>
-            </a:prstGeom>
-          </p:spPr>
-          <p:style>
-            <a:lnRef idx="2">
-              <a:schemeClr val="accent6"/>
-            </a:lnRef>
-            <a:fillRef idx="1">
-              <a:schemeClr val="lt1"/>
-            </a:fillRef>
-            <a:effectRef idx="0">
-              <a:schemeClr val="accent6"/>
-            </a:effectRef>
-            <a:fontRef idx="minor">
-              <a:schemeClr val="dk1"/>
-            </a:fontRef>
-          </p:style>
-          <p:txBody>
-            <a:bodyPr vert="vert270" rtlCol="0" anchor="ctr"/>
-            <a:lstStyle/>
-            <a:p>
-              <a:pPr algn="ctr"/>
-              <a:r>
-                <a:rPr lang="fi-FI" dirty="0"/>
-                <a:t>30</a:t>
-              </a:r>
-            </a:p>
-          </p:txBody>
-        </p:sp>
-      </p:grpSp>
+            <a:off x="3869890" y="4769310"/>
+            <a:ext cx="2301918" cy="718818"/>
+          </a:xfrm>
+          <a:prstGeom prst="flowChartProcess">
+            <a:avLst/>
+          </a:prstGeom>
+          <a:solidFill>
+            <a:schemeClr val="accent5">
+              <a:lumMod val="20000"/>
+              <a:lumOff val="80000"/>
+            </a:schemeClr>
+          </a:solidFill>
+        </p:spPr>
+        <p:style>
+          <a:lnRef idx="2">
+            <a:schemeClr val="accent6"/>
+          </a:lnRef>
+          <a:fillRef idx="1">
+            <a:schemeClr val="lt1"/>
+          </a:fillRef>
+          <a:effectRef idx="0">
+            <a:schemeClr val="accent6"/>
+          </a:effectRef>
+          <a:fontRef idx="minor">
+            <a:schemeClr val="dk1"/>
+          </a:fontRef>
+        </p:style>
+        <p:txBody>
+          <a:bodyPr rtlCol="0" anchor="ctr"/>
+          <a:lstStyle/>
+          <a:p>
+            <a:pPr algn="ctr"/>
+            <a:r>
+              <a:rPr lang="fi-FI" dirty="0" err="1"/>
+              <a:t>Defrosting</a:t>
+            </a:r>
+            <a:r>
+              <a:rPr lang="fi-FI" dirty="0"/>
+              <a:t> </a:t>
+            </a:r>
+            <a:r>
+              <a:rPr lang="fi-FI" dirty="0" err="1"/>
+              <a:t>started</a:t>
+            </a:r>
+            <a:r>
+              <a:rPr lang="fi-FI" dirty="0"/>
+              <a:t>(-2)</a:t>
+            </a:r>
+          </a:p>
+          <a:p>
+            <a:pPr algn="ctr"/>
+            <a:r>
+              <a:rPr lang="fi-FI" dirty="0"/>
+              <a:t>(RELAY OFF</a:t>
+            </a:r>
+          </a:p>
+        </p:txBody>
+      </p:sp>
+      <p:sp>
+        <p:nvSpPr>
+          <p:cNvPr id="20" name="Tasakylkinen kolmio 19">
+            <a:extLst>
+              <a:ext uri="{FF2B5EF4-FFF2-40B4-BE49-F238E27FC236}">
+                <a16:creationId xmlns:a16="http://schemas.microsoft.com/office/drawing/2014/main" id="{8FD3623A-0795-4CF7-8904-63D3F40B300F}"/>
+              </a:ext>
+            </a:extLst>
+          </p:cNvPr>
+          <p:cNvSpPr/>
+          <p:nvPr/>
+        </p:nvSpPr>
+        <p:spPr>
+          <a:xfrm rot="5400000">
+            <a:off x="6231499" y="4709623"/>
+            <a:ext cx="718817" cy="838200"/>
+          </a:xfrm>
+          <a:prstGeom prst="triangle">
+            <a:avLst/>
+          </a:prstGeom>
+        </p:spPr>
+        <p:style>
+          <a:lnRef idx="2">
+            <a:schemeClr val="accent6"/>
+          </a:lnRef>
+          <a:fillRef idx="1">
+            <a:schemeClr val="lt1"/>
+          </a:fillRef>
+          <a:effectRef idx="0">
+            <a:schemeClr val="accent6"/>
+          </a:effectRef>
+          <a:fontRef idx="minor">
+            <a:schemeClr val="dk1"/>
+          </a:fontRef>
+        </p:style>
+        <p:txBody>
+          <a:bodyPr vert="vert270" rtlCol="0" anchor="ctr"/>
+          <a:lstStyle/>
+          <a:p>
+            <a:pPr algn="ctr"/>
+            <a:r>
+              <a:rPr lang="fi-FI" dirty="0"/>
+              <a:t>30</a:t>
+            </a:r>
+          </a:p>
+        </p:txBody>
+      </p:sp>
       <p:cxnSp>
         <p:nvCxnSpPr>
           <p:cNvPr id="23" name="Yhdistin: Kulma 22">
             <a:extLst>
               <a:ext uri="{FF2B5EF4-FFF2-40B4-BE49-F238E27FC236}">
-                <a16:creationId xmlns="" xmlns:a16="http://schemas.microsoft.com/office/drawing/2014/main" id="{60791C9F-5625-4EE9-AD9B-B26409AA9872}"/>
+                <a16:creationId xmlns:a16="http://schemas.microsoft.com/office/drawing/2014/main" id="{60791C9F-5625-4EE9-AD9B-B26409AA9872}"/>
               </a:ext>
             </a:extLst>
           </p:cNvPr>
           <p:cNvCxnSpPr>
             <a:cxnSpLocks/>
+            <a:stCxn id="67" idx="0"/>
           </p:cNvCxnSpPr>
           <p:nvPr/>
         </p:nvCxnSpPr>
         <p:spPr>
           <a:xfrm>
-            <a:off x="6670438" y="2159699"/>
-            <a:ext cx="1037771" cy="2123921"/>
+            <a:off x="7111462" y="1989980"/>
+            <a:ext cx="644583" cy="1781642"/>
           </a:xfrm>
           <a:prstGeom prst="bentConnector2">
             <a:avLst/>
           </a:prstGeom>
-          <a:ln>
+          <a:ln w="19050">
             <a:tailEnd type="triangle"/>
           </a:ln>
         </p:spPr>
@@ -3878,24 +3810,26 @@
           <p:cNvPr id="25" name="Yhdistin: Kulma 24">
             <a:extLst>
               <a:ext uri="{FF2B5EF4-FFF2-40B4-BE49-F238E27FC236}">
-                <a16:creationId xmlns="" xmlns:a16="http://schemas.microsoft.com/office/drawing/2014/main" id="{A9975FA8-A447-41AE-A825-F6451924304F}"/>
+                <a16:creationId xmlns:a16="http://schemas.microsoft.com/office/drawing/2014/main" id="{A9975FA8-A447-41AE-A825-F6451924304F}"/>
               </a:ext>
             </a:extLst>
           </p:cNvPr>
           <p:cNvCxnSpPr>
             <a:cxnSpLocks/>
+            <a:stCxn id="17" idx="0"/>
+            <a:endCxn id="19" idx="0"/>
           </p:cNvCxnSpPr>
           <p:nvPr/>
         </p:nvCxnSpPr>
         <p:spPr>
           <a:xfrm rot="10800000" flipV="1">
-            <a:off x="5020850" y="4292222"/>
+            <a:off x="5020850" y="4119692"/>
             <a:ext cx="548203" cy="649618"/>
           </a:xfrm>
           <a:prstGeom prst="bentConnector2">
             <a:avLst/>
           </a:prstGeom>
-          <a:ln>
+          <a:ln w="19050">
             <a:tailEnd type="triangle"/>
           </a:ln>
         </p:spPr>
@@ -3919,7 +3853,7 @@
           <p:cNvPr id="26" name="Tekstiruutu 25">
             <a:extLst>
               <a:ext uri="{FF2B5EF4-FFF2-40B4-BE49-F238E27FC236}">
-                <a16:creationId xmlns="" xmlns:a16="http://schemas.microsoft.com/office/drawing/2014/main" id="{B007E2E9-B25B-4B3E-A0CD-9234EADDDC3A}"/>
+                <a16:creationId xmlns:a16="http://schemas.microsoft.com/office/drawing/2014/main" id="{B007E2E9-B25B-4B3E-A0CD-9234EADDDC3A}"/>
               </a:ext>
             </a:extLst>
           </p:cNvPr>
@@ -3928,7 +3862,7 @@
         </p:nvSpPr>
         <p:spPr>
           <a:xfrm>
-            <a:off x="2061975" y="1617688"/>
+            <a:off x="2061975" y="1445158"/>
             <a:ext cx="1807915" cy="369332"/>
           </a:xfrm>
           <a:prstGeom prst="rect">
@@ -3963,7 +3897,7 @@
           <p:cNvPr id="27" name="Tekstiruutu 26">
             <a:extLst>
               <a:ext uri="{FF2B5EF4-FFF2-40B4-BE49-F238E27FC236}">
-                <a16:creationId xmlns="" xmlns:a16="http://schemas.microsoft.com/office/drawing/2014/main" id="{73E848BC-8F51-4F02-9544-CF3B5220EB06}"/>
+                <a16:creationId xmlns:a16="http://schemas.microsoft.com/office/drawing/2014/main" id="{73E848BC-8F51-4F02-9544-CF3B5220EB06}"/>
               </a:ext>
             </a:extLst>
           </p:cNvPr>
@@ -3972,7 +3906,7 @@
         </p:nvSpPr>
         <p:spPr>
           <a:xfrm>
-            <a:off x="3518256" y="3719760"/>
+            <a:off x="3518256" y="3547230"/>
             <a:ext cx="1994264" cy="646331"/>
           </a:xfrm>
           <a:prstGeom prst="rect">
@@ -4024,24 +3958,26 @@
           <p:cNvPr id="29" name="Yhdistin: Kulma 28">
             <a:extLst>
               <a:ext uri="{FF2B5EF4-FFF2-40B4-BE49-F238E27FC236}">
-                <a16:creationId xmlns="" xmlns:a16="http://schemas.microsoft.com/office/drawing/2014/main" id="{8A5B9D61-8B98-4298-9E8F-06E80110EEAF}"/>
+                <a16:creationId xmlns:a16="http://schemas.microsoft.com/office/drawing/2014/main" id="{8A5B9D61-8B98-4298-9E8F-06E80110EEAF}"/>
               </a:ext>
             </a:extLst>
           </p:cNvPr>
           <p:cNvCxnSpPr>
             <a:cxnSpLocks/>
+            <a:stCxn id="20" idx="0"/>
+            <a:endCxn id="4" idx="0"/>
           </p:cNvCxnSpPr>
           <p:nvPr/>
         </p:nvCxnSpPr>
         <p:spPr>
           <a:xfrm>
-            <a:off x="7010008" y="5301254"/>
+            <a:off x="7010008" y="5128724"/>
             <a:ext cx="912901" cy="719084"/>
           </a:xfrm>
           <a:prstGeom prst="bentConnector2">
             <a:avLst/>
           </a:prstGeom>
-          <a:ln>
+          <a:ln w="19050">
             <a:tailEnd type="triangle"/>
           </a:ln>
         </p:spPr>
@@ -4065,18 +4001,19 @@
           <p:cNvPr id="32" name="Yhdistin: Kulma 31">
             <a:extLst>
               <a:ext uri="{FF2B5EF4-FFF2-40B4-BE49-F238E27FC236}">
-                <a16:creationId xmlns="" xmlns:a16="http://schemas.microsoft.com/office/drawing/2014/main" id="{F69F939A-A614-44B9-A4D7-6787A78EA7CD}"/>
+                <a16:creationId xmlns:a16="http://schemas.microsoft.com/office/drawing/2014/main" id="{F69F939A-A614-44B9-A4D7-6787A78EA7CD}"/>
               </a:ext>
             </a:extLst>
           </p:cNvPr>
           <p:cNvCxnSpPr>
             <a:cxnSpLocks/>
+            <a:stCxn id="16" idx="0"/>
           </p:cNvCxnSpPr>
           <p:nvPr/>
         </p:nvCxnSpPr>
         <p:spPr>
           <a:xfrm flipH="1" flipV="1">
-            <a:off x="5397929" y="1373253"/>
+            <a:off x="5397929" y="1200723"/>
             <a:ext cx="3586892" cy="2929930"/>
           </a:xfrm>
           <a:prstGeom prst="bentConnector3">
@@ -4084,7 +4021,7 @@
               <a:gd name="adj1" fmla="val -71339"/>
             </a:avLst>
           </a:prstGeom>
-          <a:ln>
+          <a:ln w="19050">
             <a:tailEnd type="triangle"/>
           </a:ln>
         </p:spPr>
@@ -4108,24 +4045,25 @@
           <p:cNvPr id="39" name="Yhdistin: Kulma 38">
             <a:extLst>
               <a:ext uri="{FF2B5EF4-FFF2-40B4-BE49-F238E27FC236}">
-                <a16:creationId xmlns="" xmlns:a16="http://schemas.microsoft.com/office/drawing/2014/main" id="{0DAFC146-E166-4427-861D-B06F02B2CCEC}"/>
+                <a16:creationId xmlns:a16="http://schemas.microsoft.com/office/drawing/2014/main" id="{0DAFC146-E166-4427-861D-B06F02B2CCEC}"/>
               </a:ext>
             </a:extLst>
           </p:cNvPr>
           <p:cNvCxnSpPr>
             <a:cxnSpLocks/>
+            <a:stCxn id="6" idx="0"/>
           </p:cNvCxnSpPr>
           <p:nvPr/>
         </p:nvCxnSpPr>
         <p:spPr>
           <a:xfrm flipV="1">
-            <a:off x="9911252" y="4308256"/>
+            <a:off x="9911252" y="4135726"/>
             <a:ext cx="1642573" cy="2071491"/>
           </a:xfrm>
           <a:prstGeom prst="bentConnector2">
             <a:avLst/>
           </a:prstGeom>
-          <a:ln>
+          <a:ln w="19050">
             <a:tailEnd type="triangle"/>
           </a:ln>
         </p:spPr>
@@ -4149,24 +4087,26 @@
           <p:cNvPr id="42" name="Yhdistin: Kulma 41">
             <a:extLst>
               <a:ext uri="{FF2B5EF4-FFF2-40B4-BE49-F238E27FC236}">
-                <a16:creationId xmlns="" xmlns:a16="http://schemas.microsoft.com/office/drawing/2014/main" id="{7085DE89-0D59-4550-92C6-50B997AC81CB}"/>
+                <a16:creationId xmlns:a16="http://schemas.microsoft.com/office/drawing/2014/main" id="{7085DE89-0D59-4550-92C6-50B997AC81CB}"/>
               </a:ext>
             </a:extLst>
           </p:cNvPr>
           <p:cNvCxnSpPr>
             <a:cxnSpLocks/>
+            <a:stCxn id="68" idx="0"/>
+            <a:endCxn id="45" idx="0"/>
           </p:cNvCxnSpPr>
           <p:nvPr/>
         </p:nvCxnSpPr>
         <p:spPr>
           <a:xfrm rot="10800000" flipV="1">
-            <a:off x="2707391" y="1990981"/>
+            <a:off x="2707391" y="1818451"/>
             <a:ext cx="976039" cy="620607"/>
           </a:xfrm>
           <a:prstGeom prst="bentConnector2">
             <a:avLst/>
           </a:prstGeom>
-          <a:ln>
+          <a:ln w="19050">
             <a:tailEnd type="triangle"/>
           </a:ln>
         </p:spPr>
@@ -4190,7 +4130,7 @@
           <p:cNvPr id="43" name="Tekstiruutu 42">
             <a:extLst>
               <a:ext uri="{FF2B5EF4-FFF2-40B4-BE49-F238E27FC236}">
-                <a16:creationId xmlns="" xmlns:a16="http://schemas.microsoft.com/office/drawing/2014/main" id="{BC02B610-F398-461E-BC05-8637EF952F5A}"/>
+                <a16:creationId xmlns:a16="http://schemas.microsoft.com/office/drawing/2014/main" id="{BC02B610-F398-461E-BC05-8637EF952F5A}"/>
               </a:ext>
             </a:extLst>
           </p:cNvPr>
@@ -4199,8 +4139,8 @@
         </p:nvSpPr>
         <p:spPr>
           <a:xfrm>
-            <a:off x="7670916" y="2232591"/>
-            <a:ext cx="2855842" cy="369332"/>
+            <a:off x="7160112" y="1902984"/>
+            <a:ext cx="1534009" cy="646331"/>
           </a:xfrm>
           <a:prstGeom prst="rect">
             <a:avLst/>
@@ -4241,23 +4181,182 @@
           </a:p>
         </p:txBody>
       </p:sp>
+      <p:sp>
+        <p:nvSpPr>
+          <p:cNvPr id="45" name="Vuokaavio: Prosessi 44">
+            <a:extLst>
+              <a:ext uri="{FF2B5EF4-FFF2-40B4-BE49-F238E27FC236}">
+                <a16:creationId xmlns:a16="http://schemas.microsoft.com/office/drawing/2014/main" id="{C630C195-B3BF-486C-A3C4-F2F6B07F387E}"/>
+              </a:ext>
+            </a:extLst>
+          </p:cNvPr>
+          <p:cNvSpPr/>
+          <p:nvPr/>
+        </p:nvSpPr>
+        <p:spPr>
+          <a:xfrm>
+            <a:off x="1638303" y="2439059"/>
+            <a:ext cx="2138173" cy="718818"/>
+          </a:xfrm>
+          <a:prstGeom prst="flowChartProcess">
+            <a:avLst/>
+          </a:prstGeom>
+          <a:solidFill>
+            <a:schemeClr val="accent2">
+              <a:lumMod val="20000"/>
+              <a:lumOff val="80000"/>
+            </a:schemeClr>
+          </a:solidFill>
+        </p:spPr>
+        <p:style>
+          <a:lnRef idx="2">
+            <a:schemeClr val="accent6"/>
+          </a:lnRef>
+          <a:fillRef idx="1">
+            <a:schemeClr val="lt1"/>
+          </a:fillRef>
+          <a:effectRef idx="0">
+            <a:schemeClr val="accent6"/>
+          </a:effectRef>
+          <a:fontRef idx="minor">
+            <a:schemeClr val="dk1"/>
+          </a:fontRef>
+        </p:style>
+        <p:txBody>
+          <a:bodyPr rtlCol="0" anchor="ctr"/>
+          <a:lstStyle/>
+          <a:p>
+            <a:pPr algn="ctr"/>
+            <a:r>
+              <a:rPr lang="fi-FI" dirty="0" err="1"/>
+              <a:t>Temp_exceeded</a:t>
+            </a:r>
+            <a:r>
+              <a:rPr lang="fi-FI" dirty="0"/>
+              <a:t>(1)</a:t>
+            </a:r>
+          </a:p>
+          <a:p>
+            <a:pPr algn="ctr"/>
+            <a:r>
+              <a:rPr lang="fi-FI" dirty="0"/>
+              <a:t>RELAY ON</a:t>
+            </a:r>
+          </a:p>
+        </p:txBody>
+      </p:sp>
+      <p:sp>
+        <p:nvSpPr>
+          <p:cNvPr id="46" name="Tasakylkinen kolmio 45">
+            <a:extLst>
+              <a:ext uri="{FF2B5EF4-FFF2-40B4-BE49-F238E27FC236}">
+                <a16:creationId xmlns:a16="http://schemas.microsoft.com/office/drawing/2014/main" id="{552DD7F1-6614-4407-96BE-0B42A9A9FEC7}"/>
+              </a:ext>
+            </a:extLst>
+          </p:cNvPr>
+          <p:cNvSpPr/>
+          <p:nvPr/>
+        </p:nvSpPr>
+        <p:spPr>
+          <a:xfrm rot="5400000">
+            <a:off x="3812232" y="2410552"/>
+            <a:ext cx="386667" cy="447192"/>
+          </a:xfrm>
+          <a:prstGeom prst="triangle">
+            <a:avLst/>
+          </a:prstGeom>
+        </p:spPr>
+        <p:style>
+          <a:lnRef idx="2">
+            <a:schemeClr val="accent6"/>
+          </a:lnRef>
+          <a:fillRef idx="1">
+            <a:schemeClr val="lt1"/>
+          </a:fillRef>
+          <a:effectRef idx="0">
+            <a:schemeClr val="accent6"/>
+          </a:effectRef>
+          <a:fontRef idx="minor">
+            <a:schemeClr val="dk1"/>
+          </a:fontRef>
+        </p:style>
+        <p:txBody>
+          <a:bodyPr vert="vert270" rtlCol="0" anchor="ctr"/>
+          <a:lstStyle/>
+          <a:p>
+            <a:pPr algn="ctr"/>
+            <a:r>
+              <a:rPr lang="fi-FI" dirty="0"/>
+              <a:t>5</a:t>
+            </a:r>
+          </a:p>
+        </p:txBody>
+      </p:sp>
+      <p:sp>
+        <p:nvSpPr>
+          <p:cNvPr id="47" name="Tasakylkinen kolmio 46">
+            <a:extLst>
+              <a:ext uri="{FF2B5EF4-FFF2-40B4-BE49-F238E27FC236}">
+                <a16:creationId xmlns:a16="http://schemas.microsoft.com/office/drawing/2014/main" id="{EAE226B5-0B5C-4680-9B70-2A61B86384B9}"/>
+              </a:ext>
+            </a:extLst>
+          </p:cNvPr>
+          <p:cNvSpPr/>
+          <p:nvPr/>
+        </p:nvSpPr>
+        <p:spPr>
+          <a:xfrm rot="16200000">
+            <a:off x="1052551" y="2572125"/>
+            <a:ext cx="718817" cy="452686"/>
+          </a:xfrm>
+          <a:prstGeom prst="triangle">
+            <a:avLst/>
+          </a:prstGeom>
+        </p:spPr>
+        <p:style>
+          <a:lnRef idx="2">
+            <a:schemeClr val="accent6"/>
+          </a:lnRef>
+          <a:fillRef idx="1">
+            <a:schemeClr val="lt1"/>
+          </a:fillRef>
+          <a:effectRef idx="0">
+            <a:schemeClr val="accent6"/>
+          </a:effectRef>
+          <a:fontRef idx="minor">
+            <a:schemeClr val="dk1"/>
+          </a:fontRef>
+        </p:style>
+        <p:txBody>
+          <a:bodyPr vert="vert" rtlCol="0" anchor="ctr"/>
+          <a:lstStyle/>
+          <a:p>
+            <a:pPr algn="ctr"/>
+            <a:r>
+              <a:rPr lang="fi-FI" dirty="0"/>
+              <a:t>4</a:t>
+            </a:r>
+          </a:p>
+        </p:txBody>
+      </p:sp>
       <p:cxnSp>
         <p:nvCxnSpPr>
           <p:cNvPr id="56" name="Yhdistin: Kulma 55">
             <a:extLst>
               <a:ext uri="{FF2B5EF4-FFF2-40B4-BE49-F238E27FC236}">
-                <a16:creationId xmlns="" xmlns:a16="http://schemas.microsoft.com/office/drawing/2014/main" id="{EEF17C22-A620-4C69-A5A2-3AB17B5DA731}"/>
+                <a16:creationId xmlns:a16="http://schemas.microsoft.com/office/drawing/2014/main" id="{EEF17C22-A620-4C69-A5A2-3AB17B5DA731}"/>
               </a:ext>
             </a:extLst>
           </p:cNvPr>
           <p:cNvCxnSpPr>
             <a:cxnSpLocks/>
+            <a:stCxn id="47" idx="0"/>
           </p:cNvCxnSpPr>
           <p:nvPr/>
         </p:nvCxnSpPr>
         <p:spPr>
           <a:xfrm rot="10800000" flipH="1">
-            <a:off x="1185616" y="1373254"/>
+            <a:off x="1185616" y="1200724"/>
             <a:ext cx="4188335" cy="1597744"/>
           </a:xfrm>
           <a:prstGeom prst="bentConnector3">
@@ -4265,7 +4364,7 @@
               <a:gd name="adj1" fmla="val -8635"/>
             </a:avLst>
           </a:prstGeom>
-          <a:ln>
+          <a:ln w="19050">
             <a:tailEnd type="triangle"/>
           </a:ln>
         </p:spPr>
@@ -4289,7 +4388,7 @@
           <p:cNvPr id="62" name="Tekstiruutu 61">
             <a:extLst>
               <a:ext uri="{FF2B5EF4-FFF2-40B4-BE49-F238E27FC236}">
-                <a16:creationId xmlns="" xmlns:a16="http://schemas.microsoft.com/office/drawing/2014/main" id="{5B429EDC-B27D-4DFA-81C8-5E8767A89E00}"/>
+                <a16:creationId xmlns:a16="http://schemas.microsoft.com/office/drawing/2014/main" id="{5B429EDC-B27D-4DFA-81C8-5E8767A89E00}"/>
               </a:ext>
             </a:extLst>
           </p:cNvPr>
@@ -4298,7 +4397,7 @@
         </p:nvSpPr>
         <p:spPr>
           <a:xfrm>
-            <a:off x="604652" y="2181790"/>
+            <a:off x="604652" y="2009260"/>
             <a:ext cx="1807915" cy="369332"/>
           </a:xfrm>
           <a:prstGeom prst="rect">
@@ -4330,10 +4429,170 @@
       </p:sp>
       <p:sp>
         <p:nvSpPr>
+          <p:cNvPr id="66" name="Vuokaavio: Prosessi 65">
+            <a:extLst>
+              <a:ext uri="{FF2B5EF4-FFF2-40B4-BE49-F238E27FC236}">
+                <a16:creationId xmlns:a16="http://schemas.microsoft.com/office/drawing/2014/main" id="{1632A193-82B9-4F36-9C54-7AFFDE315963}"/>
+              </a:ext>
+            </a:extLst>
+          </p:cNvPr>
+          <p:cNvSpPr/>
+          <p:nvPr/>
+        </p:nvSpPr>
+        <p:spPr>
+          <a:xfrm>
+            <a:off x="4521629" y="1449058"/>
+            <a:ext cx="1693950" cy="718818"/>
+          </a:xfrm>
+          <a:prstGeom prst="flowChartProcess">
+            <a:avLst/>
+          </a:prstGeom>
+          <a:solidFill>
+            <a:schemeClr val="accent2">
+              <a:lumMod val="20000"/>
+              <a:lumOff val="80000"/>
+            </a:schemeClr>
+          </a:solidFill>
+        </p:spPr>
+        <p:style>
+          <a:lnRef idx="2">
+            <a:schemeClr val="accent6"/>
+          </a:lnRef>
+          <a:fillRef idx="1">
+            <a:schemeClr val="lt1"/>
+          </a:fillRef>
+          <a:effectRef idx="0">
+            <a:schemeClr val="accent6"/>
+          </a:effectRef>
+          <a:fontRef idx="minor">
+            <a:schemeClr val="dk1"/>
+          </a:fontRef>
+        </p:style>
+        <p:txBody>
+          <a:bodyPr rtlCol="0" anchor="ctr"/>
+          <a:lstStyle/>
+          <a:p>
+            <a:pPr algn="ctr"/>
+            <a:r>
+              <a:rPr lang="fi-FI" dirty="0" err="1"/>
+              <a:t>Idle</a:t>
+            </a:r>
+            <a:r>
+              <a:rPr lang="fi-FI" dirty="0"/>
+              <a:t>(0)</a:t>
+            </a:r>
+          </a:p>
+          <a:p>
+            <a:pPr algn="ctr"/>
+            <a:r>
+              <a:rPr lang="fi-FI" dirty="0"/>
+              <a:t>RELAY ON</a:t>
+            </a:r>
+          </a:p>
+        </p:txBody>
+      </p:sp>
+      <p:sp>
+        <p:nvSpPr>
+          <p:cNvPr id="67" name="Tasakylkinen kolmio 66">
+            <a:extLst>
+              <a:ext uri="{FF2B5EF4-FFF2-40B4-BE49-F238E27FC236}">
+                <a16:creationId xmlns:a16="http://schemas.microsoft.com/office/drawing/2014/main" id="{AABCBC3C-34F1-409D-852B-087253346DF4}"/>
+              </a:ext>
+            </a:extLst>
+          </p:cNvPr>
+          <p:cNvSpPr/>
+          <p:nvPr/>
+        </p:nvSpPr>
+        <p:spPr>
+          <a:xfrm rot="5400000">
+            <a:off x="6499350" y="1545465"/>
+            <a:ext cx="344319" cy="879904"/>
+          </a:xfrm>
+          <a:prstGeom prst="triangle">
+            <a:avLst>
+              <a:gd name="adj" fmla="val 51325"/>
+            </a:avLst>
+          </a:prstGeom>
+        </p:spPr>
+        <p:style>
+          <a:lnRef idx="2">
+            <a:schemeClr val="accent6"/>
+          </a:lnRef>
+          <a:fillRef idx="1">
+            <a:schemeClr val="lt1"/>
+          </a:fillRef>
+          <a:effectRef idx="0">
+            <a:schemeClr val="accent6"/>
+          </a:effectRef>
+          <a:fontRef idx="minor">
+            <a:schemeClr val="dk1"/>
+          </a:fontRef>
+        </p:style>
+        <p:txBody>
+          <a:bodyPr vert="vert270" rtlCol="0" anchor="ctr"/>
+          <a:lstStyle/>
+          <a:p>
+            <a:pPr algn="ctr"/>
+            <a:r>
+              <a:rPr lang="fi-FI" dirty="0"/>
+              <a:t>150</a:t>
+            </a:r>
+          </a:p>
+        </p:txBody>
+      </p:sp>
+      <p:sp>
+        <p:nvSpPr>
+          <p:cNvPr id="68" name="Tasakylkinen kolmio 67">
+            <a:extLst>
+              <a:ext uri="{FF2B5EF4-FFF2-40B4-BE49-F238E27FC236}">
+                <a16:creationId xmlns:a16="http://schemas.microsoft.com/office/drawing/2014/main" id="{2887D7DB-E49B-4FA2-85D3-44366855794A}"/>
+              </a:ext>
+            </a:extLst>
+          </p:cNvPr>
+          <p:cNvSpPr/>
+          <p:nvPr/>
+        </p:nvSpPr>
+        <p:spPr>
+          <a:xfrm rot="16200000">
+            <a:off x="3743120" y="1399352"/>
+            <a:ext cx="718817" cy="838200"/>
+          </a:xfrm>
+          <a:prstGeom prst="triangle">
+            <a:avLst/>
+          </a:prstGeom>
+        </p:spPr>
+        <p:style>
+          <a:lnRef idx="2">
+            <a:schemeClr val="accent6"/>
+          </a:lnRef>
+          <a:fillRef idx="1">
+            <a:schemeClr val="lt1"/>
+          </a:fillRef>
+          <a:effectRef idx="0">
+            <a:schemeClr val="accent6"/>
+          </a:effectRef>
+          <a:fontRef idx="minor">
+            <a:schemeClr val="dk1"/>
+          </a:fontRef>
+        </p:style>
+        <p:txBody>
+          <a:bodyPr vert="vert" rtlCol="0" anchor="ctr"/>
+          <a:lstStyle/>
+          <a:p>
+            <a:pPr algn="ctr"/>
+            <a:r>
+              <a:rPr lang="fi-FI" dirty="0"/>
+              <a:t>4</a:t>
+            </a:r>
+          </a:p>
+        </p:txBody>
+      </p:sp>
+      <p:sp>
+        <p:nvSpPr>
           <p:cNvPr id="98" name="Tekstiruutu 97">
             <a:extLst>
               <a:ext uri="{FF2B5EF4-FFF2-40B4-BE49-F238E27FC236}">
-                <a16:creationId xmlns="" xmlns:a16="http://schemas.microsoft.com/office/drawing/2014/main" id="{E740B5C8-BA76-4034-B504-51381BFFE49A}"/>
+                <a16:creationId xmlns:a16="http://schemas.microsoft.com/office/drawing/2014/main" id="{E740B5C8-BA76-4034-B504-51381BFFE49A}"/>
               </a:ext>
             </a:extLst>
           </p:cNvPr>
@@ -4342,7 +4601,7 @@
         </p:nvSpPr>
         <p:spPr>
           <a:xfrm>
-            <a:off x="4170454" y="2486085"/>
+            <a:off x="4114583" y="2313834"/>
             <a:ext cx="3167183" cy="369332"/>
           </a:xfrm>
           <a:prstGeom prst="rect">
@@ -4385,7 +4644,7 @@
           <p:cNvPr id="105" name="Tekstiruutu 104">
             <a:extLst>
               <a:ext uri="{FF2B5EF4-FFF2-40B4-BE49-F238E27FC236}">
-                <a16:creationId xmlns="" xmlns:a16="http://schemas.microsoft.com/office/drawing/2014/main" id="{7062F488-3153-4E41-A3BE-076E5B7118D6}"/>
+                <a16:creationId xmlns:a16="http://schemas.microsoft.com/office/drawing/2014/main" id="{7062F488-3153-4E41-A3BE-076E5B7118D6}"/>
               </a:ext>
             </a:extLst>
           </p:cNvPr>
@@ -4394,7 +4653,7 @@
         </p:nvSpPr>
         <p:spPr>
           <a:xfrm>
-            <a:off x="9014413" y="3620987"/>
+            <a:off x="9014413" y="3448457"/>
             <a:ext cx="2368800" cy="646331"/>
           </a:xfrm>
           <a:prstGeom prst="rect">
@@ -4459,7 +4718,7 @@
           <p:cNvPr id="113" name="Tekstiruutu 112">
             <a:extLst>
               <a:ext uri="{FF2B5EF4-FFF2-40B4-BE49-F238E27FC236}">
-                <a16:creationId xmlns="" xmlns:a16="http://schemas.microsoft.com/office/drawing/2014/main" id="{E1B46EB5-6D79-44BB-8E0F-D374CCF292FC}"/>
+                <a16:creationId xmlns:a16="http://schemas.microsoft.com/office/drawing/2014/main" id="{E1B46EB5-6D79-44BB-8E0F-D374CCF292FC}"/>
               </a:ext>
             </a:extLst>
           </p:cNvPr>
@@ -4468,7 +4727,7 @@
         </p:nvSpPr>
         <p:spPr>
           <a:xfrm>
-            <a:off x="7895929" y="4798384"/>
+            <a:off x="7895929" y="4625854"/>
             <a:ext cx="1881102" cy="646331"/>
           </a:xfrm>
           <a:prstGeom prst="rect">
@@ -4519,7 +4778,7 @@
           <p:cNvPr id="118" name="Tekstiruutu 117">
             <a:extLst>
               <a:ext uri="{FF2B5EF4-FFF2-40B4-BE49-F238E27FC236}">
-                <a16:creationId xmlns="" xmlns:a16="http://schemas.microsoft.com/office/drawing/2014/main" id="{4E2A27A7-38C9-4C35-8EBF-C06A9F4E5A60}"/>
+                <a16:creationId xmlns:a16="http://schemas.microsoft.com/office/drawing/2014/main" id="{4E2A27A7-38C9-4C35-8EBF-C06A9F4E5A60}"/>
               </a:ext>
             </a:extLst>
           </p:cNvPr>
@@ -4528,7 +4787,7 @@
         </p:nvSpPr>
         <p:spPr>
           <a:xfrm>
-            <a:off x="9911252" y="5482369"/>
+            <a:off x="9911252" y="5309839"/>
             <a:ext cx="1633163" cy="923330"/>
           </a:xfrm>
           <a:prstGeom prst="rect">
@@ -4579,18 +4838,19 @@
           <p:cNvPr id="139" name="Yhdistin: Kulma 138">
             <a:extLst>
               <a:ext uri="{FF2B5EF4-FFF2-40B4-BE49-F238E27FC236}">
-                <a16:creationId xmlns="" xmlns:a16="http://schemas.microsoft.com/office/drawing/2014/main" id="{E3A88081-ED3B-4E41-A7C1-90830541B65A}"/>
+                <a16:creationId xmlns:a16="http://schemas.microsoft.com/office/drawing/2014/main" id="{E3A88081-ED3B-4E41-A7C1-90830541B65A}"/>
               </a:ext>
             </a:extLst>
           </p:cNvPr>
           <p:cNvCxnSpPr>
             <a:cxnSpLocks/>
+            <a:stCxn id="7" idx="0"/>
           </p:cNvCxnSpPr>
           <p:nvPr/>
         </p:nvCxnSpPr>
         <p:spPr>
           <a:xfrm rot="10800000" flipH="1">
-            <a:off x="5822749" y="3877140"/>
+            <a:off x="5822749" y="3704610"/>
             <a:ext cx="631720" cy="2502607"/>
           </a:xfrm>
           <a:prstGeom prst="bentConnector4">
@@ -4599,7 +4859,7 @@
               <a:gd name="adj2" fmla="val 113596"/>
             </a:avLst>
           </a:prstGeom>
-          <a:ln>
+          <a:ln w="19050">
             <a:tailEnd type="triangle"/>
           </a:ln>
         </p:spPr>
@@ -4623,7 +4883,7 @@
           <p:cNvPr id="157" name="Tekstiruutu 156">
             <a:extLst>
               <a:ext uri="{FF2B5EF4-FFF2-40B4-BE49-F238E27FC236}">
-                <a16:creationId xmlns="" xmlns:a16="http://schemas.microsoft.com/office/drawing/2014/main" id="{12510DC3-EEAC-4B20-9CB8-C81BCA62EDEB}"/>
+                <a16:creationId xmlns:a16="http://schemas.microsoft.com/office/drawing/2014/main" id="{12510DC3-EEAC-4B20-9CB8-C81BCA62EDEB}"/>
               </a:ext>
             </a:extLst>
           </p:cNvPr>
@@ -4632,7 +4892,7 @@
         </p:nvSpPr>
         <p:spPr>
           <a:xfrm>
-            <a:off x="3219888" y="6036367"/>
+            <a:off x="3219888" y="5863837"/>
             <a:ext cx="2557437" cy="369332"/>
           </a:xfrm>
           <a:prstGeom prst="rect">
@@ -4679,7 +4939,7 @@
           <p:cNvPr id="171" name="Yhdistin: Kulma 170">
             <a:extLst>
               <a:ext uri="{FF2B5EF4-FFF2-40B4-BE49-F238E27FC236}">
-                <a16:creationId xmlns="" xmlns:a16="http://schemas.microsoft.com/office/drawing/2014/main" id="{00ED9033-5C0A-476F-B8AD-152C87CA55CB}"/>
+                <a16:creationId xmlns:a16="http://schemas.microsoft.com/office/drawing/2014/main" id="{00ED9033-5C0A-476F-B8AD-152C87CA55CB}"/>
               </a:ext>
             </a:extLst>
           </p:cNvPr>
@@ -4690,15 +4950,15 @@
         </p:nvCxnSpPr>
         <p:spPr>
           <a:xfrm>
-            <a:off x="4229162" y="2815314"/>
-            <a:ext cx="3505138" cy="5166"/>
+            <a:off x="4229162" y="2642785"/>
+            <a:ext cx="3526266" cy="4058"/>
           </a:xfrm>
           <a:prstGeom prst="bentConnector3">
             <a:avLst>
               <a:gd name="adj1" fmla="val 50000"/>
             </a:avLst>
           </a:prstGeom>
-          <a:ln>
+          <a:ln w="19050">
             <a:tailEnd type="triangle"/>
           </a:ln>
         </p:spPr>
@@ -4717,233 +4977,220 @@
           </a:fontRef>
         </p:style>
       </p:cxnSp>
-      <p:grpSp>
-        <p:nvGrpSpPr>
-          <p:cNvPr id="63" name="Group 62"/>
-          <p:cNvGrpSpPr/>
+      <p:sp>
+        <p:nvSpPr>
+          <p:cNvPr id="36" name="Vuokaavio: Prosessi 35">
+            <a:extLst>
+              <a:ext uri="{FF2B5EF4-FFF2-40B4-BE49-F238E27FC236}">
+                <a16:creationId xmlns:a16="http://schemas.microsoft.com/office/drawing/2014/main" id="{90497816-96AC-43D8-AAB9-F35DC3844092}"/>
+              </a:ext>
+            </a:extLst>
+          </p:cNvPr>
+          <p:cNvSpPr/>
           <p:nvPr/>
-        </p:nvGrpSpPr>
-        <p:grpSpPr>
+        </p:nvSpPr>
+        <p:spPr>
           <a:xfrm>
-            <a:off x="1185617" y="2611589"/>
-            <a:ext cx="3043545" cy="729666"/>
-            <a:chOff x="1185617" y="2439059"/>
-            <a:chExt cx="3043545" cy="729666"/>
-          </a:xfrm>
-        </p:grpSpPr>
-        <p:sp>
-          <p:nvSpPr>
-            <p:cNvPr id="45" name="Vuokaavio: Prosessi 44">
-              <a:extLst>
-                <a:ext uri="{FF2B5EF4-FFF2-40B4-BE49-F238E27FC236}">
-                  <a16:creationId xmlns="" xmlns:a16="http://schemas.microsoft.com/office/drawing/2014/main" id="{C630C195-B3BF-486C-A3C4-F2F6B07F387E}"/>
-                </a:ext>
-              </a:extLst>
-            </p:cNvPr>
-            <p:cNvSpPr/>
-            <p:nvPr/>
-          </p:nvSpPr>
-          <p:spPr>
-            <a:xfrm>
-              <a:off x="1638303" y="2439059"/>
-              <a:ext cx="2138173" cy="718818"/>
-            </a:xfrm>
-            <a:prstGeom prst="flowChartProcess">
-              <a:avLst/>
-            </a:prstGeom>
-            <a:solidFill>
-              <a:schemeClr val="accent2">
-                <a:lumMod val="20000"/>
-                <a:lumOff val="80000"/>
-              </a:schemeClr>
-            </a:solidFill>
-          </p:spPr>
-          <p:style>
-            <a:lnRef idx="2">
-              <a:schemeClr val="accent6"/>
-            </a:lnRef>
-            <a:fillRef idx="1">
-              <a:schemeClr val="lt1"/>
-            </a:fillRef>
-            <a:effectRef idx="0">
-              <a:schemeClr val="accent6"/>
-            </a:effectRef>
-            <a:fontRef idx="minor">
-              <a:schemeClr val="dk1"/>
-            </a:fontRef>
-          </p:style>
-          <p:txBody>
-            <a:bodyPr rtlCol="0" anchor="ctr"/>
-            <a:lstStyle/>
-            <a:p>
-              <a:pPr algn="ctr"/>
-              <a:r>
-                <a:rPr lang="fi-FI" dirty="0" err="1"/>
-                <a:t>Temp_exceeded</a:t>
-              </a:r>
-              <a:r>
-                <a:rPr lang="fi-FI" dirty="0"/>
-                <a:t>(1)</a:t>
-              </a:r>
-            </a:p>
-            <a:p>
-              <a:pPr algn="ctr"/>
-              <a:r>
-                <a:rPr lang="fi-FI" dirty="0"/>
-                <a:t>RELAY ON</a:t>
-              </a:r>
-            </a:p>
-          </p:txBody>
-        </p:sp>
-        <p:sp>
-          <p:nvSpPr>
-            <p:cNvPr id="46" name="Tasakylkinen kolmio 45">
-              <a:extLst>
-                <a:ext uri="{FF2B5EF4-FFF2-40B4-BE49-F238E27FC236}">
-                  <a16:creationId xmlns="" xmlns:a16="http://schemas.microsoft.com/office/drawing/2014/main" id="{552DD7F1-6614-4407-96BE-0B42A9A9FEC7}"/>
-                </a:ext>
-              </a:extLst>
-            </p:cNvPr>
-            <p:cNvSpPr/>
-            <p:nvPr/>
-          </p:nvSpPr>
-          <p:spPr>
-            <a:xfrm rot="5400000">
-              <a:off x="3812232" y="2410552"/>
-              <a:ext cx="386667" cy="447192"/>
-            </a:xfrm>
-            <a:prstGeom prst="triangle">
-              <a:avLst/>
-            </a:prstGeom>
-          </p:spPr>
-          <p:style>
-            <a:lnRef idx="2">
-              <a:schemeClr val="accent6"/>
-            </a:lnRef>
-            <a:fillRef idx="1">
-              <a:schemeClr val="lt1"/>
-            </a:fillRef>
-            <a:effectRef idx="0">
-              <a:schemeClr val="accent6"/>
-            </a:effectRef>
-            <a:fontRef idx="minor">
-              <a:schemeClr val="dk1"/>
-            </a:fontRef>
-          </p:style>
-          <p:txBody>
-            <a:bodyPr vert="vert270" rtlCol="0" anchor="ctr"/>
-            <a:lstStyle/>
-            <a:p>
-              <a:pPr algn="ctr"/>
-              <a:r>
-                <a:rPr lang="fi-FI" dirty="0"/>
-                <a:t>5</a:t>
-              </a:r>
-            </a:p>
-          </p:txBody>
-        </p:sp>
-        <p:sp>
-          <p:nvSpPr>
-            <p:cNvPr id="47" name="Tasakylkinen kolmio 46">
-              <a:extLst>
-                <a:ext uri="{FF2B5EF4-FFF2-40B4-BE49-F238E27FC236}">
-                  <a16:creationId xmlns="" xmlns:a16="http://schemas.microsoft.com/office/drawing/2014/main" id="{EAE226B5-0B5C-4680-9B70-2A61B86384B9}"/>
-                </a:ext>
-              </a:extLst>
-            </p:cNvPr>
-            <p:cNvSpPr/>
-            <p:nvPr/>
-          </p:nvSpPr>
-          <p:spPr>
-            <a:xfrm rot="16200000">
-              <a:off x="1052551" y="2572125"/>
-              <a:ext cx="718817" cy="452686"/>
-            </a:xfrm>
-            <a:prstGeom prst="triangle">
-              <a:avLst/>
-            </a:prstGeom>
-          </p:spPr>
-          <p:style>
-            <a:lnRef idx="2">
-              <a:schemeClr val="accent6"/>
-            </a:lnRef>
-            <a:fillRef idx="1">
-              <a:schemeClr val="lt1"/>
-            </a:fillRef>
-            <a:effectRef idx="0">
-              <a:schemeClr val="accent6"/>
-            </a:effectRef>
-            <a:fontRef idx="minor">
-              <a:schemeClr val="dk1"/>
-            </a:fontRef>
-          </p:style>
-          <p:txBody>
-            <a:bodyPr vert="vert" rtlCol="0" anchor="ctr"/>
-            <a:lstStyle/>
-            <a:p>
-              <a:pPr algn="ctr"/>
-              <a:r>
-                <a:rPr lang="fi-FI" dirty="0"/>
-                <a:t>4</a:t>
-              </a:r>
-            </a:p>
-          </p:txBody>
-        </p:sp>
-        <p:sp>
-          <p:nvSpPr>
-            <p:cNvPr id="44" name="Tasakylkinen kolmio 43">
-              <a:extLst>
-                <a:ext uri="{FF2B5EF4-FFF2-40B4-BE49-F238E27FC236}">
-                  <a16:creationId xmlns="" xmlns:a16="http://schemas.microsoft.com/office/drawing/2014/main" id="{39FA4BA9-140D-4177-87CC-E225E08D8180}"/>
-                </a:ext>
-              </a:extLst>
-            </p:cNvPr>
-            <p:cNvSpPr/>
-            <p:nvPr/>
-          </p:nvSpPr>
-          <p:spPr>
-            <a:xfrm rot="5400000">
-              <a:off x="3812232" y="2751796"/>
-              <a:ext cx="386667" cy="447192"/>
-            </a:xfrm>
-            <a:prstGeom prst="triangle">
-              <a:avLst/>
-            </a:prstGeom>
-          </p:spPr>
-          <p:style>
-            <a:lnRef idx="2">
-              <a:schemeClr val="accent6"/>
-            </a:lnRef>
-            <a:fillRef idx="1">
-              <a:schemeClr val="lt1"/>
-            </a:fillRef>
-            <a:effectRef idx="0">
-              <a:schemeClr val="accent6"/>
-            </a:effectRef>
-            <a:fontRef idx="minor">
-              <a:schemeClr val="dk1"/>
-            </a:fontRef>
-          </p:style>
-          <p:txBody>
-            <a:bodyPr vert="vert270" rtlCol="0" anchor="ctr"/>
-            <a:lstStyle/>
-            <a:p>
-              <a:pPr algn="ctr"/>
-              <a:endParaRPr lang="fi-FI" dirty="0"/>
-            </a:p>
-            <a:p>
-              <a:pPr algn="ctr"/>
-              <a:endParaRPr lang="fi-FI" dirty="0"/>
-            </a:p>
-          </p:txBody>
-        </p:sp>
-      </p:grpSp>
+            <a:off x="2471011" y="302301"/>
+            <a:ext cx="1693950" cy="718818"/>
+          </a:xfrm>
+          <a:prstGeom prst="flowChartProcess">
+            <a:avLst/>
+          </a:prstGeom>
+          <a:solidFill>
+            <a:schemeClr val="accent5">
+              <a:lumMod val="20000"/>
+              <a:lumOff val="80000"/>
+            </a:schemeClr>
+          </a:solidFill>
+        </p:spPr>
+        <p:style>
+          <a:lnRef idx="2">
+            <a:schemeClr val="accent6"/>
+          </a:lnRef>
+          <a:fillRef idx="1">
+            <a:schemeClr val="lt1"/>
+          </a:fillRef>
+          <a:effectRef idx="0">
+            <a:schemeClr val="accent6"/>
+          </a:effectRef>
+          <a:fontRef idx="minor">
+            <a:schemeClr val="dk1"/>
+          </a:fontRef>
+        </p:style>
+        <p:txBody>
+          <a:bodyPr rtlCol="0" anchor="ctr"/>
+          <a:lstStyle/>
+          <a:p>
+            <a:pPr algn="ctr"/>
+            <a:r>
+              <a:rPr lang="fi-FI" dirty="0" err="1"/>
+              <a:t>Reset</a:t>
+            </a:r>
+            <a:r>
+              <a:rPr lang="fi-FI" dirty="0"/>
+              <a:t>(-4)</a:t>
+            </a:r>
+          </a:p>
+          <a:p>
+            <a:pPr algn="ctr"/>
+            <a:r>
+              <a:rPr lang="fi-FI" dirty="0"/>
+              <a:t>RELAY OFF</a:t>
+            </a:r>
+          </a:p>
+        </p:txBody>
+      </p:sp>
+      <p:sp>
+        <p:nvSpPr>
+          <p:cNvPr id="37" name="Tasakylkinen kolmio 36">
+            <a:extLst>
+              <a:ext uri="{FF2B5EF4-FFF2-40B4-BE49-F238E27FC236}">
+                <a16:creationId xmlns:a16="http://schemas.microsoft.com/office/drawing/2014/main" id="{97A1569A-1C68-4ECA-8511-AB664D419E77}"/>
+              </a:ext>
+            </a:extLst>
+          </p:cNvPr>
+          <p:cNvSpPr/>
+          <p:nvPr/>
+        </p:nvSpPr>
+        <p:spPr>
+          <a:xfrm rot="5400000">
+            <a:off x="4307200" y="525605"/>
+            <a:ext cx="376838" cy="639716"/>
+          </a:xfrm>
+          <a:prstGeom prst="triangle">
+            <a:avLst>
+              <a:gd name="adj" fmla="val 51325"/>
+            </a:avLst>
+          </a:prstGeom>
+        </p:spPr>
+        <p:style>
+          <a:lnRef idx="2">
+            <a:schemeClr val="accent6"/>
+          </a:lnRef>
+          <a:fillRef idx="1">
+            <a:schemeClr val="lt1"/>
+          </a:fillRef>
+          <a:effectRef idx="0">
+            <a:schemeClr val="accent6"/>
+          </a:effectRef>
+          <a:fontRef idx="minor">
+            <a:schemeClr val="dk1"/>
+          </a:fontRef>
+        </p:style>
+        <p:txBody>
+          <a:bodyPr vert="vert270" rtlCol="0" anchor="ctr"/>
+          <a:lstStyle/>
+          <a:p>
+            <a:pPr algn="ctr"/>
+            <a:r>
+              <a:rPr lang="fi-FI" dirty="0"/>
+              <a:t>0</a:t>
+            </a:r>
+          </a:p>
+        </p:txBody>
+      </p:sp>
+      <p:sp>
+        <p:nvSpPr>
+          <p:cNvPr id="38" name="Tasakylkinen kolmio 37">
+            <a:extLst>
+              <a:ext uri="{FF2B5EF4-FFF2-40B4-BE49-F238E27FC236}">
+                <a16:creationId xmlns:a16="http://schemas.microsoft.com/office/drawing/2014/main" id="{C40A5B0E-8DDF-4E0E-8AB8-1B35DA2D6D26}"/>
+              </a:ext>
+            </a:extLst>
+          </p:cNvPr>
+          <p:cNvSpPr/>
+          <p:nvPr/>
+        </p:nvSpPr>
+        <p:spPr>
+          <a:xfrm rot="16200000">
+            <a:off x="1885474" y="431407"/>
+            <a:ext cx="718817" cy="451271"/>
+          </a:xfrm>
+          <a:prstGeom prst="triangle">
+            <a:avLst/>
+          </a:prstGeom>
+        </p:spPr>
+        <p:style>
+          <a:lnRef idx="2">
+            <a:schemeClr val="accent6"/>
+          </a:lnRef>
+          <a:fillRef idx="1">
+            <a:schemeClr val="lt1"/>
+          </a:fillRef>
+          <a:effectRef idx="0">
+            <a:schemeClr val="accent6"/>
+          </a:effectRef>
+          <a:fontRef idx="minor">
+            <a:schemeClr val="dk1"/>
+          </a:fontRef>
+        </p:style>
+        <p:txBody>
+          <a:bodyPr vert="vert" rtlCol="0" anchor="ctr"/>
+          <a:lstStyle/>
+          <a:p>
+            <a:pPr algn="ctr"/>
+            <a:r>
+              <a:rPr lang="fi-FI" dirty="0"/>
+              <a:t>0</a:t>
+            </a:r>
+          </a:p>
+        </p:txBody>
+      </p:sp>
+      <p:sp>
+        <p:nvSpPr>
+          <p:cNvPr id="44" name="Tasakylkinen kolmio 43">
+            <a:extLst>
+              <a:ext uri="{FF2B5EF4-FFF2-40B4-BE49-F238E27FC236}">
+                <a16:creationId xmlns:a16="http://schemas.microsoft.com/office/drawing/2014/main" id="{39FA4BA9-140D-4177-87CC-E225E08D8180}"/>
+              </a:ext>
+            </a:extLst>
+          </p:cNvPr>
+          <p:cNvSpPr/>
+          <p:nvPr/>
+        </p:nvSpPr>
+        <p:spPr>
+          <a:xfrm rot="5400000">
+            <a:off x="3812232" y="2751796"/>
+            <a:ext cx="386667" cy="447192"/>
+          </a:xfrm>
+          <a:prstGeom prst="triangle">
+            <a:avLst/>
+          </a:prstGeom>
+        </p:spPr>
+        <p:style>
+          <a:lnRef idx="2">
+            <a:schemeClr val="accent6"/>
+          </a:lnRef>
+          <a:fillRef idx="1">
+            <a:schemeClr val="lt1"/>
+          </a:fillRef>
+          <a:effectRef idx="0">
+            <a:schemeClr val="accent6"/>
+          </a:effectRef>
+          <a:fontRef idx="minor">
+            <a:schemeClr val="dk1"/>
+          </a:fontRef>
+        </p:style>
+        <p:txBody>
+          <a:bodyPr vert="vert270" rtlCol="0" anchor="ctr"/>
+          <a:lstStyle/>
+          <a:p>
+            <a:pPr algn="ctr"/>
+            <a:endParaRPr lang="fi-FI" dirty="0"/>
+          </a:p>
+          <a:p>
+            <a:pPr algn="ctr"/>
+            <a:endParaRPr lang="fi-FI" dirty="0"/>
+          </a:p>
+        </p:txBody>
+      </p:sp>
       <p:sp>
         <p:nvSpPr>
           <p:cNvPr id="48" name="Tekstiruutu 47">
             <a:extLst>
               <a:ext uri="{FF2B5EF4-FFF2-40B4-BE49-F238E27FC236}">
-                <a16:creationId xmlns="" xmlns:a16="http://schemas.microsoft.com/office/drawing/2014/main" id="{799FFFCB-19E3-4CBA-A69C-3EED8E87A3AF}"/>
+                <a16:creationId xmlns:a16="http://schemas.microsoft.com/office/drawing/2014/main" id="{799FFFCB-19E3-4CBA-A69C-3EED8E87A3AF}"/>
               </a:ext>
             </a:extLst>
           </p:cNvPr>
@@ -4952,7 +5199,7 @@
         </p:nvSpPr>
         <p:spPr>
           <a:xfrm>
-            <a:off x="4164961" y="2817069"/>
+            <a:off x="4164961" y="2644539"/>
             <a:ext cx="2855842" cy="369332"/>
           </a:xfrm>
           <a:prstGeom prst="rect">
@@ -4999,7 +5246,7 @@
           <p:cNvPr id="12" name="Yhdistin: Kulma 11">
             <a:extLst>
               <a:ext uri="{FF2B5EF4-FFF2-40B4-BE49-F238E27FC236}">
-                <a16:creationId xmlns="" xmlns:a16="http://schemas.microsoft.com/office/drawing/2014/main" id="{81D52178-9AE6-4370-9797-112DE02B8C4D}"/>
+                <a16:creationId xmlns:a16="http://schemas.microsoft.com/office/drawing/2014/main" id="{81D52178-9AE6-4370-9797-112DE02B8C4D}"/>
               </a:ext>
             </a:extLst>
           </p:cNvPr>
@@ -5010,13 +5257,13 @@
         </p:nvCxnSpPr>
         <p:spPr>
           <a:xfrm>
-            <a:off x="4229162" y="3145970"/>
-            <a:ext cx="3484798" cy="1953"/>
+            <a:off x="4229162" y="2973440"/>
+            <a:ext cx="3526266" cy="39555"/>
           </a:xfrm>
           <a:prstGeom prst="bentConnector3">
             <a:avLst/>
           </a:prstGeom>
-          <a:ln>
+          <a:ln w="19050">
             <a:tailEnd type="triangle"/>
           </a:ln>
         </p:spPr>
@@ -5040,18 +5287,19 @@
           <p:cNvPr id="18" name="Yhdistin: Kulma 17">
             <a:extLst>
               <a:ext uri="{FF2B5EF4-FFF2-40B4-BE49-F238E27FC236}">
-                <a16:creationId xmlns="" xmlns:a16="http://schemas.microsoft.com/office/drawing/2014/main" id="{D9464A69-88F8-4050-9789-2F16F1A28499}"/>
+                <a16:creationId xmlns:a16="http://schemas.microsoft.com/office/drawing/2014/main" id="{D9464A69-88F8-4050-9789-2F16F1A28499}"/>
               </a:ext>
             </a:extLst>
           </p:cNvPr>
           <p:cNvCxnSpPr>
             <a:cxnSpLocks/>
+            <a:stCxn id="38" idx="0"/>
           </p:cNvCxnSpPr>
           <p:nvPr/>
         </p:nvCxnSpPr>
         <p:spPr>
           <a:xfrm rot="10800000" flipH="1" flipV="1">
-            <a:off x="2019247" y="829572"/>
+            <a:off x="2019247" y="657042"/>
             <a:ext cx="2590858" cy="4122312"/>
           </a:xfrm>
           <a:prstGeom prst="bentConnector4">
@@ -5060,7 +5308,7 @@
               <a:gd name="adj2" fmla="val 92941"/>
             </a:avLst>
           </a:prstGeom>
-          <a:ln>
+          <a:ln w="19050">
             <a:tailEnd type="triangle"/>
           </a:ln>
         </p:spPr>
@@ -5084,7 +5332,7 @@
           <p:cNvPr id="52" name="Tekstiruutu 51">
             <a:extLst>
               <a:ext uri="{FF2B5EF4-FFF2-40B4-BE49-F238E27FC236}">
-                <a16:creationId xmlns="" xmlns:a16="http://schemas.microsoft.com/office/drawing/2014/main" id="{331AFF1C-C092-44DF-910A-5900261A07BF}"/>
+                <a16:creationId xmlns:a16="http://schemas.microsoft.com/office/drawing/2014/main" id="{331AFF1C-C092-44DF-910A-5900261A07BF}"/>
               </a:ext>
             </a:extLst>
           </p:cNvPr>
@@ -5093,7 +5341,7 @@
         </p:nvSpPr>
         <p:spPr>
           <a:xfrm>
-            <a:off x="119699" y="573871"/>
+            <a:off x="119699" y="401341"/>
             <a:ext cx="1994264" cy="646331"/>
           </a:xfrm>
           <a:prstGeom prst="rect">
@@ -5145,24 +5393,26 @@
           <p:cNvPr id="33" name="Yhdistin: Kulma 32">
             <a:extLst>
               <a:ext uri="{FF2B5EF4-FFF2-40B4-BE49-F238E27FC236}">
-                <a16:creationId xmlns="" xmlns:a16="http://schemas.microsoft.com/office/drawing/2014/main" id="{A695496F-E1E4-40D2-A63D-184D01DB514B}"/>
+                <a16:creationId xmlns:a16="http://schemas.microsoft.com/office/drawing/2014/main" id="{A695496F-E1E4-40D2-A63D-184D01DB514B}"/>
               </a:ext>
             </a:extLst>
           </p:cNvPr>
           <p:cNvCxnSpPr>
             <a:cxnSpLocks/>
+            <a:stCxn id="37" idx="0"/>
+            <a:endCxn id="66" idx="0"/>
           </p:cNvCxnSpPr>
           <p:nvPr/>
         </p:nvCxnSpPr>
         <p:spPr>
           <a:xfrm>
-            <a:off x="4623102" y="1017201"/>
-            <a:ext cx="745502" cy="604387"/>
+            <a:off x="4815477" y="850456"/>
+            <a:ext cx="553127" cy="598602"/>
           </a:xfrm>
           <a:prstGeom prst="bentConnector2">
             <a:avLst/>
           </a:prstGeom>
-          <a:ln>
+          <a:ln w="19050">
             <a:tailEnd type="triangle"/>
           </a:ln>
         </p:spPr>
@@ -5181,511 +5431,242 @@
           </a:fontRef>
         </p:style>
       </p:cxnSp>
-      <p:grpSp>
-        <p:nvGrpSpPr>
-          <p:cNvPr id="71" name="Group 70"/>
-          <p:cNvGrpSpPr/>
+      <p:sp>
+        <p:nvSpPr>
+          <p:cNvPr id="49" name="Tasakylkinen kolmio 48">
+            <a:extLst>
+              <a:ext uri="{FF2B5EF4-FFF2-40B4-BE49-F238E27FC236}">
+                <a16:creationId xmlns:a16="http://schemas.microsoft.com/office/drawing/2014/main" id="{A9052E31-C27F-4824-B534-1F6444652227}"/>
+              </a:ext>
+            </a:extLst>
+          </p:cNvPr>
+          <p:cNvSpPr/>
           <p:nvPr/>
-        </p:nvGrpSpPr>
-        <p:grpSpPr>
+        </p:nvSpPr>
+        <p:spPr>
+          <a:xfrm rot="5400000">
+            <a:off x="4295267" y="172572"/>
+            <a:ext cx="376838" cy="639716"/>
+          </a:xfrm>
+          <a:prstGeom prst="triangle">
+            <a:avLst>
+              <a:gd name="adj" fmla="val 51325"/>
+            </a:avLst>
+          </a:prstGeom>
+        </p:spPr>
+        <p:style>
+          <a:lnRef idx="2">
+            <a:schemeClr val="accent6"/>
+          </a:lnRef>
+          <a:fillRef idx="1">
+            <a:schemeClr val="lt1"/>
+          </a:fillRef>
+          <a:effectRef idx="0">
+            <a:schemeClr val="accent6"/>
+          </a:effectRef>
+          <a:fontRef idx="minor">
+            <a:schemeClr val="dk1"/>
+          </a:fontRef>
+        </p:style>
+        <p:txBody>
+          <a:bodyPr vert="vert270" rtlCol="0" anchor="ctr"/>
+          <a:lstStyle/>
+          <a:p>
+            <a:pPr algn="ctr"/>
+            <a:r>
+              <a:rPr lang="fi-FI" dirty="0"/>
+              <a:t>3</a:t>
+            </a:r>
+          </a:p>
+        </p:txBody>
+      </p:sp>
+      <p:sp>
+        <p:nvSpPr>
+          <p:cNvPr id="50" name="Tasakylkinen kolmio 49">
+            <a:extLst>
+              <a:ext uri="{FF2B5EF4-FFF2-40B4-BE49-F238E27FC236}">
+                <a16:creationId xmlns:a16="http://schemas.microsoft.com/office/drawing/2014/main" id="{7251847E-9189-44C2-8A96-6778C7B651B7}"/>
+              </a:ext>
+            </a:extLst>
+          </p:cNvPr>
+          <p:cNvSpPr/>
+          <p:nvPr/>
+        </p:nvSpPr>
+        <p:spPr>
+          <a:xfrm rot="5400000">
+            <a:off x="6358251" y="1327028"/>
+            <a:ext cx="328467" cy="613811"/>
+          </a:xfrm>
+          <a:prstGeom prst="triangle">
+            <a:avLst>
+              <a:gd name="adj" fmla="val 51325"/>
+            </a:avLst>
+          </a:prstGeom>
+        </p:spPr>
+        <p:style>
+          <a:lnRef idx="2">
+            <a:schemeClr val="accent6"/>
+          </a:lnRef>
+          <a:fillRef idx="1">
+            <a:schemeClr val="lt1"/>
+          </a:fillRef>
+          <a:effectRef idx="0">
+            <a:schemeClr val="accent6"/>
+          </a:effectRef>
+          <a:fontRef idx="minor">
+            <a:schemeClr val="dk1"/>
+          </a:fontRef>
+        </p:style>
+        <p:txBody>
+          <a:bodyPr vert="vert270" rtlCol="0" anchor="ctr"/>
+          <a:lstStyle/>
+          <a:p>
+            <a:pPr algn="ctr"/>
+            <a:r>
+              <a:rPr lang="fi-FI" dirty="0"/>
+              <a:t>3</a:t>
+            </a:r>
+          </a:p>
+        </p:txBody>
+      </p:sp>
+      <p:sp>
+        <p:nvSpPr>
+          <p:cNvPr id="51" name="Vuokaavio: Prosessi 50">
+            <a:extLst>
+              <a:ext uri="{FF2B5EF4-FFF2-40B4-BE49-F238E27FC236}">
+                <a16:creationId xmlns:a16="http://schemas.microsoft.com/office/drawing/2014/main" id="{F1EE6690-9663-403C-B10F-92B09E0A6438}"/>
+              </a:ext>
+            </a:extLst>
+          </p:cNvPr>
+          <p:cNvSpPr/>
+          <p:nvPr/>
+        </p:nvSpPr>
+        <p:spPr>
           <a:xfrm>
-            <a:off x="7734794" y="607646"/>
-            <a:ext cx="2532150" cy="728802"/>
-            <a:chOff x="8085777" y="1992523"/>
-            <a:chExt cx="2532150" cy="728802"/>
-          </a:xfrm>
-        </p:grpSpPr>
-        <p:sp>
-          <p:nvSpPr>
-            <p:cNvPr id="58" name="Vuokaavio: Prosessi 65">
-              <a:extLst>
-                <a:ext uri="{FF2B5EF4-FFF2-40B4-BE49-F238E27FC236}">
-                  <a16:creationId xmlns="" xmlns:a16="http://schemas.microsoft.com/office/drawing/2014/main" id="{1632A193-82B9-4F36-9C54-7AFFDE315963}"/>
-                </a:ext>
-              </a:extLst>
-            </p:cNvPr>
-            <p:cNvSpPr/>
-            <p:nvPr/>
-          </p:nvSpPr>
-          <p:spPr>
-            <a:xfrm>
-              <a:off x="8923977" y="1992523"/>
-              <a:ext cx="1693950" cy="718818"/>
-            </a:xfrm>
-            <a:prstGeom prst="flowChartProcess">
-              <a:avLst/>
-            </a:prstGeom>
-            <a:solidFill>
-              <a:schemeClr val="accent2">
-                <a:lumMod val="20000"/>
-                <a:lumOff val="80000"/>
-              </a:schemeClr>
-            </a:solidFill>
-          </p:spPr>
-          <p:style>
-            <a:lnRef idx="2">
-              <a:schemeClr val="accent6"/>
-            </a:lnRef>
-            <a:fillRef idx="1">
-              <a:schemeClr val="lt1"/>
-            </a:fillRef>
-            <a:effectRef idx="0">
-              <a:schemeClr val="accent6"/>
-            </a:effectRef>
-            <a:fontRef idx="minor">
-              <a:schemeClr val="dk1"/>
-            </a:fontRef>
-          </p:style>
-          <p:txBody>
-            <a:bodyPr rtlCol="0" anchor="ctr"/>
-            <a:lstStyle/>
-            <a:p>
-              <a:pPr algn="ctr"/>
-              <a:r>
-                <a:rPr lang="fi-FI" dirty="0" smtClean="0"/>
-                <a:t>Off(-3)</a:t>
-              </a:r>
-              <a:endParaRPr lang="fi-FI" dirty="0"/>
-            </a:p>
-            <a:p>
-              <a:pPr algn="ctr"/>
-              <a:r>
-                <a:rPr lang="fi-FI" dirty="0"/>
-                <a:t>RELAY </a:t>
-              </a:r>
-              <a:r>
-                <a:rPr lang="fi-FI" dirty="0" smtClean="0"/>
-                <a:t>OFF</a:t>
-              </a:r>
-              <a:endParaRPr lang="fi-FI" dirty="0"/>
-            </a:p>
-          </p:txBody>
-        </p:sp>
-        <p:sp>
-          <p:nvSpPr>
-            <p:cNvPr id="60" name="Tasakylkinen kolmio 67">
-              <a:extLst>
-                <a:ext uri="{FF2B5EF4-FFF2-40B4-BE49-F238E27FC236}">
-                  <a16:creationId xmlns="" xmlns:a16="http://schemas.microsoft.com/office/drawing/2014/main" id="{2887D7DB-E49B-4FA2-85D3-44366855794A}"/>
-                </a:ext>
-              </a:extLst>
-            </p:cNvPr>
-            <p:cNvSpPr/>
-            <p:nvPr/>
-          </p:nvSpPr>
-          <p:spPr>
-            <a:xfrm rot="16200000">
-              <a:off x="8145468" y="1942817"/>
-              <a:ext cx="718817" cy="838200"/>
-            </a:xfrm>
-            <a:prstGeom prst="triangle">
-              <a:avLst/>
-            </a:prstGeom>
-          </p:spPr>
-          <p:style>
-            <a:lnRef idx="2">
-              <a:schemeClr val="accent6"/>
-            </a:lnRef>
-            <a:fillRef idx="1">
-              <a:schemeClr val="lt1"/>
-            </a:fillRef>
-            <a:effectRef idx="0">
-              <a:schemeClr val="accent6"/>
-            </a:effectRef>
-            <a:fontRef idx="minor">
-              <a:schemeClr val="dk1"/>
-            </a:fontRef>
-          </p:style>
-          <p:txBody>
-            <a:bodyPr vert="vert" rtlCol="0" anchor="ctr"/>
-            <a:lstStyle/>
-            <a:p>
-              <a:pPr algn="ctr"/>
-              <a:endParaRPr lang="fi-FI" dirty="0"/>
-            </a:p>
-          </p:txBody>
-        </p:sp>
-      </p:grpSp>
-      <p:grpSp>
-        <p:nvGrpSpPr>
-          <p:cNvPr id="77" name="Group 76"/>
-          <p:cNvGrpSpPr/>
+            <a:off x="8630183" y="2254622"/>
+            <a:ext cx="1693950" cy="718818"/>
+          </a:xfrm>
+          <a:prstGeom prst="flowChartProcess">
+            <a:avLst/>
+          </a:prstGeom>
+          <a:solidFill>
+            <a:schemeClr val="accent5">
+              <a:lumMod val="20000"/>
+              <a:lumOff val="80000"/>
+            </a:schemeClr>
+          </a:solidFill>
+        </p:spPr>
+        <p:style>
+          <a:lnRef idx="2">
+            <a:schemeClr val="accent6"/>
+          </a:lnRef>
+          <a:fillRef idx="1">
+            <a:schemeClr val="lt1"/>
+          </a:fillRef>
+          <a:effectRef idx="0">
+            <a:schemeClr val="accent6"/>
+          </a:effectRef>
+          <a:fontRef idx="minor">
+            <a:schemeClr val="dk1"/>
+          </a:fontRef>
+        </p:style>
+        <p:txBody>
+          <a:bodyPr rtlCol="0" anchor="ctr"/>
+          <a:lstStyle/>
+          <a:p>
+            <a:pPr algn="ctr"/>
+            <a:r>
+              <a:rPr lang="fi-FI" dirty="0" err="1"/>
+              <a:t>Off</a:t>
+            </a:r>
+            <a:r>
+              <a:rPr lang="fi-FI" dirty="0"/>
+              <a:t>(-3) </a:t>
+            </a:r>
+          </a:p>
+          <a:p>
+            <a:pPr algn="ctr"/>
+            <a:r>
+              <a:rPr lang="fi-FI" dirty="0"/>
+              <a:t>RELAY OFF</a:t>
+            </a:r>
+          </a:p>
+        </p:txBody>
+      </p:sp>
+      <p:sp>
+        <p:nvSpPr>
+          <p:cNvPr id="54" name="Tasakylkinen kolmio 53">
+            <a:extLst>
+              <a:ext uri="{FF2B5EF4-FFF2-40B4-BE49-F238E27FC236}">
+                <a16:creationId xmlns:a16="http://schemas.microsoft.com/office/drawing/2014/main" id="{95EAAC4E-BD5C-428B-8CA2-E0B985F010D7}"/>
+              </a:ext>
+            </a:extLst>
+          </p:cNvPr>
+          <p:cNvSpPr/>
           <p:nvPr/>
-        </p:nvGrpSpPr>
-        <p:grpSpPr>
-          <a:xfrm>
-            <a:off x="3683429" y="1605995"/>
-            <a:ext cx="2987009" cy="747036"/>
-            <a:chOff x="3683429" y="1433465"/>
-            <a:chExt cx="2987009" cy="747036"/>
-          </a:xfrm>
-        </p:grpSpPr>
-        <p:grpSp>
-          <p:nvGrpSpPr>
-            <p:cNvPr id="61" name="Group 60"/>
-            <p:cNvGrpSpPr/>
-            <p:nvPr/>
-          </p:nvGrpSpPr>
-          <p:grpSpPr>
-            <a:xfrm>
-              <a:off x="3683429" y="1449058"/>
-              <a:ext cx="2532150" cy="728802"/>
-              <a:chOff x="3683429" y="1449058"/>
-              <a:chExt cx="2532150" cy="728802"/>
-            </a:xfrm>
-          </p:grpSpPr>
-          <p:sp>
-            <p:nvSpPr>
-              <p:cNvPr id="66" name="Vuokaavio: Prosessi 65">
-                <a:extLst>
-                  <a:ext uri="{FF2B5EF4-FFF2-40B4-BE49-F238E27FC236}">
-                    <a16:creationId xmlns="" xmlns:a16="http://schemas.microsoft.com/office/drawing/2014/main" id="{1632A193-82B9-4F36-9C54-7AFFDE315963}"/>
-                  </a:ext>
-                </a:extLst>
-              </p:cNvPr>
-              <p:cNvSpPr/>
-              <p:nvPr/>
-            </p:nvSpPr>
-            <p:spPr>
-              <a:xfrm>
-                <a:off x="4521629" y="1449058"/>
-                <a:ext cx="1693950" cy="718818"/>
-              </a:xfrm>
-              <a:prstGeom prst="flowChartProcess">
-                <a:avLst/>
-              </a:prstGeom>
-              <a:solidFill>
-                <a:schemeClr val="accent2">
-                  <a:lumMod val="20000"/>
-                  <a:lumOff val="80000"/>
-                </a:schemeClr>
-              </a:solidFill>
-            </p:spPr>
-            <p:style>
-              <a:lnRef idx="2">
-                <a:schemeClr val="accent6"/>
-              </a:lnRef>
-              <a:fillRef idx="1">
-                <a:schemeClr val="lt1"/>
-              </a:fillRef>
-              <a:effectRef idx="0">
-                <a:schemeClr val="accent6"/>
-              </a:effectRef>
-              <a:fontRef idx="minor">
-                <a:schemeClr val="dk1"/>
-              </a:fontRef>
-            </p:style>
-            <p:txBody>
-              <a:bodyPr rtlCol="0" anchor="ctr"/>
-              <a:lstStyle/>
-              <a:p>
-                <a:pPr algn="ctr"/>
-                <a:r>
-                  <a:rPr lang="fi-FI" dirty="0" err="1"/>
-                  <a:t>Idle</a:t>
-                </a:r>
-                <a:r>
-                  <a:rPr lang="fi-FI" dirty="0"/>
-                  <a:t>(0)</a:t>
-                </a:r>
-              </a:p>
-              <a:p>
-                <a:pPr algn="ctr"/>
-                <a:r>
-                  <a:rPr lang="fi-FI" dirty="0"/>
-                  <a:t>RELAY </a:t>
-                </a:r>
-                <a:r>
-                  <a:rPr lang="fi-FI" dirty="0" smtClean="0"/>
-                  <a:t>ON</a:t>
-                </a:r>
-                <a:endParaRPr lang="fi-FI" dirty="0"/>
-              </a:p>
-            </p:txBody>
-          </p:sp>
-          <p:sp>
-            <p:nvSpPr>
-              <p:cNvPr id="68" name="Tasakylkinen kolmio 67">
-                <a:extLst>
-                  <a:ext uri="{FF2B5EF4-FFF2-40B4-BE49-F238E27FC236}">
-                    <a16:creationId xmlns="" xmlns:a16="http://schemas.microsoft.com/office/drawing/2014/main" id="{2887D7DB-E49B-4FA2-85D3-44366855794A}"/>
-                  </a:ext>
-                </a:extLst>
-              </p:cNvPr>
-              <p:cNvSpPr/>
-              <p:nvPr/>
-            </p:nvSpPr>
-            <p:spPr>
-              <a:xfrm rot="16200000">
-                <a:off x="3743120" y="1399352"/>
-                <a:ext cx="718817" cy="838200"/>
-              </a:xfrm>
-              <a:prstGeom prst="triangle">
-                <a:avLst/>
-              </a:prstGeom>
-            </p:spPr>
-            <p:style>
-              <a:lnRef idx="2">
-                <a:schemeClr val="accent6"/>
-              </a:lnRef>
-              <a:fillRef idx="1">
-                <a:schemeClr val="lt1"/>
-              </a:fillRef>
-              <a:effectRef idx="0">
-                <a:schemeClr val="accent6"/>
-              </a:effectRef>
-              <a:fontRef idx="minor">
-                <a:schemeClr val="dk1"/>
-              </a:fontRef>
-            </p:style>
-            <p:txBody>
-              <a:bodyPr vert="vert" rtlCol="0" anchor="ctr"/>
-              <a:lstStyle/>
-              <a:p>
-                <a:pPr algn="ctr"/>
-                <a:r>
-                  <a:rPr lang="fi-FI" dirty="0"/>
-                  <a:t>5</a:t>
-                </a:r>
-              </a:p>
-            </p:txBody>
-          </p:sp>
-        </p:grpSp>
-        <p:sp>
-          <p:nvSpPr>
-            <p:cNvPr id="72" name="Tasakylkinen kolmio 45">
-              <a:extLst>
-                <a:ext uri="{FF2B5EF4-FFF2-40B4-BE49-F238E27FC236}">
-                  <a16:creationId xmlns="" xmlns:a16="http://schemas.microsoft.com/office/drawing/2014/main" id="{552DD7F1-6614-4407-96BE-0B42A9A9FEC7}"/>
-                </a:ext>
-              </a:extLst>
-            </p:cNvPr>
-            <p:cNvSpPr/>
-            <p:nvPr/>
-          </p:nvSpPr>
-          <p:spPr>
-            <a:xfrm rot="5400000">
-              <a:off x="6253508" y="1763572"/>
-              <a:ext cx="386667" cy="447192"/>
-            </a:xfrm>
-            <a:prstGeom prst="triangle">
-              <a:avLst/>
-            </a:prstGeom>
-          </p:spPr>
-          <p:style>
-            <a:lnRef idx="2">
-              <a:schemeClr val="accent6"/>
-            </a:lnRef>
-            <a:fillRef idx="1">
-              <a:schemeClr val="lt1"/>
-            </a:fillRef>
-            <a:effectRef idx="0">
-              <a:schemeClr val="accent6"/>
-            </a:effectRef>
-            <a:fontRef idx="minor">
-              <a:schemeClr val="dk1"/>
-            </a:fontRef>
-          </p:style>
-          <p:txBody>
-            <a:bodyPr vert="vert270" rtlCol="0" anchor="ctr"/>
-            <a:lstStyle/>
-            <a:p>
-              <a:pPr algn="ctr"/>
-              <a:r>
-                <a:rPr lang="fi-FI" sz="600" dirty="0" smtClean="0"/>
-                <a:t>150</a:t>
-              </a:r>
-              <a:endParaRPr lang="fi-FI" sz="600" dirty="0"/>
-            </a:p>
-          </p:txBody>
-        </p:sp>
-        <p:sp>
-          <p:nvSpPr>
-            <p:cNvPr id="73" name="Tasakylkinen kolmio 43">
-              <a:extLst>
-                <a:ext uri="{FF2B5EF4-FFF2-40B4-BE49-F238E27FC236}">
-                  <a16:creationId xmlns="" xmlns:a16="http://schemas.microsoft.com/office/drawing/2014/main" id="{39FA4BA9-140D-4177-87CC-E225E08D8180}"/>
-                </a:ext>
-              </a:extLst>
-            </p:cNvPr>
-            <p:cNvSpPr/>
-            <p:nvPr/>
-          </p:nvSpPr>
-          <p:spPr>
-            <a:xfrm rot="5400000">
-              <a:off x="6242007" y="1403203"/>
-              <a:ext cx="386667" cy="447192"/>
-            </a:xfrm>
-            <a:prstGeom prst="triangle">
-              <a:avLst/>
-            </a:prstGeom>
-          </p:spPr>
-          <p:style>
-            <a:lnRef idx="2">
-              <a:schemeClr val="accent6"/>
-            </a:lnRef>
-            <a:fillRef idx="1">
-              <a:schemeClr val="lt1"/>
-            </a:fillRef>
-            <a:effectRef idx="0">
-              <a:schemeClr val="accent6"/>
-            </a:effectRef>
-            <a:fontRef idx="minor">
-              <a:schemeClr val="dk1"/>
-            </a:fontRef>
-          </p:style>
-          <p:txBody>
-            <a:bodyPr vert="vert270" rtlCol="0" anchor="ctr"/>
-            <a:lstStyle/>
-            <a:p>
-              <a:pPr algn="ctr"/>
-              <a:endParaRPr lang="fi-FI" dirty="0"/>
-            </a:p>
-            <a:p>
-              <a:pPr algn="ctr"/>
-              <a:endParaRPr lang="fi-FI" dirty="0"/>
-            </a:p>
-          </p:txBody>
-        </p:sp>
-      </p:grpSp>
+        </p:nvSpPr>
+        <p:spPr>
+          <a:xfrm rot="5400000">
+            <a:off x="10179541" y="2400924"/>
+            <a:ext cx="717108" cy="427924"/>
+          </a:xfrm>
+          <a:prstGeom prst="triangle">
+            <a:avLst>
+              <a:gd name="adj" fmla="val 51325"/>
+            </a:avLst>
+          </a:prstGeom>
+        </p:spPr>
+        <p:style>
+          <a:lnRef idx="2">
+            <a:schemeClr val="accent6"/>
+          </a:lnRef>
+          <a:fillRef idx="1">
+            <a:schemeClr val="lt1"/>
+          </a:fillRef>
+          <a:effectRef idx="0">
+            <a:schemeClr val="accent6"/>
+          </a:effectRef>
+          <a:fontRef idx="minor">
+            <a:schemeClr val="dk1"/>
+          </a:fontRef>
+        </p:style>
+        <p:txBody>
+          <a:bodyPr vert="vert270" rtlCol="0" anchor="ctr"/>
+          <a:lstStyle/>
+          <a:p>
+            <a:pPr algn="ctr"/>
+            <a:r>
+              <a:rPr lang="fi-FI" dirty="0"/>
+              <a:t>2</a:t>
+            </a:r>
+          </a:p>
+        </p:txBody>
+      </p:sp>
       <p:cxnSp>
         <p:nvCxnSpPr>
-          <p:cNvPr id="75" name="Yhdistin: Kulma 22">
-            <a:extLst>
-              <a:ext uri="{FF2B5EF4-FFF2-40B4-BE49-F238E27FC236}">
-                <a16:creationId xmlns="" xmlns:a16="http://schemas.microsoft.com/office/drawing/2014/main" id="{60791C9F-5625-4EE9-AD9B-B26409AA9872}"/>
+          <p:cNvPr id="8" name="Yhdistin: Kulma 7">
+            <a:extLst>
+              <a:ext uri="{FF2B5EF4-FFF2-40B4-BE49-F238E27FC236}">
+                <a16:creationId xmlns:a16="http://schemas.microsoft.com/office/drawing/2014/main" id="{16BD989D-9FB6-4700-B212-1FFE70AF8076}"/>
               </a:ext>
             </a:extLst>
           </p:cNvPr>
           <p:cNvCxnSpPr>
             <a:cxnSpLocks/>
+            <a:stCxn id="49" idx="0"/>
+            <a:endCxn id="51" idx="0"/>
           </p:cNvCxnSpPr>
           <p:nvPr/>
         </p:nvCxnSpPr>
         <p:spPr>
-          <a:xfrm flipV="1">
-            <a:off x="6658937" y="967055"/>
-            <a:ext cx="3608007" cy="832275"/>
-          </a:xfrm>
-          <a:prstGeom prst="bentConnector3">
-            <a:avLst>
-              <a:gd name="adj1" fmla="val 106336"/>
-            </a:avLst>
-          </a:prstGeom>
-          <a:ln>
-            <a:tailEnd type="triangle"/>
-          </a:ln>
-        </p:spPr>
-        <p:style>
-          <a:lnRef idx="1">
-            <a:schemeClr val="accent1"/>
-          </a:lnRef>
-          <a:fillRef idx="0">
-            <a:schemeClr val="accent1"/>
-          </a:fillRef>
-          <a:effectRef idx="0">
-            <a:schemeClr val="accent1"/>
-          </a:effectRef>
-          <a:fontRef idx="minor">
-            <a:schemeClr val="tx1"/>
-          </a:fontRef>
-        </p:style>
-      </p:cxnSp>
-      <p:sp>
-        <p:nvSpPr>
-          <p:cNvPr id="79" name="Tekstiruutu 42">
-            <a:extLst>
-              <a:ext uri="{FF2B5EF4-FFF2-40B4-BE49-F238E27FC236}">
-                <a16:creationId xmlns="" xmlns:a16="http://schemas.microsoft.com/office/drawing/2014/main" id="{BC02B610-F398-461E-BC05-8637EF952F5A}"/>
-              </a:ext>
-            </a:extLst>
-          </p:cNvPr>
-          <p:cNvSpPr txBox="1"/>
-          <p:nvPr/>
-        </p:nvSpPr>
-        <p:spPr>
           <a:xfrm>
-            <a:off x="7073752" y="1465865"/>
-            <a:ext cx="4574656" cy="369332"/>
-          </a:xfrm>
-          <a:prstGeom prst="rect">
-            <a:avLst/>
-          </a:prstGeom>
-          <a:noFill/>
-        </p:spPr>
-        <p:txBody>
-          <a:bodyPr wrap="square" rtlCol="0">
-            <a:spAutoFit/>
-          </a:bodyPr>
-          <a:lstStyle/>
-          <a:p>
-            <a:r>
-              <a:rPr lang="fi-FI" dirty="0" smtClean="0"/>
-              <a:t>Temperature threshold to enter Off exceeded</a:t>
-            </a:r>
-            <a:endParaRPr lang="fi-FI" dirty="0"/>
-          </a:p>
-        </p:txBody>
-      </p:sp>
-      <p:sp>
-        <p:nvSpPr>
-          <p:cNvPr id="80" name="Tekstiruutu 42">
-            <a:extLst>
-              <a:ext uri="{FF2B5EF4-FFF2-40B4-BE49-F238E27FC236}">
-                <a16:creationId xmlns="" xmlns:a16="http://schemas.microsoft.com/office/drawing/2014/main" id="{BC02B610-F398-461E-BC05-8637EF952F5A}"/>
-              </a:ext>
-            </a:extLst>
-          </p:cNvPr>
-          <p:cNvSpPr txBox="1"/>
-          <p:nvPr/>
-        </p:nvSpPr>
-        <p:spPr>
-          <a:xfrm>
-            <a:off x="5472554" y="631312"/>
-            <a:ext cx="2319718" cy="646331"/>
-          </a:xfrm>
-          <a:prstGeom prst="rect">
-            <a:avLst/>
-          </a:prstGeom>
-          <a:noFill/>
-        </p:spPr>
-        <p:txBody>
-          <a:bodyPr wrap="square" rtlCol="0">
-            <a:spAutoFit/>
-          </a:bodyPr>
-          <a:lstStyle/>
-          <a:p>
-            <a:r>
-              <a:rPr lang="fi-FI" dirty="0" smtClean="0"/>
-              <a:t>Temperature threshold to exit Off exceeded</a:t>
-            </a:r>
-            <a:endParaRPr lang="fi-FI" dirty="0"/>
-          </a:p>
-        </p:txBody>
-      </p:sp>
-      <p:cxnSp>
-        <p:nvCxnSpPr>
-          <p:cNvPr id="81" name="Yhdistin: Kulma 22">
-            <a:extLst>
-              <a:ext uri="{FF2B5EF4-FFF2-40B4-BE49-F238E27FC236}">
-                <a16:creationId xmlns="" xmlns:a16="http://schemas.microsoft.com/office/drawing/2014/main" id="{60791C9F-5625-4EE9-AD9B-B26409AA9872}"/>
-              </a:ext>
-            </a:extLst>
-          </p:cNvPr>
-          <p:cNvCxnSpPr>
-            <a:cxnSpLocks/>
-          </p:cNvCxnSpPr>
-          <p:nvPr/>
-        </p:nvCxnSpPr>
-        <p:spPr>
-          <a:xfrm rot="10800000" flipV="1">
-            <a:off x="5368604" y="977040"/>
-            <a:ext cx="2366190" cy="644548"/>
+            <a:off x="4803544" y="497423"/>
+            <a:ext cx="4673614" cy="1757199"/>
           </a:xfrm>
           <a:prstGeom prst="bentConnector2">
             <a:avLst/>
           </a:prstGeom>
-          <a:ln>
+          <a:ln w="19050">
             <a:tailEnd type="triangle"/>
           </a:ln>
         </p:spPr>
@@ -5706,31 +5687,28 @@
       </p:cxnSp>
       <p:cxnSp>
         <p:nvCxnSpPr>
-          <p:cNvPr id="57" name="Yhdistin: Kulma 22">
-            <a:extLst>
-              <a:ext uri="{FF2B5EF4-FFF2-40B4-BE49-F238E27FC236}">
-                <a16:creationId xmlns="" xmlns:a16="http://schemas.microsoft.com/office/drawing/2014/main" id="{60791C9F-5625-4EE9-AD9B-B26409AA9872}"/>
+          <p:cNvPr id="13" name="Suora nuoliyhdysviiva 12">
+            <a:extLst>
+              <a:ext uri="{FF2B5EF4-FFF2-40B4-BE49-F238E27FC236}">
+                <a16:creationId xmlns:a16="http://schemas.microsoft.com/office/drawing/2014/main" id="{E7364C05-771F-49E3-8A51-D2B6C114928F}"/>
               </a:ext>
             </a:extLst>
           </p:cNvPr>
           <p:cNvCxnSpPr>
             <a:cxnSpLocks/>
+            <a:stCxn id="50" idx="0"/>
           </p:cNvCxnSpPr>
           <p:nvPr/>
         </p:nvCxnSpPr>
         <p:spPr>
-          <a:xfrm>
-            <a:off x="4623102" y="675957"/>
-            <a:ext cx="5643842" cy="291098"/>
-          </a:xfrm>
-          <a:prstGeom prst="bentConnector5">
-            <a:avLst>
-              <a:gd name="adj1" fmla="val 11111"/>
-              <a:gd name="adj2" fmla="val -101997"/>
-              <a:gd name="adj3" fmla="val 104050"/>
-            </a:avLst>
+          <a:xfrm flipV="1">
+            <a:off x="6829390" y="1614453"/>
+            <a:ext cx="2647768" cy="23833"/>
+          </a:xfrm>
+          <a:prstGeom prst="straightConnector1">
+            <a:avLst/>
           </a:prstGeom>
-          <a:ln>
+          <a:ln w="19050">
             <a:tailEnd type="triangle"/>
           </a:ln>
         </p:spPr>
@@ -5749,265 +5727,54 @@
           </a:fontRef>
         </p:style>
       </p:cxnSp>
-      <p:grpSp>
-        <p:nvGrpSpPr>
-          <p:cNvPr id="78" name="Group 77"/>
-          <p:cNvGrpSpPr/>
+      <p:cxnSp>
+        <p:nvCxnSpPr>
+          <p:cNvPr id="21" name="Suora nuoliyhdysviiva 20">
+            <a:extLst>
+              <a:ext uri="{FF2B5EF4-FFF2-40B4-BE49-F238E27FC236}">
+                <a16:creationId xmlns:a16="http://schemas.microsoft.com/office/drawing/2014/main" id="{4853092D-3296-4DDE-BEC9-99986D3CB191}"/>
+              </a:ext>
+            </a:extLst>
+          </p:cNvPr>
+          <p:cNvCxnSpPr>
+            <a:cxnSpLocks/>
+            <a:stCxn id="54" idx="0"/>
+          </p:cNvCxnSpPr>
           <p:nvPr/>
-        </p:nvGrpSpPr>
-        <p:grpSpPr>
+        </p:nvCxnSpPr>
+        <p:spPr>
           <a:xfrm>
-            <a:off x="2019247" y="470164"/>
-            <a:ext cx="2603855" cy="740369"/>
-            <a:chOff x="2019247" y="297634"/>
-            <a:chExt cx="2603855" cy="740369"/>
-          </a:xfrm>
-        </p:grpSpPr>
-        <p:grpSp>
-          <p:nvGrpSpPr>
-            <p:cNvPr id="70" name="Group 69"/>
-            <p:cNvGrpSpPr/>
-            <p:nvPr/>
-          </p:nvGrpSpPr>
-          <p:grpSpPr>
-            <a:xfrm>
-              <a:off x="2019247" y="297634"/>
-              <a:ext cx="2145714" cy="723485"/>
-              <a:chOff x="2019247" y="297634"/>
-              <a:chExt cx="2145714" cy="723485"/>
-            </a:xfrm>
-          </p:grpSpPr>
-          <p:sp>
-            <p:nvSpPr>
-              <p:cNvPr id="36" name="Vuokaavio: Prosessi 35">
-                <a:extLst>
-                  <a:ext uri="{FF2B5EF4-FFF2-40B4-BE49-F238E27FC236}">
-                    <a16:creationId xmlns="" xmlns:a16="http://schemas.microsoft.com/office/drawing/2014/main" id="{90497816-96AC-43D8-AAB9-F35DC3844092}"/>
-                  </a:ext>
-                </a:extLst>
-              </p:cNvPr>
-              <p:cNvSpPr/>
-              <p:nvPr/>
-            </p:nvSpPr>
-            <p:spPr>
-              <a:xfrm>
-                <a:off x="2471011" y="302301"/>
-                <a:ext cx="1693950" cy="718818"/>
-              </a:xfrm>
-              <a:prstGeom prst="flowChartProcess">
-                <a:avLst/>
-              </a:prstGeom>
-              <a:solidFill>
-                <a:schemeClr val="accent5">
-                  <a:lumMod val="20000"/>
-                  <a:lumOff val="80000"/>
-                </a:schemeClr>
-              </a:solidFill>
-              <a:ln w="15875">
-                <a:solidFill>
-                  <a:schemeClr val="tx1"/>
-                </a:solidFill>
-              </a:ln>
-            </p:spPr>
-            <p:style>
-              <a:lnRef idx="2">
-                <a:schemeClr val="accent6"/>
-              </a:lnRef>
-              <a:fillRef idx="1">
-                <a:schemeClr val="lt1"/>
-              </a:fillRef>
-              <a:effectRef idx="0">
-                <a:schemeClr val="accent6"/>
-              </a:effectRef>
-              <a:fontRef idx="minor">
-                <a:schemeClr val="dk1"/>
-              </a:fontRef>
-            </p:style>
-            <p:txBody>
-              <a:bodyPr rtlCol="0" anchor="ctr"/>
-              <a:lstStyle/>
-              <a:p>
-                <a:pPr algn="ctr"/>
-                <a:r>
-                  <a:rPr lang="fi-FI" dirty="0" err="1"/>
-                  <a:t>Reset</a:t>
-                </a:r>
-                <a:r>
-                  <a:rPr lang="fi-FI" dirty="0"/>
-                  <a:t>(-4)</a:t>
-                </a:r>
-              </a:p>
-              <a:p>
-                <a:pPr algn="ctr"/>
-                <a:r>
-                  <a:rPr lang="fi-FI" dirty="0"/>
-                  <a:t>RELAY OFF</a:t>
-                </a:r>
-              </a:p>
-            </p:txBody>
-          </p:sp>
-          <p:sp>
-            <p:nvSpPr>
-              <p:cNvPr id="38" name="Tasakylkinen kolmio 37">
-                <a:extLst>
-                  <a:ext uri="{FF2B5EF4-FFF2-40B4-BE49-F238E27FC236}">
-                    <a16:creationId xmlns="" xmlns:a16="http://schemas.microsoft.com/office/drawing/2014/main" id="{C40A5B0E-8DDF-4E0E-8AB8-1B35DA2D6D26}"/>
-                  </a:ext>
-                </a:extLst>
-              </p:cNvPr>
-              <p:cNvSpPr/>
-              <p:nvPr/>
-            </p:nvSpPr>
-            <p:spPr>
-              <a:xfrm rot="16200000">
-                <a:off x="1885474" y="431407"/>
-                <a:ext cx="718817" cy="451271"/>
-              </a:xfrm>
-              <a:prstGeom prst="triangle">
-                <a:avLst/>
-              </a:prstGeom>
-              <a:ln w="15875">
-                <a:solidFill>
-                  <a:schemeClr val="tx1"/>
-                </a:solidFill>
-              </a:ln>
-            </p:spPr>
-            <p:style>
-              <a:lnRef idx="2">
-                <a:schemeClr val="accent6"/>
-              </a:lnRef>
-              <a:fillRef idx="1">
-                <a:schemeClr val="lt1"/>
-              </a:fillRef>
-              <a:effectRef idx="0">
-                <a:schemeClr val="accent6"/>
-              </a:effectRef>
-              <a:fontRef idx="minor">
-                <a:schemeClr val="dk1"/>
-              </a:fontRef>
-            </p:style>
-            <p:txBody>
-              <a:bodyPr vert="vert" rtlCol="0" anchor="ctr"/>
-              <a:lstStyle/>
-              <a:p>
-                <a:pPr algn="ctr"/>
-                <a:r>
-                  <a:rPr lang="fi-FI" dirty="0"/>
-                  <a:t>0</a:t>
-                </a:r>
-              </a:p>
-            </p:txBody>
-          </p:sp>
-        </p:grpSp>
-        <p:sp>
-          <p:nvSpPr>
-            <p:cNvPr id="74" name="Tasakylkinen kolmio 45">
-              <a:extLst>
-                <a:ext uri="{FF2B5EF4-FFF2-40B4-BE49-F238E27FC236}">
-                  <a16:creationId xmlns="" xmlns:a16="http://schemas.microsoft.com/office/drawing/2014/main" id="{552DD7F1-6614-4407-96BE-0B42A9A9FEC7}"/>
-                </a:ext>
-              </a:extLst>
-            </p:cNvPr>
-            <p:cNvSpPr/>
-            <p:nvPr/>
-          </p:nvSpPr>
-          <p:spPr>
-            <a:xfrm rot="5400000">
-              <a:off x="4206172" y="279830"/>
-              <a:ext cx="386667" cy="447192"/>
-            </a:xfrm>
-            <a:prstGeom prst="triangle">
-              <a:avLst/>
-            </a:prstGeom>
-            <a:ln w="15875">
-              <a:solidFill>
-                <a:schemeClr val="tx1"/>
-              </a:solidFill>
-            </a:ln>
-          </p:spPr>
-          <p:style>
-            <a:lnRef idx="2">
-              <a:schemeClr val="accent6"/>
-            </a:lnRef>
-            <a:fillRef idx="1">
-              <a:schemeClr val="lt1"/>
-            </a:fillRef>
-            <a:effectRef idx="0">
-              <a:schemeClr val="accent6"/>
-            </a:effectRef>
-            <a:fontRef idx="minor">
-              <a:schemeClr val="dk1"/>
-            </a:fontRef>
-          </p:style>
-          <p:txBody>
-            <a:bodyPr vert="vert270" rtlCol="0" anchor="ctr"/>
-            <a:lstStyle/>
-            <a:p>
-              <a:pPr algn="ctr"/>
-              <a:endParaRPr lang="fi-FI" dirty="0"/>
-            </a:p>
-          </p:txBody>
-        </p:sp>
-        <p:sp>
-          <p:nvSpPr>
-            <p:cNvPr id="76" name="Tasakylkinen kolmio 43">
-              <a:extLst>
-                <a:ext uri="{FF2B5EF4-FFF2-40B4-BE49-F238E27FC236}">
-                  <a16:creationId xmlns="" xmlns:a16="http://schemas.microsoft.com/office/drawing/2014/main" id="{39FA4BA9-140D-4177-87CC-E225E08D8180}"/>
-                </a:ext>
-              </a:extLst>
-            </p:cNvPr>
-            <p:cNvSpPr/>
-            <p:nvPr/>
-          </p:nvSpPr>
-          <p:spPr>
-            <a:xfrm rot="5400000">
-              <a:off x="4206172" y="621074"/>
-              <a:ext cx="386667" cy="447192"/>
-            </a:xfrm>
-            <a:prstGeom prst="triangle">
-              <a:avLst/>
-            </a:prstGeom>
-            <a:ln w="15875">
-              <a:solidFill>
-                <a:schemeClr val="tx1"/>
-              </a:solidFill>
-            </a:ln>
-          </p:spPr>
-          <p:style>
-            <a:lnRef idx="2">
-              <a:schemeClr val="accent6"/>
-            </a:lnRef>
-            <a:fillRef idx="1">
-              <a:schemeClr val="lt1"/>
-            </a:fillRef>
-            <a:effectRef idx="0">
-              <a:schemeClr val="accent6"/>
-            </a:effectRef>
-            <a:fontRef idx="minor">
-              <a:schemeClr val="dk1"/>
-            </a:fontRef>
-          </p:style>
-          <p:txBody>
-            <a:bodyPr vert="vert270" rtlCol="0" anchor="ctr"/>
-            <a:lstStyle/>
-            <a:p>
-              <a:pPr algn="ctr"/>
-              <a:endParaRPr lang="fi-FI" dirty="0"/>
-            </a:p>
-            <a:p>
-              <a:pPr algn="ctr"/>
-              <a:endParaRPr lang="fi-FI" dirty="0"/>
-            </a:p>
-          </p:txBody>
-        </p:sp>
-      </p:grpSp>
-      <p:sp>
-        <p:nvSpPr>
-          <p:cNvPr id="90" name="Tekstiruutu 42">
-            <a:extLst>
-              <a:ext uri="{FF2B5EF4-FFF2-40B4-BE49-F238E27FC236}">
-                <a16:creationId xmlns="" xmlns:a16="http://schemas.microsoft.com/office/drawing/2014/main" id="{BC02B610-F398-461E-BC05-8637EF952F5A}"/>
+            <a:off x="10752057" y="2624388"/>
+            <a:ext cx="792358" cy="0"/>
+          </a:xfrm>
+          <a:prstGeom prst="straightConnector1">
+            <a:avLst/>
+          </a:prstGeom>
+          <a:ln w="19050">
+            <a:tailEnd type="triangle"/>
+          </a:ln>
+        </p:spPr>
+        <p:style>
+          <a:lnRef idx="1">
+            <a:schemeClr val="accent1"/>
+          </a:lnRef>
+          <a:fillRef idx="0">
+            <a:schemeClr val="accent1"/>
+          </a:fillRef>
+          <a:effectRef idx="0">
+            <a:schemeClr val="accent1"/>
+          </a:effectRef>
+          <a:fontRef idx="minor">
+            <a:schemeClr val="tx1"/>
+          </a:fontRef>
+        </p:style>
+      </p:cxnSp>
+      <p:sp>
+        <p:nvSpPr>
+          <p:cNvPr id="64" name="Tekstiruutu 63">
+            <a:extLst>
+              <a:ext uri="{FF2B5EF4-FFF2-40B4-BE49-F238E27FC236}">
+                <a16:creationId xmlns:a16="http://schemas.microsoft.com/office/drawing/2014/main" id="{C045F270-9ADD-46F3-9933-88C8F52172B4}"/>
               </a:ext>
             </a:extLst>
           </p:cNvPr>
@@ -6016,8 +5783,8 @@
         </p:nvSpPr>
         <p:spPr>
           <a:xfrm>
-            <a:off x="5334091" y="74764"/>
-            <a:ext cx="4574656" cy="369332"/>
+            <a:off x="10540177" y="1322711"/>
+            <a:ext cx="1491044" cy="1200329"/>
           </a:xfrm>
           <a:prstGeom prst="rect">
             <a:avLst/>
@@ -6031,8 +5798,152 @@
           <a:lstStyle/>
           <a:p>
             <a:r>
-              <a:rPr lang="fi-FI" dirty="0" smtClean="0"/>
-              <a:t>Temperature threshold to enter Off exceeded</a:t>
+              <a:rPr lang="fi-FI" dirty="0" err="1"/>
+              <a:t>OutdoorT</a:t>
+            </a:r>
+            <a:r>
+              <a:rPr lang="fi-FI" dirty="0"/>
+              <a:t> </a:t>
+            </a:r>
+            <a:r>
+              <a:rPr lang="fi-FI" dirty="0" err="1"/>
+              <a:t>enables</a:t>
+            </a:r>
+            <a:r>
+              <a:rPr lang="fi-FI" dirty="0"/>
+              <a:t>  </a:t>
+            </a:r>
+            <a:r>
+              <a:rPr lang="fi-FI" dirty="0" err="1"/>
+              <a:t>defrost</a:t>
+            </a:r>
+            <a:r>
+              <a:rPr lang="fi-FI" dirty="0"/>
+              <a:t> </a:t>
+            </a:r>
+            <a:r>
+              <a:rPr lang="fi-FI" dirty="0" err="1"/>
+              <a:t>hacking</a:t>
+            </a:r>
+            <a:endParaRPr lang="fi-FI" dirty="0"/>
+          </a:p>
+        </p:txBody>
+      </p:sp>
+      <p:sp>
+        <p:nvSpPr>
+          <p:cNvPr id="69" name="Tekstiruutu 68">
+            <a:extLst>
+              <a:ext uri="{FF2B5EF4-FFF2-40B4-BE49-F238E27FC236}">
+                <a16:creationId xmlns:a16="http://schemas.microsoft.com/office/drawing/2014/main" id="{66E0D612-098F-4653-A3D9-F9ED33C4C2E0}"/>
+              </a:ext>
+            </a:extLst>
+          </p:cNvPr>
+          <p:cNvSpPr txBox="1"/>
+          <p:nvPr/>
+        </p:nvSpPr>
+        <p:spPr>
+          <a:xfrm>
+            <a:off x="8388529" y="1262649"/>
+            <a:ext cx="2073181" cy="646331"/>
+          </a:xfrm>
+          <a:prstGeom prst="rect">
+            <a:avLst/>
+          </a:prstGeom>
+          <a:noFill/>
+        </p:spPr>
+        <p:txBody>
+          <a:bodyPr wrap="square" rtlCol="0">
+            <a:spAutoFit/>
+          </a:bodyPr>
+          <a:lstStyle/>
+          <a:p>
+            <a:r>
+              <a:rPr lang="fi-FI" dirty="0" err="1"/>
+              <a:t>OutdoorT</a:t>
+            </a:r>
+            <a:r>
+              <a:rPr lang="fi-FI" dirty="0"/>
+              <a:t> </a:t>
+            </a:r>
+            <a:r>
+              <a:rPr lang="fi-FI" dirty="0" err="1"/>
+              <a:t>disables</a:t>
+            </a:r>
+            <a:r>
+              <a:rPr lang="fi-FI" dirty="0"/>
+              <a:t>  </a:t>
+            </a:r>
+            <a:r>
+              <a:rPr lang="fi-FI" dirty="0" err="1"/>
+              <a:t>defrost</a:t>
+            </a:r>
+            <a:r>
+              <a:rPr lang="fi-FI" dirty="0"/>
+              <a:t> </a:t>
+            </a:r>
+            <a:r>
+              <a:rPr lang="fi-FI" dirty="0" err="1"/>
+              <a:t>hacking</a:t>
+            </a:r>
+            <a:endParaRPr lang="fi-FI" dirty="0"/>
+          </a:p>
+        </p:txBody>
+      </p:sp>
+      <p:sp>
+        <p:nvSpPr>
+          <p:cNvPr id="71" name="Tekstiruutu 70">
+            <a:extLst>
+              <a:ext uri="{FF2B5EF4-FFF2-40B4-BE49-F238E27FC236}">
+                <a16:creationId xmlns:a16="http://schemas.microsoft.com/office/drawing/2014/main" id="{7BD0CB07-FBE9-44BA-83DA-172F048038C6}"/>
+              </a:ext>
+            </a:extLst>
+          </p:cNvPr>
+          <p:cNvSpPr txBox="1"/>
+          <p:nvPr/>
+        </p:nvSpPr>
+        <p:spPr>
+          <a:xfrm>
+            <a:off x="6315348" y="157760"/>
+            <a:ext cx="2073181" cy="646331"/>
+          </a:xfrm>
+          <a:prstGeom prst="rect">
+            <a:avLst/>
+          </a:prstGeom>
+          <a:noFill/>
+        </p:spPr>
+        <p:txBody>
+          <a:bodyPr wrap="square" rtlCol="0">
+            <a:spAutoFit/>
+          </a:bodyPr>
+          <a:lstStyle/>
+          <a:p>
+            <a:r>
+              <a:rPr lang="fi-FI" dirty="0" err="1"/>
+              <a:t>OutdoorT</a:t>
+            </a:r>
+            <a:r>
+              <a:rPr lang="fi-FI" dirty="0"/>
+              <a:t> </a:t>
+            </a:r>
+            <a:r>
+              <a:rPr lang="fi-FI" dirty="0" err="1"/>
+              <a:t>disables</a:t>
+            </a:r>
+            <a:r>
+              <a:rPr lang="fi-FI" dirty="0"/>
+              <a:t>  </a:t>
+            </a:r>
+            <a:r>
+              <a:rPr lang="fi-FI" dirty="0" err="1"/>
+              <a:t>defrost</a:t>
+            </a:r>
+            <a:r>
+              <a:rPr lang="fi-FI" dirty="0"/>
+              <a:t> </a:t>
+            </a:r>
+            <a:r>
+              <a:rPr lang="fi-FI" dirty="0" err="1"/>
+              <a:t>hacking</a:t>
             </a:r>
             <a:endParaRPr lang="fi-FI" dirty="0"/>
           </a:p>
@@ -6041,7 +5952,7 @@
     </p:spTree>
     <p:extLst>
       <p:ext uri="{BB962C8B-B14F-4D97-AF65-F5344CB8AC3E}">
-        <p14:creationId xmlns="" xmlns:p14="http://schemas.microsoft.com/office/powerpoint/2010/main" val="4065499932"/>
+        <p14:creationId xmlns:p14="http://schemas.microsoft.com/office/powerpoint/2010/main" val="4065499932"/>
       </p:ext>
     </p:extLst>
   </p:cSld>
@@ -6094,7 +6005,7 @@
     </a:clrScheme>
     <a:fontScheme name="Office">
       <a:majorFont>
-        <a:latin typeface="Calibri Light"/>
+        <a:latin typeface="Calibri Light" panose="020F0302020204030204"/>
         <a:ea typeface=""/>
         <a:cs typeface=""/>
         <a:font script="Jpan" typeface="游ゴシック Light"/>
@@ -6146,7 +6057,7 @@
         <a:font script="Tfng" typeface="Ebrima"/>
       </a:majorFont>
       <a:minorFont>
-        <a:latin typeface="Calibri"/>
+        <a:latin typeface="Calibri" panose="020F0502020204030204"/>
         <a:ea typeface=""/>
         <a:cs typeface=""/>
         <a:font script="Jpan" typeface="游ゴシック"/>
@@ -6340,7 +6251,7 @@
   <a:extraClrSchemeLst/>
   <a:extLst>
     <a:ext uri="{05A4C25C-085E-4340-85A3-A5531E510DB2}">
-      <thm15:themeFamily xmlns="" xmlns:thm15="http://schemas.microsoft.com/office/thememl/2012/main" name="Office Theme" id="{62F939B6-93AF-4DB8-9C6B-D6C7DFDC589F}" vid="{4A3C46E8-61CC-4603-A589-7422A47A8E4A}"/>
+      <thm15:themeFamily xmlns:thm15="http://schemas.microsoft.com/office/thememl/2012/main" name="Office Theme" id="{62F939B6-93AF-4DB8-9C6B-D6C7DFDC589F}" vid="{4A3C46E8-61CC-4603-A589-7422A47A8E4A}"/>
     </a:ext>
   </a:extLst>
 </a:theme>

</xml_diff>

<commit_message>
Added Off state in the state machine flowchart (#20)
* Added Off state in the state machine flowchart
</commit_message>
<xml_diff>
--- a/Pictures/StateMachine.pptx
+++ b/Pictures/StateMachine.pptx
@@ -259,7 +259,7 @@
           <a:p>
             <a:fld id="{978E5B9B-AA1C-4837-A679-92CCBB0596D1}" type="datetimeFigureOut">
               <a:rPr lang="fi-FI" smtClean="0"/>
-              <a:t>13.3.2021</a:t>
+              <a:t>18.3.2021</a:t>
             </a:fld>
             <a:endParaRPr lang="fi-FI"/>
           </a:p>
@@ -457,7 +457,7 @@
           <a:p>
             <a:fld id="{978E5B9B-AA1C-4837-A679-92CCBB0596D1}" type="datetimeFigureOut">
               <a:rPr lang="fi-FI" smtClean="0"/>
-              <a:t>13.3.2021</a:t>
+              <a:t>18.3.2021</a:t>
             </a:fld>
             <a:endParaRPr lang="fi-FI"/>
           </a:p>
@@ -665,7 +665,7 @@
           <a:p>
             <a:fld id="{978E5B9B-AA1C-4837-A679-92CCBB0596D1}" type="datetimeFigureOut">
               <a:rPr lang="fi-FI" smtClean="0"/>
-              <a:t>13.3.2021</a:t>
+              <a:t>18.3.2021</a:t>
             </a:fld>
             <a:endParaRPr lang="fi-FI"/>
           </a:p>
@@ -863,7 +863,7 @@
           <a:p>
             <a:fld id="{978E5B9B-AA1C-4837-A679-92CCBB0596D1}" type="datetimeFigureOut">
               <a:rPr lang="fi-FI" smtClean="0"/>
-              <a:t>13.3.2021</a:t>
+              <a:t>18.3.2021</a:t>
             </a:fld>
             <a:endParaRPr lang="fi-FI"/>
           </a:p>
@@ -1138,7 +1138,7 @@
           <a:p>
             <a:fld id="{978E5B9B-AA1C-4837-A679-92CCBB0596D1}" type="datetimeFigureOut">
               <a:rPr lang="fi-FI" smtClean="0"/>
-              <a:t>13.3.2021</a:t>
+              <a:t>18.3.2021</a:t>
             </a:fld>
             <a:endParaRPr lang="fi-FI"/>
           </a:p>
@@ -1403,7 +1403,7 @@
           <a:p>
             <a:fld id="{978E5B9B-AA1C-4837-A679-92CCBB0596D1}" type="datetimeFigureOut">
               <a:rPr lang="fi-FI" smtClean="0"/>
-              <a:t>13.3.2021</a:t>
+              <a:t>18.3.2021</a:t>
             </a:fld>
             <a:endParaRPr lang="fi-FI"/>
           </a:p>
@@ -1815,7 +1815,7 @@
           <a:p>
             <a:fld id="{978E5B9B-AA1C-4837-A679-92CCBB0596D1}" type="datetimeFigureOut">
               <a:rPr lang="fi-FI" smtClean="0"/>
-              <a:t>13.3.2021</a:t>
+              <a:t>18.3.2021</a:t>
             </a:fld>
             <a:endParaRPr lang="fi-FI"/>
           </a:p>
@@ -1956,7 +1956,7 @@
           <a:p>
             <a:fld id="{978E5B9B-AA1C-4837-A679-92CCBB0596D1}" type="datetimeFigureOut">
               <a:rPr lang="fi-FI" smtClean="0"/>
-              <a:t>13.3.2021</a:t>
+              <a:t>18.3.2021</a:t>
             </a:fld>
             <a:endParaRPr lang="fi-FI"/>
           </a:p>
@@ -2069,7 +2069,7 @@
           <a:p>
             <a:fld id="{978E5B9B-AA1C-4837-A679-92CCBB0596D1}" type="datetimeFigureOut">
               <a:rPr lang="fi-FI" smtClean="0"/>
-              <a:t>13.3.2021</a:t>
+              <a:t>18.3.2021</a:t>
             </a:fld>
             <a:endParaRPr lang="fi-FI"/>
           </a:p>
@@ -2380,7 +2380,7 @@
           <a:p>
             <a:fld id="{978E5B9B-AA1C-4837-A679-92CCBB0596D1}" type="datetimeFigureOut">
               <a:rPr lang="fi-FI" smtClean="0"/>
-              <a:t>13.3.2021</a:t>
+              <a:t>18.3.2021</a:t>
             </a:fld>
             <a:endParaRPr lang="fi-FI"/>
           </a:p>
@@ -2668,7 +2668,7 @@
           <a:p>
             <a:fld id="{978E5B9B-AA1C-4837-A679-92CCBB0596D1}" type="datetimeFigureOut">
               <a:rPr lang="fi-FI" smtClean="0"/>
-              <a:t>13.3.2021</a:t>
+              <a:t>18.3.2021</a:t>
             </a:fld>
             <a:endParaRPr lang="fi-FI"/>
           </a:p>
@@ -2909,7 +2909,7 @@
           <a:p>
             <a:fld id="{978E5B9B-AA1C-4837-A679-92CCBB0596D1}" type="datetimeFigureOut">
               <a:rPr lang="fi-FI" smtClean="0"/>
-              <a:t>13.3.2021</a:t>
+              <a:t>18.3.2021</a:t>
             </a:fld>
             <a:endParaRPr lang="fi-FI"/>
           </a:p>
@@ -3711,7 +3711,7 @@
             <a:pPr algn="ctr"/>
             <a:r>
               <a:rPr lang="fi-FI" dirty="0"/>
-              <a:t> RELAY OFF</a:t>
+              <a:t>(RELAY OFF</a:t>
             </a:r>
           </a:p>
         </p:txBody>
@@ -3780,13 +3780,13 @@
         </p:nvCxnSpPr>
         <p:spPr>
           <a:xfrm>
-            <a:off x="7206470" y="1817994"/>
-            <a:ext cx="507490" cy="1942288"/>
+            <a:off x="7111462" y="1989980"/>
+            <a:ext cx="644583" cy="1781642"/>
           </a:xfrm>
           <a:prstGeom prst="bentConnector2">
             <a:avLst/>
           </a:prstGeom>
-          <a:ln>
+          <a:ln w="19050">
             <a:tailEnd type="triangle"/>
           </a:ln>
         </p:spPr>
@@ -3829,7 +3829,7 @@
           <a:prstGeom prst="bentConnector2">
             <a:avLst/>
           </a:prstGeom>
-          <a:ln>
+          <a:ln w="19050">
             <a:tailEnd type="triangle"/>
           </a:ln>
         </p:spPr>
@@ -3977,7 +3977,7 @@
           <a:prstGeom prst="bentConnector2">
             <a:avLst/>
           </a:prstGeom>
-          <a:ln>
+          <a:ln w="19050">
             <a:tailEnd type="triangle"/>
           </a:ln>
         </p:spPr>
@@ -4021,7 +4021,7 @@
               <a:gd name="adj1" fmla="val -71339"/>
             </a:avLst>
           </a:prstGeom>
-          <a:ln>
+          <a:ln w="19050">
             <a:tailEnd type="triangle"/>
           </a:ln>
         </p:spPr>
@@ -4063,7 +4063,7 @@
           <a:prstGeom prst="bentConnector2">
             <a:avLst/>
           </a:prstGeom>
-          <a:ln>
+          <a:ln w="19050">
             <a:tailEnd type="triangle"/>
           </a:ln>
         </p:spPr>
@@ -4106,7 +4106,7 @@
           <a:prstGeom prst="bentConnector2">
             <a:avLst/>
           </a:prstGeom>
-          <a:ln>
+          <a:ln w="19050">
             <a:tailEnd type="triangle"/>
           </a:ln>
         </p:spPr>
@@ -4139,8 +4139,8 @@
         </p:nvSpPr>
         <p:spPr>
           <a:xfrm>
-            <a:off x="7067066" y="1427457"/>
-            <a:ext cx="2855842" cy="369332"/>
+            <a:off x="7160112" y="1902984"/>
+            <a:ext cx="1534009" cy="646331"/>
           </a:xfrm>
           <a:prstGeom prst="rect">
             <a:avLst/>
@@ -4364,7 +4364,7 @@
               <a:gd name="adj1" fmla="val -8635"/>
             </a:avLst>
           </a:prstGeom>
-          <a:ln>
+          <a:ln w="19050">
             <a:tailEnd type="triangle"/>
           </a:ln>
         </p:spPr>
@@ -4505,8 +4505,8 @@
         </p:nvSpPr>
         <p:spPr>
           <a:xfrm rot="5400000">
-            <a:off x="6354290" y="1315698"/>
-            <a:ext cx="718817" cy="985542"/>
+            <a:off x="6499350" y="1545465"/>
+            <a:ext cx="344319" cy="879904"/>
           </a:xfrm>
           <a:prstGeom prst="triangle">
             <a:avLst>
@@ -4601,7 +4601,7 @@
         </p:nvSpPr>
         <p:spPr>
           <a:xfrm>
-            <a:off x="4170454" y="2313555"/>
+            <a:off x="4114583" y="2313834"/>
             <a:ext cx="3167183" cy="369332"/>
           </a:xfrm>
           <a:prstGeom prst="rect">
@@ -4859,7 +4859,7 @@
               <a:gd name="adj2" fmla="val 113596"/>
             </a:avLst>
           </a:prstGeom>
-          <a:ln>
+          <a:ln w="19050">
             <a:tailEnd type="triangle"/>
           </a:ln>
         </p:spPr>
@@ -4950,15 +4950,15 @@
         </p:nvCxnSpPr>
         <p:spPr>
           <a:xfrm>
-            <a:off x="4229162" y="2642784"/>
-            <a:ext cx="3505138" cy="5166"/>
+            <a:off x="4229162" y="2642785"/>
+            <a:ext cx="3526266" cy="4058"/>
           </a:xfrm>
           <a:prstGeom prst="bentConnector3">
             <a:avLst>
               <a:gd name="adj1" fmla="val 50000"/>
             </a:avLst>
           </a:prstGeom>
-          <a:ln>
+          <a:ln w="19050">
             <a:tailEnd type="triangle"/>
           </a:ln>
         </p:spPr>
@@ -5055,8 +5055,8 @@
         </p:nvSpPr>
         <p:spPr>
           <a:xfrm rot="5400000">
-            <a:off x="4136210" y="354615"/>
-            <a:ext cx="718817" cy="639716"/>
+            <a:off x="4307200" y="525605"/>
+            <a:ext cx="376838" cy="639716"/>
           </a:xfrm>
           <a:prstGeom prst="triangle">
             <a:avLst>
@@ -5083,7 +5083,10 @@
           <a:lstStyle/>
           <a:p>
             <a:pPr algn="ctr"/>
-            <a:endParaRPr lang="fi-FI" dirty="0"/>
+            <a:r>
+              <a:rPr lang="fi-FI" dirty="0"/>
+              <a:t>0</a:t>
+            </a:r>
           </a:p>
         </p:txBody>
       </p:sp>
@@ -5255,12 +5258,12 @@
         <p:spPr>
           <a:xfrm>
             <a:off x="4229162" y="2973440"/>
-            <a:ext cx="3484798" cy="1953"/>
+            <a:ext cx="3526266" cy="39555"/>
           </a:xfrm>
           <a:prstGeom prst="bentConnector3">
             <a:avLst/>
           </a:prstGeom>
-          <a:ln>
+          <a:ln w="19050">
             <a:tailEnd type="triangle"/>
           </a:ln>
         </p:spPr>
@@ -5305,7 +5308,7 @@
               <a:gd name="adj2" fmla="val 92941"/>
             </a:avLst>
           </a:prstGeom>
-          <a:ln>
+          <a:ln w="19050">
             <a:tailEnd type="triangle"/>
           </a:ln>
         </p:spPr>
@@ -5403,13 +5406,13 @@
         </p:nvCxnSpPr>
         <p:spPr>
           <a:xfrm>
-            <a:off x="4815477" y="683998"/>
-            <a:ext cx="553127" cy="765060"/>
+            <a:off x="4815477" y="850456"/>
+            <a:ext cx="553127" cy="598602"/>
           </a:xfrm>
           <a:prstGeom prst="bentConnector2">
             <a:avLst/>
           </a:prstGeom>
-          <a:ln>
+          <a:ln w="19050">
             <a:tailEnd type="triangle"/>
           </a:ln>
         </p:spPr>
@@ -5428,6 +5431,524 @@
           </a:fontRef>
         </p:style>
       </p:cxnSp>
+      <p:sp>
+        <p:nvSpPr>
+          <p:cNvPr id="49" name="Tasakylkinen kolmio 48">
+            <a:extLst>
+              <a:ext uri="{FF2B5EF4-FFF2-40B4-BE49-F238E27FC236}">
+                <a16:creationId xmlns:a16="http://schemas.microsoft.com/office/drawing/2014/main" id="{A9052E31-C27F-4824-B534-1F6444652227}"/>
+              </a:ext>
+            </a:extLst>
+          </p:cNvPr>
+          <p:cNvSpPr/>
+          <p:nvPr/>
+        </p:nvSpPr>
+        <p:spPr>
+          <a:xfrm rot="5400000">
+            <a:off x="4295267" y="172572"/>
+            <a:ext cx="376838" cy="639716"/>
+          </a:xfrm>
+          <a:prstGeom prst="triangle">
+            <a:avLst>
+              <a:gd name="adj" fmla="val 51325"/>
+            </a:avLst>
+          </a:prstGeom>
+        </p:spPr>
+        <p:style>
+          <a:lnRef idx="2">
+            <a:schemeClr val="accent6"/>
+          </a:lnRef>
+          <a:fillRef idx="1">
+            <a:schemeClr val="lt1"/>
+          </a:fillRef>
+          <a:effectRef idx="0">
+            <a:schemeClr val="accent6"/>
+          </a:effectRef>
+          <a:fontRef idx="minor">
+            <a:schemeClr val="dk1"/>
+          </a:fontRef>
+        </p:style>
+        <p:txBody>
+          <a:bodyPr vert="vert270" rtlCol="0" anchor="ctr"/>
+          <a:lstStyle/>
+          <a:p>
+            <a:pPr algn="ctr"/>
+            <a:r>
+              <a:rPr lang="fi-FI" dirty="0"/>
+              <a:t>3</a:t>
+            </a:r>
+          </a:p>
+        </p:txBody>
+      </p:sp>
+      <p:sp>
+        <p:nvSpPr>
+          <p:cNvPr id="50" name="Tasakylkinen kolmio 49">
+            <a:extLst>
+              <a:ext uri="{FF2B5EF4-FFF2-40B4-BE49-F238E27FC236}">
+                <a16:creationId xmlns:a16="http://schemas.microsoft.com/office/drawing/2014/main" id="{7251847E-9189-44C2-8A96-6778C7B651B7}"/>
+              </a:ext>
+            </a:extLst>
+          </p:cNvPr>
+          <p:cNvSpPr/>
+          <p:nvPr/>
+        </p:nvSpPr>
+        <p:spPr>
+          <a:xfrm rot="5400000">
+            <a:off x="6358251" y="1327028"/>
+            <a:ext cx="328467" cy="613811"/>
+          </a:xfrm>
+          <a:prstGeom prst="triangle">
+            <a:avLst>
+              <a:gd name="adj" fmla="val 51325"/>
+            </a:avLst>
+          </a:prstGeom>
+        </p:spPr>
+        <p:style>
+          <a:lnRef idx="2">
+            <a:schemeClr val="accent6"/>
+          </a:lnRef>
+          <a:fillRef idx="1">
+            <a:schemeClr val="lt1"/>
+          </a:fillRef>
+          <a:effectRef idx="0">
+            <a:schemeClr val="accent6"/>
+          </a:effectRef>
+          <a:fontRef idx="minor">
+            <a:schemeClr val="dk1"/>
+          </a:fontRef>
+        </p:style>
+        <p:txBody>
+          <a:bodyPr vert="vert270" rtlCol="0" anchor="ctr"/>
+          <a:lstStyle/>
+          <a:p>
+            <a:pPr algn="ctr"/>
+            <a:r>
+              <a:rPr lang="fi-FI" dirty="0"/>
+              <a:t>3</a:t>
+            </a:r>
+          </a:p>
+        </p:txBody>
+      </p:sp>
+      <p:sp>
+        <p:nvSpPr>
+          <p:cNvPr id="51" name="Vuokaavio: Prosessi 50">
+            <a:extLst>
+              <a:ext uri="{FF2B5EF4-FFF2-40B4-BE49-F238E27FC236}">
+                <a16:creationId xmlns:a16="http://schemas.microsoft.com/office/drawing/2014/main" id="{F1EE6690-9663-403C-B10F-92B09E0A6438}"/>
+              </a:ext>
+            </a:extLst>
+          </p:cNvPr>
+          <p:cNvSpPr/>
+          <p:nvPr/>
+        </p:nvSpPr>
+        <p:spPr>
+          <a:xfrm>
+            <a:off x="8630183" y="2254622"/>
+            <a:ext cx="1693950" cy="718818"/>
+          </a:xfrm>
+          <a:prstGeom prst="flowChartProcess">
+            <a:avLst/>
+          </a:prstGeom>
+          <a:solidFill>
+            <a:schemeClr val="accent5">
+              <a:lumMod val="20000"/>
+              <a:lumOff val="80000"/>
+            </a:schemeClr>
+          </a:solidFill>
+        </p:spPr>
+        <p:style>
+          <a:lnRef idx="2">
+            <a:schemeClr val="accent6"/>
+          </a:lnRef>
+          <a:fillRef idx="1">
+            <a:schemeClr val="lt1"/>
+          </a:fillRef>
+          <a:effectRef idx="0">
+            <a:schemeClr val="accent6"/>
+          </a:effectRef>
+          <a:fontRef idx="minor">
+            <a:schemeClr val="dk1"/>
+          </a:fontRef>
+        </p:style>
+        <p:txBody>
+          <a:bodyPr rtlCol="0" anchor="ctr"/>
+          <a:lstStyle/>
+          <a:p>
+            <a:pPr algn="ctr"/>
+            <a:r>
+              <a:rPr lang="fi-FI" dirty="0" err="1"/>
+              <a:t>Off</a:t>
+            </a:r>
+            <a:r>
+              <a:rPr lang="fi-FI" dirty="0"/>
+              <a:t>(-3) </a:t>
+            </a:r>
+          </a:p>
+          <a:p>
+            <a:pPr algn="ctr"/>
+            <a:r>
+              <a:rPr lang="fi-FI" dirty="0"/>
+              <a:t>RELAY OFF</a:t>
+            </a:r>
+          </a:p>
+        </p:txBody>
+      </p:sp>
+      <p:sp>
+        <p:nvSpPr>
+          <p:cNvPr id="54" name="Tasakylkinen kolmio 53">
+            <a:extLst>
+              <a:ext uri="{FF2B5EF4-FFF2-40B4-BE49-F238E27FC236}">
+                <a16:creationId xmlns:a16="http://schemas.microsoft.com/office/drawing/2014/main" id="{95EAAC4E-BD5C-428B-8CA2-E0B985F010D7}"/>
+              </a:ext>
+            </a:extLst>
+          </p:cNvPr>
+          <p:cNvSpPr/>
+          <p:nvPr/>
+        </p:nvSpPr>
+        <p:spPr>
+          <a:xfrm rot="5400000">
+            <a:off x="10179541" y="2400924"/>
+            <a:ext cx="717108" cy="427924"/>
+          </a:xfrm>
+          <a:prstGeom prst="triangle">
+            <a:avLst>
+              <a:gd name="adj" fmla="val 51325"/>
+            </a:avLst>
+          </a:prstGeom>
+        </p:spPr>
+        <p:style>
+          <a:lnRef idx="2">
+            <a:schemeClr val="accent6"/>
+          </a:lnRef>
+          <a:fillRef idx="1">
+            <a:schemeClr val="lt1"/>
+          </a:fillRef>
+          <a:effectRef idx="0">
+            <a:schemeClr val="accent6"/>
+          </a:effectRef>
+          <a:fontRef idx="minor">
+            <a:schemeClr val="dk1"/>
+          </a:fontRef>
+        </p:style>
+        <p:txBody>
+          <a:bodyPr vert="vert270" rtlCol="0" anchor="ctr"/>
+          <a:lstStyle/>
+          <a:p>
+            <a:pPr algn="ctr"/>
+            <a:r>
+              <a:rPr lang="fi-FI" dirty="0"/>
+              <a:t>2</a:t>
+            </a:r>
+          </a:p>
+        </p:txBody>
+      </p:sp>
+      <p:cxnSp>
+        <p:nvCxnSpPr>
+          <p:cNvPr id="8" name="Yhdistin: Kulma 7">
+            <a:extLst>
+              <a:ext uri="{FF2B5EF4-FFF2-40B4-BE49-F238E27FC236}">
+                <a16:creationId xmlns:a16="http://schemas.microsoft.com/office/drawing/2014/main" id="{16BD989D-9FB6-4700-B212-1FFE70AF8076}"/>
+              </a:ext>
+            </a:extLst>
+          </p:cNvPr>
+          <p:cNvCxnSpPr>
+            <a:cxnSpLocks/>
+            <a:stCxn id="49" idx="0"/>
+            <a:endCxn id="51" idx="0"/>
+          </p:cNvCxnSpPr>
+          <p:nvPr/>
+        </p:nvCxnSpPr>
+        <p:spPr>
+          <a:xfrm>
+            <a:off x="4803544" y="497423"/>
+            <a:ext cx="4673614" cy="1757199"/>
+          </a:xfrm>
+          <a:prstGeom prst="bentConnector2">
+            <a:avLst/>
+          </a:prstGeom>
+          <a:ln w="19050">
+            <a:tailEnd type="triangle"/>
+          </a:ln>
+        </p:spPr>
+        <p:style>
+          <a:lnRef idx="1">
+            <a:schemeClr val="accent1"/>
+          </a:lnRef>
+          <a:fillRef idx="0">
+            <a:schemeClr val="accent1"/>
+          </a:fillRef>
+          <a:effectRef idx="0">
+            <a:schemeClr val="accent1"/>
+          </a:effectRef>
+          <a:fontRef idx="minor">
+            <a:schemeClr val="tx1"/>
+          </a:fontRef>
+        </p:style>
+      </p:cxnSp>
+      <p:cxnSp>
+        <p:nvCxnSpPr>
+          <p:cNvPr id="13" name="Suora nuoliyhdysviiva 12">
+            <a:extLst>
+              <a:ext uri="{FF2B5EF4-FFF2-40B4-BE49-F238E27FC236}">
+                <a16:creationId xmlns:a16="http://schemas.microsoft.com/office/drawing/2014/main" id="{E7364C05-771F-49E3-8A51-D2B6C114928F}"/>
+              </a:ext>
+            </a:extLst>
+          </p:cNvPr>
+          <p:cNvCxnSpPr>
+            <a:cxnSpLocks/>
+            <a:stCxn id="50" idx="0"/>
+          </p:cNvCxnSpPr>
+          <p:nvPr/>
+        </p:nvCxnSpPr>
+        <p:spPr>
+          <a:xfrm flipV="1">
+            <a:off x="6829390" y="1614453"/>
+            <a:ext cx="2647768" cy="23833"/>
+          </a:xfrm>
+          <a:prstGeom prst="straightConnector1">
+            <a:avLst/>
+          </a:prstGeom>
+          <a:ln w="19050">
+            <a:tailEnd type="triangle"/>
+          </a:ln>
+        </p:spPr>
+        <p:style>
+          <a:lnRef idx="1">
+            <a:schemeClr val="accent1"/>
+          </a:lnRef>
+          <a:fillRef idx="0">
+            <a:schemeClr val="accent1"/>
+          </a:fillRef>
+          <a:effectRef idx="0">
+            <a:schemeClr val="accent1"/>
+          </a:effectRef>
+          <a:fontRef idx="minor">
+            <a:schemeClr val="tx1"/>
+          </a:fontRef>
+        </p:style>
+      </p:cxnSp>
+      <p:cxnSp>
+        <p:nvCxnSpPr>
+          <p:cNvPr id="21" name="Suora nuoliyhdysviiva 20">
+            <a:extLst>
+              <a:ext uri="{FF2B5EF4-FFF2-40B4-BE49-F238E27FC236}">
+                <a16:creationId xmlns:a16="http://schemas.microsoft.com/office/drawing/2014/main" id="{4853092D-3296-4DDE-BEC9-99986D3CB191}"/>
+              </a:ext>
+            </a:extLst>
+          </p:cNvPr>
+          <p:cNvCxnSpPr>
+            <a:cxnSpLocks/>
+            <a:stCxn id="54" idx="0"/>
+          </p:cNvCxnSpPr>
+          <p:nvPr/>
+        </p:nvCxnSpPr>
+        <p:spPr>
+          <a:xfrm>
+            <a:off x="10752057" y="2624388"/>
+            <a:ext cx="792358" cy="0"/>
+          </a:xfrm>
+          <a:prstGeom prst="straightConnector1">
+            <a:avLst/>
+          </a:prstGeom>
+          <a:ln w="19050">
+            <a:tailEnd type="triangle"/>
+          </a:ln>
+        </p:spPr>
+        <p:style>
+          <a:lnRef idx="1">
+            <a:schemeClr val="accent1"/>
+          </a:lnRef>
+          <a:fillRef idx="0">
+            <a:schemeClr val="accent1"/>
+          </a:fillRef>
+          <a:effectRef idx="0">
+            <a:schemeClr val="accent1"/>
+          </a:effectRef>
+          <a:fontRef idx="minor">
+            <a:schemeClr val="tx1"/>
+          </a:fontRef>
+        </p:style>
+      </p:cxnSp>
+      <p:sp>
+        <p:nvSpPr>
+          <p:cNvPr id="64" name="Tekstiruutu 63">
+            <a:extLst>
+              <a:ext uri="{FF2B5EF4-FFF2-40B4-BE49-F238E27FC236}">
+                <a16:creationId xmlns:a16="http://schemas.microsoft.com/office/drawing/2014/main" id="{C045F270-9ADD-46F3-9933-88C8F52172B4}"/>
+              </a:ext>
+            </a:extLst>
+          </p:cNvPr>
+          <p:cNvSpPr txBox="1"/>
+          <p:nvPr/>
+        </p:nvSpPr>
+        <p:spPr>
+          <a:xfrm>
+            <a:off x="10540177" y="1322711"/>
+            <a:ext cx="1491044" cy="1200329"/>
+          </a:xfrm>
+          <a:prstGeom prst="rect">
+            <a:avLst/>
+          </a:prstGeom>
+          <a:noFill/>
+        </p:spPr>
+        <p:txBody>
+          <a:bodyPr wrap="square" rtlCol="0">
+            <a:spAutoFit/>
+          </a:bodyPr>
+          <a:lstStyle/>
+          <a:p>
+            <a:r>
+              <a:rPr lang="fi-FI" dirty="0" err="1"/>
+              <a:t>OutdoorT</a:t>
+            </a:r>
+            <a:r>
+              <a:rPr lang="fi-FI" dirty="0"/>
+              <a:t> </a:t>
+            </a:r>
+            <a:r>
+              <a:rPr lang="fi-FI" dirty="0" err="1"/>
+              <a:t>enables</a:t>
+            </a:r>
+            <a:r>
+              <a:rPr lang="fi-FI" dirty="0"/>
+              <a:t>  </a:t>
+            </a:r>
+            <a:r>
+              <a:rPr lang="fi-FI" dirty="0" err="1"/>
+              <a:t>defrost</a:t>
+            </a:r>
+            <a:r>
+              <a:rPr lang="fi-FI" dirty="0"/>
+              <a:t> </a:t>
+            </a:r>
+            <a:r>
+              <a:rPr lang="fi-FI" dirty="0" err="1"/>
+              <a:t>hacking</a:t>
+            </a:r>
+            <a:endParaRPr lang="fi-FI" dirty="0"/>
+          </a:p>
+        </p:txBody>
+      </p:sp>
+      <p:sp>
+        <p:nvSpPr>
+          <p:cNvPr id="69" name="Tekstiruutu 68">
+            <a:extLst>
+              <a:ext uri="{FF2B5EF4-FFF2-40B4-BE49-F238E27FC236}">
+                <a16:creationId xmlns:a16="http://schemas.microsoft.com/office/drawing/2014/main" id="{66E0D612-098F-4653-A3D9-F9ED33C4C2E0}"/>
+              </a:ext>
+            </a:extLst>
+          </p:cNvPr>
+          <p:cNvSpPr txBox="1"/>
+          <p:nvPr/>
+        </p:nvSpPr>
+        <p:spPr>
+          <a:xfrm>
+            <a:off x="8388529" y="1262649"/>
+            <a:ext cx="2073181" cy="646331"/>
+          </a:xfrm>
+          <a:prstGeom prst="rect">
+            <a:avLst/>
+          </a:prstGeom>
+          <a:noFill/>
+        </p:spPr>
+        <p:txBody>
+          <a:bodyPr wrap="square" rtlCol="0">
+            <a:spAutoFit/>
+          </a:bodyPr>
+          <a:lstStyle/>
+          <a:p>
+            <a:r>
+              <a:rPr lang="fi-FI" dirty="0" err="1"/>
+              <a:t>OutdoorT</a:t>
+            </a:r>
+            <a:r>
+              <a:rPr lang="fi-FI" dirty="0"/>
+              <a:t> </a:t>
+            </a:r>
+            <a:r>
+              <a:rPr lang="fi-FI" dirty="0" err="1"/>
+              <a:t>disables</a:t>
+            </a:r>
+            <a:r>
+              <a:rPr lang="fi-FI" dirty="0"/>
+              <a:t>  </a:t>
+            </a:r>
+            <a:r>
+              <a:rPr lang="fi-FI" dirty="0" err="1"/>
+              <a:t>defrost</a:t>
+            </a:r>
+            <a:r>
+              <a:rPr lang="fi-FI" dirty="0"/>
+              <a:t> </a:t>
+            </a:r>
+            <a:r>
+              <a:rPr lang="fi-FI" dirty="0" err="1"/>
+              <a:t>hacking</a:t>
+            </a:r>
+            <a:endParaRPr lang="fi-FI" dirty="0"/>
+          </a:p>
+        </p:txBody>
+      </p:sp>
+      <p:sp>
+        <p:nvSpPr>
+          <p:cNvPr id="71" name="Tekstiruutu 70">
+            <a:extLst>
+              <a:ext uri="{FF2B5EF4-FFF2-40B4-BE49-F238E27FC236}">
+                <a16:creationId xmlns:a16="http://schemas.microsoft.com/office/drawing/2014/main" id="{7BD0CB07-FBE9-44BA-83DA-172F048038C6}"/>
+              </a:ext>
+            </a:extLst>
+          </p:cNvPr>
+          <p:cNvSpPr txBox="1"/>
+          <p:nvPr/>
+        </p:nvSpPr>
+        <p:spPr>
+          <a:xfrm>
+            <a:off x="6315348" y="157760"/>
+            <a:ext cx="2073181" cy="646331"/>
+          </a:xfrm>
+          <a:prstGeom prst="rect">
+            <a:avLst/>
+          </a:prstGeom>
+          <a:noFill/>
+        </p:spPr>
+        <p:txBody>
+          <a:bodyPr wrap="square" rtlCol="0">
+            <a:spAutoFit/>
+          </a:bodyPr>
+          <a:lstStyle/>
+          <a:p>
+            <a:r>
+              <a:rPr lang="fi-FI" dirty="0" err="1"/>
+              <a:t>OutdoorT</a:t>
+            </a:r>
+            <a:r>
+              <a:rPr lang="fi-FI" dirty="0"/>
+              <a:t> </a:t>
+            </a:r>
+            <a:r>
+              <a:rPr lang="fi-FI" dirty="0" err="1"/>
+              <a:t>disables</a:t>
+            </a:r>
+            <a:r>
+              <a:rPr lang="fi-FI" dirty="0"/>
+              <a:t>  </a:t>
+            </a:r>
+            <a:r>
+              <a:rPr lang="fi-FI" dirty="0" err="1"/>
+              <a:t>defrost</a:t>
+            </a:r>
+            <a:r>
+              <a:rPr lang="fi-FI" dirty="0"/>
+              <a:t> </a:t>
+            </a:r>
+            <a:r>
+              <a:rPr lang="fi-FI" dirty="0" err="1"/>
+              <a:t>hacking</a:t>
+            </a:r>
+            <a:endParaRPr lang="fi-FI" dirty="0"/>
+          </a:p>
+        </p:txBody>
+      </p:sp>
     </p:spTree>
     <p:extLst>
       <p:ext uri="{BB962C8B-B14F-4D97-AF65-F5344CB8AC3E}">

</xml_diff>